<commit_message>
Diagram updated with relays etc.
</commit_message>
<xml_diff>
--- a/Diagram.pptx
+++ b/Diagram.pptx
@@ -8,6 +8,7 @@
     <p:sldId id="256" r:id="rId2"/>
     <p:sldId id="257" r:id="rId3"/>
     <p:sldId id="258" r:id="rId4"/>
+    <p:sldId id="259" r:id="rId5"/>
   </p:sldIdLst>
   <p:sldSz cx="9144000" cy="6858000" type="screen4x3"/>
   <p:notesSz cx="6858000" cy="9144000"/>
@@ -108,7 +109,7 @@
   </p:defaultTextStyle>
   <p:extLst>
     <p:ext uri="{EFAFB233-063F-42B5-8137-9DF3F51BA10A}">
-      <p15:sldGuideLst xmlns:p15="http://schemas.microsoft.com/office/powerpoint/2012/main">
+      <p15:sldGuideLst xmlns:p15="http://schemas.microsoft.com/office/powerpoint/2012/main" xmlns="">
         <p15:guide id="1" orient="horz" pos="2160">
           <p15:clr>
             <a:srgbClr val="A4A3A4"/>
@@ -305,7 +306,7 @@
             <a:fld id="{1D8BD707-D9CF-40AE-B4C6-C98DA3205C09}" type="datetimeFigureOut">
               <a:rPr lang="en-US" smtClean="0"/>
               <a:pPr/>
-              <a:t>10/12/2023</a:t>
+              <a:t>9/16/2024</a:t>
             </a:fld>
             <a:endParaRPr lang="en-US"/>
           </a:p>
@@ -470,7 +471,7 @@
             <a:fld id="{1D8BD707-D9CF-40AE-B4C6-C98DA3205C09}" type="datetimeFigureOut">
               <a:rPr lang="en-US" smtClean="0"/>
               <a:pPr/>
-              <a:t>10/12/2023</a:t>
+              <a:t>9/16/2024</a:t>
             </a:fld>
             <a:endParaRPr lang="en-US"/>
           </a:p>
@@ -645,7 +646,7 @@
             <a:fld id="{1D8BD707-D9CF-40AE-B4C6-C98DA3205C09}" type="datetimeFigureOut">
               <a:rPr lang="en-US" smtClean="0"/>
               <a:pPr/>
-              <a:t>10/12/2023</a:t>
+              <a:t>9/16/2024</a:t>
             </a:fld>
             <a:endParaRPr lang="en-US"/>
           </a:p>
@@ -810,7 +811,7 @@
             <a:fld id="{1D8BD707-D9CF-40AE-B4C6-C98DA3205C09}" type="datetimeFigureOut">
               <a:rPr lang="en-US" smtClean="0"/>
               <a:pPr/>
-              <a:t>10/12/2023</a:t>
+              <a:t>9/16/2024</a:t>
             </a:fld>
             <a:endParaRPr lang="en-US"/>
           </a:p>
@@ -1052,7 +1053,7 @@
             <a:fld id="{1D8BD707-D9CF-40AE-B4C6-C98DA3205C09}" type="datetimeFigureOut">
               <a:rPr lang="en-US" smtClean="0"/>
               <a:pPr/>
-              <a:t>10/12/2023</a:t>
+              <a:t>9/16/2024</a:t>
             </a:fld>
             <a:endParaRPr lang="en-US"/>
           </a:p>
@@ -1334,7 +1335,7 @@
             <a:fld id="{1D8BD707-D9CF-40AE-B4C6-C98DA3205C09}" type="datetimeFigureOut">
               <a:rPr lang="en-US" smtClean="0"/>
               <a:pPr/>
-              <a:t>10/12/2023</a:t>
+              <a:t>9/16/2024</a:t>
             </a:fld>
             <a:endParaRPr lang="en-US"/>
           </a:p>
@@ -1750,7 +1751,7 @@
             <a:fld id="{1D8BD707-D9CF-40AE-B4C6-C98DA3205C09}" type="datetimeFigureOut">
               <a:rPr lang="en-US" smtClean="0"/>
               <a:pPr/>
-              <a:t>10/12/2023</a:t>
+              <a:t>9/16/2024</a:t>
             </a:fld>
             <a:endParaRPr lang="en-US"/>
           </a:p>
@@ -1864,7 +1865,7 @@
             <a:fld id="{1D8BD707-D9CF-40AE-B4C6-C98DA3205C09}" type="datetimeFigureOut">
               <a:rPr lang="en-US" smtClean="0"/>
               <a:pPr/>
-              <a:t>10/12/2023</a:t>
+              <a:t>9/16/2024</a:t>
             </a:fld>
             <a:endParaRPr lang="en-US"/>
           </a:p>
@@ -1956,7 +1957,7 @@
             <a:fld id="{1D8BD707-D9CF-40AE-B4C6-C98DA3205C09}" type="datetimeFigureOut">
               <a:rPr lang="en-US" smtClean="0"/>
               <a:pPr/>
-              <a:t>10/12/2023</a:t>
+              <a:t>9/16/2024</a:t>
             </a:fld>
             <a:endParaRPr lang="en-US"/>
           </a:p>
@@ -2228,7 +2229,7 @@
             <a:fld id="{1D8BD707-D9CF-40AE-B4C6-C98DA3205C09}" type="datetimeFigureOut">
               <a:rPr lang="en-US" smtClean="0"/>
               <a:pPr/>
-              <a:t>10/12/2023</a:t>
+              <a:t>9/16/2024</a:t>
             </a:fld>
             <a:endParaRPr lang="en-US"/>
           </a:p>
@@ -2477,7 +2478,7 @@
             <a:fld id="{1D8BD707-D9CF-40AE-B4C6-C98DA3205C09}" type="datetimeFigureOut">
               <a:rPr lang="en-US" smtClean="0"/>
               <a:pPr/>
-              <a:t>10/12/2023</a:t>
+              <a:t>9/16/2024</a:t>
             </a:fld>
             <a:endParaRPr lang="en-US"/>
           </a:p>
@@ -2685,7 +2686,7 @@
             <a:fld id="{1D8BD707-D9CF-40AE-B4C6-C98DA3205C09}" type="datetimeFigureOut">
               <a:rPr lang="en-US" smtClean="0"/>
               <a:pPr/>
-              <a:t>10/12/2023</a:t>
+              <a:t>9/16/2024</a:t>
             </a:fld>
             <a:endParaRPr lang="en-US"/>
           </a:p>
@@ -5049,7 +5050,7 @@
           <p:cNvPr id="3" name="Straight Connector 2">
             <a:extLst>
               <a:ext uri="{FF2B5EF4-FFF2-40B4-BE49-F238E27FC236}">
-                <a16:creationId xmlns:a16="http://schemas.microsoft.com/office/drawing/2014/main" id="{576723D5-C875-83D8-4E57-4E9EB941DFA8}"/>
+                <a16:creationId xmlns:a16="http://schemas.microsoft.com/office/drawing/2014/main" xmlns="" id="{576723D5-C875-83D8-4E57-4E9EB941DFA8}"/>
               </a:ext>
             </a:extLst>
           </p:cNvPr>
@@ -5090,7 +5091,7 @@
           <p:cNvPr id="5" name="Straight Connector 4">
             <a:extLst>
               <a:ext uri="{FF2B5EF4-FFF2-40B4-BE49-F238E27FC236}">
-                <a16:creationId xmlns:a16="http://schemas.microsoft.com/office/drawing/2014/main" id="{FE28DF91-3789-901B-5087-6AC47B0ADEED}"/>
+                <a16:creationId xmlns:a16="http://schemas.microsoft.com/office/drawing/2014/main" xmlns="" id="{FE28DF91-3789-901B-5087-6AC47B0ADEED}"/>
               </a:ext>
             </a:extLst>
           </p:cNvPr>
@@ -6962,7 +6963,7 @@
           <p:cNvPr id="3" name="Rectangle 2">
             <a:extLst>
               <a:ext uri="{FF2B5EF4-FFF2-40B4-BE49-F238E27FC236}">
-                <a16:creationId xmlns:a16="http://schemas.microsoft.com/office/drawing/2014/main" id="{FFEF0871-0309-1572-391B-5985ABE4CE01}"/>
+                <a16:creationId xmlns:a16="http://schemas.microsoft.com/office/drawing/2014/main" xmlns="" id="{FFEF0871-0309-1572-391B-5985ABE4CE01}"/>
               </a:ext>
             </a:extLst>
           </p:cNvPr>
@@ -7016,7 +7017,7 @@
           <p:cNvPr id="5" name="Rectangle 4">
             <a:extLst>
               <a:ext uri="{FF2B5EF4-FFF2-40B4-BE49-F238E27FC236}">
-                <a16:creationId xmlns:a16="http://schemas.microsoft.com/office/drawing/2014/main" id="{22B14C85-B862-AC4B-4E24-B2666F986BDA}"/>
+                <a16:creationId xmlns:a16="http://schemas.microsoft.com/office/drawing/2014/main" xmlns="" id="{22B14C85-B862-AC4B-4E24-B2666F986BDA}"/>
               </a:ext>
             </a:extLst>
           </p:cNvPr>
@@ -7070,7 +7071,7 @@
           <p:cNvPr id="2" name="TextBox 1">
             <a:extLst>
               <a:ext uri="{FF2B5EF4-FFF2-40B4-BE49-F238E27FC236}">
-                <a16:creationId xmlns:a16="http://schemas.microsoft.com/office/drawing/2014/main" id="{F62B988E-ABD2-B6BD-8DE5-484D49EFC299}"/>
+                <a16:creationId xmlns:a16="http://schemas.microsoft.com/office/drawing/2014/main" xmlns="" id="{F62B988E-ABD2-B6BD-8DE5-484D49EFC299}"/>
               </a:ext>
             </a:extLst>
           </p:cNvPr>
@@ -7106,7 +7107,7 @@
           <p:cNvPr id="6" name="TextBox 5">
             <a:extLst>
               <a:ext uri="{FF2B5EF4-FFF2-40B4-BE49-F238E27FC236}">
-                <a16:creationId xmlns:a16="http://schemas.microsoft.com/office/drawing/2014/main" id="{032073D1-5C86-096E-E34F-E839D76407AB}"/>
+                <a16:creationId xmlns:a16="http://schemas.microsoft.com/office/drawing/2014/main" xmlns="" id="{032073D1-5C86-096E-E34F-E839D76407AB}"/>
               </a:ext>
             </a:extLst>
           </p:cNvPr>
@@ -7142,7 +7143,7 @@
           <p:cNvPr id="7" name="Straight Connector 6">
             <a:extLst>
               <a:ext uri="{FF2B5EF4-FFF2-40B4-BE49-F238E27FC236}">
-                <a16:creationId xmlns:a16="http://schemas.microsoft.com/office/drawing/2014/main" id="{31790475-B929-D740-4390-015E0BD2F48D}"/>
+                <a16:creationId xmlns:a16="http://schemas.microsoft.com/office/drawing/2014/main" xmlns="" id="{31790475-B929-D740-4390-015E0BD2F48D}"/>
               </a:ext>
             </a:extLst>
           </p:cNvPr>
@@ -7183,7 +7184,7 @@
           <p:cNvPr id="8" name="Straight Connector 7">
             <a:extLst>
               <a:ext uri="{FF2B5EF4-FFF2-40B4-BE49-F238E27FC236}">
-                <a16:creationId xmlns:a16="http://schemas.microsoft.com/office/drawing/2014/main" id="{46648A93-25ED-D0F3-F7B8-144008FB16B7}"/>
+                <a16:creationId xmlns:a16="http://schemas.microsoft.com/office/drawing/2014/main" xmlns="" id="{46648A93-25ED-D0F3-F7B8-144008FB16B7}"/>
               </a:ext>
             </a:extLst>
           </p:cNvPr>
@@ -7224,7 +7225,7 @@
     </p:spTree>
     <p:extLst>
       <p:ext uri="{BB962C8B-B14F-4D97-AF65-F5344CB8AC3E}">
-        <p14:creationId xmlns:p14="http://schemas.microsoft.com/office/powerpoint/2010/main" val="1879124536"/>
+        <p14:creationId xmlns:p14="http://schemas.microsoft.com/office/powerpoint/2010/main" xmlns="" val="1879124536"/>
       </p:ext>
     </p:extLst>
   </p:cSld>
@@ -8514,7 +8515,7 @@
           <p:cNvPr id="3" name="Rectangle 2">
             <a:extLst>
               <a:ext uri="{FF2B5EF4-FFF2-40B4-BE49-F238E27FC236}">
-                <a16:creationId xmlns:a16="http://schemas.microsoft.com/office/drawing/2014/main" id="{FFEF0871-0309-1572-391B-5985ABE4CE01}"/>
+                <a16:creationId xmlns:a16="http://schemas.microsoft.com/office/drawing/2014/main" xmlns="" id="{FFEF0871-0309-1572-391B-5985ABE4CE01}"/>
               </a:ext>
             </a:extLst>
           </p:cNvPr>
@@ -8568,7 +8569,7 @@
           <p:cNvPr id="5" name="Rectangle 4">
             <a:extLst>
               <a:ext uri="{FF2B5EF4-FFF2-40B4-BE49-F238E27FC236}">
-                <a16:creationId xmlns:a16="http://schemas.microsoft.com/office/drawing/2014/main" id="{22B14C85-B862-AC4B-4E24-B2666F986BDA}"/>
+                <a16:creationId xmlns:a16="http://schemas.microsoft.com/office/drawing/2014/main" xmlns="" id="{22B14C85-B862-AC4B-4E24-B2666F986BDA}"/>
               </a:ext>
             </a:extLst>
           </p:cNvPr>
@@ -8622,7 +8623,7 @@
           <p:cNvPr id="2" name="TextBox 1">
             <a:extLst>
               <a:ext uri="{FF2B5EF4-FFF2-40B4-BE49-F238E27FC236}">
-                <a16:creationId xmlns:a16="http://schemas.microsoft.com/office/drawing/2014/main" id="{F62B988E-ABD2-B6BD-8DE5-484D49EFC299}"/>
+                <a16:creationId xmlns:a16="http://schemas.microsoft.com/office/drawing/2014/main" xmlns="" id="{F62B988E-ABD2-B6BD-8DE5-484D49EFC299}"/>
               </a:ext>
             </a:extLst>
           </p:cNvPr>
@@ -8658,7 +8659,7 @@
           <p:cNvPr id="6" name="TextBox 5">
             <a:extLst>
               <a:ext uri="{FF2B5EF4-FFF2-40B4-BE49-F238E27FC236}">
-                <a16:creationId xmlns:a16="http://schemas.microsoft.com/office/drawing/2014/main" id="{032073D1-5C86-096E-E34F-E839D76407AB}"/>
+                <a16:creationId xmlns:a16="http://schemas.microsoft.com/office/drawing/2014/main" xmlns="" id="{032073D1-5C86-096E-E34F-E839D76407AB}"/>
               </a:ext>
             </a:extLst>
           </p:cNvPr>
@@ -8694,7 +8695,7 @@
           <p:cNvPr id="18" name="Picture 17">
             <a:extLst>
               <a:ext uri="{FF2B5EF4-FFF2-40B4-BE49-F238E27FC236}">
-                <a16:creationId xmlns:a16="http://schemas.microsoft.com/office/drawing/2014/main" id="{AB95657D-99F1-D34C-92B6-10255E6E567F}"/>
+                <a16:creationId xmlns:a16="http://schemas.microsoft.com/office/drawing/2014/main" xmlns="" id="{AB95657D-99F1-D34C-92B6-10255E6E567F}"/>
               </a:ext>
             </a:extLst>
           </p:cNvPr>
@@ -8704,7 +8705,7 @@
           <p:nvPr/>
         </p:nvPicPr>
         <p:blipFill>
-          <a:blip r:embed="rId10"/>
+          <a:blip r:embed="rId10" cstate="print"/>
           <a:stretch>
             <a:fillRect/>
           </a:stretch>
@@ -8724,7 +8725,7 @@
           <p:cNvPr id="20" name="Picture 19">
             <a:extLst>
               <a:ext uri="{FF2B5EF4-FFF2-40B4-BE49-F238E27FC236}">
-                <a16:creationId xmlns:a16="http://schemas.microsoft.com/office/drawing/2014/main" id="{C09DE846-15F0-FDAB-B4C7-57DC529AD9DF}"/>
+                <a16:creationId xmlns:a16="http://schemas.microsoft.com/office/drawing/2014/main" xmlns="" id="{C09DE846-15F0-FDAB-B4C7-57DC529AD9DF}"/>
               </a:ext>
             </a:extLst>
           </p:cNvPr>
@@ -8734,7 +8735,7 @@
           <p:nvPr/>
         </p:nvPicPr>
         <p:blipFill>
-          <a:blip r:embed="rId10"/>
+          <a:blip r:embed="rId10" cstate="print"/>
           <a:stretch>
             <a:fillRect/>
           </a:stretch>
@@ -8754,7 +8755,7 @@
           <p:cNvPr id="22" name="Picture 21">
             <a:extLst>
               <a:ext uri="{FF2B5EF4-FFF2-40B4-BE49-F238E27FC236}">
-                <a16:creationId xmlns:a16="http://schemas.microsoft.com/office/drawing/2014/main" id="{68CFDBB9-9A7A-C1DC-EDEF-AB162E041FAE}"/>
+                <a16:creationId xmlns:a16="http://schemas.microsoft.com/office/drawing/2014/main" xmlns="" id="{68CFDBB9-9A7A-C1DC-EDEF-AB162E041FAE}"/>
               </a:ext>
             </a:extLst>
           </p:cNvPr>
@@ -8764,7 +8765,7 @@
           <p:nvPr/>
         </p:nvPicPr>
         <p:blipFill>
-          <a:blip r:embed="rId10"/>
+          <a:blip r:embed="rId10" cstate="print"/>
           <a:stretch>
             <a:fillRect/>
           </a:stretch>
@@ -8784,7 +8785,7 @@
           <p:cNvPr id="23" name="Picture 22">
             <a:extLst>
               <a:ext uri="{FF2B5EF4-FFF2-40B4-BE49-F238E27FC236}">
-                <a16:creationId xmlns:a16="http://schemas.microsoft.com/office/drawing/2014/main" id="{69D68710-3B44-B909-ADAC-FA9688495BE1}"/>
+                <a16:creationId xmlns:a16="http://schemas.microsoft.com/office/drawing/2014/main" xmlns="" id="{69D68710-3B44-B909-ADAC-FA9688495BE1}"/>
               </a:ext>
             </a:extLst>
           </p:cNvPr>
@@ -8794,7 +8795,7 @@
           <p:nvPr/>
         </p:nvPicPr>
         <p:blipFill>
-          <a:blip r:embed="rId10"/>
+          <a:blip r:embed="rId10" cstate="print"/>
           <a:stretch>
             <a:fillRect/>
           </a:stretch>
@@ -8814,7 +8815,7 @@
           <p:cNvPr id="24" name="TextBox 23">
             <a:extLst>
               <a:ext uri="{FF2B5EF4-FFF2-40B4-BE49-F238E27FC236}">
-                <a16:creationId xmlns:a16="http://schemas.microsoft.com/office/drawing/2014/main" id="{6491949F-0B8B-D8B9-30F5-0C2986FAC5A2}"/>
+                <a16:creationId xmlns:a16="http://schemas.microsoft.com/office/drawing/2014/main" xmlns="" id="{6491949F-0B8B-D8B9-30F5-0C2986FAC5A2}"/>
               </a:ext>
             </a:extLst>
           </p:cNvPr>
@@ -8850,7 +8851,7 @@
           <p:cNvPr id="29" name="Straight Connector 28">
             <a:extLst>
               <a:ext uri="{FF2B5EF4-FFF2-40B4-BE49-F238E27FC236}">
-                <a16:creationId xmlns:a16="http://schemas.microsoft.com/office/drawing/2014/main" id="{0D49A566-5B7F-D34D-3E43-FE185127CCDB}"/>
+                <a16:creationId xmlns:a16="http://schemas.microsoft.com/office/drawing/2014/main" xmlns="" id="{0D49A566-5B7F-D34D-3E43-FE185127CCDB}"/>
               </a:ext>
             </a:extLst>
           </p:cNvPr>
@@ -8886,7 +8887,7 @@
           <p:cNvPr id="31" name="Straight Connector 30">
             <a:extLst>
               <a:ext uri="{FF2B5EF4-FFF2-40B4-BE49-F238E27FC236}">
-                <a16:creationId xmlns:a16="http://schemas.microsoft.com/office/drawing/2014/main" id="{26A481AF-3F70-BE61-B85D-BFCC35BD3BD6}"/>
+                <a16:creationId xmlns:a16="http://schemas.microsoft.com/office/drawing/2014/main" xmlns="" id="{26A481AF-3F70-BE61-B85D-BFCC35BD3BD6}"/>
               </a:ext>
             </a:extLst>
           </p:cNvPr>
@@ -8924,7 +8925,7 @@
           <p:cNvPr id="34" name="Straight Connector 33">
             <a:extLst>
               <a:ext uri="{FF2B5EF4-FFF2-40B4-BE49-F238E27FC236}">
-                <a16:creationId xmlns:a16="http://schemas.microsoft.com/office/drawing/2014/main" id="{3D6012E6-6D5B-F289-961F-FA011B17512A}"/>
+                <a16:creationId xmlns:a16="http://schemas.microsoft.com/office/drawing/2014/main" xmlns="" id="{3D6012E6-6D5B-F289-961F-FA011B17512A}"/>
               </a:ext>
             </a:extLst>
           </p:cNvPr>
@@ -8962,7 +8963,7 @@
           <p:cNvPr id="47" name="Straight Connector 46">
             <a:extLst>
               <a:ext uri="{FF2B5EF4-FFF2-40B4-BE49-F238E27FC236}">
-                <a16:creationId xmlns:a16="http://schemas.microsoft.com/office/drawing/2014/main" id="{0A4A8CBD-1219-8D50-33BA-F5FEF58F5650}"/>
+                <a16:creationId xmlns:a16="http://schemas.microsoft.com/office/drawing/2014/main" xmlns="" id="{0A4A8CBD-1219-8D50-33BA-F5FEF58F5650}"/>
               </a:ext>
             </a:extLst>
           </p:cNvPr>
@@ -9000,7 +9001,7 @@
           <p:cNvPr id="51" name="Straight Connector 50">
             <a:extLst>
               <a:ext uri="{FF2B5EF4-FFF2-40B4-BE49-F238E27FC236}">
-                <a16:creationId xmlns:a16="http://schemas.microsoft.com/office/drawing/2014/main" id="{09F998D2-8EDC-52C6-38C9-7F5A3EFAED1E}"/>
+                <a16:creationId xmlns:a16="http://schemas.microsoft.com/office/drawing/2014/main" xmlns="" id="{09F998D2-8EDC-52C6-38C9-7F5A3EFAED1E}"/>
               </a:ext>
             </a:extLst>
           </p:cNvPr>
@@ -9036,7 +9037,7 @@
           <p:cNvPr id="53" name="Straight Connector 52">
             <a:extLst>
               <a:ext uri="{FF2B5EF4-FFF2-40B4-BE49-F238E27FC236}">
-                <a16:creationId xmlns:a16="http://schemas.microsoft.com/office/drawing/2014/main" id="{F720A4A6-D647-0DFD-3852-25AB813A17B3}"/>
+                <a16:creationId xmlns:a16="http://schemas.microsoft.com/office/drawing/2014/main" xmlns="" id="{F720A4A6-D647-0DFD-3852-25AB813A17B3}"/>
               </a:ext>
             </a:extLst>
           </p:cNvPr>
@@ -9072,7 +9073,7 @@
           <p:cNvPr id="57" name="Straight Connector 56">
             <a:extLst>
               <a:ext uri="{FF2B5EF4-FFF2-40B4-BE49-F238E27FC236}">
-                <a16:creationId xmlns:a16="http://schemas.microsoft.com/office/drawing/2014/main" id="{67E3784E-FCEA-17AD-5D68-82183ABFD7DD}"/>
+                <a16:creationId xmlns:a16="http://schemas.microsoft.com/office/drawing/2014/main" xmlns="" id="{67E3784E-FCEA-17AD-5D68-82183ABFD7DD}"/>
               </a:ext>
             </a:extLst>
           </p:cNvPr>
@@ -9110,7 +9111,7 @@
           <p:cNvPr id="62" name="Straight Connector 61">
             <a:extLst>
               <a:ext uri="{FF2B5EF4-FFF2-40B4-BE49-F238E27FC236}">
-                <a16:creationId xmlns:a16="http://schemas.microsoft.com/office/drawing/2014/main" id="{7727660B-60D5-3134-195A-D379982C0FF6}"/>
+                <a16:creationId xmlns:a16="http://schemas.microsoft.com/office/drawing/2014/main" xmlns="" id="{7727660B-60D5-3134-195A-D379982C0FF6}"/>
               </a:ext>
             </a:extLst>
           </p:cNvPr>
@@ -9148,7 +9149,7 @@
           <p:cNvPr id="65" name="Straight Connector 64">
             <a:extLst>
               <a:ext uri="{FF2B5EF4-FFF2-40B4-BE49-F238E27FC236}">
-                <a16:creationId xmlns:a16="http://schemas.microsoft.com/office/drawing/2014/main" id="{DEB4620B-C2B2-E6D6-1CC5-53201B8269D8}"/>
+                <a16:creationId xmlns:a16="http://schemas.microsoft.com/office/drawing/2014/main" xmlns="" id="{DEB4620B-C2B2-E6D6-1CC5-53201B8269D8}"/>
               </a:ext>
             </a:extLst>
           </p:cNvPr>
@@ -9186,7 +9187,7 @@
           <p:cNvPr id="75" name="Straight Connector 74">
             <a:extLst>
               <a:ext uri="{FF2B5EF4-FFF2-40B4-BE49-F238E27FC236}">
-                <a16:creationId xmlns:a16="http://schemas.microsoft.com/office/drawing/2014/main" id="{3915A501-B812-0A5D-9C8B-3AE6E58C67BF}"/>
+                <a16:creationId xmlns:a16="http://schemas.microsoft.com/office/drawing/2014/main" xmlns="" id="{3915A501-B812-0A5D-9C8B-3AE6E58C67BF}"/>
               </a:ext>
             </a:extLst>
           </p:cNvPr>
@@ -9224,7 +9225,7 @@
           <p:cNvPr id="78" name="Straight Connector 77">
             <a:extLst>
               <a:ext uri="{FF2B5EF4-FFF2-40B4-BE49-F238E27FC236}">
-                <a16:creationId xmlns:a16="http://schemas.microsoft.com/office/drawing/2014/main" id="{862DE9C4-3ED2-79CE-4851-2EE67E8CB872}"/>
+                <a16:creationId xmlns:a16="http://schemas.microsoft.com/office/drawing/2014/main" xmlns="" id="{862DE9C4-3ED2-79CE-4851-2EE67E8CB872}"/>
               </a:ext>
             </a:extLst>
           </p:cNvPr>
@@ -9262,7 +9263,7 @@
           <p:cNvPr id="81" name="Straight Connector 80">
             <a:extLst>
               <a:ext uri="{FF2B5EF4-FFF2-40B4-BE49-F238E27FC236}">
-                <a16:creationId xmlns:a16="http://schemas.microsoft.com/office/drawing/2014/main" id="{E5458755-91D9-4DEF-B2C8-89F087D1CBA1}"/>
+                <a16:creationId xmlns:a16="http://schemas.microsoft.com/office/drawing/2014/main" xmlns="" id="{E5458755-91D9-4DEF-B2C8-89F087D1CBA1}"/>
               </a:ext>
             </a:extLst>
           </p:cNvPr>
@@ -9295,10 +9296,4465 @@
           </a:fontRef>
         </p:style>
       </p:cxnSp>
+      <p:cxnSp>
+        <p:nvCxnSpPr>
+          <p:cNvPr id="61" name="Straight Connector 60">
+            <a:extLst>
+              <a:ext uri="{FF2B5EF4-FFF2-40B4-BE49-F238E27FC236}">
+                <a16:creationId xmlns:a16="http://schemas.microsoft.com/office/drawing/2014/main" xmlns="" id="{31790475-B929-D740-4390-015E0BD2F48D}"/>
+              </a:ext>
+            </a:extLst>
+          </p:cNvPr>
+          <p:cNvCxnSpPr/>
+          <p:nvPr/>
+        </p:nvCxnSpPr>
+        <p:spPr>
+          <a:xfrm>
+            <a:off x="596900" y="1250950"/>
+            <a:ext cx="8162925" cy="4575175"/>
+          </a:xfrm>
+          <a:prstGeom prst="line">
+            <a:avLst/>
+          </a:prstGeom>
+          <a:ln w="104775">
+            <a:solidFill>
+              <a:schemeClr val="tx1"/>
+            </a:solidFill>
+          </a:ln>
+        </p:spPr>
+        <p:style>
+          <a:lnRef idx="1">
+            <a:schemeClr val="accent1"/>
+          </a:lnRef>
+          <a:fillRef idx="0">
+            <a:schemeClr val="accent1"/>
+          </a:fillRef>
+          <a:effectRef idx="0">
+            <a:schemeClr val="accent1"/>
+          </a:effectRef>
+          <a:fontRef idx="minor">
+            <a:schemeClr val="tx1"/>
+          </a:fontRef>
+        </p:style>
+      </p:cxnSp>
+      <p:cxnSp>
+        <p:nvCxnSpPr>
+          <p:cNvPr id="63" name="Straight Connector 62">
+            <a:extLst>
+              <a:ext uri="{FF2B5EF4-FFF2-40B4-BE49-F238E27FC236}">
+                <a16:creationId xmlns:a16="http://schemas.microsoft.com/office/drawing/2014/main" xmlns="" id="{46648A93-25ED-D0F3-F7B8-144008FB16B7}"/>
+              </a:ext>
+            </a:extLst>
+          </p:cNvPr>
+          <p:cNvCxnSpPr>
+            <a:cxnSpLocks/>
+          </p:cNvCxnSpPr>
+          <p:nvPr/>
+        </p:nvCxnSpPr>
+        <p:spPr>
+          <a:xfrm flipV="1">
+            <a:off x="546100" y="1364336"/>
+            <a:ext cx="8047038" cy="4228993"/>
+          </a:xfrm>
+          <a:prstGeom prst="line">
+            <a:avLst/>
+          </a:prstGeom>
+          <a:ln w="104775">
+            <a:solidFill>
+              <a:schemeClr val="tx1"/>
+            </a:solidFill>
+          </a:ln>
+        </p:spPr>
+        <p:style>
+          <a:lnRef idx="1">
+            <a:schemeClr val="accent1"/>
+          </a:lnRef>
+          <a:fillRef idx="0">
+            <a:schemeClr val="accent1"/>
+          </a:fillRef>
+          <a:effectRef idx="0">
+            <a:schemeClr val="accent1"/>
+          </a:effectRef>
+          <a:fontRef idx="minor">
+            <a:schemeClr val="tx1"/>
+          </a:fontRef>
+        </p:style>
+      </p:cxnSp>
     </p:spTree>
     <p:extLst>
       <p:ext uri="{BB962C8B-B14F-4D97-AF65-F5344CB8AC3E}">
-        <p14:creationId xmlns:p14="http://schemas.microsoft.com/office/powerpoint/2010/main" val="1004649057"/>
+        <p14:creationId xmlns:p14="http://schemas.microsoft.com/office/powerpoint/2010/main" xmlns="" val="1004649057"/>
+      </p:ext>
+    </p:extLst>
+  </p:cSld>
+  <p:clrMapOvr>
+    <a:masterClrMapping/>
+  </p:clrMapOvr>
+</p:sld>
+</file>
+
+<file path=ppt/slides/slide4.xml><?xml version="1.0" encoding="utf-8"?>
+<p:sld xmlns:a="http://schemas.openxmlformats.org/drawingml/2006/main" xmlns:r="http://schemas.openxmlformats.org/officeDocument/2006/relationships" xmlns:p="http://schemas.openxmlformats.org/presentationml/2006/main">
+  <p:cSld>
+    <p:spTree>
+      <p:nvGrpSpPr>
+        <p:cNvPr id="1" name=""/>
+        <p:cNvGrpSpPr/>
+        <p:nvPr/>
+      </p:nvGrpSpPr>
+      <p:grpSpPr>
+        <a:xfrm>
+          <a:off x="0" y="0"/>
+          <a:ext cx="0" cy="0"/>
+          <a:chOff x="0" y="0"/>
+          <a:chExt cx="0" cy="0"/>
+        </a:xfrm>
+      </p:grpSpPr>
+      <p:pic>
+        <p:nvPicPr>
+          <p:cNvPr id="192" name="Picture 15"/>
+          <p:cNvPicPr>
+            <a:picLocks noChangeAspect="1" noChangeArrowheads="1"/>
+          </p:cNvPicPr>
+          <p:nvPr/>
+        </p:nvPicPr>
+        <p:blipFill>
+          <a:blip r:embed="rId2" cstate="print"/>
+          <a:srcRect/>
+          <a:stretch>
+            <a:fillRect/>
+          </a:stretch>
+        </p:blipFill>
+        <p:spPr bwMode="auto">
+          <a:xfrm>
+            <a:off x="2038351" y="3104344"/>
+            <a:ext cx="1387474" cy="935420"/>
+          </a:xfrm>
+          <a:prstGeom prst="rect">
+            <a:avLst/>
+          </a:prstGeom>
+          <a:noFill/>
+          <a:ln w="9525">
+            <a:noFill/>
+            <a:miter lim="800000"/>
+            <a:headEnd/>
+            <a:tailEnd/>
+          </a:ln>
+        </p:spPr>
+      </p:pic>
+      <p:pic>
+        <p:nvPicPr>
+          <p:cNvPr id="1039" name="Picture 15"/>
+          <p:cNvPicPr>
+            <a:picLocks noChangeAspect="1" noChangeArrowheads="1"/>
+          </p:cNvPicPr>
+          <p:nvPr/>
+        </p:nvPicPr>
+        <p:blipFill>
+          <a:blip r:embed="rId2" cstate="print"/>
+          <a:srcRect/>
+          <a:stretch>
+            <a:fillRect/>
+          </a:stretch>
+        </p:blipFill>
+        <p:spPr bwMode="auto">
+          <a:xfrm>
+            <a:off x="2028826" y="4164794"/>
+            <a:ext cx="1387474" cy="935420"/>
+          </a:xfrm>
+          <a:prstGeom prst="rect">
+            <a:avLst/>
+          </a:prstGeom>
+          <a:noFill/>
+          <a:ln w="9525">
+            <a:noFill/>
+            <a:miter lim="800000"/>
+            <a:headEnd/>
+            <a:tailEnd/>
+          </a:ln>
+        </p:spPr>
+      </p:pic>
+      <p:pic>
+        <p:nvPicPr>
+          <p:cNvPr id="4" name="Picture 2"/>
+          <p:cNvPicPr>
+            <a:picLocks noChangeAspect="1" noChangeArrowheads="1"/>
+          </p:cNvPicPr>
+          <p:nvPr/>
+        </p:nvPicPr>
+        <p:blipFill>
+          <a:blip r:embed="rId3" cstate="print"/>
+          <a:srcRect/>
+          <a:stretch>
+            <a:fillRect/>
+          </a:stretch>
+        </p:blipFill>
+        <p:spPr bwMode="auto">
+          <a:xfrm>
+            <a:off x="3889014" y="2706121"/>
+            <a:ext cx="2887878" cy="1518487"/>
+          </a:xfrm>
+          <a:prstGeom prst="rect">
+            <a:avLst/>
+          </a:prstGeom>
+          <a:noFill/>
+          <a:ln w="9525">
+            <a:noFill/>
+            <a:miter lim="800000"/>
+            <a:headEnd/>
+            <a:tailEnd/>
+          </a:ln>
+        </p:spPr>
+      </p:pic>
+      <p:pic>
+        <p:nvPicPr>
+          <p:cNvPr id="1030" name="Picture 6"/>
+          <p:cNvPicPr>
+            <a:picLocks noChangeAspect="1" noChangeArrowheads="1"/>
+          </p:cNvPicPr>
+          <p:nvPr/>
+        </p:nvPicPr>
+        <p:blipFill>
+          <a:blip r:embed="rId4" cstate="print"/>
+          <a:srcRect/>
+          <a:stretch>
+            <a:fillRect/>
+          </a:stretch>
+        </p:blipFill>
+        <p:spPr bwMode="auto">
+          <a:xfrm>
+            <a:off x="7404197" y="3574080"/>
+            <a:ext cx="457200" cy="436944"/>
+          </a:xfrm>
+          <a:prstGeom prst="rect">
+            <a:avLst/>
+          </a:prstGeom>
+          <a:noFill/>
+          <a:ln w="9525">
+            <a:noFill/>
+            <a:miter lim="800000"/>
+            <a:headEnd/>
+            <a:tailEnd/>
+          </a:ln>
+        </p:spPr>
+      </p:pic>
+      <p:pic>
+        <p:nvPicPr>
+          <p:cNvPr id="39" name="Picture 6"/>
+          <p:cNvPicPr>
+            <a:picLocks noChangeAspect="1" noChangeArrowheads="1"/>
+          </p:cNvPicPr>
+          <p:nvPr/>
+        </p:nvPicPr>
+        <p:blipFill>
+          <a:blip r:embed="rId4" cstate="print"/>
+          <a:srcRect/>
+          <a:stretch>
+            <a:fillRect/>
+          </a:stretch>
+        </p:blipFill>
+        <p:spPr bwMode="auto">
+          <a:xfrm>
+            <a:off x="7404197" y="3952485"/>
+            <a:ext cx="457200" cy="436944"/>
+          </a:xfrm>
+          <a:prstGeom prst="rect">
+            <a:avLst/>
+          </a:prstGeom>
+          <a:noFill/>
+          <a:ln w="9525">
+            <a:noFill/>
+            <a:miter lim="800000"/>
+            <a:headEnd/>
+            <a:tailEnd/>
+          </a:ln>
+        </p:spPr>
+      </p:pic>
+      <p:cxnSp>
+        <p:nvCxnSpPr>
+          <p:cNvPr id="45" name="Elbow Connector 44"/>
+          <p:cNvCxnSpPr/>
+          <p:nvPr/>
+        </p:nvCxnSpPr>
+        <p:spPr>
+          <a:xfrm rot="10800000">
+            <a:off x="6400625" y="3537810"/>
+            <a:ext cx="966305" cy="363364"/>
+          </a:xfrm>
+          <a:prstGeom prst="bentConnector3">
+            <a:avLst>
+              <a:gd name="adj1" fmla="val 26033"/>
+            </a:avLst>
+          </a:prstGeom>
+        </p:spPr>
+        <p:style>
+          <a:lnRef idx="1">
+            <a:schemeClr val="accent1"/>
+          </a:lnRef>
+          <a:fillRef idx="0">
+            <a:schemeClr val="accent1"/>
+          </a:fillRef>
+          <a:effectRef idx="0">
+            <a:schemeClr val="accent1"/>
+          </a:effectRef>
+          <a:fontRef idx="minor">
+            <a:schemeClr val="tx1"/>
+          </a:fontRef>
+        </p:style>
+      </p:cxnSp>
+      <p:cxnSp>
+        <p:nvCxnSpPr>
+          <p:cNvPr id="48" name="Elbow Connector 47"/>
+          <p:cNvCxnSpPr/>
+          <p:nvPr/>
+        </p:nvCxnSpPr>
+        <p:spPr>
+          <a:xfrm rot="10800000">
+            <a:off x="6392636" y="3597708"/>
+            <a:ext cx="970300" cy="674817"/>
+          </a:xfrm>
+          <a:prstGeom prst="bentConnector3">
+            <a:avLst>
+              <a:gd name="adj1" fmla="val 31893"/>
+            </a:avLst>
+          </a:prstGeom>
+        </p:spPr>
+        <p:style>
+          <a:lnRef idx="1">
+            <a:schemeClr val="accent1"/>
+          </a:lnRef>
+          <a:fillRef idx="0">
+            <a:schemeClr val="accent1"/>
+          </a:fillRef>
+          <a:effectRef idx="0">
+            <a:schemeClr val="accent1"/>
+          </a:effectRef>
+          <a:fontRef idx="minor">
+            <a:schemeClr val="tx1"/>
+          </a:fontRef>
+        </p:style>
+      </p:cxnSp>
+      <p:pic>
+        <p:nvPicPr>
+          <p:cNvPr id="1037" name="Picture 13"/>
+          <p:cNvPicPr>
+            <a:picLocks noChangeAspect="1" noChangeArrowheads="1"/>
+          </p:cNvPicPr>
+          <p:nvPr/>
+        </p:nvPicPr>
+        <p:blipFill>
+          <a:blip r:embed="rId5" cstate="print"/>
+          <a:srcRect/>
+          <a:stretch>
+            <a:fillRect/>
+          </a:stretch>
+        </p:blipFill>
+        <p:spPr bwMode="auto">
+          <a:xfrm>
+            <a:off x="7154864" y="2495550"/>
+            <a:ext cx="851671" cy="947738"/>
+          </a:xfrm>
+          <a:prstGeom prst="rect">
+            <a:avLst/>
+          </a:prstGeom>
+          <a:noFill/>
+          <a:ln w="9525">
+            <a:noFill/>
+            <a:miter lim="800000"/>
+            <a:headEnd/>
+            <a:tailEnd/>
+          </a:ln>
+        </p:spPr>
+      </p:pic>
+      <p:pic>
+        <p:nvPicPr>
+          <p:cNvPr id="110" name="Picture 12"/>
+          <p:cNvPicPr>
+            <a:picLocks noChangeAspect="1" noChangeArrowheads="1"/>
+          </p:cNvPicPr>
+          <p:nvPr/>
+        </p:nvPicPr>
+        <p:blipFill>
+          <a:blip r:embed="rId6" cstate="print"/>
+          <a:srcRect/>
+          <a:stretch>
+            <a:fillRect/>
+          </a:stretch>
+        </p:blipFill>
+        <p:spPr bwMode="auto">
+          <a:xfrm>
+            <a:off x="7159639" y="2348216"/>
+            <a:ext cx="138882" cy="134253"/>
+          </a:xfrm>
+          <a:prstGeom prst="rect">
+            <a:avLst/>
+          </a:prstGeom>
+          <a:noFill/>
+          <a:ln w="9525">
+            <a:noFill/>
+            <a:miter lim="800000"/>
+            <a:headEnd/>
+            <a:tailEnd/>
+          </a:ln>
+        </p:spPr>
+      </p:pic>
+      <p:cxnSp>
+        <p:nvCxnSpPr>
+          <p:cNvPr id="114" name="Straight Connector 113"/>
+          <p:cNvCxnSpPr/>
+          <p:nvPr/>
+        </p:nvCxnSpPr>
+        <p:spPr>
+          <a:xfrm flipH="1" flipV="1">
+            <a:off x="7516813" y="2386013"/>
+            <a:ext cx="7937" cy="103188"/>
+          </a:xfrm>
+          <a:prstGeom prst="line">
+            <a:avLst/>
+          </a:prstGeom>
+        </p:spPr>
+        <p:style>
+          <a:lnRef idx="1">
+            <a:schemeClr val="accent1"/>
+          </a:lnRef>
+          <a:fillRef idx="0">
+            <a:schemeClr val="accent1"/>
+          </a:fillRef>
+          <a:effectRef idx="0">
+            <a:schemeClr val="accent1"/>
+          </a:effectRef>
+          <a:fontRef idx="minor">
+            <a:schemeClr val="tx1"/>
+          </a:fontRef>
+        </p:style>
+      </p:cxnSp>
+      <p:cxnSp>
+        <p:nvCxnSpPr>
+          <p:cNvPr id="121" name="Straight Connector 120"/>
+          <p:cNvCxnSpPr/>
+          <p:nvPr/>
+        </p:nvCxnSpPr>
+        <p:spPr>
+          <a:xfrm flipH="1" flipV="1">
+            <a:off x="7300913" y="2339975"/>
+            <a:ext cx="127000" cy="152400"/>
+          </a:xfrm>
+          <a:prstGeom prst="line">
+            <a:avLst/>
+          </a:prstGeom>
+        </p:spPr>
+        <p:style>
+          <a:lnRef idx="1">
+            <a:schemeClr val="accent1"/>
+          </a:lnRef>
+          <a:fillRef idx="0">
+            <a:schemeClr val="accent1"/>
+          </a:fillRef>
+          <a:effectRef idx="0">
+            <a:schemeClr val="accent1"/>
+          </a:effectRef>
+          <a:fontRef idx="minor">
+            <a:schemeClr val="tx1"/>
+          </a:fontRef>
+        </p:style>
+      </p:cxnSp>
+      <p:cxnSp>
+        <p:nvCxnSpPr>
+          <p:cNvPr id="123" name="Straight Connector 122"/>
+          <p:cNvCxnSpPr/>
+          <p:nvPr/>
+        </p:nvCxnSpPr>
+        <p:spPr>
+          <a:xfrm flipV="1">
+            <a:off x="7221538" y="2333625"/>
+            <a:ext cx="85725" cy="4763"/>
+          </a:xfrm>
+          <a:prstGeom prst="line">
+            <a:avLst/>
+          </a:prstGeom>
+        </p:spPr>
+        <p:style>
+          <a:lnRef idx="1">
+            <a:schemeClr val="accent1"/>
+          </a:lnRef>
+          <a:fillRef idx="0">
+            <a:schemeClr val="accent1"/>
+          </a:fillRef>
+          <a:effectRef idx="0">
+            <a:schemeClr val="accent1"/>
+          </a:effectRef>
+          <a:fontRef idx="minor">
+            <a:schemeClr val="tx1"/>
+          </a:fontRef>
+        </p:style>
+      </p:cxnSp>
+      <p:cxnSp>
+        <p:nvCxnSpPr>
+          <p:cNvPr id="125" name="Straight Connector 124"/>
+          <p:cNvCxnSpPr/>
+          <p:nvPr/>
+        </p:nvCxnSpPr>
+        <p:spPr>
+          <a:xfrm flipV="1">
+            <a:off x="7613650" y="2232025"/>
+            <a:ext cx="0" cy="282575"/>
+          </a:xfrm>
+          <a:prstGeom prst="line">
+            <a:avLst/>
+          </a:prstGeom>
+        </p:spPr>
+        <p:style>
+          <a:lnRef idx="1">
+            <a:schemeClr val="accent1"/>
+          </a:lnRef>
+          <a:fillRef idx="0">
+            <a:schemeClr val="accent1"/>
+          </a:fillRef>
+          <a:effectRef idx="0">
+            <a:schemeClr val="accent1"/>
+          </a:effectRef>
+          <a:fontRef idx="minor">
+            <a:schemeClr val="tx1"/>
+          </a:fontRef>
+        </p:style>
+      </p:cxnSp>
+      <p:cxnSp>
+        <p:nvCxnSpPr>
+          <p:cNvPr id="129" name="Straight Connector 128"/>
+          <p:cNvCxnSpPr/>
+          <p:nvPr/>
+        </p:nvCxnSpPr>
+        <p:spPr>
+          <a:xfrm flipH="1">
+            <a:off x="6550025" y="1536700"/>
+            <a:ext cx="227013" cy="3080"/>
+          </a:xfrm>
+          <a:prstGeom prst="line">
+            <a:avLst/>
+          </a:prstGeom>
+        </p:spPr>
+        <p:style>
+          <a:lnRef idx="1">
+            <a:schemeClr val="accent1"/>
+          </a:lnRef>
+          <a:fillRef idx="0">
+            <a:schemeClr val="accent1"/>
+          </a:fillRef>
+          <a:effectRef idx="0">
+            <a:schemeClr val="accent1"/>
+          </a:effectRef>
+          <a:fontRef idx="minor">
+            <a:schemeClr val="tx1"/>
+          </a:fontRef>
+        </p:style>
+      </p:cxnSp>
+      <p:cxnSp>
+        <p:nvCxnSpPr>
+          <p:cNvPr id="133" name="Straight Connector 132"/>
+          <p:cNvCxnSpPr/>
+          <p:nvPr/>
+        </p:nvCxnSpPr>
+        <p:spPr>
+          <a:xfrm flipH="1">
+            <a:off x="6415089" y="2990850"/>
+            <a:ext cx="134936" cy="0"/>
+          </a:xfrm>
+          <a:prstGeom prst="line">
+            <a:avLst/>
+          </a:prstGeom>
+        </p:spPr>
+        <p:style>
+          <a:lnRef idx="1">
+            <a:schemeClr val="accent1"/>
+          </a:lnRef>
+          <a:fillRef idx="0">
+            <a:schemeClr val="accent1"/>
+          </a:fillRef>
+          <a:effectRef idx="0">
+            <a:schemeClr val="accent1"/>
+          </a:effectRef>
+          <a:fontRef idx="minor">
+            <a:schemeClr val="tx1"/>
+          </a:fontRef>
+        </p:style>
+      </p:cxnSp>
+      <p:cxnSp>
+        <p:nvCxnSpPr>
+          <p:cNvPr id="140" name="Straight Connector 139"/>
+          <p:cNvCxnSpPr/>
+          <p:nvPr/>
+        </p:nvCxnSpPr>
+        <p:spPr>
+          <a:xfrm flipV="1">
+            <a:off x="6546850" y="1533525"/>
+            <a:ext cx="0" cy="1460501"/>
+          </a:xfrm>
+          <a:prstGeom prst="line">
+            <a:avLst/>
+          </a:prstGeom>
+        </p:spPr>
+        <p:style>
+          <a:lnRef idx="1">
+            <a:schemeClr val="accent1"/>
+          </a:lnRef>
+          <a:fillRef idx="0">
+            <a:schemeClr val="accent1"/>
+          </a:fillRef>
+          <a:effectRef idx="0">
+            <a:schemeClr val="accent1"/>
+          </a:effectRef>
+          <a:fontRef idx="minor">
+            <a:schemeClr val="tx1"/>
+          </a:fontRef>
+        </p:style>
+      </p:cxnSp>
+      <p:cxnSp>
+        <p:nvCxnSpPr>
+          <p:cNvPr id="157" name="Elbow Connector 156"/>
+          <p:cNvCxnSpPr/>
+          <p:nvPr/>
+        </p:nvCxnSpPr>
+        <p:spPr>
+          <a:xfrm flipV="1">
+            <a:off x="2781300" y="3254375"/>
+            <a:ext cx="1184275" cy="149226"/>
+          </a:xfrm>
+          <a:prstGeom prst="bentConnector3">
+            <a:avLst>
+              <a:gd name="adj1" fmla="val 19973"/>
+            </a:avLst>
+          </a:prstGeom>
+        </p:spPr>
+        <p:style>
+          <a:lnRef idx="1">
+            <a:schemeClr val="accent1"/>
+          </a:lnRef>
+          <a:fillRef idx="0">
+            <a:schemeClr val="accent1"/>
+          </a:fillRef>
+          <a:effectRef idx="0">
+            <a:schemeClr val="accent1"/>
+          </a:effectRef>
+          <a:fontRef idx="minor">
+            <a:schemeClr val="tx1"/>
+          </a:fontRef>
+        </p:style>
+      </p:cxnSp>
+      <p:cxnSp>
+        <p:nvCxnSpPr>
+          <p:cNvPr id="160" name="Elbow Connector 159"/>
+          <p:cNvCxnSpPr/>
+          <p:nvPr/>
+        </p:nvCxnSpPr>
+        <p:spPr>
+          <a:xfrm flipV="1">
+            <a:off x="2771775" y="3314700"/>
+            <a:ext cx="1200150" cy="193676"/>
+          </a:xfrm>
+          <a:prstGeom prst="bentConnector3">
+            <a:avLst>
+              <a:gd name="adj1" fmla="val 26984"/>
+            </a:avLst>
+          </a:prstGeom>
+        </p:spPr>
+        <p:style>
+          <a:lnRef idx="1">
+            <a:schemeClr val="accent1"/>
+          </a:lnRef>
+          <a:fillRef idx="0">
+            <a:schemeClr val="accent1"/>
+          </a:fillRef>
+          <a:effectRef idx="0">
+            <a:schemeClr val="accent1"/>
+          </a:effectRef>
+          <a:fontRef idx="minor">
+            <a:schemeClr val="tx1"/>
+          </a:fontRef>
+        </p:style>
+      </p:cxnSp>
+      <p:cxnSp>
+        <p:nvCxnSpPr>
+          <p:cNvPr id="177" name="Elbow Connector 176"/>
+          <p:cNvCxnSpPr>
+            <a:cxnSpLocks/>
+          </p:cNvCxnSpPr>
+          <p:nvPr/>
+        </p:nvCxnSpPr>
+        <p:spPr>
+          <a:xfrm flipV="1">
+            <a:off x="2752725" y="3393111"/>
+            <a:ext cx="1237192" cy="1067764"/>
+          </a:xfrm>
+          <a:prstGeom prst="bentConnector3">
+            <a:avLst>
+              <a:gd name="adj1" fmla="val 68135"/>
+            </a:avLst>
+          </a:prstGeom>
+        </p:spPr>
+        <p:style>
+          <a:lnRef idx="1">
+            <a:schemeClr val="accent1"/>
+          </a:lnRef>
+          <a:fillRef idx="0">
+            <a:schemeClr val="accent1"/>
+          </a:fillRef>
+          <a:effectRef idx="0">
+            <a:schemeClr val="accent1"/>
+          </a:effectRef>
+          <a:fontRef idx="minor">
+            <a:schemeClr val="tx1"/>
+          </a:fontRef>
+        </p:style>
+      </p:cxnSp>
+      <p:cxnSp>
+        <p:nvCxnSpPr>
+          <p:cNvPr id="179" name="Elbow Connector 178"/>
+          <p:cNvCxnSpPr>
+            <a:cxnSpLocks/>
+          </p:cNvCxnSpPr>
+          <p:nvPr/>
+        </p:nvCxnSpPr>
+        <p:spPr>
+          <a:xfrm flipV="1">
+            <a:off x="2738181" y="3473691"/>
+            <a:ext cx="1281898" cy="1097503"/>
+          </a:xfrm>
+          <a:prstGeom prst="bentConnector3">
+            <a:avLst>
+              <a:gd name="adj1" fmla="val 73942"/>
+            </a:avLst>
+          </a:prstGeom>
+        </p:spPr>
+        <p:style>
+          <a:lnRef idx="1">
+            <a:schemeClr val="accent1"/>
+          </a:lnRef>
+          <a:fillRef idx="0">
+            <a:schemeClr val="accent1"/>
+          </a:fillRef>
+          <a:effectRef idx="0">
+            <a:schemeClr val="accent1"/>
+          </a:effectRef>
+          <a:fontRef idx="minor">
+            <a:schemeClr val="tx1"/>
+          </a:fontRef>
+        </p:style>
+      </p:cxnSp>
+      <p:sp>
+        <p:nvSpPr>
+          <p:cNvPr id="186" name="Rectangle 185"/>
+          <p:cNvSpPr/>
+          <p:nvPr/>
+        </p:nvSpPr>
+        <p:spPr>
+          <a:xfrm>
+            <a:off x="3930650" y="3838575"/>
+            <a:ext cx="965200" cy="203200"/>
+          </a:xfrm>
+          <a:prstGeom prst="rect">
+            <a:avLst/>
+          </a:prstGeom>
+          <a:solidFill>
+            <a:schemeClr val="bg1">
+              <a:lumMod val="50000"/>
+              <a:alpha val="66000"/>
+            </a:schemeClr>
+          </a:solidFill>
+          <a:ln>
+            <a:noFill/>
+          </a:ln>
+        </p:spPr>
+        <p:style>
+          <a:lnRef idx="2">
+            <a:schemeClr val="accent1">
+              <a:shade val="50000"/>
+            </a:schemeClr>
+          </a:lnRef>
+          <a:fillRef idx="1">
+            <a:schemeClr val="accent1"/>
+          </a:fillRef>
+          <a:effectRef idx="0">
+            <a:schemeClr val="accent1"/>
+          </a:effectRef>
+          <a:fontRef idx="minor">
+            <a:schemeClr val="lt1"/>
+          </a:fontRef>
+        </p:style>
+        <p:txBody>
+          <a:bodyPr rtlCol="0" anchor="ctr"/>
+          <a:lstStyle/>
+          <a:p>
+            <a:pPr algn="ctr"/>
+            <a:endParaRPr lang="en-US"/>
+          </a:p>
+        </p:txBody>
+      </p:sp>
+      <p:sp>
+        <p:nvSpPr>
+          <p:cNvPr id="187" name="Rectangle 186"/>
+          <p:cNvSpPr/>
+          <p:nvPr/>
+        </p:nvSpPr>
+        <p:spPr>
+          <a:xfrm>
+            <a:off x="5746750" y="3911600"/>
+            <a:ext cx="688975" cy="203200"/>
+          </a:xfrm>
+          <a:prstGeom prst="rect">
+            <a:avLst/>
+          </a:prstGeom>
+          <a:solidFill>
+            <a:schemeClr val="bg1">
+              <a:lumMod val="50000"/>
+              <a:alpha val="66000"/>
+            </a:schemeClr>
+          </a:solidFill>
+          <a:ln>
+            <a:noFill/>
+          </a:ln>
+        </p:spPr>
+        <p:style>
+          <a:lnRef idx="2">
+            <a:schemeClr val="accent1">
+              <a:shade val="50000"/>
+            </a:schemeClr>
+          </a:lnRef>
+          <a:fillRef idx="1">
+            <a:schemeClr val="accent1"/>
+          </a:fillRef>
+          <a:effectRef idx="0">
+            <a:schemeClr val="accent1"/>
+          </a:effectRef>
+          <a:fontRef idx="minor">
+            <a:schemeClr val="lt1"/>
+          </a:fontRef>
+        </p:style>
+        <p:txBody>
+          <a:bodyPr rtlCol="0" anchor="ctr"/>
+          <a:lstStyle/>
+          <a:p>
+            <a:pPr algn="ctr"/>
+            <a:endParaRPr lang="en-US"/>
+          </a:p>
+        </p:txBody>
+      </p:sp>
+      <p:pic>
+        <p:nvPicPr>
+          <p:cNvPr id="1038" name="Picture 14"/>
+          <p:cNvPicPr>
+            <a:picLocks noChangeAspect="1" noChangeArrowheads="1"/>
+          </p:cNvPicPr>
+          <p:nvPr/>
+        </p:nvPicPr>
+        <p:blipFill>
+          <a:blip r:embed="rId7" cstate="print"/>
+          <a:srcRect/>
+          <a:stretch>
+            <a:fillRect/>
+          </a:stretch>
+        </p:blipFill>
+        <p:spPr bwMode="auto">
+          <a:xfrm>
+            <a:off x="1243799" y="2079625"/>
+            <a:ext cx="2005982" cy="736600"/>
+          </a:xfrm>
+          <a:prstGeom prst="rect">
+            <a:avLst/>
+          </a:prstGeom>
+          <a:noFill/>
+          <a:ln w="9525">
+            <a:noFill/>
+            <a:miter lim="800000"/>
+            <a:headEnd/>
+            <a:tailEnd/>
+          </a:ln>
+        </p:spPr>
+      </p:pic>
+      <p:sp>
+        <p:nvSpPr>
+          <p:cNvPr id="5" name="Rectangle 4">
+            <a:extLst>
+              <a:ext uri="{FF2B5EF4-FFF2-40B4-BE49-F238E27FC236}">
+                <a16:creationId xmlns:a16="http://schemas.microsoft.com/office/drawing/2014/main" xmlns="" id="{22B14C85-B862-AC4B-4E24-B2666F986BDA}"/>
+              </a:ext>
+            </a:extLst>
+          </p:cNvPr>
+          <p:cNvSpPr/>
+          <p:nvPr/>
+        </p:nvSpPr>
+        <p:spPr>
+          <a:xfrm>
+            <a:off x="7286812" y="1248601"/>
+            <a:ext cx="182187" cy="134169"/>
+          </a:xfrm>
+          <a:prstGeom prst="rect">
+            <a:avLst/>
+          </a:prstGeom>
+          <a:solidFill>
+            <a:schemeClr val="bg1"/>
+          </a:solidFill>
+          <a:ln>
+            <a:solidFill>
+              <a:schemeClr val="bg1"/>
+            </a:solidFill>
+          </a:ln>
+        </p:spPr>
+        <p:style>
+          <a:lnRef idx="2">
+            <a:schemeClr val="accent1">
+              <a:shade val="15000"/>
+            </a:schemeClr>
+          </a:lnRef>
+          <a:fillRef idx="1">
+            <a:schemeClr val="accent1"/>
+          </a:fillRef>
+          <a:effectRef idx="0">
+            <a:schemeClr val="accent1"/>
+          </a:effectRef>
+          <a:fontRef idx="minor">
+            <a:schemeClr val="lt1"/>
+          </a:fontRef>
+        </p:style>
+        <p:txBody>
+          <a:bodyPr rtlCol="0" anchor="ctr"/>
+          <a:lstStyle/>
+          <a:p>
+            <a:pPr algn="ctr"/>
+            <a:endParaRPr lang="en-US"/>
+          </a:p>
+        </p:txBody>
+      </p:sp>
+      <p:sp>
+        <p:nvSpPr>
+          <p:cNvPr id="6" name="TextBox 5">
+            <a:extLst>
+              <a:ext uri="{FF2B5EF4-FFF2-40B4-BE49-F238E27FC236}">
+                <a16:creationId xmlns:a16="http://schemas.microsoft.com/office/drawing/2014/main" xmlns="" id="{032073D1-5C86-096E-E34F-E839D76407AB}"/>
+              </a:ext>
+            </a:extLst>
+          </p:cNvPr>
+          <p:cNvSpPr txBox="1"/>
+          <p:nvPr/>
+        </p:nvSpPr>
+        <p:spPr>
+          <a:xfrm>
+            <a:off x="7351146" y="2264196"/>
+            <a:ext cx="370454" cy="169277"/>
+          </a:xfrm>
+          <a:prstGeom prst="rect">
+            <a:avLst/>
+          </a:prstGeom>
+          <a:noFill/>
+        </p:spPr>
+        <p:txBody>
+          <a:bodyPr wrap="square" rtlCol="0">
+            <a:spAutoFit/>
+          </a:bodyPr>
+          <a:lstStyle/>
+          <a:p>
+            <a:r>
+              <a:rPr lang="da-DK" sz="500" dirty="0"/>
+              <a:t>+3,3V</a:t>
+            </a:r>
+            <a:endParaRPr lang="en-US" sz="500" dirty="0"/>
+          </a:p>
+        </p:txBody>
+      </p:sp>
+      <p:pic>
+        <p:nvPicPr>
+          <p:cNvPr id="18" name="Picture 17">
+            <a:extLst>
+              <a:ext uri="{FF2B5EF4-FFF2-40B4-BE49-F238E27FC236}">
+                <a16:creationId xmlns:a16="http://schemas.microsoft.com/office/drawing/2014/main" xmlns="" id="{AB95657D-99F1-D34C-92B6-10255E6E567F}"/>
+              </a:ext>
+            </a:extLst>
+          </p:cNvPr>
+          <p:cNvPicPr>
+            <a:picLocks noChangeAspect="1"/>
+          </p:cNvPicPr>
+          <p:nvPr/>
+        </p:nvPicPr>
+        <p:blipFill>
+          <a:blip r:embed="rId8" cstate="print"/>
+          <a:stretch>
+            <a:fillRect/>
+          </a:stretch>
+        </p:blipFill>
+        <p:spPr>
+          <a:xfrm>
+            <a:off x="4354385" y="2512623"/>
+            <a:ext cx="264727" cy="281377"/>
+          </a:xfrm>
+          <a:prstGeom prst="rect">
+            <a:avLst/>
+          </a:prstGeom>
+        </p:spPr>
+      </p:pic>
+      <p:pic>
+        <p:nvPicPr>
+          <p:cNvPr id="20" name="Picture 19">
+            <a:extLst>
+              <a:ext uri="{FF2B5EF4-FFF2-40B4-BE49-F238E27FC236}">
+                <a16:creationId xmlns:a16="http://schemas.microsoft.com/office/drawing/2014/main" xmlns="" id="{C09DE846-15F0-FDAB-B4C7-57DC529AD9DF}"/>
+              </a:ext>
+            </a:extLst>
+          </p:cNvPr>
+          <p:cNvPicPr>
+            <a:picLocks noChangeAspect="1"/>
+          </p:cNvPicPr>
+          <p:nvPr/>
+        </p:nvPicPr>
+        <p:blipFill>
+          <a:blip r:embed="rId8" cstate="print"/>
+          <a:stretch>
+            <a:fillRect/>
+          </a:stretch>
+        </p:blipFill>
+        <p:spPr>
+          <a:xfrm>
+            <a:off x="4354385" y="2242476"/>
+            <a:ext cx="264727" cy="281377"/>
+          </a:xfrm>
+          <a:prstGeom prst="rect">
+            <a:avLst/>
+          </a:prstGeom>
+        </p:spPr>
+      </p:pic>
+      <p:pic>
+        <p:nvPicPr>
+          <p:cNvPr id="22" name="Picture 21">
+            <a:extLst>
+              <a:ext uri="{FF2B5EF4-FFF2-40B4-BE49-F238E27FC236}">
+                <a16:creationId xmlns:a16="http://schemas.microsoft.com/office/drawing/2014/main" xmlns="" id="{68CFDBB9-9A7A-C1DC-EDEF-AB162E041FAE}"/>
+              </a:ext>
+            </a:extLst>
+          </p:cNvPr>
+          <p:cNvPicPr>
+            <a:picLocks noChangeAspect="1"/>
+          </p:cNvPicPr>
+          <p:nvPr/>
+        </p:nvPicPr>
+        <p:blipFill>
+          <a:blip r:embed="rId8" cstate="print"/>
+          <a:stretch>
+            <a:fillRect/>
+          </a:stretch>
+        </p:blipFill>
+        <p:spPr>
+          <a:xfrm>
+            <a:off x="4354385" y="1972330"/>
+            <a:ext cx="264727" cy="281377"/>
+          </a:xfrm>
+          <a:prstGeom prst="rect">
+            <a:avLst/>
+          </a:prstGeom>
+        </p:spPr>
+      </p:pic>
+      <p:pic>
+        <p:nvPicPr>
+          <p:cNvPr id="23" name="Picture 22">
+            <a:extLst>
+              <a:ext uri="{FF2B5EF4-FFF2-40B4-BE49-F238E27FC236}">
+                <a16:creationId xmlns:a16="http://schemas.microsoft.com/office/drawing/2014/main" xmlns="" id="{69D68710-3B44-B909-ADAC-FA9688495BE1}"/>
+              </a:ext>
+            </a:extLst>
+          </p:cNvPr>
+          <p:cNvPicPr>
+            <a:picLocks noChangeAspect="1"/>
+          </p:cNvPicPr>
+          <p:nvPr/>
+        </p:nvPicPr>
+        <p:blipFill>
+          <a:blip r:embed="rId8" cstate="print"/>
+          <a:stretch>
+            <a:fillRect/>
+          </a:stretch>
+        </p:blipFill>
+        <p:spPr>
+          <a:xfrm>
+            <a:off x="4354385" y="1702184"/>
+            <a:ext cx="264727" cy="281377"/>
+          </a:xfrm>
+          <a:prstGeom prst="rect">
+            <a:avLst/>
+          </a:prstGeom>
+        </p:spPr>
+      </p:pic>
+      <p:sp>
+        <p:nvSpPr>
+          <p:cNvPr id="24" name="TextBox 23">
+            <a:extLst>
+              <a:ext uri="{FF2B5EF4-FFF2-40B4-BE49-F238E27FC236}">
+                <a16:creationId xmlns:a16="http://schemas.microsoft.com/office/drawing/2014/main" xmlns="" id="{6491949F-0B8B-D8B9-30F5-0C2986FAC5A2}"/>
+              </a:ext>
+            </a:extLst>
+          </p:cNvPr>
+          <p:cNvSpPr txBox="1"/>
+          <p:nvPr/>
+        </p:nvSpPr>
+        <p:spPr>
+          <a:xfrm>
+            <a:off x="4550464" y="2059643"/>
+            <a:ext cx="572272" cy="338554"/>
+          </a:xfrm>
+          <a:prstGeom prst="rect">
+            <a:avLst/>
+          </a:prstGeom>
+          <a:noFill/>
+        </p:spPr>
+        <p:txBody>
+          <a:bodyPr wrap="square" rtlCol="0">
+            <a:spAutoFit/>
+          </a:bodyPr>
+          <a:lstStyle/>
+          <a:p>
+            <a:r>
+              <a:rPr lang="da-DK" sz="800" dirty="0"/>
+              <a:t>IR sensors</a:t>
+            </a:r>
+            <a:endParaRPr lang="en-US" sz="800" dirty="0"/>
+          </a:p>
+        </p:txBody>
+      </p:sp>
+      <p:cxnSp>
+        <p:nvCxnSpPr>
+          <p:cNvPr id="29" name="Straight Connector 28">
+            <a:extLst>
+              <a:ext uri="{FF2B5EF4-FFF2-40B4-BE49-F238E27FC236}">
+                <a16:creationId xmlns:a16="http://schemas.microsoft.com/office/drawing/2014/main" xmlns="" id="{0D49A566-5B7F-D34D-3E43-FE185127CCDB}"/>
+              </a:ext>
+            </a:extLst>
+          </p:cNvPr>
+          <p:cNvCxnSpPr/>
+          <p:nvPr/>
+        </p:nvCxnSpPr>
+        <p:spPr>
+          <a:xfrm flipH="1">
+            <a:off x="4167717" y="2982781"/>
+            <a:ext cx="84666" cy="0"/>
+          </a:xfrm>
+          <a:prstGeom prst="line">
+            <a:avLst/>
+          </a:prstGeom>
+        </p:spPr>
+        <p:style>
+          <a:lnRef idx="1">
+            <a:schemeClr val="accent1"/>
+          </a:lnRef>
+          <a:fillRef idx="0">
+            <a:schemeClr val="accent1"/>
+          </a:fillRef>
+          <a:effectRef idx="0">
+            <a:schemeClr val="accent1"/>
+          </a:effectRef>
+          <a:fontRef idx="minor">
+            <a:schemeClr val="tx1"/>
+          </a:fontRef>
+        </p:style>
+      </p:cxnSp>
+      <p:cxnSp>
+        <p:nvCxnSpPr>
+          <p:cNvPr id="31" name="Straight Connector 30">
+            <a:extLst>
+              <a:ext uri="{FF2B5EF4-FFF2-40B4-BE49-F238E27FC236}">
+                <a16:creationId xmlns:a16="http://schemas.microsoft.com/office/drawing/2014/main" xmlns="" id="{26A481AF-3F70-BE61-B85D-BFCC35BD3BD6}"/>
+              </a:ext>
+            </a:extLst>
+          </p:cNvPr>
+          <p:cNvCxnSpPr>
+            <a:cxnSpLocks/>
+          </p:cNvCxnSpPr>
+          <p:nvPr/>
+        </p:nvCxnSpPr>
+        <p:spPr>
+          <a:xfrm flipV="1">
+            <a:off x="4167717" y="2667000"/>
+            <a:ext cx="0" cy="315781"/>
+          </a:xfrm>
+          <a:prstGeom prst="line">
+            <a:avLst/>
+          </a:prstGeom>
+        </p:spPr>
+        <p:style>
+          <a:lnRef idx="1">
+            <a:schemeClr val="accent1"/>
+          </a:lnRef>
+          <a:fillRef idx="0">
+            <a:schemeClr val="accent1"/>
+          </a:fillRef>
+          <a:effectRef idx="0">
+            <a:schemeClr val="accent1"/>
+          </a:effectRef>
+          <a:fontRef idx="minor">
+            <a:schemeClr val="tx1"/>
+          </a:fontRef>
+        </p:style>
+      </p:cxnSp>
+      <p:cxnSp>
+        <p:nvCxnSpPr>
+          <p:cNvPr id="34" name="Straight Connector 33">
+            <a:extLst>
+              <a:ext uri="{FF2B5EF4-FFF2-40B4-BE49-F238E27FC236}">
+                <a16:creationId xmlns:a16="http://schemas.microsoft.com/office/drawing/2014/main" xmlns="" id="{3D6012E6-6D5B-F289-961F-FA011B17512A}"/>
+              </a:ext>
+            </a:extLst>
+          </p:cNvPr>
+          <p:cNvCxnSpPr>
+            <a:cxnSpLocks/>
+          </p:cNvCxnSpPr>
+          <p:nvPr/>
+        </p:nvCxnSpPr>
+        <p:spPr>
+          <a:xfrm>
+            <a:off x="4171950" y="2665237"/>
+            <a:ext cx="223252" cy="0"/>
+          </a:xfrm>
+          <a:prstGeom prst="line">
+            <a:avLst/>
+          </a:prstGeom>
+        </p:spPr>
+        <p:style>
+          <a:lnRef idx="1">
+            <a:schemeClr val="accent1"/>
+          </a:lnRef>
+          <a:fillRef idx="0">
+            <a:schemeClr val="accent1"/>
+          </a:fillRef>
+          <a:effectRef idx="0">
+            <a:schemeClr val="accent1"/>
+          </a:effectRef>
+          <a:fontRef idx="minor">
+            <a:schemeClr val="tx1"/>
+          </a:fontRef>
+        </p:style>
+      </p:cxnSp>
+      <p:cxnSp>
+        <p:nvCxnSpPr>
+          <p:cNvPr id="47" name="Straight Connector 46">
+            <a:extLst>
+              <a:ext uri="{FF2B5EF4-FFF2-40B4-BE49-F238E27FC236}">
+                <a16:creationId xmlns:a16="http://schemas.microsoft.com/office/drawing/2014/main" xmlns="" id="{0A4A8CBD-1219-8D50-33BA-F5FEF58F5650}"/>
+              </a:ext>
+            </a:extLst>
+          </p:cNvPr>
+          <p:cNvCxnSpPr>
+            <a:cxnSpLocks/>
+          </p:cNvCxnSpPr>
+          <p:nvPr/>
+        </p:nvCxnSpPr>
+        <p:spPr>
+          <a:xfrm flipH="1">
+            <a:off x="4087283" y="2400098"/>
+            <a:ext cx="315785" cy="0"/>
+          </a:xfrm>
+          <a:prstGeom prst="line">
+            <a:avLst/>
+          </a:prstGeom>
+        </p:spPr>
+        <p:style>
+          <a:lnRef idx="1">
+            <a:schemeClr val="accent1"/>
+          </a:lnRef>
+          <a:fillRef idx="0">
+            <a:schemeClr val="accent1"/>
+          </a:fillRef>
+          <a:effectRef idx="0">
+            <a:schemeClr val="accent1"/>
+          </a:effectRef>
+          <a:fontRef idx="minor">
+            <a:schemeClr val="tx1"/>
+          </a:fontRef>
+        </p:style>
+      </p:cxnSp>
+      <p:cxnSp>
+        <p:nvCxnSpPr>
+          <p:cNvPr id="51" name="Straight Connector 50">
+            <a:extLst>
+              <a:ext uri="{FF2B5EF4-FFF2-40B4-BE49-F238E27FC236}">
+                <a16:creationId xmlns:a16="http://schemas.microsoft.com/office/drawing/2014/main" xmlns="" id="{09F998D2-8EDC-52C6-38C9-7F5A3EFAED1E}"/>
+              </a:ext>
+            </a:extLst>
+          </p:cNvPr>
+          <p:cNvCxnSpPr/>
+          <p:nvPr/>
+        </p:nvCxnSpPr>
+        <p:spPr>
+          <a:xfrm>
+            <a:off x="4091517" y="2406650"/>
+            <a:ext cx="0" cy="635000"/>
+          </a:xfrm>
+          <a:prstGeom prst="line">
+            <a:avLst/>
+          </a:prstGeom>
+        </p:spPr>
+        <p:style>
+          <a:lnRef idx="1">
+            <a:schemeClr val="accent1"/>
+          </a:lnRef>
+          <a:fillRef idx="0">
+            <a:schemeClr val="accent1"/>
+          </a:fillRef>
+          <a:effectRef idx="0">
+            <a:schemeClr val="accent1"/>
+          </a:effectRef>
+          <a:fontRef idx="minor">
+            <a:schemeClr val="tx1"/>
+          </a:fontRef>
+        </p:style>
+      </p:cxnSp>
+      <p:cxnSp>
+        <p:nvCxnSpPr>
+          <p:cNvPr id="53" name="Straight Connector 52">
+            <a:extLst>
+              <a:ext uri="{FF2B5EF4-FFF2-40B4-BE49-F238E27FC236}">
+                <a16:creationId xmlns:a16="http://schemas.microsoft.com/office/drawing/2014/main" xmlns="" id="{F720A4A6-D647-0DFD-3852-25AB813A17B3}"/>
+              </a:ext>
+            </a:extLst>
+          </p:cNvPr>
+          <p:cNvCxnSpPr/>
+          <p:nvPr/>
+        </p:nvCxnSpPr>
+        <p:spPr>
+          <a:xfrm>
+            <a:off x="4089400" y="3048000"/>
+            <a:ext cx="179917" cy="0"/>
+          </a:xfrm>
+          <a:prstGeom prst="line">
+            <a:avLst/>
+          </a:prstGeom>
+        </p:spPr>
+        <p:style>
+          <a:lnRef idx="1">
+            <a:schemeClr val="accent1"/>
+          </a:lnRef>
+          <a:fillRef idx="0">
+            <a:schemeClr val="accent1"/>
+          </a:fillRef>
+          <a:effectRef idx="0">
+            <a:schemeClr val="accent1"/>
+          </a:effectRef>
+          <a:fontRef idx="minor">
+            <a:schemeClr val="tx1"/>
+          </a:fontRef>
+        </p:style>
+      </p:cxnSp>
+      <p:cxnSp>
+        <p:nvCxnSpPr>
+          <p:cNvPr id="57" name="Straight Connector 56">
+            <a:extLst>
+              <a:ext uri="{FF2B5EF4-FFF2-40B4-BE49-F238E27FC236}">
+                <a16:creationId xmlns:a16="http://schemas.microsoft.com/office/drawing/2014/main" xmlns="" id="{67E3784E-FCEA-17AD-5D68-82183ABFD7DD}"/>
+              </a:ext>
+            </a:extLst>
+          </p:cNvPr>
+          <p:cNvCxnSpPr>
+            <a:cxnSpLocks/>
+          </p:cNvCxnSpPr>
+          <p:nvPr/>
+        </p:nvCxnSpPr>
+        <p:spPr>
+          <a:xfrm flipH="1">
+            <a:off x="4002617" y="2127836"/>
+            <a:ext cx="379285" cy="0"/>
+          </a:xfrm>
+          <a:prstGeom prst="line">
+            <a:avLst/>
+          </a:prstGeom>
+        </p:spPr>
+        <p:style>
+          <a:lnRef idx="1">
+            <a:schemeClr val="accent1"/>
+          </a:lnRef>
+          <a:fillRef idx="0">
+            <a:schemeClr val="accent1"/>
+          </a:fillRef>
+          <a:effectRef idx="0">
+            <a:schemeClr val="accent1"/>
+          </a:effectRef>
+          <a:fontRef idx="minor">
+            <a:schemeClr val="tx1"/>
+          </a:fontRef>
+        </p:style>
+      </p:cxnSp>
+      <p:cxnSp>
+        <p:nvCxnSpPr>
+          <p:cNvPr id="62" name="Straight Connector 61">
+            <a:extLst>
+              <a:ext uri="{FF2B5EF4-FFF2-40B4-BE49-F238E27FC236}">
+                <a16:creationId xmlns:a16="http://schemas.microsoft.com/office/drawing/2014/main" xmlns="" id="{7727660B-60D5-3134-195A-D379982C0FF6}"/>
+              </a:ext>
+            </a:extLst>
+          </p:cNvPr>
+          <p:cNvCxnSpPr>
+            <a:cxnSpLocks/>
+          </p:cNvCxnSpPr>
+          <p:nvPr/>
+        </p:nvCxnSpPr>
+        <p:spPr>
+          <a:xfrm>
+            <a:off x="4002617" y="2127250"/>
+            <a:ext cx="0" cy="994833"/>
+          </a:xfrm>
+          <a:prstGeom prst="line">
+            <a:avLst/>
+          </a:prstGeom>
+        </p:spPr>
+        <p:style>
+          <a:lnRef idx="1">
+            <a:schemeClr val="accent1"/>
+          </a:lnRef>
+          <a:fillRef idx="0">
+            <a:schemeClr val="accent1"/>
+          </a:fillRef>
+          <a:effectRef idx="0">
+            <a:schemeClr val="accent1"/>
+          </a:effectRef>
+          <a:fontRef idx="minor">
+            <a:schemeClr val="tx1"/>
+          </a:fontRef>
+        </p:style>
+      </p:cxnSp>
+      <p:cxnSp>
+        <p:nvCxnSpPr>
+          <p:cNvPr id="65" name="Straight Connector 64">
+            <a:extLst>
+              <a:ext uri="{FF2B5EF4-FFF2-40B4-BE49-F238E27FC236}">
+                <a16:creationId xmlns:a16="http://schemas.microsoft.com/office/drawing/2014/main" xmlns="" id="{DEB4620B-C2B2-E6D6-1CC5-53201B8269D8}"/>
+              </a:ext>
+            </a:extLst>
+          </p:cNvPr>
+          <p:cNvCxnSpPr>
+            <a:cxnSpLocks/>
+          </p:cNvCxnSpPr>
+          <p:nvPr/>
+        </p:nvCxnSpPr>
+        <p:spPr>
+          <a:xfrm>
+            <a:off x="3998383" y="3115733"/>
+            <a:ext cx="258234" cy="0"/>
+          </a:xfrm>
+          <a:prstGeom prst="line">
+            <a:avLst/>
+          </a:prstGeom>
+        </p:spPr>
+        <p:style>
+          <a:lnRef idx="1">
+            <a:schemeClr val="accent1"/>
+          </a:lnRef>
+          <a:fillRef idx="0">
+            <a:schemeClr val="accent1"/>
+          </a:fillRef>
+          <a:effectRef idx="0">
+            <a:schemeClr val="accent1"/>
+          </a:effectRef>
+          <a:fontRef idx="minor">
+            <a:schemeClr val="tx1"/>
+          </a:fontRef>
+        </p:style>
+      </p:cxnSp>
+      <p:cxnSp>
+        <p:nvCxnSpPr>
+          <p:cNvPr id="75" name="Straight Connector 74">
+            <a:extLst>
+              <a:ext uri="{FF2B5EF4-FFF2-40B4-BE49-F238E27FC236}">
+                <a16:creationId xmlns:a16="http://schemas.microsoft.com/office/drawing/2014/main" xmlns="" id="{3915A501-B812-0A5D-9C8B-3AE6E58C67BF}"/>
+              </a:ext>
+            </a:extLst>
+          </p:cNvPr>
+          <p:cNvCxnSpPr>
+            <a:cxnSpLocks/>
+          </p:cNvCxnSpPr>
+          <p:nvPr/>
+        </p:nvCxnSpPr>
+        <p:spPr>
+          <a:xfrm>
+            <a:off x="3903133" y="1856317"/>
+            <a:ext cx="491067" cy="0"/>
+          </a:xfrm>
+          <a:prstGeom prst="line">
+            <a:avLst/>
+          </a:prstGeom>
+        </p:spPr>
+        <p:style>
+          <a:lnRef idx="1">
+            <a:schemeClr val="accent1"/>
+          </a:lnRef>
+          <a:fillRef idx="0">
+            <a:schemeClr val="accent1"/>
+          </a:fillRef>
+          <a:effectRef idx="0">
+            <a:schemeClr val="accent1"/>
+          </a:effectRef>
+          <a:fontRef idx="minor">
+            <a:schemeClr val="tx1"/>
+          </a:fontRef>
+        </p:style>
+      </p:cxnSp>
+      <p:cxnSp>
+        <p:nvCxnSpPr>
+          <p:cNvPr id="78" name="Straight Connector 77">
+            <a:extLst>
+              <a:ext uri="{FF2B5EF4-FFF2-40B4-BE49-F238E27FC236}">
+                <a16:creationId xmlns:a16="http://schemas.microsoft.com/office/drawing/2014/main" xmlns="" id="{862DE9C4-3ED2-79CE-4851-2EE67E8CB872}"/>
+              </a:ext>
+            </a:extLst>
+          </p:cNvPr>
+          <p:cNvCxnSpPr>
+            <a:cxnSpLocks/>
+          </p:cNvCxnSpPr>
+          <p:nvPr/>
+        </p:nvCxnSpPr>
+        <p:spPr>
+          <a:xfrm>
+            <a:off x="3898900" y="3181350"/>
+            <a:ext cx="361949" cy="0"/>
+          </a:xfrm>
+          <a:prstGeom prst="line">
+            <a:avLst/>
+          </a:prstGeom>
+        </p:spPr>
+        <p:style>
+          <a:lnRef idx="1">
+            <a:schemeClr val="accent1"/>
+          </a:lnRef>
+          <a:fillRef idx="0">
+            <a:schemeClr val="accent1"/>
+          </a:fillRef>
+          <a:effectRef idx="0">
+            <a:schemeClr val="accent1"/>
+          </a:effectRef>
+          <a:fontRef idx="minor">
+            <a:schemeClr val="tx1"/>
+          </a:fontRef>
+        </p:style>
+      </p:cxnSp>
+      <p:cxnSp>
+        <p:nvCxnSpPr>
+          <p:cNvPr id="81" name="Straight Connector 80">
+            <a:extLst>
+              <a:ext uri="{FF2B5EF4-FFF2-40B4-BE49-F238E27FC236}">
+                <a16:creationId xmlns:a16="http://schemas.microsoft.com/office/drawing/2014/main" xmlns="" id="{E5458755-91D9-4DEF-B2C8-89F087D1CBA1}"/>
+              </a:ext>
+            </a:extLst>
+          </p:cNvPr>
+          <p:cNvCxnSpPr>
+            <a:cxnSpLocks/>
+          </p:cNvCxnSpPr>
+          <p:nvPr/>
+        </p:nvCxnSpPr>
+        <p:spPr>
+          <a:xfrm>
+            <a:off x="3905250" y="1858433"/>
+            <a:ext cx="0" cy="1318684"/>
+          </a:xfrm>
+          <a:prstGeom prst="line">
+            <a:avLst/>
+          </a:prstGeom>
+        </p:spPr>
+        <p:style>
+          <a:lnRef idx="1">
+            <a:schemeClr val="accent1"/>
+          </a:lnRef>
+          <a:fillRef idx="0">
+            <a:schemeClr val="accent1"/>
+          </a:fillRef>
+          <a:effectRef idx="0">
+            <a:schemeClr val="accent1"/>
+          </a:effectRef>
+          <a:fontRef idx="minor">
+            <a:schemeClr val="tx1"/>
+          </a:fontRef>
+        </p:style>
+      </p:cxnSp>
+      <p:pic>
+        <p:nvPicPr>
+          <p:cNvPr id="1026" name="Picture 2"/>
+          <p:cNvPicPr>
+            <a:picLocks noChangeAspect="1" noChangeArrowheads="1"/>
+          </p:cNvPicPr>
+          <p:nvPr/>
+        </p:nvPicPr>
+        <p:blipFill>
+          <a:blip r:embed="rId9" cstate="print"/>
+          <a:srcRect/>
+          <a:stretch>
+            <a:fillRect/>
+          </a:stretch>
+        </p:blipFill>
+        <p:spPr bwMode="auto">
+          <a:xfrm>
+            <a:off x="6728192" y="571499"/>
+            <a:ext cx="743077" cy="1181101"/>
+          </a:xfrm>
+          <a:prstGeom prst="rect">
+            <a:avLst/>
+          </a:prstGeom>
+          <a:noFill/>
+          <a:ln w="9525">
+            <a:noFill/>
+            <a:miter lim="800000"/>
+            <a:headEnd/>
+            <a:tailEnd/>
+          </a:ln>
+          <a:effectLst/>
+        </p:spPr>
+      </p:pic>
+      <p:pic>
+        <p:nvPicPr>
+          <p:cNvPr id="1028" name="Picture 4"/>
+          <p:cNvPicPr>
+            <a:picLocks noChangeAspect="1" noChangeArrowheads="1"/>
+          </p:cNvPicPr>
+          <p:nvPr/>
+        </p:nvPicPr>
+        <p:blipFill>
+          <a:blip r:embed="rId10" cstate="print"/>
+          <a:srcRect/>
+          <a:stretch>
+            <a:fillRect/>
+          </a:stretch>
+        </p:blipFill>
+        <p:spPr bwMode="auto">
+          <a:xfrm>
+            <a:off x="4259743" y="1917699"/>
+            <a:ext cx="63019" cy="207963"/>
+          </a:xfrm>
+          <a:prstGeom prst="rect">
+            <a:avLst/>
+          </a:prstGeom>
+          <a:noFill/>
+          <a:ln w="9525">
+            <a:noFill/>
+            <a:miter lim="800000"/>
+            <a:headEnd/>
+            <a:tailEnd/>
+          </a:ln>
+          <a:effectLst/>
+        </p:spPr>
+      </p:pic>
+      <p:pic>
+        <p:nvPicPr>
+          <p:cNvPr id="64" name="Picture 4"/>
+          <p:cNvPicPr>
+            <a:picLocks noChangeAspect="1" noChangeArrowheads="1"/>
+          </p:cNvPicPr>
+          <p:nvPr/>
+        </p:nvPicPr>
+        <p:blipFill>
+          <a:blip r:embed="rId10" cstate="print"/>
+          <a:srcRect/>
+          <a:stretch>
+            <a:fillRect/>
+          </a:stretch>
+        </p:blipFill>
+        <p:spPr bwMode="auto">
+          <a:xfrm>
+            <a:off x="4259743" y="2187574"/>
+            <a:ext cx="63019" cy="207963"/>
+          </a:xfrm>
+          <a:prstGeom prst="rect">
+            <a:avLst/>
+          </a:prstGeom>
+          <a:noFill/>
+          <a:ln w="9525">
+            <a:noFill/>
+            <a:miter lim="800000"/>
+            <a:headEnd/>
+            <a:tailEnd/>
+          </a:ln>
+          <a:effectLst/>
+        </p:spPr>
+      </p:pic>
+      <p:pic>
+        <p:nvPicPr>
+          <p:cNvPr id="66" name="Picture 4"/>
+          <p:cNvPicPr>
+            <a:picLocks noChangeAspect="1" noChangeArrowheads="1"/>
+          </p:cNvPicPr>
+          <p:nvPr/>
+        </p:nvPicPr>
+        <p:blipFill>
+          <a:blip r:embed="rId10" cstate="print"/>
+          <a:srcRect/>
+          <a:stretch>
+            <a:fillRect/>
+          </a:stretch>
+        </p:blipFill>
+        <p:spPr bwMode="auto">
+          <a:xfrm>
+            <a:off x="4262918" y="2454274"/>
+            <a:ext cx="63019" cy="207963"/>
+          </a:xfrm>
+          <a:prstGeom prst="rect">
+            <a:avLst/>
+          </a:prstGeom>
+          <a:noFill/>
+          <a:ln w="9525">
+            <a:noFill/>
+            <a:miter lim="800000"/>
+            <a:headEnd/>
+            <a:tailEnd/>
+          </a:ln>
+          <a:effectLst/>
+        </p:spPr>
+      </p:pic>
+      <p:cxnSp>
+        <p:nvCxnSpPr>
+          <p:cNvPr id="67" name="Straight Connector 66"/>
+          <p:cNvCxnSpPr/>
+          <p:nvPr/>
+        </p:nvCxnSpPr>
+        <p:spPr>
+          <a:xfrm>
+            <a:off x="6416675" y="3192463"/>
+            <a:ext cx="285750" cy="0"/>
+          </a:xfrm>
+          <a:prstGeom prst="line">
+            <a:avLst/>
+          </a:prstGeom>
+        </p:spPr>
+        <p:style>
+          <a:lnRef idx="1">
+            <a:schemeClr val="accent1"/>
+          </a:lnRef>
+          <a:fillRef idx="0">
+            <a:schemeClr val="accent1"/>
+          </a:fillRef>
+          <a:effectRef idx="0">
+            <a:schemeClr val="accent1"/>
+          </a:effectRef>
+          <a:fontRef idx="minor">
+            <a:schemeClr val="tx1"/>
+          </a:fontRef>
+        </p:style>
+      </p:cxnSp>
+      <p:cxnSp>
+        <p:nvCxnSpPr>
+          <p:cNvPr id="76" name="Straight Connector 75"/>
+          <p:cNvCxnSpPr/>
+          <p:nvPr/>
+        </p:nvCxnSpPr>
+        <p:spPr>
+          <a:xfrm flipV="1">
+            <a:off x="6702425" y="1603375"/>
+            <a:ext cx="0" cy="1584327"/>
+          </a:xfrm>
+          <a:prstGeom prst="line">
+            <a:avLst/>
+          </a:prstGeom>
+        </p:spPr>
+        <p:style>
+          <a:lnRef idx="1">
+            <a:schemeClr val="accent1"/>
+          </a:lnRef>
+          <a:fillRef idx="0">
+            <a:schemeClr val="accent1"/>
+          </a:fillRef>
+          <a:effectRef idx="0">
+            <a:schemeClr val="accent1"/>
+          </a:effectRef>
+          <a:fontRef idx="minor">
+            <a:schemeClr val="tx1"/>
+          </a:fontRef>
+        </p:style>
+      </p:cxnSp>
+      <p:cxnSp>
+        <p:nvCxnSpPr>
+          <p:cNvPr id="82" name="Straight Connector 81"/>
+          <p:cNvCxnSpPr/>
+          <p:nvPr/>
+        </p:nvCxnSpPr>
+        <p:spPr>
+          <a:xfrm flipH="1">
+            <a:off x="6702425" y="1606550"/>
+            <a:ext cx="58739" cy="0"/>
+          </a:xfrm>
+          <a:prstGeom prst="line">
+            <a:avLst/>
+          </a:prstGeom>
+        </p:spPr>
+        <p:style>
+          <a:lnRef idx="1">
+            <a:schemeClr val="accent1"/>
+          </a:lnRef>
+          <a:fillRef idx="0">
+            <a:schemeClr val="accent1"/>
+          </a:fillRef>
+          <a:effectRef idx="0">
+            <a:schemeClr val="accent1"/>
+          </a:effectRef>
+          <a:fontRef idx="minor">
+            <a:schemeClr val="tx1"/>
+          </a:fontRef>
+        </p:style>
+      </p:cxnSp>
+      <p:cxnSp>
+        <p:nvCxnSpPr>
+          <p:cNvPr id="84" name="Straight Connector 83"/>
+          <p:cNvCxnSpPr/>
+          <p:nvPr/>
+        </p:nvCxnSpPr>
+        <p:spPr>
+          <a:xfrm>
+            <a:off x="6553200" y="2233613"/>
+            <a:ext cx="1060450" cy="0"/>
+          </a:xfrm>
+          <a:prstGeom prst="line">
+            <a:avLst/>
+          </a:prstGeom>
+        </p:spPr>
+        <p:style>
+          <a:lnRef idx="1">
+            <a:schemeClr val="accent1"/>
+          </a:lnRef>
+          <a:fillRef idx="0">
+            <a:schemeClr val="accent1"/>
+          </a:fillRef>
+          <a:effectRef idx="0">
+            <a:schemeClr val="accent1"/>
+          </a:effectRef>
+          <a:fontRef idx="minor">
+            <a:schemeClr val="tx1"/>
+          </a:fontRef>
+        </p:style>
+      </p:cxnSp>
+      <p:sp>
+        <p:nvSpPr>
+          <p:cNvPr id="90" name="Oval 89"/>
+          <p:cNvSpPr/>
+          <p:nvPr/>
+        </p:nvSpPr>
+        <p:spPr>
+          <a:xfrm>
+            <a:off x="6689725" y="2108200"/>
+            <a:ext cx="36000" cy="36000"/>
+          </a:xfrm>
+          <a:prstGeom prst="ellipse">
+            <a:avLst/>
+          </a:prstGeom>
+          <a:ln>
+            <a:solidFill>
+              <a:schemeClr val="accent1"/>
+            </a:solidFill>
+          </a:ln>
+        </p:spPr>
+        <p:style>
+          <a:lnRef idx="2">
+            <a:schemeClr val="accent1">
+              <a:shade val="50000"/>
+            </a:schemeClr>
+          </a:lnRef>
+          <a:fillRef idx="1">
+            <a:schemeClr val="accent1"/>
+          </a:fillRef>
+          <a:effectRef idx="0">
+            <a:schemeClr val="accent1"/>
+          </a:effectRef>
+          <a:fontRef idx="minor">
+            <a:schemeClr val="lt1"/>
+          </a:fontRef>
+        </p:style>
+        <p:txBody>
+          <a:bodyPr rtlCol="0" anchor="ctr"/>
+          <a:lstStyle/>
+          <a:p>
+            <a:pPr algn="ctr"/>
+            <a:endParaRPr lang="en-US"/>
+          </a:p>
+        </p:txBody>
+      </p:sp>
+      <p:sp>
+        <p:nvSpPr>
+          <p:cNvPr id="91" name="Oval 90"/>
+          <p:cNvSpPr/>
+          <p:nvPr/>
+        </p:nvSpPr>
+        <p:spPr>
+          <a:xfrm>
+            <a:off x="6530975" y="2222500"/>
+            <a:ext cx="36000" cy="36000"/>
+          </a:xfrm>
+          <a:prstGeom prst="ellipse">
+            <a:avLst/>
+          </a:prstGeom>
+          <a:ln>
+            <a:solidFill>
+              <a:schemeClr val="accent1"/>
+            </a:solidFill>
+          </a:ln>
+        </p:spPr>
+        <p:style>
+          <a:lnRef idx="2">
+            <a:schemeClr val="accent1">
+              <a:shade val="50000"/>
+            </a:schemeClr>
+          </a:lnRef>
+          <a:fillRef idx="1">
+            <a:schemeClr val="accent1"/>
+          </a:fillRef>
+          <a:effectRef idx="0">
+            <a:schemeClr val="accent1"/>
+          </a:effectRef>
+          <a:fontRef idx="minor">
+            <a:schemeClr val="lt1"/>
+          </a:fontRef>
+        </p:style>
+        <p:txBody>
+          <a:bodyPr rtlCol="0" anchor="ctr"/>
+          <a:lstStyle/>
+          <a:p>
+            <a:pPr algn="ctr"/>
+            <a:endParaRPr lang="en-US"/>
+          </a:p>
+        </p:txBody>
+      </p:sp>
+      <p:cxnSp>
+        <p:nvCxnSpPr>
+          <p:cNvPr id="92" name="Straight Connector 91"/>
+          <p:cNvCxnSpPr/>
+          <p:nvPr/>
+        </p:nvCxnSpPr>
+        <p:spPr>
+          <a:xfrm>
+            <a:off x="6705600" y="2128838"/>
+            <a:ext cx="1003300" cy="0"/>
+          </a:xfrm>
+          <a:prstGeom prst="line">
+            <a:avLst/>
+          </a:prstGeom>
+        </p:spPr>
+        <p:style>
+          <a:lnRef idx="1">
+            <a:schemeClr val="accent1"/>
+          </a:lnRef>
+          <a:fillRef idx="0">
+            <a:schemeClr val="accent1"/>
+          </a:fillRef>
+          <a:effectRef idx="0">
+            <a:schemeClr val="accent1"/>
+          </a:effectRef>
+          <a:fontRef idx="minor">
+            <a:schemeClr val="tx1"/>
+          </a:fontRef>
+        </p:style>
+      </p:cxnSp>
+      <p:cxnSp>
+        <p:nvCxnSpPr>
+          <p:cNvPr id="93" name="Straight Connector 92"/>
+          <p:cNvCxnSpPr/>
+          <p:nvPr/>
+        </p:nvCxnSpPr>
+        <p:spPr>
+          <a:xfrm flipV="1">
+            <a:off x="7712075" y="2130425"/>
+            <a:ext cx="0" cy="374651"/>
+          </a:xfrm>
+          <a:prstGeom prst="line">
+            <a:avLst/>
+          </a:prstGeom>
+        </p:spPr>
+        <p:style>
+          <a:lnRef idx="1">
+            <a:schemeClr val="accent1"/>
+          </a:lnRef>
+          <a:fillRef idx="0">
+            <a:schemeClr val="accent1"/>
+          </a:fillRef>
+          <a:effectRef idx="0">
+            <a:schemeClr val="accent1"/>
+          </a:effectRef>
+          <a:fontRef idx="minor">
+            <a:schemeClr val="tx1"/>
+          </a:fontRef>
+        </p:style>
+      </p:cxnSp>
+      <p:pic>
+        <p:nvPicPr>
+          <p:cNvPr id="96" name="Picture 4"/>
+          <p:cNvPicPr>
+            <a:picLocks noChangeAspect="1" noChangeArrowheads="1"/>
+          </p:cNvPicPr>
+          <p:nvPr/>
+        </p:nvPicPr>
+        <p:blipFill>
+          <a:blip r:embed="rId10" cstate="print"/>
+          <a:srcRect/>
+          <a:stretch>
+            <a:fillRect/>
+          </a:stretch>
+        </p:blipFill>
+        <p:spPr bwMode="auto">
+          <a:xfrm>
+            <a:off x="7418868" y="2025649"/>
+            <a:ext cx="63019" cy="207963"/>
+          </a:xfrm>
+          <a:prstGeom prst="rect">
+            <a:avLst/>
+          </a:prstGeom>
+          <a:noFill/>
+          <a:ln w="9525">
+            <a:noFill/>
+            <a:miter lim="800000"/>
+            <a:headEnd/>
+            <a:tailEnd/>
+          </a:ln>
+          <a:effectLst/>
+        </p:spPr>
+      </p:pic>
+      <p:pic>
+        <p:nvPicPr>
+          <p:cNvPr id="97" name="Picture 4"/>
+          <p:cNvPicPr>
+            <a:picLocks noChangeAspect="1" noChangeArrowheads="1"/>
+          </p:cNvPicPr>
+          <p:nvPr/>
+        </p:nvPicPr>
+        <p:blipFill>
+          <a:blip r:embed="rId10" cstate="print"/>
+          <a:srcRect/>
+          <a:stretch>
+            <a:fillRect/>
+          </a:stretch>
+        </p:blipFill>
+        <p:spPr bwMode="auto">
+          <a:xfrm>
+            <a:off x="7571268" y="1917699"/>
+            <a:ext cx="63019" cy="207963"/>
+          </a:xfrm>
+          <a:prstGeom prst="rect">
+            <a:avLst/>
+          </a:prstGeom>
+          <a:noFill/>
+          <a:ln w="9525">
+            <a:noFill/>
+            <a:miter lim="800000"/>
+            <a:headEnd/>
+            <a:tailEnd/>
+          </a:ln>
+          <a:effectLst/>
+        </p:spPr>
+      </p:pic>
+      <p:pic>
+        <p:nvPicPr>
+          <p:cNvPr id="98" name="Picture 4"/>
+          <p:cNvPicPr>
+            <a:picLocks noChangeAspect="1" noChangeArrowheads="1"/>
+          </p:cNvPicPr>
+          <p:nvPr/>
+        </p:nvPicPr>
+        <p:blipFill>
+          <a:blip r:embed="rId10" cstate="print"/>
+          <a:srcRect/>
+          <a:stretch>
+            <a:fillRect/>
+          </a:stretch>
+        </p:blipFill>
+        <p:spPr bwMode="auto">
+          <a:xfrm>
+            <a:off x="7418868" y="2025649"/>
+            <a:ext cx="63019" cy="207963"/>
+          </a:xfrm>
+          <a:prstGeom prst="rect">
+            <a:avLst/>
+          </a:prstGeom>
+          <a:noFill/>
+          <a:ln w="9525">
+            <a:noFill/>
+            <a:miter lim="800000"/>
+            <a:headEnd/>
+            <a:tailEnd/>
+          </a:ln>
+          <a:effectLst/>
+        </p:spPr>
+      </p:pic>
+      <p:sp>
+        <p:nvSpPr>
+          <p:cNvPr id="99" name="TextBox 98">
+            <a:extLst>
+              <a:ext uri="{FF2B5EF4-FFF2-40B4-BE49-F238E27FC236}">
+                <a16:creationId xmlns:a16="http://schemas.microsoft.com/office/drawing/2014/main" xmlns="" id="{032073D1-5C86-096E-E34F-E839D76407AB}"/>
+              </a:ext>
+            </a:extLst>
+          </p:cNvPr>
+          <p:cNvSpPr txBox="1"/>
+          <p:nvPr/>
+        </p:nvSpPr>
+        <p:spPr>
+          <a:xfrm>
+            <a:off x="6290696" y="1248196"/>
+            <a:ext cx="370454" cy="169277"/>
+          </a:xfrm>
+          <a:prstGeom prst="rect">
+            <a:avLst/>
+          </a:prstGeom>
+          <a:noFill/>
+        </p:spPr>
+        <p:txBody>
+          <a:bodyPr wrap="square" rtlCol="0">
+            <a:spAutoFit/>
+          </a:bodyPr>
+          <a:lstStyle/>
+          <a:p>
+            <a:r>
+              <a:rPr lang="da-DK" sz="500" dirty="0"/>
+              <a:t>+3,3V</a:t>
+            </a:r>
+            <a:endParaRPr lang="en-US" sz="500" dirty="0"/>
+          </a:p>
+        </p:txBody>
+      </p:sp>
+      <p:sp>
+        <p:nvSpPr>
+          <p:cNvPr id="100" name="TextBox 99">
+            <a:extLst>
+              <a:ext uri="{FF2B5EF4-FFF2-40B4-BE49-F238E27FC236}">
+                <a16:creationId xmlns:a16="http://schemas.microsoft.com/office/drawing/2014/main" xmlns="" id="{032073D1-5C86-096E-E34F-E839D76407AB}"/>
+              </a:ext>
+            </a:extLst>
+          </p:cNvPr>
+          <p:cNvSpPr txBox="1"/>
+          <p:nvPr/>
+        </p:nvSpPr>
+        <p:spPr>
+          <a:xfrm>
+            <a:off x="4045971" y="1676821"/>
+            <a:ext cx="370454" cy="169277"/>
+          </a:xfrm>
+          <a:prstGeom prst="rect">
+            <a:avLst/>
+          </a:prstGeom>
+          <a:noFill/>
+        </p:spPr>
+        <p:txBody>
+          <a:bodyPr wrap="square" rtlCol="0">
+            <a:spAutoFit/>
+          </a:bodyPr>
+          <a:lstStyle/>
+          <a:p>
+            <a:r>
+              <a:rPr lang="da-DK" sz="500" dirty="0" smtClean="0"/>
+              <a:t>270R</a:t>
+            </a:r>
+            <a:endParaRPr lang="en-US" sz="500" dirty="0"/>
+          </a:p>
+        </p:txBody>
+      </p:sp>
+      <p:sp>
+        <p:nvSpPr>
+          <p:cNvPr id="101" name="TextBox 100">
+            <a:extLst>
+              <a:ext uri="{FF2B5EF4-FFF2-40B4-BE49-F238E27FC236}">
+                <a16:creationId xmlns:a16="http://schemas.microsoft.com/office/drawing/2014/main" xmlns="" id="{032073D1-5C86-096E-E34F-E839D76407AB}"/>
+              </a:ext>
+            </a:extLst>
+          </p:cNvPr>
+          <p:cNvSpPr txBox="1"/>
+          <p:nvPr/>
+        </p:nvSpPr>
+        <p:spPr>
+          <a:xfrm>
+            <a:off x="7551171" y="1943521"/>
+            <a:ext cx="370454" cy="169277"/>
+          </a:xfrm>
+          <a:prstGeom prst="rect">
+            <a:avLst/>
+          </a:prstGeom>
+          <a:noFill/>
+        </p:spPr>
+        <p:txBody>
+          <a:bodyPr wrap="square" rtlCol="0">
+            <a:spAutoFit/>
+          </a:bodyPr>
+          <a:lstStyle/>
+          <a:p>
+            <a:r>
+              <a:rPr lang="da-DK" sz="500" dirty="0" smtClean="0"/>
+              <a:t>4K7</a:t>
+            </a:r>
+            <a:endParaRPr lang="en-US" sz="500" dirty="0"/>
+          </a:p>
+        </p:txBody>
+      </p:sp>
+      <p:cxnSp>
+        <p:nvCxnSpPr>
+          <p:cNvPr id="105" name="Straight Connector 104"/>
+          <p:cNvCxnSpPr/>
+          <p:nvPr/>
+        </p:nvCxnSpPr>
+        <p:spPr>
+          <a:xfrm flipH="1">
+            <a:off x="6543675" y="1330325"/>
+            <a:ext cx="227013" cy="3080"/>
+          </a:xfrm>
+          <a:prstGeom prst="line">
+            <a:avLst/>
+          </a:prstGeom>
+        </p:spPr>
+        <p:style>
+          <a:lnRef idx="1">
+            <a:schemeClr val="accent1"/>
+          </a:lnRef>
+          <a:fillRef idx="0">
+            <a:schemeClr val="accent1"/>
+          </a:fillRef>
+          <a:effectRef idx="0">
+            <a:schemeClr val="accent1"/>
+          </a:effectRef>
+          <a:fontRef idx="minor">
+            <a:schemeClr val="tx1"/>
+          </a:fontRef>
+        </p:style>
+      </p:cxnSp>
+      <p:cxnSp>
+        <p:nvCxnSpPr>
+          <p:cNvPr id="113" name="Straight Connector 112"/>
+          <p:cNvCxnSpPr/>
+          <p:nvPr/>
+        </p:nvCxnSpPr>
+        <p:spPr>
+          <a:xfrm flipH="1">
+            <a:off x="6369050" y="1400175"/>
+            <a:ext cx="404814" cy="0"/>
+          </a:xfrm>
+          <a:prstGeom prst="line">
+            <a:avLst/>
+          </a:prstGeom>
+        </p:spPr>
+        <p:style>
+          <a:lnRef idx="1">
+            <a:schemeClr val="accent1"/>
+          </a:lnRef>
+          <a:fillRef idx="0">
+            <a:schemeClr val="accent1"/>
+          </a:fillRef>
+          <a:effectRef idx="0">
+            <a:schemeClr val="accent1"/>
+          </a:effectRef>
+          <a:fontRef idx="minor">
+            <a:schemeClr val="tx1"/>
+          </a:fontRef>
+        </p:style>
+      </p:cxnSp>
+      <p:cxnSp>
+        <p:nvCxnSpPr>
+          <p:cNvPr id="116" name="Straight Connector 115"/>
+          <p:cNvCxnSpPr/>
+          <p:nvPr/>
+        </p:nvCxnSpPr>
+        <p:spPr>
+          <a:xfrm flipV="1">
+            <a:off x="6372225" y="1403350"/>
+            <a:ext cx="0" cy="441325"/>
+          </a:xfrm>
+          <a:prstGeom prst="line">
+            <a:avLst/>
+          </a:prstGeom>
+        </p:spPr>
+        <p:style>
+          <a:lnRef idx="1">
+            <a:schemeClr val="accent1"/>
+          </a:lnRef>
+          <a:fillRef idx="0">
+            <a:schemeClr val="accent1"/>
+          </a:fillRef>
+          <a:effectRef idx="0">
+            <a:schemeClr val="accent1"/>
+          </a:effectRef>
+          <a:fontRef idx="minor">
+            <a:schemeClr val="tx1"/>
+          </a:fontRef>
+        </p:style>
+      </p:cxnSp>
+      <p:cxnSp>
+        <p:nvCxnSpPr>
+          <p:cNvPr id="118" name="Straight Connector 117"/>
+          <p:cNvCxnSpPr/>
+          <p:nvPr/>
+        </p:nvCxnSpPr>
+        <p:spPr>
+          <a:xfrm flipH="1">
+            <a:off x="6375400" y="1841500"/>
+            <a:ext cx="1231900" cy="0"/>
+          </a:xfrm>
+          <a:prstGeom prst="line">
+            <a:avLst/>
+          </a:prstGeom>
+        </p:spPr>
+        <p:style>
+          <a:lnRef idx="1">
+            <a:schemeClr val="accent1"/>
+          </a:lnRef>
+          <a:fillRef idx="0">
+            <a:schemeClr val="accent1"/>
+          </a:fillRef>
+          <a:effectRef idx="0">
+            <a:schemeClr val="accent1"/>
+          </a:effectRef>
+          <a:fontRef idx="minor">
+            <a:schemeClr val="tx1"/>
+          </a:fontRef>
+        </p:style>
+      </p:cxnSp>
+      <p:cxnSp>
+        <p:nvCxnSpPr>
+          <p:cNvPr id="120" name="Straight Connector 119"/>
+          <p:cNvCxnSpPr/>
+          <p:nvPr/>
+        </p:nvCxnSpPr>
+        <p:spPr>
+          <a:xfrm flipV="1">
+            <a:off x="7600950" y="1524000"/>
+            <a:ext cx="0" cy="317500"/>
+          </a:xfrm>
+          <a:prstGeom prst="line">
+            <a:avLst/>
+          </a:prstGeom>
+        </p:spPr>
+        <p:style>
+          <a:lnRef idx="1">
+            <a:schemeClr val="accent1"/>
+          </a:lnRef>
+          <a:fillRef idx="0">
+            <a:schemeClr val="accent1"/>
+          </a:fillRef>
+          <a:effectRef idx="0">
+            <a:schemeClr val="accent1"/>
+          </a:effectRef>
+          <a:fontRef idx="minor">
+            <a:schemeClr val="tx1"/>
+          </a:fontRef>
+        </p:style>
+      </p:cxnSp>
+      <p:cxnSp>
+        <p:nvCxnSpPr>
+          <p:cNvPr id="124" name="Straight Connector 123"/>
+          <p:cNvCxnSpPr/>
+          <p:nvPr/>
+        </p:nvCxnSpPr>
+        <p:spPr>
+          <a:xfrm flipH="1">
+            <a:off x="7448551" y="1527080"/>
+            <a:ext cx="152399" cy="0"/>
+          </a:xfrm>
+          <a:prstGeom prst="line">
+            <a:avLst/>
+          </a:prstGeom>
+        </p:spPr>
+        <p:style>
+          <a:lnRef idx="1">
+            <a:schemeClr val="accent1"/>
+          </a:lnRef>
+          <a:fillRef idx="0">
+            <a:schemeClr val="accent1"/>
+          </a:fillRef>
+          <a:effectRef idx="0">
+            <a:schemeClr val="accent1"/>
+          </a:effectRef>
+          <a:fontRef idx="minor">
+            <a:schemeClr val="tx1"/>
+          </a:fontRef>
+        </p:style>
+      </p:cxnSp>
+      <p:cxnSp>
+        <p:nvCxnSpPr>
+          <p:cNvPr id="128" name="Straight Connector 127"/>
+          <p:cNvCxnSpPr/>
+          <p:nvPr/>
+        </p:nvCxnSpPr>
+        <p:spPr>
+          <a:xfrm flipH="1">
+            <a:off x="7448551" y="1663605"/>
+            <a:ext cx="152399" cy="0"/>
+          </a:xfrm>
+          <a:prstGeom prst="line">
+            <a:avLst/>
+          </a:prstGeom>
+        </p:spPr>
+        <p:style>
+          <a:lnRef idx="1">
+            <a:schemeClr val="accent1"/>
+          </a:lnRef>
+          <a:fillRef idx="0">
+            <a:schemeClr val="accent1"/>
+          </a:fillRef>
+          <a:effectRef idx="0">
+            <a:schemeClr val="accent1"/>
+          </a:effectRef>
+          <a:fontRef idx="minor">
+            <a:schemeClr val="tx1"/>
+          </a:fontRef>
+        </p:style>
+      </p:cxnSp>
+      <p:cxnSp>
+        <p:nvCxnSpPr>
+          <p:cNvPr id="130" name="Straight Connector 129"/>
+          <p:cNvCxnSpPr/>
+          <p:nvPr/>
+        </p:nvCxnSpPr>
+        <p:spPr>
+          <a:xfrm flipH="1">
+            <a:off x="7445376" y="1593755"/>
+            <a:ext cx="152399" cy="0"/>
+          </a:xfrm>
+          <a:prstGeom prst="line">
+            <a:avLst/>
+          </a:prstGeom>
+        </p:spPr>
+        <p:style>
+          <a:lnRef idx="1">
+            <a:schemeClr val="accent1"/>
+          </a:lnRef>
+          <a:fillRef idx="0">
+            <a:schemeClr val="accent1"/>
+          </a:fillRef>
+          <a:effectRef idx="0">
+            <a:schemeClr val="accent1"/>
+          </a:effectRef>
+          <a:fontRef idx="minor">
+            <a:schemeClr val="tx1"/>
+          </a:fontRef>
+        </p:style>
+      </p:cxnSp>
+      <p:sp>
+        <p:nvSpPr>
+          <p:cNvPr id="135" name="Oval 134"/>
+          <p:cNvSpPr/>
+          <p:nvPr/>
+        </p:nvSpPr>
+        <p:spPr>
+          <a:xfrm>
+            <a:off x="7585075" y="1644650"/>
+            <a:ext cx="36000" cy="36000"/>
+          </a:xfrm>
+          <a:prstGeom prst="ellipse">
+            <a:avLst/>
+          </a:prstGeom>
+          <a:ln>
+            <a:solidFill>
+              <a:schemeClr val="accent1"/>
+            </a:solidFill>
+          </a:ln>
+        </p:spPr>
+        <p:style>
+          <a:lnRef idx="2">
+            <a:schemeClr val="accent1">
+              <a:shade val="50000"/>
+            </a:schemeClr>
+          </a:lnRef>
+          <a:fillRef idx="1">
+            <a:schemeClr val="accent1"/>
+          </a:fillRef>
+          <a:effectRef idx="0">
+            <a:schemeClr val="accent1"/>
+          </a:effectRef>
+          <a:fontRef idx="minor">
+            <a:schemeClr val="lt1"/>
+          </a:fontRef>
+        </p:style>
+        <p:txBody>
+          <a:bodyPr rtlCol="0" anchor="ctr"/>
+          <a:lstStyle/>
+          <a:p>
+            <a:pPr algn="ctr"/>
+            <a:endParaRPr lang="en-US"/>
+          </a:p>
+        </p:txBody>
+      </p:sp>
+      <p:sp>
+        <p:nvSpPr>
+          <p:cNvPr id="137" name="Oval 136"/>
+          <p:cNvSpPr/>
+          <p:nvPr/>
+        </p:nvSpPr>
+        <p:spPr>
+          <a:xfrm>
+            <a:off x="7581900" y="1574800"/>
+            <a:ext cx="36000" cy="36000"/>
+          </a:xfrm>
+          <a:prstGeom prst="ellipse">
+            <a:avLst/>
+          </a:prstGeom>
+          <a:ln>
+            <a:solidFill>
+              <a:schemeClr val="accent1"/>
+            </a:solidFill>
+          </a:ln>
+        </p:spPr>
+        <p:style>
+          <a:lnRef idx="2">
+            <a:schemeClr val="accent1">
+              <a:shade val="50000"/>
+            </a:schemeClr>
+          </a:lnRef>
+          <a:fillRef idx="1">
+            <a:schemeClr val="accent1"/>
+          </a:fillRef>
+          <a:effectRef idx="0">
+            <a:schemeClr val="accent1"/>
+          </a:effectRef>
+          <a:fontRef idx="minor">
+            <a:schemeClr val="lt1"/>
+          </a:fontRef>
+        </p:style>
+        <p:txBody>
+          <a:bodyPr rtlCol="0" anchor="ctr"/>
+          <a:lstStyle/>
+          <a:p>
+            <a:pPr algn="ctr"/>
+            <a:endParaRPr lang="en-US"/>
+          </a:p>
+        </p:txBody>
+      </p:sp>
+      <p:cxnSp>
+        <p:nvCxnSpPr>
+          <p:cNvPr id="139" name="Straight Connector 138"/>
+          <p:cNvCxnSpPr/>
+          <p:nvPr/>
+        </p:nvCxnSpPr>
+        <p:spPr>
+          <a:xfrm flipH="1">
+            <a:off x="7442201" y="1244505"/>
+            <a:ext cx="152399" cy="0"/>
+          </a:xfrm>
+          <a:prstGeom prst="line">
+            <a:avLst/>
+          </a:prstGeom>
+        </p:spPr>
+        <p:style>
+          <a:lnRef idx="1">
+            <a:schemeClr val="accent1"/>
+          </a:lnRef>
+          <a:fillRef idx="0">
+            <a:schemeClr val="accent1"/>
+          </a:fillRef>
+          <a:effectRef idx="0">
+            <a:schemeClr val="accent1"/>
+          </a:effectRef>
+          <a:fontRef idx="minor">
+            <a:schemeClr val="tx1"/>
+          </a:fontRef>
+        </p:style>
+      </p:cxnSp>
+      <p:cxnSp>
+        <p:nvCxnSpPr>
+          <p:cNvPr id="141" name="Straight Connector 140"/>
+          <p:cNvCxnSpPr/>
+          <p:nvPr/>
+        </p:nvCxnSpPr>
+        <p:spPr>
+          <a:xfrm flipH="1">
+            <a:off x="6623051" y="761905"/>
+            <a:ext cx="152399" cy="0"/>
+          </a:xfrm>
+          <a:prstGeom prst="line">
+            <a:avLst/>
+          </a:prstGeom>
+        </p:spPr>
+        <p:style>
+          <a:lnRef idx="1">
+            <a:schemeClr val="accent1"/>
+          </a:lnRef>
+          <a:fillRef idx="0">
+            <a:schemeClr val="accent1"/>
+          </a:fillRef>
+          <a:effectRef idx="0">
+            <a:schemeClr val="accent1"/>
+          </a:effectRef>
+          <a:fontRef idx="minor">
+            <a:schemeClr val="tx1"/>
+          </a:fontRef>
+        </p:style>
+      </p:cxnSp>
+      <p:cxnSp>
+        <p:nvCxnSpPr>
+          <p:cNvPr id="143" name="Straight Connector 142"/>
+          <p:cNvCxnSpPr/>
+          <p:nvPr/>
+        </p:nvCxnSpPr>
+        <p:spPr>
+          <a:xfrm flipH="1">
+            <a:off x="7442201" y="895255"/>
+            <a:ext cx="152399" cy="0"/>
+          </a:xfrm>
+          <a:prstGeom prst="line">
+            <a:avLst/>
+          </a:prstGeom>
+        </p:spPr>
+        <p:style>
+          <a:lnRef idx="1">
+            <a:schemeClr val="accent1"/>
+          </a:lnRef>
+          <a:fillRef idx="0">
+            <a:schemeClr val="accent1"/>
+          </a:fillRef>
+          <a:effectRef idx="0">
+            <a:schemeClr val="accent1"/>
+          </a:effectRef>
+          <a:fontRef idx="minor">
+            <a:schemeClr val="tx1"/>
+          </a:fontRef>
+        </p:style>
+      </p:cxnSp>
+      <p:cxnSp>
+        <p:nvCxnSpPr>
+          <p:cNvPr id="144" name="Straight Connector 143"/>
+          <p:cNvCxnSpPr/>
+          <p:nvPr/>
+        </p:nvCxnSpPr>
+        <p:spPr>
+          <a:xfrm flipH="1">
+            <a:off x="7442201" y="965105"/>
+            <a:ext cx="152399" cy="0"/>
+          </a:xfrm>
+          <a:prstGeom prst="line">
+            <a:avLst/>
+          </a:prstGeom>
+        </p:spPr>
+        <p:style>
+          <a:lnRef idx="1">
+            <a:schemeClr val="accent1"/>
+          </a:lnRef>
+          <a:fillRef idx="0">
+            <a:schemeClr val="accent1"/>
+          </a:fillRef>
+          <a:effectRef idx="0">
+            <a:schemeClr val="accent1"/>
+          </a:effectRef>
+          <a:fontRef idx="minor">
+            <a:schemeClr val="tx1"/>
+          </a:fontRef>
+        </p:style>
+      </p:cxnSp>
+      <p:cxnSp>
+        <p:nvCxnSpPr>
+          <p:cNvPr id="145" name="Straight Connector 144"/>
+          <p:cNvCxnSpPr/>
+          <p:nvPr/>
+        </p:nvCxnSpPr>
+        <p:spPr>
+          <a:xfrm flipH="1">
+            <a:off x="7442201" y="1031780"/>
+            <a:ext cx="152399" cy="0"/>
+          </a:xfrm>
+          <a:prstGeom prst="line">
+            <a:avLst/>
+          </a:prstGeom>
+        </p:spPr>
+        <p:style>
+          <a:lnRef idx="1">
+            <a:schemeClr val="accent1"/>
+          </a:lnRef>
+          <a:fillRef idx="0">
+            <a:schemeClr val="accent1"/>
+          </a:fillRef>
+          <a:effectRef idx="0">
+            <a:schemeClr val="accent1"/>
+          </a:effectRef>
+          <a:fontRef idx="minor">
+            <a:schemeClr val="tx1"/>
+          </a:fontRef>
+        </p:style>
+      </p:cxnSp>
+      <p:cxnSp>
+        <p:nvCxnSpPr>
+          <p:cNvPr id="146" name="Straight Connector 145"/>
+          <p:cNvCxnSpPr/>
+          <p:nvPr/>
+        </p:nvCxnSpPr>
+        <p:spPr>
+          <a:xfrm flipH="1">
+            <a:off x="7442201" y="1107980"/>
+            <a:ext cx="152399" cy="0"/>
+          </a:xfrm>
+          <a:prstGeom prst="line">
+            <a:avLst/>
+          </a:prstGeom>
+        </p:spPr>
+        <p:style>
+          <a:lnRef idx="1">
+            <a:schemeClr val="accent1"/>
+          </a:lnRef>
+          <a:fillRef idx="0">
+            <a:schemeClr val="accent1"/>
+          </a:fillRef>
+          <a:effectRef idx="0">
+            <a:schemeClr val="accent1"/>
+          </a:effectRef>
+          <a:fontRef idx="minor">
+            <a:schemeClr val="tx1"/>
+          </a:fontRef>
+        </p:style>
+      </p:cxnSp>
+      <p:cxnSp>
+        <p:nvCxnSpPr>
+          <p:cNvPr id="147" name="Straight Connector 146"/>
+          <p:cNvCxnSpPr/>
+          <p:nvPr/>
+        </p:nvCxnSpPr>
+        <p:spPr>
+          <a:xfrm flipH="1">
+            <a:off x="7442201" y="1181005"/>
+            <a:ext cx="152399" cy="0"/>
+          </a:xfrm>
+          <a:prstGeom prst="line">
+            <a:avLst/>
+          </a:prstGeom>
+        </p:spPr>
+        <p:style>
+          <a:lnRef idx="1">
+            <a:schemeClr val="accent1"/>
+          </a:lnRef>
+          <a:fillRef idx="0">
+            <a:schemeClr val="accent1"/>
+          </a:fillRef>
+          <a:effectRef idx="0">
+            <a:schemeClr val="accent1"/>
+          </a:effectRef>
+          <a:fontRef idx="minor">
+            <a:schemeClr val="tx1"/>
+          </a:fontRef>
+        </p:style>
+      </p:cxnSp>
+      <p:cxnSp>
+        <p:nvCxnSpPr>
+          <p:cNvPr id="148" name="Straight Connector 147"/>
+          <p:cNvCxnSpPr/>
+          <p:nvPr/>
+        </p:nvCxnSpPr>
+        <p:spPr>
+          <a:xfrm flipH="1">
+            <a:off x="6623051" y="838105"/>
+            <a:ext cx="152399" cy="0"/>
+          </a:xfrm>
+          <a:prstGeom prst="line">
+            <a:avLst/>
+          </a:prstGeom>
+        </p:spPr>
+        <p:style>
+          <a:lnRef idx="1">
+            <a:schemeClr val="accent1"/>
+          </a:lnRef>
+          <a:fillRef idx="0">
+            <a:schemeClr val="accent1"/>
+          </a:fillRef>
+          <a:effectRef idx="0">
+            <a:schemeClr val="accent1"/>
+          </a:effectRef>
+          <a:fontRef idx="minor">
+            <a:schemeClr val="tx1"/>
+          </a:fontRef>
+        </p:style>
+      </p:cxnSp>
+      <p:cxnSp>
+        <p:nvCxnSpPr>
+          <p:cNvPr id="149" name="Straight Connector 148"/>
+          <p:cNvCxnSpPr/>
+          <p:nvPr/>
+        </p:nvCxnSpPr>
+        <p:spPr>
+          <a:xfrm flipH="1">
+            <a:off x="6623051" y="911130"/>
+            <a:ext cx="152399" cy="0"/>
+          </a:xfrm>
+          <a:prstGeom prst="line">
+            <a:avLst/>
+          </a:prstGeom>
+        </p:spPr>
+        <p:style>
+          <a:lnRef idx="1">
+            <a:schemeClr val="accent1"/>
+          </a:lnRef>
+          <a:fillRef idx="0">
+            <a:schemeClr val="accent1"/>
+          </a:fillRef>
+          <a:effectRef idx="0">
+            <a:schemeClr val="accent1"/>
+          </a:effectRef>
+          <a:fontRef idx="minor">
+            <a:schemeClr val="tx1"/>
+          </a:fontRef>
+        </p:style>
+      </p:cxnSp>
+      <p:cxnSp>
+        <p:nvCxnSpPr>
+          <p:cNvPr id="150" name="Straight Connector 149"/>
+          <p:cNvCxnSpPr/>
+          <p:nvPr/>
+        </p:nvCxnSpPr>
+        <p:spPr>
+          <a:xfrm flipH="1">
+            <a:off x="6623051" y="974630"/>
+            <a:ext cx="152399" cy="0"/>
+          </a:xfrm>
+          <a:prstGeom prst="line">
+            <a:avLst/>
+          </a:prstGeom>
+        </p:spPr>
+        <p:style>
+          <a:lnRef idx="1">
+            <a:schemeClr val="accent1"/>
+          </a:lnRef>
+          <a:fillRef idx="0">
+            <a:schemeClr val="accent1"/>
+          </a:fillRef>
+          <a:effectRef idx="0">
+            <a:schemeClr val="accent1"/>
+          </a:effectRef>
+          <a:fontRef idx="minor">
+            <a:schemeClr val="tx1"/>
+          </a:fontRef>
+        </p:style>
+      </p:cxnSp>
+      <p:cxnSp>
+        <p:nvCxnSpPr>
+          <p:cNvPr id="151" name="Straight Connector 150"/>
+          <p:cNvCxnSpPr/>
+          <p:nvPr/>
+        </p:nvCxnSpPr>
+        <p:spPr>
+          <a:xfrm flipH="1">
+            <a:off x="6623051" y="1044480"/>
+            <a:ext cx="152399" cy="0"/>
+          </a:xfrm>
+          <a:prstGeom prst="line">
+            <a:avLst/>
+          </a:prstGeom>
+        </p:spPr>
+        <p:style>
+          <a:lnRef idx="1">
+            <a:schemeClr val="accent1"/>
+          </a:lnRef>
+          <a:fillRef idx="0">
+            <a:schemeClr val="accent1"/>
+          </a:fillRef>
+          <a:effectRef idx="0">
+            <a:schemeClr val="accent1"/>
+          </a:effectRef>
+          <a:fontRef idx="minor">
+            <a:schemeClr val="tx1"/>
+          </a:fontRef>
+        </p:style>
+      </p:cxnSp>
+      <p:cxnSp>
+        <p:nvCxnSpPr>
+          <p:cNvPr id="152" name="Straight Connector 151"/>
+          <p:cNvCxnSpPr/>
+          <p:nvPr/>
+        </p:nvCxnSpPr>
+        <p:spPr>
+          <a:xfrm flipH="1">
+            <a:off x="6623051" y="1123855"/>
+            <a:ext cx="152399" cy="0"/>
+          </a:xfrm>
+          <a:prstGeom prst="line">
+            <a:avLst/>
+          </a:prstGeom>
+        </p:spPr>
+        <p:style>
+          <a:lnRef idx="1">
+            <a:schemeClr val="accent1"/>
+          </a:lnRef>
+          <a:fillRef idx="0">
+            <a:schemeClr val="accent1"/>
+          </a:fillRef>
+          <a:effectRef idx="0">
+            <a:schemeClr val="accent1"/>
+          </a:effectRef>
+          <a:fontRef idx="minor">
+            <a:schemeClr val="tx1"/>
+          </a:fontRef>
+        </p:style>
+      </p:cxnSp>
+      <p:cxnSp>
+        <p:nvCxnSpPr>
+          <p:cNvPr id="155" name="Straight Connector 154"/>
+          <p:cNvCxnSpPr/>
+          <p:nvPr/>
+        </p:nvCxnSpPr>
+        <p:spPr>
+          <a:xfrm rot="2700000" flipH="1">
+            <a:off x="6565901" y="815879"/>
+            <a:ext cx="72000" cy="0"/>
+          </a:xfrm>
+          <a:prstGeom prst="line">
+            <a:avLst/>
+          </a:prstGeom>
+        </p:spPr>
+        <p:style>
+          <a:lnRef idx="1">
+            <a:schemeClr val="accent1"/>
+          </a:lnRef>
+          <a:fillRef idx="0">
+            <a:schemeClr val="accent1"/>
+          </a:fillRef>
+          <a:effectRef idx="0">
+            <a:schemeClr val="accent1"/>
+          </a:effectRef>
+          <a:fontRef idx="minor">
+            <a:schemeClr val="tx1"/>
+          </a:fontRef>
+        </p:style>
+      </p:cxnSp>
+      <p:cxnSp>
+        <p:nvCxnSpPr>
+          <p:cNvPr id="156" name="Straight Connector 155"/>
+          <p:cNvCxnSpPr/>
+          <p:nvPr/>
+        </p:nvCxnSpPr>
+        <p:spPr>
+          <a:xfrm rot="-2700000" flipH="1">
+            <a:off x="7585076" y="869854"/>
+            <a:ext cx="72000" cy="0"/>
+          </a:xfrm>
+          <a:prstGeom prst="line">
+            <a:avLst/>
+          </a:prstGeom>
+        </p:spPr>
+        <p:style>
+          <a:lnRef idx="1">
+            <a:schemeClr val="accent1"/>
+          </a:lnRef>
+          <a:fillRef idx="0">
+            <a:schemeClr val="accent1"/>
+          </a:fillRef>
+          <a:effectRef idx="0">
+            <a:schemeClr val="accent1"/>
+          </a:effectRef>
+          <a:fontRef idx="minor">
+            <a:schemeClr val="tx1"/>
+          </a:fontRef>
+        </p:style>
+      </p:cxnSp>
+      <p:cxnSp>
+        <p:nvCxnSpPr>
+          <p:cNvPr id="158" name="Straight Connector 157"/>
+          <p:cNvCxnSpPr/>
+          <p:nvPr/>
+        </p:nvCxnSpPr>
+        <p:spPr>
+          <a:xfrm rot="-2700000" flipH="1">
+            <a:off x="7585076" y="936530"/>
+            <a:ext cx="72000" cy="0"/>
+          </a:xfrm>
+          <a:prstGeom prst="line">
+            <a:avLst/>
+          </a:prstGeom>
+        </p:spPr>
+        <p:style>
+          <a:lnRef idx="1">
+            <a:schemeClr val="accent1"/>
+          </a:lnRef>
+          <a:fillRef idx="0">
+            <a:schemeClr val="accent1"/>
+          </a:fillRef>
+          <a:effectRef idx="0">
+            <a:schemeClr val="accent1"/>
+          </a:effectRef>
+          <a:fontRef idx="minor">
+            <a:schemeClr val="tx1"/>
+          </a:fontRef>
+        </p:style>
+      </p:cxnSp>
+      <p:cxnSp>
+        <p:nvCxnSpPr>
+          <p:cNvPr id="159" name="Straight Connector 158"/>
+          <p:cNvCxnSpPr/>
+          <p:nvPr/>
+        </p:nvCxnSpPr>
+        <p:spPr>
+          <a:xfrm rot="-2700000" flipH="1">
+            <a:off x="7585076" y="1003205"/>
+            <a:ext cx="72000" cy="0"/>
+          </a:xfrm>
+          <a:prstGeom prst="line">
+            <a:avLst/>
+          </a:prstGeom>
+        </p:spPr>
+        <p:style>
+          <a:lnRef idx="1">
+            <a:schemeClr val="accent1"/>
+          </a:lnRef>
+          <a:fillRef idx="0">
+            <a:schemeClr val="accent1"/>
+          </a:fillRef>
+          <a:effectRef idx="0">
+            <a:schemeClr val="accent1"/>
+          </a:effectRef>
+          <a:fontRef idx="minor">
+            <a:schemeClr val="tx1"/>
+          </a:fontRef>
+        </p:style>
+      </p:cxnSp>
+      <p:cxnSp>
+        <p:nvCxnSpPr>
+          <p:cNvPr id="161" name="Straight Connector 160"/>
+          <p:cNvCxnSpPr/>
+          <p:nvPr/>
+        </p:nvCxnSpPr>
+        <p:spPr>
+          <a:xfrm rot="-2700000" flipH="1">
+            <a:off x="7585076" y="1082580"/>
+            <a:ext cx="72000" cy="0"/>
+          </a:xfrm>
+          <a:prstGeom prst="line">
+            <a:avLst/>
+          </a:prstGeom>
+        </p:spPr>
+        <p:style>
+          <a:lnRef idx="1">
+            <a:schemeClr val="accent1"/>
+          </a:lnRef>
+          <a:fillRef idx="0">
+            <a:schemeClr val="accent1"/>
+          </a:fillRef>
+          <a:effectRef idx="0">
+            <a:schemeClr val="accent1"/>
+          </a:effectRef>
+          <a:fontRef idx="minor">
+            <a:schemeClr val="tx1"/>
+          </a:fontRef>
+        </p:style>
+      </p:cxnSp>
+      <p:cxnSp>
+        <p:nvCxnSpPr>
+          <p:cNvPr id="162" name="Straight Connector 161"/>
+          <p:cNvCxnSpPr/>
+          <p:nvPr/>
+        </p:nvCxnSpPr>
+        <p:spPr>
+          <a:xfrm rot="-2700000" flipH="1">
+            <a:off x="7585076" y="1155606"/>
+            <a:ext cx="72000" cy="0"/>
+          </a:xfrm>
+          <a:prstGeom prst="line">
+            <a:avLst/>
+          </a:prstGeom>
+        </p:spPr>
+        <p:style>
+          <a:lnRef idx="1">
+            <a:schemeClr val="accent1"/>
+          </a:lnRef>
+          <a:fillRef idx="0">
+            <a:schemeClr val="accent1"/>
+          </a:fillRef>
+          <a:effectRef idx="0">
+            <a:schemeClr val="accent1"/>
+          </a:effectRef>
+          <a:fontRef idx="minor">
+            <a:schemeClr val="tx1"/>
+          </a:fontRef>
+        </p:style>
+      </p:cxnSp>
+      <p:cxnSp>
+        <p:nvCxnSpPr>
+          <p:cNvPr id="163" name="Straight Connector 162"/>
+          <p:cNvCxnSpPr/>
+          <p:nvPr/>
+        </p:nvCxnSpPr>
+        <p:spPr>
+          <a:xfrm rot="-2700000" flipH="1">
+            <a:off x="7585076" y="1219106"/>
+            <a:ext cx="72000" cy="0"/>
+          </a:xfrm>
+          <a:prstGeom prst="line">
+            <a:avLst/>
+          </a:prstGeom>
+        </p:spPr>
+        <p:style>
+          <a:lnRef idx="1">
+            <a:schemeClr val="accent1"/>
+          </a:lnRef>
+          <a:fillRef idx="0">
+            <a:schemeClr val="accent1"/>
+          </a:fillRef>
+          <a:effectRef idx="0">
+            <a:schemeClr val="accent1"/>
+          </a:effectRef>
+          <a:fontRef idx="minor">
+            <a:schemeClr val="tx1"/>
+          </a:fontRef>
+        </p:style>
+      </p:cxnSp>
+      <p:cxnSp>
+        <p:nvCxnSpPr>
+          <p:cNvPr id="164" name="Straight Connector 163"/>
+          <p:cNvCxnSpPr/>
+          <p:nvPr/>
+        </p:nvCxnSpPr>
+        <p:spPr>
+          <a:xfrm rot="2700000" flipH="1">
+            <a:off x="6565901" y="949230"/>
+            <a:ext cx="72000" cy="0"/>
+          </a:xfrm>
+          <a:prstGeom prst="line">
+            <a:avLst/>
+          </a:prstGeom>
+        </p:spPr>
+        <p:style>
+          <a:lnRef idx="1">
+            <a:schemeClr val="accent1"/>
+          </a:lnRef>
+          <a:fillRef idx="0">
+            <a:schemeClr val="accent1"/>
+          </a:fillRef>
+          <a:effectRef idx="0">
+            <a:schemeClr val="accent1"/>
+          </a:effectRef>
+          <a:fontRef idx="minor">
+            <a:schemeClr val="tx1"/>
+          </a:fontRef>
+        </p:style>
+      </p:cxnSp>
+      <p:cxnSp>
+        <p:nvCxnSpPr>
+          <p:cNvPr id="165" name="Straight Connector 164"/>
+          <p:cNvCxnSpPr/>
+          <p:nvPr/>
+        </p:nvCxnSpPr>
+        <p:spPr>
+          <a:xfrm rot="2700000" flipH="1">
+            <a:off x="6565901" y="1019080"/>
+            <a:ext cx="72000" cy="0"/>
+          </a:xfrm>
+          <a:prstGeom prst="line">
+            <a:avLst/>
+          </a:prstGeom>
+        </p:spPr>
+        <p:style>
+          <a:lnRef idx="1">
+            <a:schemeClr val="accent1"/>
+          </a:lnRef>
+          <a:fillRef idx="0">
+            <a:schemeClr val="accent1"/>
+          </a:fillRef>
+          <a:effectRef idx="0">
+            <a:schemeClr val="accent1"/>
+          </a:effectRef>
+          <a:fontRef idx="minor">
+            <a:schemeClr val="tx1"/>
+          </a:fontRef>
+        </p:style>
+      </p:cxnSp>
+      <p:cxnSp>
+        <p:nvCxnSpPr>
+          <p:cNvPr id="166" name="Straight Connector 165"/>
+          <p:cNvCxnSpPr/>
+          <p:nvPr/>
+        </p:nvCxnSpPr>
+        <p:spPr>
+          <a:xfrm rot="2700000" flipH="1">
+            <a:off x="6565901" y="736506"/>
+            <a:ext cx="72000" cy="0"/>
+          </a:xfrm>
+          <a:prstGeom prst="line">
+            <a:avLst/>
+          </a:prstGeom>
+        </p:spPr>
+        <p:style>
+          <a:lnRef idx="1">
+            <a:schemeClr val="accent1"/>
+          </a:lnRef>
+          <a:fillRef idx="0">
+            <a:schemeClr val="accent1"/>
+          </a:fillRef>
+          <a:effectRef idx="0">
+            <a:schemeClr val="accent1"/>
+          </a:effectRef>
+          <a:fontRef idx="minor">
+            <a:schemeClr val="tx1"/>
+          </a:fontRef>
+        </p:style>
+      </p:cxnSp>
+      <p:cxnSp>
+        <p:nvCxnSpPr>
+          <p:cNvPr id="167" name="Straight Connector 166"/>
+          <p:cNvCxnSpPr/>
+          <p:nvPr/>
+        </p:nvCxnSpPr>
+        <p:spPr>
+          <a:xfrm rot="2700000" flipH="1">
+            <a:off x="6565901" y="885730"/>
+            <a:ext cx="72000" cy="0"/>
+          </a:xfrm>
+          <a:prstGeom prst="line">
+            <a:avLst/>
+          </a:prstGeom>
+        </p:spPr>
+        <p:style>
+          <a:lnRef idx="1">
+            <a:schemeClr val="accent1"/>
+          </a:lnRef>
+          <a:fillRef idx="0">
+            <a:schemeClr val="accent1"/>
+          </a:fillRef>
+          <a:effectRef idx="0">
+            <a:schemeClr val="accent1"/>
+          </a:effectRef>
+          <a:fontRef idx="minor">
+            <a:schemeClr val="tx1"/>
+          </a:fontRef>
+        </p:style>
+      </p:cxnSp>
+      <p:cxnSp>
+        <p:nvCxnSpPr>
+          <p:cNvPr id="168" name="Straight Connector 167"/>
+          <p:cNvCxnSpPr/>
+          <p:nvPr/>
+        </p:nvCxnSpPr>
+        <p:spPr>
+          <a:xfrm rot="2700000" flipH="1">
+            <a:off x="6565901" y="1101631"/>
+            <a:ext cx="72000" cy="0"/>
+          </a:xfrm>
+          <a:prstGeom prst="line">
+            <a:avLst/>
+          </a:prstGeom>
+        </p:spPr>
+        <p:style>
+          <a:lnRef idx="1">
+            <a:schemeClr val="accent1"/>
+          </a:lnRef>
+          <a:fillRef idx="0">
+            <a:schemeClr val="accent1"/>
+          </a:fillRef>
+          <a:effectRef idx="0">
+            <a:schemeClr val="accent1"/>
+          </a:effectRef>
+          <a:fontRef idx="minor">
+            <a:schemeClr val="tx1"/>
+          </a:fontRef>
+        </p:style>
+      </p:cxnSp>
+      <p:cxnSp>
+        <p:nvCxnSpPr>
+          <p:cNvPr id="170" name="Straight Connector 169"/>
+          <p:cNvCxnSpPr/>
+          <p:nvPr/>
+        </p:nvCxnSpPr>
+        <p:spPr>
+          <a:xfrm flipV="1">
+            <a:off x="6572250" y="314325"/>
+            <a:ext cx="15809" cy="765180"/>
+          </a:xfrm>
+          <a:prstGeom prst="line">
+            <a:avLst/>
+          </a:prstGeom>
+          <a:ln w="22225"/>
+        </p:spPr>
+        <p:style>
+          <a:lnRef idx="1">
+            <a:schemeClr val="accent1"/>
+          </a:lnRef>
+          <a:fillRef idx="0">
+            <a:schemeClr val="accent1"/>
+          </a:fillRef>
+          <a:effectRef idx="0">
+            <a:schemeClr val="accent1"/>
+          </a:effectRef>
+          <a:fontRef idx="minor">
+            <a:schemeClr val="tx1"/>
+          </a:fontRef>
+        </p:style>
+      </p:cxnSp>
+      <p:cxnSp>
+        <p:nvCxnSpPr>
+          <p:cNvPr id="172" name="Straight Connector 171"/>
+          <p:cNvCxnSpPr/>
+          <p:nvPr/>
+        </p:nvCxnSpPr>
+        <p:spPr>
+          <a:xfrm flipV="1">
+            <a:off x="7651750" y="257175"/>
+            <a:ext cx="0" cy="933452"/>
+          </a:xfrm>
+          <a:prstGeom prst="line">
+            <a:avLst/>
+          </a:prstGeom>
+          <a:ln w="22225"/>
+        </p:spPr>
+        <p:style>
+          <a:lnRef idx="1">
+            <a:schemeClr val="accent1"/>
+          </a:lnRef>
+          <a:fillRef idx="0">
+            <a:schemeClr val="accent1"/>
+          </a:fillRef>
+          <a:effectRef idx="0">
+            <a:schemeClr val="accent1"/>
+          </a:effectRef>
+          <a:fontRef idx="minor">
+            <a:schemeClr val="tx1"/>
+          </a:fontRef>
+        </p:style>
+      </p:cxnSp>
+      <p:cxnSp>
+        <p:nvCxnSpPr>
+          <p:cNvPr id="174" name="Straight Connector 173"/>
+          <p:cNvCxnSpPr/>
+          <p:nvPr/>
+        </p:nvCxnSpPr>
+        <p:spPr>
+          <a:xfrm flipH="1">
+            <a:off x="4724400" y="266700"/>
+            <a:ext cx="2933700" cy="0"/>
+          </a:xfrm>
+          <a:prstGeom prst="line">
+            <a:avLst/>
+          </a:prstGeom>
+          <a:ln w="22225"/>
+        </p:spPr>
+        <p:style>
+          <a:lnRef idx="1">
+            <a:schemeClr val="accent1"/>
+          </a:lnRef>
+          <a:fillRef idx="0">
+            <a:schemeClr val="accent1"/>
+          </a:fillRef>
+          <a:effectRef idx="0">
+            <a:schemeClr val="accent1"/>
+          </a:effectRef>
+          <a:fontRef idx="minor">
+            <a:schemeClr val="tx1"/>
+          </a:fontRef>
+        </p:style>
+      </p:cxnSp>
+      <p:cxnSp>
+        <p:nvCxnSpPr>
+          <p:cNvPr id="175" name="Straight Connector 174"/>
+          <p:cNvCxnSpPr/>
+          <p:nvPr/>
+        </p:nvCxnSpPr>
+        <p:spPr>
+          <a:xfrm rot="2700000" flipH="1">
+            <a:off x="6524626" y="292005"/>
+            <a:ext cx="72000" cy="0"/>
+          </a:xfrm>
+          <a:prstGeom prst="line">
+            <a:avLst/>
+          </a:prstGeom>
+          <a:ln w="22225"/>
+        </p:spPr>
+        <p:style>
+          <a:lnRef idx="1">
+            <a:schemeClr val="accent1"/>
+          </a:lnRef>
+          <a:fillRef idx="0">
+            <a:schemeClr val="accent1"/>
+          </a:fillRef>
+          <a:effectRef idx="0">
+            <a:schemeClr val="accent1"/>
+          </a:effectRef>
+          <a:fontRef idx="minor">
+            <a:schemeClr val="tx1"/>
+          </a:fontRef>
+        </p:style>
+      </p:cxnSp>
+      <p:sp>
+        <p:nvSpPr>
+          <p:cNvPr id="7" name="AutoShape 6" descr="https://ae01.alicdn.com/kf/H237ad536157742e3b1476063bc2ce1026.jpg"/>
+          <p:cNvSpPr>
+            <a:spLocks noChangeAspect="1" noChangeArrowheads="1"/>
+          </p:cNvSpPr>
+          <p:nvPr/>
+        </p:nvSpPr>
+        <p:spPr bwMode="auto">
+          <a:xfrm>
+            <a:off x="155575" y="-144463"/>
+            <a:ext cx="304800" cy="304801"/>
+          </a:xfrm>
+          <a:prstGeom prst="rect">
+            <a:avLst/>
+          </a:prstGeom>
+          <a:noFill/>
+        </p:spPr>
+        <p:txBody>
+          <a:bodyPr vert="horz" wrap="square" lIns="91440" tIns="45720" rIns="91440" bIns="45720" numCol="1" anchor="t" anchorCtr="0" compatLnSpc="1">
+            <a:prstTxWarp prst="textNoShape">
+              <a:avLst/>
+            </a:prstTxWarp>
+          </a:bodyPr>
+          <a:lstStyle/>
+          <a:p>
+            <a:endParaRPr lang="en-US"/>
+          </a:p>
+        </p:txBody>
+      </p:sp>
+      <p:sp>
+        <p:nvSpPr>
+          <p:cNvPr id="8" name="AutoShape 8" descr="https://ae01.alicdn.com/kf/H237ad536157742e3b1476063bc2ce1026.jpg"/>
+          <p:cNvSpPr>
+            <a:spLocks noChangeAspect="1" noChangeArrowheads="1"/>
+          </p:cNvSpPr>
+          <p:nvPr/>
+        </p:nvSpPr>
+        <p:spPr bwMode="auto">
+          <a:xfrm>
+            <a:off x="155575" y="-144463"/>
+            <a:ext cx="304800" cy="304801"/>
+          </a:xfrm>
+          <a:prstGeom prst="rect">
+            <a:avLst/>
+          </a:prstGeom>
+          <a:noFill/>
+        </p:spPr>
+        <p:txBody>
+          <a:bodyPr vert="horz" wrap="square" lIns="91440" tIns="45720" rIns="91440" bIns="45720" numCol="1" anchor="t" anchorCtr="0" compatLnSpc="1">
+            <a:prstTxWarp prst="textNoShape">
+              <a:avLst/>
+            </a:prstTxWarp>
+          </a:bodyPr>
+          <a:lstStyle/>
+          <a:p>
+            <a:endParaRPr lang="en-US"/>
+          </a:p>
+        </p:txBody>
+      </p:sp>
+      <p:pic>
+        <p:nvPicPr>
+          <p:cNvPr id="1033" name="Picture 9"/>
+          <p:cNvPicPr>
+            <a:picLocks noChangeAspect="1" noChangeArrowheads="1"/>
+          </p:cNvPicPr>
+          <p:nvPr/>
+        </p:nvPicPr>
+        <p:blipFill>
+          <a:blip r:embed="rId11" cstate="print"/>
+          <a:srcRect/>
+          <a:stretch>
+            <a:fillRect/>
+          </a:stretch>
+        </p:blipFill>
+        <p:spPr bwMode="auto">
+          <a:xfrm rot="10800000">
+            <a:off x="3541713" y="406399"/>
+            <a:ext cx="2499183" cy="912813"/>
+          </a:xfrm>
+          <a:prstGeom prst="rect">
+            <a:avLst/>
+          </a:prstGeom>
+          <a:noFill/>
+          <a:ln w="9525">
+            <a:noFill/>
+            <a:miter lim="800000"/>
+            <a:headEnd/>
+            <a:tailEnd/>
+          </a:ln>
+          <a:effectLst/>
+        </p:spPr>
+      </p:pic>
+      <p:pic>
+        <p:nvPicPr>
+          <p:cNvPr id="180" name="Picture 12"/>
+          <p:cNvPicPr>
+            <a:picLocks noChangeAspect="1" noChangeArrowheads="1"/>
+          </p:cNvPicPr>
+          <p:nvPr/>
+        </p:nvPicPr>
+        <p:blipFill>
+          <a:blip r:embed="rId6" cstate="print"/>
+          <a:srcRect/>
+          <a:stretch>
+            <a:fillRect/>
+          </a:stretch>
+        </p:blipFill>
+        <p:spPr bwMode="auto">
+          <a:xfrm>
+            <a:off x="4318014" y="293991"/>
+            <a:ext cx="138882" cy="134253"/>
+          </a:xfrm>
+          <a:prstGeom prst="rect">
+            <a:avLst/>
+          </a:prstGeom>
+          <a:noFill/>
+          <a:ln w="9525">
+            <a:noFill/>
+            <a:miter lim="800000"/>
+            <a:headEnd/>
+            <a:tailEnd/>
+          </a:ln>
+        </p:spPr>
+      </p:pic>
+      <p:cxnSp>
+        <p:nvCxnSpPr>
+          <p:cNvPr id="181" name="Straight Connector 180"/>
+          <p:cNvCxnSpPr/>
+          <p:nvPr/>
+        </p:nvCxnSpPr>
+        <p:spPr>
+          <a:xfrm flipH="1" flipV="1">
+            <a:off x="4632325" y="346075"/>
+            <a:ext cx="1" cy="101601"/>
+          </a:xfrm>
+          <a:prstGeom prst="line">
+            <a:avLst/>
+          </a:prstGeom>
+        </p:spPr>
+        <p:style>
+          <a:lnRef idx="1">
+            <a:schemeClr val="accent1"/>
+          </a:lnRef>
+          <a:fillRef idx="0">
+            <a:schemeClr val="accent1"/>
+          </a:fillRef>
+          <a:effectRef idx="0">
+            <a:schemeClr val="accent1"/>
+          </a:effectRef>
+          <a:fontRef idx="minor">
+            <a:schemeClr val="tx1"/>
+          </a:fontRef>
+        </p:style>
+      </p:cxnSp>
+      <p:cxnSp>
+        <p:nvCxnSpPr>
+          <p:cNvPr id="182" name="Straight Connector 181"/>
+          <p:cNvCxnSpPr/>
+          <p:nvPr/>
+        </p:nvCxnSpPr>
+        <p:spPr>
+          <a:xfrm flipH="1" flipV="1">
+            <a:off x="4459288" y="285750"/>
+            <a:ext cx="127000" cy="152400"/>
+          </a:xfrm>
+          <a:prstGeom prst="line">
+            <a:avLst/>
+          </a:prstGeom>
+        </p:spPr>
+        <p:style>
+          <a:lnRef idx="1">
+            <a:schemeClr val="accent1"/>
+          </a:lnRef>
+          <a:fillRef idx="0">
+            <a:schemeClr val="accent1"/>
+          </a:fillRef>
+          <a:effectRef idx="0">
+            <a:schemeClr val="accent1"/>
+          </a:effectRef>
+          <a:fontRef idx="minor">
+            <a:schemeClr val="tx1"/>
+          </a:fontRef>
+        </p:style>
+      </p:cxnSp>
+      <p:cxnSp>
+        <p:nvCxnSpPr>
+          <p:cNvPr id="183" name="Straight Connector 182"/>
+          <p:cNvCxnSpPr/>
+          <p:nvPr/>
+        </p:nvCxnSpPr>
+        <p:spPr>
+          <a:xfrm flipV="1">
+            <a:off x="4379913" y="279400"/>
+            <a:ext cx="85725" cy="4763"/>
+          </a:xfrm>
+          <a:prstGeom prst="line">
+            <a:avLst/>
+          </a:prstGeom>
+        </p:spPr>
+        <p:style>
+          <a:lnRef idx="1">
+            <a:schemeClr val="accent1"/>
+          </a:lnRef>
+          <a:fillRef idx="0">
+            <a:schemeClr val="accent1"/>
+          </a:fillRef>
+          <a:effectRef idx="0">
+            <a:schemeClr val="accent1"/>
+          </a:effectRef>
+          <a:fontRef idx="minor">
+            <a:schemeClr val="tx1"/>
+          </a:fontRef>
+        </p:style>
+      </p:cxnSp>
+      <p:sp>
+        <p:nvSpPr>
+          <p:cNvPr id="185" name="TextBox 184">
+            <a:extLst>
+              <a:ext uri="{FF2B5EF4-FFF2-40B4-BE49-F238E27FC236}">
+                <a16:creationId xmlns:a16="http://schemas.microsoft.com/office/drawing/2014/main" xmlns="" id="{032073D1-5C86-096E-E34F-E839D76407AB}"/>
+              </a:ext>
+            </a:extLst>
+          </p:cNvPr>
+          <p:cNvSpPr txBox="1"/>
+          <p:nvPr/>
+        </p:nvSpPr>
+        <p:spPr>
+          <a:xfrm>
+            <a:off x="4474596" y="232196"/>
+            <a:ext cx="370454" cy="169277"/>
+          </a:xfrm>
+          <a:prstGeom prst="rect">
+            <a:avLst/>
+          </a:prstGeom>
+          <a:noFill/>
+        </p:spPr>
+        <p:txBody>
+          <a:bodyPr wrap="square" rtlCol="0">
+            <a:spAutoFit/>
+          </a:bodyPr>
+          <a:lstStyle/>
+          <a:p>
+            <a:r>
+              <a:rPr lang="da-DK" sz="500" dirty="0" smtClean="0"/>
+              <a:t>+</a:t>
+            </a:r>
+            <a:r>
+              <a:rPr lang="da-DK" sz="500" dirty="0" smtClean="0"/>
+              <a:t>5</a:t>
+            </a:r>
+            <a:r>
+              <a:rPr lang="da-DK" sz="500" dirty="0" smtClean="0"/>
+              <a:t>V</a:t>
+            </a:r>
+            <a:endParaRPr lang="en-US" sz="500" dirty="0"/>
+          </a:p>
+        </p:txBody>
+      </p:sp>
+      <p:cxnSp>
+        <p:nvCxnSpPr>
+          <p:cNvPr id="196" name="Straight Connector 195"/>
+          <p:cNvCxnSpPr/>
+          <p:nvPr/>
+        </p:nvCxnSpPr>
+        <p:spPr>
+          <a:xfrm rot="-2700000" flipH="1">
+            <a:off x="4679951" y="295179"/>
+            <a:ext cx="72000" cy="0"/>
+          </a:xfrm>
+          <a:prstGeom prst="line">
+            <a:avLst/>
+          </a:prstGeom>
+        </p:spPr>
+        <p:style>
+          <a:lnRef idx="1">
+            <a:schemeClr val="accent1"/>
+          </a:lnRef>
+          <a:fillRef idx="0">
+            <a:schemeClr val="accent1"/>
+          </a:fillRef>
+          <a:effectRef idx="0">
+            <a:schemeClr val="accent1"/>
+          </a:effectRef>
+          <a:fontRef idx="minor">
+            <a:schemeClr val="tx1"/>
+          </a:fontRef>
+        </p:style>
+      </p:cxnSp>
+      <p:cxnSp>
+        <p:nvCxnSpPr>
+          <p:cNvPr id="197" name="Straight Connector 196"/>
+          <p:cNvCxnSpPr/>
+          <p:nvPr/>
+        </p:nvCxnSpPr>
+        <p:spPr>
+          <a:xfrm rot="-2700000" flipH="1">
+            <a:off x="4733637" y="295179"/>
+            <a:ext cx="72000" cy="0"/>
+          </a:xfrm>
+          <a:prstGeom prst="line">
+            <a:avLst/>
+          </a:prstGeom>
+        </p:spPr>
+        <p:style>
+          <a:lnRef idx="1">
+            <a:schemeClr val="accent1"/>
+          </a:lnRef>
+          <a:fillRef idx="0">
+            <a:schemeClr val="accent1"/>
+          </a:fillRef>
+          <a:effectRef idx="0">
+            <a:schemeClr val="accent1"/>
+          </a:effectRef>
+          <a:fontRef idx="minor">
+            <a:schemeClr val="tx1"/>
+          </a:fontRef>
+        </p:style>
+      </p:cxnSp>
+      <p:cxnSp>
+        <p:nvCxnSpPr>
+          <p:cNvPr id="198" name="Straight Connector 197"/>
+          <p:cNvCxnSpPr/>
+          <p:nvPr/>
+        </p:nvCxnSpPr>
+        <p:spPr>
+          <a:xfrm rot="-2700000" flipH="1">
+            <a:off x="4894695" y="295179"/>
+            <a:ext cx="72000" cy="0"/>
+          </a:xfrm>
+          <a:prstGeom prst="line">
+            <a:avLst/>
+          </a:prstGeom>
+        </p:spPr>
+        <p:style>
+          <a:lnRef idx="1">
+            <a:schemeClr val="accent1"/>
+          </a:lnRef>
+          <a:fillRef idx="0">
+            <a:schemeClr val="accent1"/>
+          </a:fillRef>
+          <a:effectRef idx="0">
+            <a:schemeClr val="accent1"/>
+          </a:effectRef>
+          <a:fontRef idx="minor">
+            <a:schemeClr val="tx1"/>
+          </a:fontRef>
+        </p:style>
+      </p:cxnSp>
+      <p:cxnSp>
+        <p:nvCxnSpPr>
+          <p:cNvPr id="199" name="Straight Connector 198"/>
+          <p:cNvCxnSpPr/>
+          <p:nvPr/>
+        </p:nvCxnSpPr>
+        <p:spPr>
+          <a:xfrm rot="-2700000" flipH="1">
+            <a:off x="4787323" y="295179"/>
+            <a:ext cx="72000" cy="0"/>
+          </a:xfrm>
+          <a:prstGeom prst="line">
+            <a:avLst/>
+          </a:prstGeom>
+        </p:spPr>
+        <p:style>
+          <a:lnRef idx="1">
+            <a:schemeClr val="accent1"/>
+          </a:lnRef>
+          <a:fillRef idx="0">
+            <a:schemeClr val="accent1"/>
+          </a:fillRef>
+          <a:effectRef idx="0">
+            <a:schemeClr val="accent1"/>
+          </a:effectRef>
+          <a:fontRef idx="minor">
+            <a:schemeClr val="tx1"/>
+          </a:fontRef>
+        </p:style>
+      </p:cxnSp>
+      <p:cxnSp>
+        <p:nvCxnSpPr>
+          <p:cNvPr id="200" name="Straight Connector 199"/>
+          <p:cNvCxnSpPr/>
+          <p:nvPr/>
+        </p:nvCxnSpPr>
+        <p:spPr>
+          <a:xfrm rot="-2700000" flipH="1">
+            <a:off x="5002067" y="295179"/>
+            <a:ext cx="72000" cy="0"/>
+          </a:xfrm>
+          <a:prstGeom prst="line">
+            <a:avLst/>
+          </a:prstGeom>
+        </p:spPr>
+        <p:style>
+          <a:lnRef idx="1">
+            <a:schemeClr val="accent1"/>
+          </a:lnRef>
+          <a:fillRef idx="0">
+            <a:schemeClr val="accent1"/>
+          </a:fillRef>
+          <a:effectRef idx="0">
+            <a:schemeClr val="accent1"/>
+          </a:effectRef>
+          <a:fontRef idx="minor">
+            <a:schemeClr val="tx1"/>
+          </a:fontRef>
+        </p:style>
+      </p:cxnSp>
+      <p:cxnSp>
+        <p:nvCxnSpPr>
+          <p:cNvPr id="201" name="Straight Connector 200"/>
+          <p:cNvCxnSpPr/>
+          <p:nvPr/>
+        </p:nvCxnSpPr>
+        <p:spPr>
+          <a:xfrm rot="-2700000" flipH="1">
+            <a:off x="5216811" y="295179"/>
+            <a:ext cx="72000" cy="0"/>
+          </a:xfrm>
+          <a:prstGeom prst="line">
+            <a:avLst/>
+          </a:prstGeom>
+        </p:spPr>
+        <p:style>
+          <a:lnRef idx="1">
+            <a:schemeClr val="accent1"/>
+          </a:lnRef>
+          <a:fillRef idx="0">
+            <a:schemeClr val="accent1"/>
+          </a:fillRef>
+          <a:effectRef idx="0">
+            <a:schemeClr val="accent1"/>
+          </a:effectRef>
+          <a:fontRef idx="minor">
+            <a:schemeClr val="tx1"/>
+          </a:fontRef>
+        </p:style>
+      </p:cxnSp>
+      <p:cxnSp>
+        <p:nvCxnSpPr>
+          <p:cNvPr id="202" name="Straight Connector 201"/>
+          <p:cNvCxnSpPr/>
+          <p:nvPr/>
+        </p:nvCxnSpPr>
+        <p:spPr>
+          <a:xfrm rot="-2700000" flipH="1">
+            <a:off x="5270501" y="295179"/>
+            <a:ext cx="72000" cy="0"/>
+          </a:xfrm>
+          <a:prstGeom prst="line">
+            <a:avLst/>
+          </a:prstGeom>
+        </p:spPr>
+        <p:style>
+          <a:lnRef idx="1">
+            <a:schemeClr val="accent1"/>
+          </a:lnRef>
+          <a:fillRef idx="0">
+            <a:schemeClr val="accent1"/>
+          </a:fillRef>
+          <a:effectRef idx="0">
+            <a:schemeClr val="accent1"/>
+          </a:effectRef>
+          <a:fontRef idx="minor">
+            <a:schemeClr val="tx1"/>
+          </a:fontRef>
+        </p:style>
+      </p:cxnSp>
+      <p:cxnSp>
+        <p:nvCxnSpPr>
+          <p:cNvPr id="203" name="Straight Connector 202"/>
+          <p:cNvCxnSpPr/>
+          <p:nvPr/>
+        </p:nvCxnSpPr>
+        <p:spPr>
+          <a:xfrm rot="-2700000" flipH="1">
+            <a:off x="5109439" y="295179"/>
+            <a:ext cx="72000" cy="0"/>
+          </a:xfrm>
+          <a:prstGeom prst="line">
+            <a:avLst/>
+          </a:prstGeom>
+        </p:spPr>
+        <p:style>
+          <a:lnRef idx="1">
+            <a:schemeClr val="accent1"/>
+          </a:lnRef>
+          <a:fillRef idx="0">
+            <a:schemeClr val="accent1"/>
+          </a:fillRef>
+          <a:effectRef idx="0">
+            <a:schemeClr val="accent1"/>
+          </a:effectRef>
+          <a:fontRef idx="minor">
+            <a:schemeClr val="tx1"/>
+          </a:fontRef>
+        </p:style>
+      </p:cxnSp>
+      <p:cxnSp>
+        <p:nvCxnSpPr>
+          <p:cNvPr id="204" name="Straight Connector 203"/>
+          <p:cNvCxnSpPr/>
+          <p:nvPr/>
+        </p:nvCxnSpPr>
+        <p:spPr>
+          <a:xfrm rot="-2700000" flipH="1">
+            <a:off x="4841009" y="295179"/>
+            <a:ext cx="72000" cy="0"/>
+          </a:xfrm>
+          <a:prstGeom prst="line">
+            <a:avLst/>
+          </a:prstGeom>
+        </p:spPr>
+        <p:style>
+          <a:lnRef idx="1">
+            <a:schemeClr val="accent1"/>
+          </a:lnRef>
+          <a:fillRef idx="0">
+            <a:schemeClr val="accent1"/>
+          </a:fillRef>
+          <a:effectRef idx="0">
+            <a:schemeClr val="accent1"/>
+          </a:effectRef>
+          <a:fontRef idx="minor">
+            <a:schemeClr val="tx1"/>
+          </a:fontRef>
+        </p:style>
+      </p:cxnSp>
+      <p:cxnSp>
+        <p:nvCxnSpPr>
+          <p:cNvPr id="205" name="Straight Connector 204"/>
+          <p:cNvCxnSpPr/>
+          <p:nvPr/>
+        </p:nvCxnSpPr>
+        <p:spPr>
+          <a:xfrm rot="-2700000" flipH="1">
+            <a:off x="4948381" y="295179"/>
+            <a:ext cx="72000" cy="0"/>
+          </a:xfrm>
+          <a:prstGeom prst="line">
+            <a:avLst/>
+          </a:prstGeom>
+        </p:spPr>
+        <p:style>
+          <a:lnRef idx="1">
+            <a:schemeClr val="accent1"/>
+          </a:lnRef>
+          <a:fillRef idx="0">
+            <a:schemeClr val="accent1"/>
+          </a:fillRef>
+          <a:effectRef idx="0">
+            <a:schemeClr val="accent1"/>
+          </a:effectRef>
+          <a:fontRef idx="minor">
+            <a:schemeClr val="tx1"/>
+          </a:fontRef>
+        </p:style>
+      </p:cxnSp>
+      <p:cxnSp>
+        <p:nvCxnSpPr>
+          <p:cNvPr id="206" name="Straight Connector 205"/>
+          <p:cNvCxnSpPr/>
+          <p:nvPr/>
+        </p:nvCxnSpPr>
+        <p:spPr>
+          <a:xfrm rot="-2700000" flipH="1">
+            <a:off x="5163125" y="295179"/>
+            <a:ext cx="72000" cy="0"/>
+          </a:xfrm>
+          <a:prstGeom prst="line">
+            <a:avLst/>
+          </a:prstGeom>
+        </p:spPr>
+        <p:style>
+          <a:lnRef idx="1">
+            <a:schemeClr val="accent1"/>
+          </a:lnRef>
+          <a:fillRef idx="0">
+            <a:schemeClr val="accent1"/>
+          </a:fillRef>
+          <a:effectRef idx="0">
+            <a:schemeClr val="accent1"/>
+          </a:effectRef>
+          <a:fontRef idx="minor">
+            <a:schemeClr val="tx1"/>
+          </a:fontRef>
+        </p:style>
+      </p:cxnSp>
+      <p:cxnSp>
+        <p:nvCxnSpPr>
+          <p:cNvPr id="207" name="Straight Connector 206"/>
+          <p:cNvCxnSpPr/>
+          <p:nvPr/>
+        </p:nvCxnSpPr>
+        <p:spPr>
+          <a:xfrm rot="-2700000" flipH="1">
+            <a:off x="5055753" y="295179"/>
+            <a:ext cx="72000" cy="0"/>
+          </a:xfrm>
+          <a:prstGeom prst="line">
+            <a:avLst/>
+          </a:prstGeom>
+        </p:spPr>
+        <p:style>
+          <a:lnRef idx="1">
+            <a:schemeClr val="accent1"/>
+          </a:lnRef>
+          <a:fillRef idx="0">
+            <a:schemeClr val="accent1"/>
+          </a:fillRef>
+          <a:effectRef idx="0">
+            <a:schemeClr val="accent1"/>
+          </a:effectRef>
+          <a:fontRef idx="minor">
+            <a:schemeClr val="tx1"/>
+          </a:fontRef>
+        </p:style>
+      </p:cxnSp>
+      <p:cxnSp>
+        <p:nvCxnSpPr>
+          <p:cNvPr id="214" name="Straight Connector 213"/>
+          <p:cNvCxnSpPr/>
+          <p:nvPr/>
+        </p:nvCxnSpPr>
+        <p:spPr>
+          <a:xfrm flipH="1" flipV="1">
+            <a:off x="4689476" y="320675"/>
+            <a:ext cx="1" cy="130177"/>
+          </a:xfrm>
+          <a:prstGeom prst="line">
+            <a:avLst/>
+          </a:prstGeom>
+        </p:spPr>
+        <p:style>
+          <a:lnRef idx="1">
+            <a:schemeClr val="accent1"/>
+          </a:lnRef>
+          <a:fillRef idx="0">
+            <a:schemeClr val="accent1"/>
+          </a:fillRef>
+          <a:effectRef idx="0">
+            <a:schemeClr val="accent1"/>
+          </a:effectRef>
+          <a:fontRef idx="minor">
+            <a:schemeClr val="tx1"/>
+          </a:fontRef>
+        </p:style>
+      </p:cxnSp>
+      <p:cxnSp>
+        <p:nvCxnSpPr>
+          <p:cNvPr id="216" name="Straight Connector 215"/>
+          <p:cNvCxnSpPr/>
+          <p:nvPr/>
+        </p:nvCxnSpPr>
+        <p:spPr>
+          <a:xfrm flipH="1" flipV="1">
+            <a:off x="4743162" y="320675"/>
+            <a:ext cx="1" cy="130177"/>
+          </a:xfrm>
+          <a:prstGeom prst="line">
+            <a:avLst/>
+          </a:prstGeom>
+        </p:spPr>
+        <p:style>
+          <a:lnRef idx="1">
+            <a:schemeClr val="accent1"/>
+          </a:lnRef>
+          <a:fillRef idx="0">
+            <a:schemeClr val="accent1"/>
+          </a:fillRef>
+          <a:effectRef idx="0">
+            <a:schemeClr val="accent1"/>
+          </a:effectRef>
+          <a:fontRef idx="minor">
+            <a:schemeClr val="tx1"/>
+          </a:fontRef>
+        </p:style>
+      </p:cxnSp>
+      <p:cxnSp>
+        <p:nvCxnSpPr>
+          <p:cNvPr id="217" name="Straight Connector 216"/>
+          <p:cNvCxnSpPr/>
+          <p:nvPr/>
+        </p:nvCxnSpPr>
+        <p:spPr>
+          <a:xfrm flipH="1" flipV="1">
+            <a:off x="4796848" y="320675"/>
+            <a:ext cx="1" cy="130177"/>
+          </a:xfrm>
+          <a:prstGeom prst="line">
+            <a:avLst/>
+          </a:prstGeom>
+        </p:spPr>
+        <p:style>
+          <a:lnRef idx="1">
+            <a:schemeClr val="accent1"/>
+          </a:lnRef>
+          <a:fillRef idx="0">
+            <a:schemeClr val="accent1"/>
+          </a:fillRef>
+          <a:effectRef idx="0">
+            <a:schemeClr val="accent1"/>
+          </a:effectRef>
+          <a:fontRef idx="minor">
+            <a:schemeClr val="tx1"/>
+          </a:fontRef>
+        </p:style>
+      </p:cxnSp>
+      <p:cxnSp>
+        <p:nvCxnSpPr>
+          <p:cNvPr id="218" name="Straight Connector 217"/>
+          <p:cNvCxnSpPr/>
+          <p:nvPr/>
+        </p:nvCxnSpPr>
+        <p:spPr>
+          <a:xfrm flipH="1" flipV="1">
+            <a:off x="5011592" y="320675"/>
+            <a:ext cx="1" cy="130177"/>
+          </a:xfrm>
+          <a:prstGeom prst="line">
+            <a:avLst/>
+          </a:prstGeom>
+        </p:spPr>
+        <p:style>
+          <a:lnRef idx="1">
+            <a:schemeClr val="accent1"/>
+          </a:lnRef>
+          <a:fillRef idx="0">
+            <a:schemeClr val="accent1"/>
+          </a:fillRef>
+          <a:effectRef idx="0">
+            <a:schemeClr val="accent1"/>
+          </a:effectRef>
+          <a:fontRef idx="minor">
+            <a:schemeClr val="tx1"/>
+          </a:fontRef>
+        </p:style>
+      </p:cxnSp>
+      <p:cxnSp>
+        <p:nvCxnSpPr>
+          <p:cNvPr id="219" name="Straight Connector 218"/>
+          <p:cNvCxnSpPr/>
+          <p:nvPr/>
+        </p:nvCxnSpPr>
+        <p:spPr>
+          <a:xfrm flipH="1" flipV="1">
+            <a:off x="5226336" y="320675"/>
+            <a:ext cx="1" cy="130177"/>
+          </a:xfrm>
+          <a:prstGeom prst="line">
+            <a:avLst/>
+          </a:prstGeom>
+        </p:spPr>
+        <p:style>
+          <a:lnRef idx="1">
+            <a:schemeClr val="accent1"/>
+          </a:lnRef>
+          <a:fillRef idx="0">
+            <a:schemeClr val="accent1"/>
+          </a:fillRef>
+          <a:effectRef idx="0">
+            <a:schemeClr val="accent1"/>
+          </a:effectRef>
+          <a:fontRef idx="minor">
+            <a:schemeClr val="tx1"/>
+          </a:fontRef>
+        </p:style>
+      </p:cxnSp>
+      <p:cxnSp>
+        <p:nvCxnSpPr>
+          <p:cNvPr id="220" name="Straight Connector 219"/>
+          <p:cNvCxnSpPr/>
+          <p:nvPr/>
+        </p:nvCxnSpPr>
+        <p:spPr>
+          <a:xfrm flipH="1" flipV="1">
+            <a:off x="4957906" y="320675"/>
+            <a:ext cx="1" cy="130177"/>
+          </a:xfrm>
+          <a:prstGeom prst="line">
+            <a:avLst/>
+          </a:prstGeom>
+        </p:spPr>
+        <p:style>
+          <a:lnRef idx="1">
+            <a:schemeClr val="accent1"/>
+          </a:lnRef>
+          <a:fillRef idx="0">
+            <a:schemeClr val="accent1"/>
+          </a:fillRef>
+          <a:effectRef idx="0">
+            <a:schemeClr val="accent1"/>
+          </a:effectRef>
+          <a:fontRef idx="minor">
+            <a:schemeClr val="tx1"/>
+          </a:fontRef>
+        </p:style>
+      </p:cxnSp>
+      <p:cxnSp>
+        <p:nvCxnSpPr>
+          <p:cNvPr id="221" name="Straight Connector 220"/>
+          <p:cNvCxnSpPr/>
+          <p:nvPr/>
+        </p:nvCxnSpPr>
+        <p:spPr>
+          <a:xfrm flipH="1" flipV="1">
+            <a:off x="5172650" y="320675"/>
+            <a:ext cx="1" cy="130177"/>
+          </a:xfrm>
+          <a:prstGeom prst="line">
+            <a:avLst/>
+          </a:prstGeom>
+        </p:spPr>
+        <p:style>
+          <a:lnRef idx="1">
+            <a:schemeClr val="accent1"/>
+          </a:lnRef>
+          <a:fillRef idx="0">
+            <a:schemeClr val="accent1"/>
+          </a:fillRef>
+          <a:effectRef idx="0">
+            <a:schemeClr val="accent1"/>
+          </a:effectRef>
+          <a:fontRef idx="minor">
+            <a:schemeClr val="tx1"/>
+          </a:fontRef>
+        </p:style>
+      </p:cxnSp>
+      <p:cxnSp>
+        <p:nvCxnSpPr>
+          <p:cNvPr id="222" name="Straight Connector 221"/>
+          <p:cNvCxnSpPr/>
+          <p:nvPr/>
+        </p:nvCxnSpPr>
+        <p:spPr>
+          <a:xfrm flipH="1" flipV="1">
+            <a:off x="5280026" y="320675"/>
+            <a:ext cx="1" cy="130177"/>
+          </a:xfrm>
+          <a:prstGeom prst="line">
+            <a:avLst/>
+          </a:prstGeom>
+        </p:spPr>
+        <p:style>
+          <a:lnRef idx="1">
+            <a:schemeClr val="accent1"/>
+          </a:lnRef>
+          <a:fillRef idx="0">
+            <a:schemeClr val="accent1"/>
+          </a:fillRef>
+          <a:effectRef idx="0">
+            <a:schemeClr val="accent1"/>
+          </a:effectRef>
+          <a:fontRef idx="minor">
+            <a:schemeClr val="tx1"/>
+          </a:fontRef>
+        </p:style>
+      </p:cxnSp>
+      <p:cxnSp>
+        <p:nvCxnSpPr>
+          <p:cNvPr id="223" name="Straight Connector 222"/>
+          <p:cNvCxnSpPr/>
+          <p:nvPr/>
+        </p:nvCxnSpPr>
+        <p:spPr>
+          <a:xfrm flipH="1" flipV="1">
+            <a:off x="4904220" y="320675"/>
+            <a:ext cx="1" cy="130177"/>
+          </a:xfrm>
+          <a:prstGeom prst="line">
+            <a:avLst/>
+          </a:prstGeom>
+        </p:spPr>
+        <p:style>
+          <a:lnRef idx="1">
+            <a:schemeClr val="accent1"/>
+          </a:lnRef>
+          <a:fillRef idx="0">
+            <a:schemeClr val="accent1"/>
+          </a:fillRef>
+          <a:effectRef idx="0">
+            <a:schemeClr val="accent1"/>
+          </a:effectRef>
+          <a:fontRef idx="minor">
+            <a:schemeClr val="tx1"/>
+          </a:fontRef>
+        </p:style>
+      </p:cxnSp>
+      <p:cxnSp>
+        <p:nvCxnSpPr>
+          <p:cNvPr id="224" name="Straight Connector 223"/>
+          <p:cNvCxnSpPr/>
+          <p:nvPr/>
+        </p:nvCxnSpPr>
+        <p:spPr>
+          <a:xfrm flipH="1" flipV="1">
+            <a:off x="5118964" y="320675"/>
+            <a:ext cx="1" cy="130177"/>
+          </a:xfrm>
+          <a:prstGeom prst="line">
+            <a:avLst/>
+          </a:prstGeom>
+        </p:spPr>
+        <p:style>
+          <a:lnRef idx="1">
+            <a:schemeClr val="accent1"/>
+          </a:lnRef>
+          <a:fillRef idx="0">
+            <a:schemeClr val="accent1"/>
+          </a:fillRef>
+          <a:effectRef idx="0">
+            <a:schemeClr val="accent1"/>
+          </a:effectRef>
+          <a:fontRef idx="minor">
+            <a:schemeClr val="tx1"/>
+          </a:fontRef>
+        </p:style>
+      </p:cxnSp>
+      <p:cxnSp>
+        <p:nvCxnSpPr>
+          <p:cNvPr id="225" name="Straight Connector 224"/>
+          <p:cNvCxnSpPr/>
+          <p:nvPr/>
+        </p:nvCxnSpPr>
+        <p:spPr>
+          <a:xfrm flipH="1" flipV="1">
+            <a:off x="4850534" y="320675"/>
+            <a:ext cx="1" cy="130177"/>
+          </a:xfrm>
+          <a:prstGeom prst="line">
+            <a:avLst/>
+          </a:prstGeom>
+        </p:spPr>
+        <p:style>
+          <a:lnRef idx="1">
+            <a:schemeClr val="accent1"/>
+          </a:lnRef>
+          <a:fillRef idx="0">
+            <a:schemeClr val="accent1"/>
+          </a:fillRef>
+          <a:effectRef idx="0">
+            <a:schemeClr val="accent1"/>
+          </a:effectRef>
+          <a:fontRef idx="minor">
+            <a:schemeClr val="tx1"/>
+          </a:fontRef>
+        </p:style>
+      </p:cxnSp>
+      <p:cxnSp>
+        <p:nvCxnSpPr>
+          <p:cNvPr id="226" name="Straight Connector 225"/>
+          <p:cNvCxnSpPr/>
+          <p:nvPr/>
+        </p:nvCxnSpPr>
+        <p:spPr>
+          <a:xfrm flipH="1" flipV="1">
+            <a:off x="5065278" y="320675"/>
+            <a:ext cx="1" cy="130177"/>
+          </a:xfrm>
+          <a:prstGeom prst="line">
+            <a:avLst/>
+          </a:prstGeom>
+        </p:spPr>
+        <p:style>
+          <a:lnRef idx="1">
+            <a:schemeClr val="accent1"/>
+          </a:lnRef>
+          <a:fillRef idx="0">
+            <a:schemeClr val="accent1"/>
+          </a:fillRef>
+          <a:effectRef idx="0">
+            <a:schemeClr val="accent1"/>
+          </a:effectRef>
+          <a:fontRef idx="minor">
+            <a:schemeClr val="tx1"/>
+          </a:fontRef>
+        </p:style>
+      </p:cxnSp>
+      <p:cxnSp>
+        <p:nvCxnSpPr>
+          <p:cNvPr id="228" name="Straight Connector 227"/>
+          <p:cNvCxnSpPr/>
+          <p:nvPr/>
+        </p:nvCxnSpPr>
+        <p:spPr>
+          <a:xfrm>
+            <a:off x="3448050" y="3535363"/>
+            <a:ext cx="523875" cy="0"/>
+          </a:xfrm>
+          <a:prstGeom prst="line">
+            <a:avLst/>
+          </a:prstGeom>
+        </p:spPr>
+        <p:style>
+          <a:lnRef idx="1">
+            <a:schemeClr val="accent1"/>
+          </a:lnRef>
+          <a:fillRef idx="0">
+            <a:schemeClr val="accent1"/>
+          </a:fillRef>
+          <a:effectRef idx="0">
+            <a:schemeClr val="accent1"/>
+          </a:effectRef>
+          <a:fontRef idx="minor">
+            <a:schemeClr val="tx1"/>
+          </a:fontRef>
+        </p:style>
+      </p:cxnSp>
+      <p:cxnSp>
+        <p:nvCxnSpPr>
+          <p:cNvPr id="230" name="Straight Connector 229"/>
+          <p:cNvCxnSpPr/>
+          <p:nvPr/>
+        </p:nvCxnSpPr>
+        <p:spPr>
+          <a:xfrm flipV="1">
+            <a:off x="3448050" y="2517775"/>
+            <a:ext cx="0" cy="1019176"/>
+          </a:xfrm>
+          <a:prstGeom prst="line">
+            <a:avLst/>
+          </a:prstGeom>
+        </p:spPr>
+        <p:style>
+          <a:lnRef idx="1">
+            <a:schemeClr val="accent1"/>
+          </a:lnRef>
+          <a:fillRef idx="0">
+            <a:schemeClr val="accent1"/>
+          </a:fillRef>
+          <a:effectRef idx="0">
+            <a:schemeClr val="accent1"/>
+          </a:effectRef>
+          <a:fontRef idx="minor">
+            <a:schemeClr val="tx1"/>
+          </a:fontRef>
+        </p:style>
+      </p:cxnSp>
+      <p:cxnSp>
+        <p:nvCxnSpPr>
+          <p:cNvPr id="232" name="Straight Connector 231"/>
+          <p:cNvCxnSpPr/>
+          <p:nvPr/>
+        </p:nvCxnSpPr>
+        <p:spPr>
+          <a:xfrm flipH="1">
+            <a:off x="3248026" y="2520855"/>
+            <a:ext cx="203199" cy="0"/>
+          </a:xfrm>
+          <a:prstGeom prst="line">
+            <a:avLst/>
+          </a:prstGeom>
+        </p:spPr>
+        <p:style>
+          <a:lnRef idx="1">
+            <a:schemeClr val="accent1"/>
+          </a:lnRef>
+          <a:fillRef idx="0">
+            <a:schemeClr val="accent1"/>
+          </a:fillRef>
+          <a:effectRef idx="0">
+            <a:schemeClr val="accent1"/>
+          </a:effectRef>
+          <a:fontRef idx="minor">
+            <a:schemeClr val="tx1"/>
+          </a:fontRef>
+        </p:style>
+      </p:cxnSp>
+      <p:pic>
+        <p:nvPicPr>
+          <p:cNvPr id="234" name="Picture 4"/>
+          <p:cNvPicPr>
+            <a:picLocks noChangeAspect="1" noChangeArrowheads="1"/>
+          </p:cNvPicPr>
+          <p:nvPr/>
+        </p:nvPicPr>
+        <p:blipFill>
+          <a:blip r:embed="rId10" cstate="print"/>
+          <a:srcRect/>
+          <a:stretch>
+            <a:fillRect/>
+          </a:stretch>
+        </p:blipFill>
+        <p:spPr bwMode="auto">
+          <a:xfrm>
+            <a:off x="4262918" y="1647824"/>
+            <a:ext cx="63019" cy="207963"/>
+          </a:xfrm>
+          <a:prstGeom prst="rect">
+            <a:avLst/>
+          </a:prstGeom>
+          <a:noFill/>
+          <a:ln w="9525">
+            <a:noFill/>
+            <a:miter lim="800000"/>
+            <a:headEnd/>
+            <a:tailEnd/>
+          </a:ln>
+          <a:effectLst/>
+        </p:spPr>
+      </p:pic>
+    </p:spTree>
+    <p:extLst>
+      <p:ext uri="{BB962C8B-B14F-4D97-AF65-F5344CB8AC3E}">
+        <p14:creationId xmlns:p14="http://schemas.microsoft.com/office/powerpoint/2010/main" xmlns="" val="1004649057"/>
       </p:ext>
     </p:extLst>
   </p:cSld>

</xml_diff>

<commit_message>
Reset bias added to diagram. Port numbers corrected in SW.
</commit_message>
<xml_diff>
--- a/Diagram.pptx
+++ b/Diagram.pptx
@@ -109,7 +109,7 @@
   </p:defaultTextStyle>
   <p:extLst>
     <p:ext uri="{EFAFB233-063F-42B5-8137-9DF3F51BA10A}">
-      <p15:sldGuideLst xmlns:p15="http://schemas.microsoft.com/office/powerpoint/2012/main" xmlns="">
+      <p15:sldGuideLst xmlns="" xmlns:p15="http://schemas.microsoft.com/office/powerpoint/2012/main">
         <p15:guide id="1" orient="horz" pos="2160">
           <p15:clr>
             <a:srgbClr val="A4A3A4"/>
@@ -5050,7 +5050,7 @@
           <p:cNvPr id="3" name="Straight Connector 2">
             <a:extLst>
               <a:ext uri="{FF2B5EF4-FFF2-40B4-BE49-F238E27FC236}">
-                <a16:creationId xmlns:a16="http://schemas.microsoft.com/office/drawing/2014/main" xmlns="" id="{576723D5-C875-83D8-4E57-4E9EB941DFA8}"/>
+                <a16:creationId xmlns="" xmlns:a16="http://schemas.microsoft.com/office/drawing/2014/main" id="{576723D5-C875-83D8-4E57-4E9EB941DFA8}"/>
               </a:ext>
             </a:extLst>
           </p:cNvPr>
@@ -5091,7 +5091,7 @@
           <p:cNvPr id="5" name="Straight Connector 4">
             <a:extLst>
               <a:ext uri="{FF2B5EF4-FFF2-40B4-BE49-F238E27FC236}">
-                <a16:creationId xmlns:a16="http://schemas.microsoft.com/office/drawing/2014/main" xmlns="" id="{FE28DF91-3789-901B-5087-6AC47B0ADEED}"/>
+                <a16:creationId xmlns="" xmlns:a16="http://schemas.microsoft.com/office/drawing/2014/main" id="{FE28DF91-3789-901B-5087-6AC47B0ADEED}"/>
               </a:ext>
             </a:extLst>
           </p:cNvPr>
@@ -6963,7 +6963,7 @@
           <p:cNvPr id="3" name="Rectangle 2">
             <a:extLst>
               <a:ext uri="{FF2B5EF4-FFF2-40B4-BE49-F238E27FC236}">
-                <a16:creationId xmlns:a16="http://schemas.microsoft.com/office/drawing/2014/main" xmlns="" id="{FFEF0871-0309-1572-391B-5985ABE4CE01}"/>
+                <a16:creationId xmlns="" xmlns:a16="http://schemas.microsoft.com/office/drawing/2014/main" id="{FFEF0871-0309-1572-391B-5985ABE4CE01}"/>
               </a:ext>
             </a:extLst>
           </p:cNvPr>
@@ -7017,7 +7017,7 @@
           <p:cNvPr id="5" name="Rectangle 4">
             <a:extLst>
               <a:ext uri="{FF2B5EF4-FFF2-40B4-BE49-F238E27FC236}">
-                <a16:creationId xmlns:a16="http://schemas.microsoft.com/office/drawing/2014/main" xmlns="" id="{22B14C85-B862-AC4B-4E24-B2666F986BDA}"/>
+                <a16:creationId xmlns="" xmlns:a16="http://schemas.microsoft.com/office/drawing/2014/main" id="{22B14C85-B862-AC4B-4E24-B2666F986BDA}"/>
               </a:ext>
             </a:extLst>
           </p:cNvPr>
@@ -7071,7 +7071,7 @@
           <p:cNvPr id="2" name="TextBox 1">
             <a:extLst>
               <a:ext uri="{FF2B5EF4-FFF2-40B4-BE49-F238E27FC236}">
-                <a16:creationId xmlns:a16="http://schemas.microsoft.com/office/drawing/2014/main" xmlns="" id="{F62B988E-ABD2-B6BD-8DE5-484D49EFC299}"/>
+                <a16:creationId xmlns="" xmlns:a16="http://schemas.microsoft.com/office/drawing/2014/main" id="{F62B988E-ABD2-B6BD-8DE5-484D49EFC299}"/>
               </a:ext>
             </a:extLst>
           </p:cNvPr>
@@ -7107,7 +7107,7 @@
           <p:cNvPr id="6" name="TextBox 5">
             <a:extLst>
               <a:ext uri="{FF2B5EF4-FFF2-40B4-BE49-F238E27FC236}">
-                <a16:creationId xmlns:a16="http://schemas.microsoft.com/office/drawing/2014/main" xmlns="" id="{032073D1-5C86-096E-E34F-E839D76407AB}"/>
+                <a16:creationId xmlns="" xmlns:a16="http://schemas.microsoft.com/office/drawing/2014/main" id="{032073D1-5C86-096E-E34F-E839D76407AB}"/>
               </a:ext>
             </a:extLst>
           </p:cNvPr>
@@ -7143,7 +7143,7 @@
           <p:cNvPr id="7" name="Straight Connector 6">
             <a:extLst>
               <a:ext uri="{FF2B5EF4-FFF2-40B4-BE49-F238E27FC236}">
-                <a16:creationId xmlns:a16="http://schemas.microsoft.com/office/drawing/2014/main" xmlns="" id="{31790475-B929-D740-4390-015E0BD2F48D}"/>
+                <a16:creationId xmlns="" xmlns:a16="http://schemas.microsoft.com/office/drawing/2014/main" id="{31790475-B929-D740-4390-015E0BD2F48D}"/>
               </a:ext>
             </a:extLst>
           </p:cNvPr>
@@ -7184,7 +7184,7 @@
           <p:cNvPr id="8" name="Straight Connector 7">
             <a:extLst>
               <a:ext uri="{FF2B5EF4-FFF2-40B4-BE49-F238E27FC236}">
-                <a16:creationId xmlns:a16="http://schemas.microsoft.com/office/drawing/2014/main" xmlns="" id="{46648A93-25ED-D0F3-F7B8-144008FB16B7}"/>
+                <a16:creationId xmlns="" xmlns:a16="http://schemas.microsoft.com/office/drawing/2014/main" id="{46648A93-25ED-D0F3-F7B8-144008FB16B7}"/>
               </a:ext>
             </a:extLst>
           </p:cNvPr>
@@ -7225,7 +7225,7 @@
     </p:spTree>
     <p:extLst>
       <p:ext uri="{BB962C8B-B14F-4D97-AF65-F5344CB8AC3E}">
-        <p14:creationId xmlns:p14="http://schemas.microsoft.com/office/powerpoint/2010/main" xmlns="" val="1879124536"/>
+        <p14:creationId xmlns="" xmlns:p14="http://schemas.microsoft.com/office/powerpoint/2010/main" val="1879124536"/>
       </p:ext>
     </p:extLst>
   </p:cSld>
@@ -8515,7 +8515,7 @@
           <p:cNvPr id="3" name="Rectangle 2">
             <a:extLst>
               <a:ext uri="{FF2B5EF4-FFF2-40B4-BE49-F238E27FC236}">
-                <a16:creationId xmlns:a16="http://schemas.microsoft.com/office/drawing/2014/main" xmlns="" id="{FFEF0871-0309-1572-391B-5985ABE4CE01}"/>
+                <a16:creationId xmlns="" xmlns:a16="http://schemas.microsoft.com/office/drawing/2014/main" id="{FFEF0871-0309-1572-391B-5985ABE4CE01}"/>
               </a:ext>
             </a:extLst>
           </p:cNvPr>
@@ -8569,7 +8569,7 @@
           <p:cNvPr id="5" name="Rectangle 4">
             <a:extLst>
               <a:ext uri="{FF2B5EF4-FFF2-40B4-BE49-F238E27FC236}">
-                <a16:creationId xmlns:a16="http://schemas.microsoft.com/office/drawing/2014/main" xmlns="" id="{22B14C85-B862-AC4B-4E24-B2666F986BDA}"/>
+                <a16:creationId xmlns="" xmlns:a16="http://schemas.microsoft.com/office/drawing/2014/main" id="{22B14C85-B862-AC4B-4E24-B2666F986BDA}"/>
               </a:ext>
             </a:extLst>
           </p:cNvPr>
@@ -8623,7 +8623,7 @@
           <p:cNvPr id="2" name="TextBox 1">
             <a:extLst>
               <a:ext uri="{FF2B5EF4-FFF2-40B4-BE49-F238E27FC236}">
-                <a16:creationId xmlns:a16="http://schemas.microsoft.com/office/drawing/2014/main" xmlns="" id="{F62B988E-ABD2-B6BD-8DE5-484D49EFC299}"/>
+                <a16:creationId xmlns="" xmlns:a16="http://schemas.microsoft.com/office/drawing/2014/main" id="{F62B988E-ABD2-B6BD-8DE5-484D49EFC299}"/>
               </a:ext>
             </a:extLst>
           </p:cNvPr>
@@ -8659,7 +8659,7 @@
           <p:cNvPr id="6" name="TextBox 5">
             <a:extLst>
               <a:ext uri="{FF2B5EF4-FFF2-40B4-BE49-F238E27FC236}">
-                <a16:creationId xmlns:a16="http://schemas.microsoft.com/office/drawing/2014/main" xmlns="" id="{032073D1-5C86-096E-E34F-E839D76407AB}"/>
+                <a16:creationId xmlns="" xmlns:a16="http://schemas.microsoft.com/office/drawing/2014/main" id="{032073D1-5C86-096E-E34F-E839D76407AB}"/>
               </a:ext>
             </a:extLst>
           </p:cNvPr>
@@ -8695,7 +8695,7 @@
           <p:cNvPr id="18" name="Picture 17">
             <a:extLst>
               <a:ext uri="{FF2B5EF4-FFF2-40B4-BE49-F238E27FC236}">
-                <a16:creationId xmlns:a16="http://schemas.microsoft.com/office/drawing/2014/main" xmlns="" id="{AB95657D-99F1-D34C-92B6-10255E6E567F}"/>
+                <a16:creationId xmlns="" xmlns:a16="http://schemas.microsoft.com/office/drawing/2014/main" id="{AB95657D-99F1-D34C-92B6-10255E6E567F}"/>
               </a:ext>
             </a:extLst>
           </p:cNvPr>
@@ -8725,7 +8725,7 @@
           <p:cNvPr id="20" name="Picture 19">
             <a:extLst>
               <a:ext uri="{FF2B5EF4-FFF2-40B4-BE49-F238E27FC236}">
-                <a16:creationId xmlns:a16="http://schemas.microsoft.com/office/drawing/2014/main" xmlns="" id="{C09DE846-15F0-FDAB-B4C7-57DC529AD9DF}"/>
+                <a16:creationId xmlns="" xmlns:a16="http://schemas.microsoft.com/office/drawing/2014/main" id="{C09DE846-15F0-FDAB-B4C7-57DC529AD9DF}"/>
               </a:ext>
             </a:extLst>
           </p:cNvPr>
@@ -8755,7 +8755,7 @@
           <p:cNvPr id="22" name="Picture 21">
             <a:extLst>
               <a:ext uri="{FF2B5EF4-FFF2-40B4-BE49-F238E27FC236}">
-                <a16:creationId xmlns:a16="http://schemas.microsoft.com/office/drawing/2014/main" xmlns="" id="{68CFDBB9-9A7A-C1DC-EDEF-AB162E041FAE}"/>
+                <a16:creationId xmlns="" xmlns:a16="http://schemas.microsoft.com/office/drawing/2014/main" id="{68CFDBB9-9A7A-C1DC-EDEF-AB162E041FAE}"/>
               </a:ext>
             </a:extLst>
           </p:cNvPr>
@@ -8785,7 +8785,7 @@
           <p:cNvPr id="23" name="Picture 22">
             <a:extLst>
               <a:ext uri="{FF2B5EF4-FFF2-40B4-BE49-F238E27FC236}">
-                <a16:creationId xmlns:a16="http://schemas.microsoft.com/office/drawing/2014/main" xmlns="" id="{69D68710-3B44-B909-ADAC-FA9688495BE1}"/>
+                <a16:creationId xmlns="" xmlns:a16="http://schemas.microsoft.com/office/drawing/2014/main" id="{69D68710-3B44-B909-ADAC-FA9688495BE1}"/>
               </a:ext>
             </a:extLst>
           </p:cNvPr>
@@ -8815,7 +8815,7 @@
           <p:cNvPr id="24" name="TextBox 23">
             <a:extLst>
               <a:ext uri="{FF2B5EF4-FFF2-40B4-BE49-F238E27FC236}">
-                <a16:creationId xmlns:a16="http://schemas.microsoft.com/office/drawing/2014/main" xmlns="" id="{6491949F-0B8B-D8B9-30F5-0C2986FAC5A2}"/>
+                <a16:creationId xmlns="" xmlns:a16="http://schemas.microsoft.com/office/drawing/2014/main" id="{6491949F-0B8B-D8B9-30F5-0C2986FAC5A2}"/>
               </a:ext>
             </a:extLst>
           </p:cNvPr>
@@ -8851,7 +8851,7 @@
           <p:cNvPr id="29" name="Straight Connector 28">
             <a:extLst>
               <a:ext uri="{FF2B5EF4-FFF2-40B4-BE49-F238E27FC236}">
-                <a16:creationId xmlns:a16="http://schemas.microsoft.com/office/drawing/2014/main" xmlns="" id="{0D49A566-5B7F-D34D-3E43-FE185127CCDB}"/>
+                <a16:creationId xmlns="" xmlns:a16="http://schemas.microsoft.com/office/drawing/2014/main" id="{0D49A566-5B7F-D34D-3E43-FE185127CCDB}"/>
               </a:ext>
             </a:extLst>
           </p:cNvPr>
@@ -8887,7 +8887,7 @@
           <p:cNvPr id="31" name="Straight Connector 30">
             <a:extLst>
               <a:ext uri="{FF2B5EF4-FFF2-40B4-BE49-F238E27FC236}">
-                <a16:creationId xmlns:a16="http://schemas.microsoft.com/office/drawing/2014/main" xmlns="" id="{26A481AF-3F70-BE61-B85D-BFCC35BD3BD6}"/>
+                <a16:creationId xmlns="" xmlns:a16="http://schemas.microsoft.com/office/drawing/2014/main" id="{26A481AF-3F70-BE61-B85D-BFCC35BD3BD6}"/>
               </a:ext>
             </a:extLst>
           </p:cNvPr>
@@ -8925,7 +8925,7 @@
           <p:cNvPr id="34" name="Straight Connector 33">
             <a:extLst>
               <a:ext uri="{FF2B5EF4-FFF2-40B4-BE49-F238E27FC236}">
-                <a16:creationId xmlns:a16="http://schemas.microsoft.com/office/drawing/2014/main" xmlns="" id="{3D6012E6-6D5B-F289-961F-FA011B17512A}"/>
+                <a16:creationId xmlns="" xmlns:a16="http://schemas.microsoft.com/office/drawing/2014/main" id="{3D6012E6-6D5B-F289-961F-FA011B17512A}"/>
               </a:ext>
             </a:extLst>
           </p:cNvPr>
@@ -8963,7 +8963,7 @@
           <p:cNvPr id="47" name="Straight Connector 46">
             <a:extLst>
               <a:ext uri="{FF2B5EF4-FFF2-40B4-BE49-F238E27FC236}">
-                <a16:creationId xmlns:a16="http://schemas.microsoft.com/office/drawing/2014/main" xmlns="" id="{0A4A8CBD-1219-8D50-33BA-F5FEF58F5650}"/>
+                <a16:creationId xmlns="" xmlns:a16="http://schemas.microsoft.com/office/drawing/2014/main" id="{0A4A8CBD-1219-8D50-33BA-F5FEF58F5650}"/>
               </a:ext>
             </a:extLst>
           </p:cNvPr>
@@ -9001,7 +9001,7 @@
           <p:cNvPr id="51" name="Straight Connector 50">
             <a:extLst>
               <a:ext uri="{FF2B5EF4-FFF2-40B4-BE49-F238E27FC236}">
-                <a16:creationId xmlns:a16="http://schemas.microsoft.com/office/drawing/2014/main" xmlns="" id="{09F998D2-8EDC-52C6-38C9-7F5A3EFAED1E}"/>
+                <a16:creationId xmlns="" xmlns:a16="http://schemas.microsoft.com/office/drawing/2014/main" id="{09F998D2-8EDC-52C6-38C9-7F5A3EFAED1E}"/>
               </a:ext>
             </a:extLst>
           </p:cNvPr>
@@ -9037,7 +9037,7 @@
           <p:cNvPr id="53" name="Straight Connector 52">
             <a:extLst>
               <a:ext uri="{FF2B5EF4-FFF2-40B4-BE49-F238E27FC236}">
-                <a16:creationId xmlns:a16="http://schemas.microsoft.com/office/drawing/2014/main" xmlns="" id="{F720A4A6-D647-0DFD-3852-25AB813A17B3}"/>
+                <a16:creationId xmlns="" xmlns:a16="http://schemas.microsoft.com/office/drawing/2014/main" id="{F720A4A6-D647-0DFD-3852-25AB813A17B3}"/>
               </a:ext>
             </a:extLst>
           </p:cNvPr>
@@ -9073,7 +9073,7 @@
           <p:cNvPr id="57" name="Straight Connector 56">
             <a:extLst>
               <a:ext uri="{FF2B5EF4-FFF2-40B4-BE49-F238E27FC236}">
-                <a16:creationId xmlns:a16="http://schemas.microsoft.com/office/drawing/2014/main" xmlns="" id="{67E3784E-FCEA-17AD-5D68-82183ABFD7DD}"/>
+                <a16:creationId xmlns="" xmlns:a16="http://schemas.microsoft.com/office/drawing/2014/main" id="{67E3784E-FCEA-17AD-5D68-82183ABFD7DD}"/>
               </a:ext>
             </a:extLst>
           </p:cNvPr>
@@ -9111,7 +9111,7 @@
           <p:cNvPr id="62" name="Straight Connector 61">
             <a:extLst>
               <a:ext uri="{FF2B5EF4-FFF2-40B4-BE49-F238E27FC236}">
-                <a16:creationId xmlns:a16="http://schemas.microsoft.com/office/drawing/2014/main" xmlns="" id="{7727660B-60D5-3134-195A-D379982C0FF6}"/>
+                <a16:creationId xmlns="" xmlns:a16="http://schemas.microsoft.com/office/drawing/2014/main" id="{7727660B-60D5-3134-195A-D379982C0FF6}"/>
               </a:ext>
             </a:extLst>
           </p:cNvPr>
@@ -9149,7 +9149,7 @@
           <p:cNvPr id="65" name="Straight Connector 64">
             <a:extLst>
               <a:ext uri="{FF2B5EF4-FFF2-40B4-BE49-F238E27FC236}">
-                <a16:creationId xmlns:a16="http://schemas.microsoft.com/office/drawing/2014/main" xmlns="" id="{DEB4620B-C2B2-E6D6-1CC5-53201B8269D8}"/>
+                <a16:creationId xmlns="" xmlns:a16="http://schemas.microsoft.com/office/drawing/2014/main" id="{DEB4620B-C2B2-E6D6-1CC5-53201B8269D8}"/>
               </a:ext>
             </a:extLst>
           </p:cNvPr>
@@ -9187,7 +9187,7 @@
           <p:cNvPr id="75" name="Straight Connector 74">
             <a:extLst>
               <a:ext uri="{FF2B5EF4-FFF2-40B4-BE49-F238E27FC236}">
-                <a16:creationId xmlns:a16="http://schemas.microsoft.com/office/drawing/2014/main" xmlns="" id="{3915A501-B812-0A5D-9C8B-3AE6E58C67BF}"/>
+                <a16:creationId xmlns="" xmlns:a16="http://schemas.microsoft.com/office/drawing/2014/main" id="{3915A501-B812-0A5D-9C8B-3AE6E58C67BF}"/>
               </a:ext>
             </a:extLst>
           </p:cNvPr>
@@ -9225,7 +9225,7 @@
           <p:cNvPr id="78" name="Straight Connector 77">
             <a:extLst>
               <a:ext uri="{FF2B5EF4-FFF2-40B4-BE49-F238E27FC236}">
-                <a16:creationId xmlns:a16="http://schemas.microsoft.com/office/drawing/2014/main" xmlns="" id="{862DE9C4-3ED2-79CE-4851-2EE67E8CB872}"/>
+                <a16:creationId xmlns="" xmlns:a16="http://schemas.microsoft.com/office/drawing/2014/main" id="{862DE9C4-3ED2-79CE-4851-2EE67E8CB872}"/>
               </a:ext>
             </a:extLst>
           </p:cNvPr>
@@ -9263,7 +9263,7 @@
           <p:cNvPr id="81" name="Straight Connector 80">
             <a:extLst>
               <a:ext uri="{FF2B5EF4-FFF2-40B4-BE49-F238E27FC236}">
-                <a16:creationId xmlns:a16="http://schemas.microsoft.com/office/drawing/2014/main" xmlns="" id="{E5458755-91D9-4DEF-B2C8-89F087D1CBA1}"/>
+                <a16:creationId xmlns="" xmlns:a16="http://schemas.microsoft.com/office/drawing/2014/main" id="{E5458755-91D9-4DEF-B2C8-89F087D1CBA1}"/>
               </a:ext>
             </a:extLst>
           </p:cNvPr>
@@ -9301,7 +9301,7 @@
           <p:cNvPr id="61" name="Straight Connector 60">
             <a:extLst>
               <a:ext uri="{FF2B5EF4-FFF2-40B4-BE49-F238E27FC236}">
-                <a16:creationId xmlns:a16="http://schemas.microsoft.com/office/drawing/2014/main" xmlns="" id="{31790475-B929-D740-4390-015E0BD2F48D}"/>
+                <a16:creationId xmlns="" xmlns:a16="http://schemas.microsoft.com/office/drawing/2014/main" id="{31790475-B929-D740-4390-015E0BD2F48D}"/>
               </a:ext>
             </a:extLst>
           </p:cNvPr>
@@ -9342,7 +9342,7 @@
           <p:cNvPr id="63" name="Straight Connector 62">
             <a:extLst>
               <a:ext uri="{FF2B5EF4-FFF2-40B4-BE49-F238E27FC236}">
-                <a16:creationId xmlns:a16="http://schemas.microsoft.com/office/drawing/2014/main" xmlns="" id="{46648A93-25ED-D0F3-F7B8-144008FB16B7}"/>
+                <a16:creationId xmlns="" xmlns:a16="http://schemas.microsoft.com/office/drawing/2014/main" id="{46648A93-25ED-D0F3-F7B8-144008FB16B7}"/>
               </a:ext>
             </a:extLst>
           </p:cNvPr>
@@ -9383,7 +9383,7 @@
     </p:spTree>
     <p:extLst>
       <p:ext uri="{BB962C8B-B14F-4D97-AF65-F5344CB8AC3E}">
-        <p14:creationId xmlns:p14="http://schemas.microsoft.com/office/powerpoint/2010/main" xmlns="" val="1004649057"/>
+        <p14:creationId xmlns="" xmlns:p14="http://schemas.microsoft.com/office/powerpoint/2010/main" val="1004649057"/>
       </p:ext>
     </p:extLst>
   </p:cSld>
@@ -10175,7 +10175,7 @@
           <p:cNvPr id="5" name="Rectangle 4">
             <a:extLst>
               <a:ext uri="{FF2B5EF4-FFF2-40B4-BE49-F238E27FC236}">
-                <a16:creationId xmlns:a16="http://schemas.microsoft.com/office/drawing/2014/main" xmlns="" id="{22B14C85-B862-AC4B-4E24-B2666F986BDA}"/>
+                <a16:creationId xmlns="" xmlns:a16="http://schemas.microsoft.com/office/drawing/2014/main" id="{22B14C85-B862-AC4B-4E24-B2666F986BDA}"/>
               </a:ext>
             </a:extLst>
           </p:cNvPr>
@@ -10229,7 +10229,7 @@
           <p:cNvPr id="6" name="TextBox 5">
             <a:extLst>
               <a:ext uri="{FF2B5EF4-FFF2-40B4-BE49-F238E27FC236}">
-                <a16:creationId xmlns:a16="http://schemas.microsoft.com/office/drawing/2014/main" xmlns="" id="{032073D1-5C86-096E-E34F-E839D76407AB}"/>
+                <a16:creationId xmlns="" xmlns:a16="http://schemas.microsoft.com/office/drawing/2014/main" id="{032073D1-5C86-096E-E34F-E839D76407AB}"/>
               </a:ext>
             </a:extLst>
           </p:cNvPr>
@@ -10265,7 +10265,7 @@
           <p:cNvPr id="18" name="Picture 17">
             <a:extLst>
               <a:ext uri="{FF2B5EF4-FFF2-40B4-BE49-F238E27FC236}">
-                <a16:creationId xmlns:a16="http://schemas.microsoft.com/office/drawing/2014/main" xmlns="" id="{AB95657D-99F1-D34C-92B6-10255E6E567F}"/>
+                <a16:creationId xmlns="" xmlns:a16="http://schemas.microsoft.com/office/drawing/2014/main" id="{AB95657D-99F1-D34C-92B6-10255E6E567F}"/>
               </a:ext>
             </a:extLst>
           </p:cNvPr>
@@ -10295,7 +10295,7 @@
           <p:cNvPr id="20" name="Picture 19">
             <a:extLst>
               <a:ext uri="{FF2B5EF4-FFF2-40B4-BE49-F238E27FC236}">
-                <a16:creationId xmlns:a16="http://schemas.microsoft.com/office/drawing/2014/main" xmlns="" id="{C09DE846-15F0-FDAB-B4C7-57DC529AD9DF}"/>
+                <a16:creationId xmlns="" xmlns:a16="http://schemas.microsoft.com/office/drawing/2014/main" id="{C09DE846-15F0-FDAB-B4C7-57DC529AD9DF}"/>
               </a:ext>
             </a:extLst>
           </p:cNvPr>
@@ -10325,7 +10325,7 @@
           <p:cNvPr id="22" name="Picture 21">
             <a:extLst>
               <a:ext uri="{FF2B5EF4-FFF2-40B4-BE49-F238E27FC236}">
-                <a16:creationId xmlns:a16="http://schemas.microsoft.com/office/drawing/2014/main" xmlns="" id="{68CFDBB9-9A7A-C1DC-EDEF-AB162E041FAE}"/>
+                <a16:creationId xmlns="" xmlns:a16="http://schemas.microsoft.com/office/drawing/2014/main" id="{68CFDBB9-9A7A-C1DC-EDEF-AB162E041FAE}"/>
               </a:ext>
             </a:extLst>
           </p:cNvPr>
@@ -10355,7 +10355,7 @@
           <p:cNvPr id="23" name="Picture 22">
             <a:extLst>
               <a:ext uri="{FF2B5EF4-FFF2-40B4-BE49-F238E27FC236}">
-                <a16:creationId xmlns:a16="http://schemas.microsoft.com/office/drawing/2014/main" xmlns="" id="{69D68710-3B44-B909-ADAC-FA9688495BE1}"/>
+                <a16:creationId xmlns="" xmlns:a16="http://schemas.microsoft.com/office/drawing/2014/main" id="{69D68710-3B44-B909-ADAC-FA9688495BE1}"/>
               </a:ext>
             </a:extLst>
           </p:cNvPr>
@@ -10385,7 +10385,7 @@
           <p:cNvPr id="24" name="TextBox 23">
             <a:extLst>
               <a:ext uri="{FF2B5EF4-FFF2-40B4-BE49-F238E27FC236}">
-                <a16:creationId xmlns:a16="http://schemas.microsoft.com/office/drawing/2014/main" xmlns="" id="{6491949F-0B8B-D8B9-30F5-0C2986FAC5A2}"/>
+                <a16:creationId xmlns="" xmlns:a16="http://schemas.microsoft.com/office/drawing/2014/main" id="{6491949F-0B8B-D8B9-30F5-0C2986FAC5A2}"/>
               </a:ext>
             </a:extLst>
           </p:cNvPr>
@@ -10421,7 +10421,7 @@
           <p:cNvPr id="29" name="Straight Connector 28">
             <a:extLst>
               <a:ext uri="{FF2B5EF4-FFF2-40B4-BE49-F238E27FC236}">
-                <a16:creationId xmlns:a16="http://schemas.microsoft.com/office/drawing/2014/main" xmlns="" id="{0D49A566-5B7F-D34D-3E43-FE185127CCDB}"/>
+                <a16:creationId xmlns="" xmlns:a16="http://schemas.microsoft.com/office/drawing/2014/main" id="{0D49A566-5B7F-D34D-3E43-FE185127CCDB}"/>
               </a:ext>
             </a:extLst>
           </p:cNvPr>
@@ -10457,7 +10457,7 @@
           <p:cNvPr id="31" name="Straight Connector 30">
             <a:extLst>
               <a:ext uri="{FF2B5EF4-FFF2-40B4-BE49-F238E27FC236}">
-                <a16:creationId xmlns:a16="http://schemas.microsoft.com/office/drawing/2014/main" xmlns="" id="{26A481AF-3F70-BE61-B85D-BFCC35BD3BD6}"/>
+                <a16:creationId xmlns="" xmlns:a16="http://schemas.microsoft.com/office/drawing/2014/main" id="{26A481AF-3F70-BE61-B85D-BFCC35BD3BD6}"/>
               </a:ext>
             </a:extLst>
           </p:cNvPr>
@@ -10495,7 +10495,7 @@
           <p:cNvPr id="34" name="Straight Connector 33">
             <a:extLst>
               <a:ext uri="{FF2B5EF4-FFF2-40B4-BE49-F238E27FC236}">
-                <a16:creationId xmlns:a16="http://schemas.microsoft.com/office/drawing/2014/main" xmlns="" id="{3D6012E6-6D5B-F289-961F-FA011B17512A}"/>
+                <a16:creationId xmlns="" xmlns:a16="http://schemas.microsoft.com/office/drawing/2014/main" id="{3D6012E6-6D5B-F289-961F-FA011B17512A}"/>
               </a:ext>
             </a:extLst>
           </p:cNvPr>
@@ -10533,7 +10533,7 @@
           <p:cNvPr id="47" name="Straight Connector 46">
             <a:extLst>
               <a:ext uri="{FF2B5EF4-FFF2-40B4-BE49-F238E27FC236}">
-                <a16:creationId xmlns:a16="http://schemas.microsoft.com/office/drawing/2014/main" xmlns="" id="{0A4A8CBD-1219-8D50-33BA-F5FEF58F5650}"/>
+                <a16:creationId xmlns="" xmlns:a16="http://schemas.microsoft.com/office/drawing/2014/main" id="{0A4A8CBD-1219-8D50-33BA-F5FEF58F5650}"/>
               </a:ext>
             </a:extLst>
           </p:cNvPr>
@@ -10571,7 +10571,7 @@
           <p:cNvPr id="51" name="Straight Connector 50">
             <a:extLst>
               <a:ext uri="{FF2B5EF4-FFF2-40B4-BE49-F238E27FC236}">
-                <a16:creationId xmlns:a16="http://schemas.microsoft.com/office/drawing/2014/main" xmlns="" id="{09F998D2-8EDC-52C6-38C9-7F5A3EFAED1E}"/>
+                <a16:creationId xmlns="" xmlns:a16="http://schemas.microsoft.com/office/drawing/2014/main" id="{09F998D2-8EDC-52C6-38C9-7F5A3EFAED1E}"/>
               </a:ext>
             </a:extLst>
           </p:cNvPr>
@@ -10607,7 +10607,7 @@
           <p:cNvPr id="53" name="Straight Connector 52">
             <a:extLst>
               <a:ext uri="{FF2B5EF4-FFF2-40B4-BE49-F238E27FC236}">
-                <a16:creationId xmlns:a16="http://schemas.microsoft.com/office/drawing/2014/main" xmlns="" id="{F720A4A6-D647-0DFD-3852-25AB813A17B3}"/>
+                <a16:creationId xmlns="" xmlns:a16="http://schemas.microsoft.com/office/drawing/2014/main" id="{F720A4A6-D647-0DFD-3852-25AB813A17B3}"/>
               </a:ext>
             </a:extLst>
           </p:cNvPr>
@@ -10643,7 +10643,7 @@
           <p:cNvPr id="57" name="Straight Connector 56">
             <a:extLst>
               <a:ext uri="{FF2B5EF4-FFF2-40B4-BE49-F238E27FC236}">
-                <a16:creationId xmlns:a16="http://schemas.microsoft.com/office/drawing/2014/main" xmlns="" id="{67E3784E-FCEA-17AD-5D68-82183ABFD7DD}"/>
+                <a16:creationId xmlns="" xmlns:a16="http://schemas.microsoft.com/office/drawing/2014/main" id="{67E3784E-FCEA-17AD-5D68-82183ABFD7DD}"/>
               </a:ext>
             </a:extLst>
           </p:cNvPr>
@@ -10681,7 +10681,7 @@
           <p:cNvPr id="62" name="Straight Connector 61">
             <a:extLst>
               <a:ext uri="{FF2B5EF4-FFF2-40B4-BE49-F238E27FC236}">
-                <a16:creationId xmlns:a16="http://schemas.microsoft.com/office/drawing/2014/main" xmlns="" id="{7727660B-60D5-3134-195A-D379982C0FF6}"/>
+                <a16:creationId xmlns="" xmlns:a16="http://schemas.microsoft.com/office/drawing/2014/main" id="{7727660B-60D5-3134-195A-D379982C0FF6}"/>
               </a:ext>
             </a:extLst>
           </p:cNvPr>
@@ -10719,7 +10719,7 @@
           <p:cNvPr id="65" name="Straight Connector 64">
             <a:extLst>
               <a:ext uri="{FF2B5EF4-FFF2-40B4-BE49-F238E27FC236}">
-                <a16:creationId xmlns:a16="http://schemas.microsoft.com/office/drawing/2014/main" xmlns="" id="{DEB4620B-C2B2-E6D6-1CC5-53201B8269D8}"/>
+                <a16:creationId xmlns="" xmlns:a16="http://schemas.microsoft.com/office/drawing/2014/main" id="{DEB4620B-C2B2-E6D6-1CC5-53201B8269D8}"/>
               </a:ext>
             </a:extLst>
           </p:cNvPr>
@@ -10757,7 +10757,7 @@
           <p:cNvPr id="75" name="Straight Connector 74">
             <a:extLst>
               <a:ext uri="{FF2B5EF4-FFF2-40B4-BE49-F238E27FC236}">
-                <a16:creationId xmlns:a16="http://schemas.microsoft.com/office/drawing/2014/main" xmlns="" id="{3915A501-B812-0A5D-9C8B-3AE6E58C67BF}"/>
+                <a16:creationId xmlns="" xmlns:a16="http://schemas.microsoft.com/office/drawing/2014/main" id="{3915A501-B812-0A5D-9C8B-3AE6E58C67BF}"/>
               </a:ext>
             </a:extLst>
           </p:cNvPr>
@@ -10795,7 +10795,7 @@
           <p:cNvPr id="78" name="Straight Connector 77">
             <a:extLst>
               <a:ext uri="{FF2B5EF4-FFF2-40B4-BE49-F238E27FC236}">
-                <a16:creationId xmlns:a16="http://schemas.microsoft.com/office/drawing/2014/main" xmlns="" id="{862DE9C4-3ED2-79CE-4851-2EE67E8CB872}"/>
+                <a16:creationId xmlns="" xmlns:a16="http://schemas.microsoft.com/office/drawing/2014/main" id="{862DE9C4-3ED2-79CE-4851-2EE67E8CB872}"/>
               </a:ext>
             </a:extLst>
           </p:cNvPr>
@@ -10833,7 +10833,7 @@
           <p:cNvPr id="81" name="Straight Connector 80">
             <a:extLst>
               <a:ext uri="{FF2B5EF4-FFF2-40B4-BE49-F238E27FC236}">
-                <a16:creationId xmlns:a16="http://schemas.microsoft.com/office/drawing/2014/main" xmlns="" id="{E5458755-91D9-4DEF-B2C8-89F087D1CBA1}"/>
+                <a16:creationId xmlns="" xmlns:a16="http://schemas.microsoft.com/office/drawing/2014/main" id="{E5458755-91D9-4DEF-B2C8-89F087D1CBA1}"/>
               </a:ext>
             </a:extLst>
           </p:cNvPr>
@@ -11372,7 +11372,7 @@
           <p:cNvPr id="99" name="TextBox 98">
             <a:extLst>
               <a:ext uri="{FF2B5EF4-FFF2-40B4-BE49-F238E27FC236}">
-                <a16:creationId xmlns:a16="http://schemas.microsoft.com/office/drawing/2014/main" xmlns="" id="{032073D1-5C86-096E-E34F-E839D76407AB}"/>
+                <a16:creationId xmlns="" xmlns:a16="http://schemas.microsoft.com/office/drawing/2014/main" id="{032073D1-5C86-096E-E34F-E839D76407AB}"/>
               </a:ext>
             </a:extLst>
           </p:cNvPr>
@@ -11408,7 +11408,7 @@
           <p:cNvPr id="100" name="TextBox 99">
             <a:extLst>
               <a:ext uri="{FF2B5EF4-FFF2-40B4-BE49-F238E27FC236}">
-                <a16:creationId xmlns:a16="http://schemas.microsoft.com/office/drawing/2014/main" xmlns="" id="{032073D1-5C86-096E-E34F-E839D76407AB}"/>
+                <a16:creationId xmlns="" xmlns:a16="http://schemas.microsoft.com/office/drawing/2014/main" id="{032073D1-5C86-096E-E34F-E839D76407AB}"/>
               </a:ext>
             </a:extLst>
           </p:cNvPr>
@@ -11444,7 +11444,7 @@
           <p:cNvPr id="101" name="TextBox 100">
             <a:extLst>
               <a:ext uri="{FF2B5EF4-FFF2-40B4-BE49-F238E27FC236}">
-                <a16:creationId xmlns:a16="http://schemas.microsoft.com/office/drawing/2014/main" xmlns="" id="{032073D1-5C86-096E-E34F-E839D76407AB}"/>
+                <a16:creationId xmlns="" xmlns:a16="http://schemas.microsoft.com/office/drawing/2014/main" id="{032073D1-5C86-096E-E34F-E839D76407AB}"/>
               </a:ext>
             </a:extLst>
           </p:cNvPr>
@@ -12869,7 +12869,7 @@
           <p:cNvPr id="185" name="TextBox 184">
             <a:extLst>
               <a:ext uri="{FF2B5EF4-FFF2-40B4-BE49-F238E27FC236}">
-                <a16:creationId xmlns:a16="http://schemas.microsoft.com/office/drawing/2014/main" xmlns="" id="{032073D1-5C86-096E-E34F-E839D76407AB}"/>
+                <a16:creationId xmlns="" xmlns:a16="http://schemas.microsoft.com/office/drawing/2014/main" id="{032073D1-5C86-096E-E34F-E839D76407AB}"/>
               </a:ext>
             </a:extLst>
           </p:cNvPr>
@@ -12894,15 +12894,7 @@
           <a:p>
             <a:r>
               <a:rPr lang="da-DK" sz="500" dirty="0" smtClean="0"/>
-              <a:t>+</a:t>
-            </a:r>
-            <a:r>
-              <a:rPr lang="da-DK" sz="500" dirty="0" smtClean="0"/>
-              <a:t>5</a:t>
-            </a:r>
-            <a:r>
-              <a:rPr lang="da-DK" sz="500" dirty="0" smtClean="0"/>
-              <a:t>V</a:t>
+              <a:t>+5V</a:t>
             </a:r>
             <a:endParaRPr lang="en-US" sz="500" dirty="0"/>
           </a:p>
@@ -13751,10 +13743,76 @@
           <a:effectLst/>
         </p:spPr>
       </p:pic>
+      <p:cxnSp>
+        <p:nvCxnSpPr>
+          <p:cNvPr id="136" name="Straight Connector 135"/>
+          <p:cNvCxnSpPr/>
+          <p:nvPr/>
+        </p:nvCxnSpPr>
+        <p:spPr>
+          <a:xfrm flipH="1">
+            <a:off x="7442200" y="1457325"/>
+            <a:ext cx="227013" cy="3080"/>
+          </a:xfrm>
+          <a:prstGeom prst="line">
+            <a:avLst/>
+          </a:prstGeom>
+        </p:spPr>
+        <p:style>
+          <a:lnRef idx="1">
+            <a:schemeClr val="accent1"/>
+          </a:lnRef>
+          <a:fillRef idx="0">
+            <a:schemeClr val="accent1"/>
+          </a:fillRef>
+          <a:effectRef idx="0">
+            <a:schemeClr val="accent1"/>
+          </a:effectRef>
+          <a:fontRef idx="minor">
+            <a:schemeClr val="tx1"/>
+          </a:fontRef>
+        </p:style>
+      </p:cxnSp>
+      <p:sp>
+        <p:nvSpPr>
+          <p:cNvPr id="138" name="TextBox 137">
+            <a:extLst>
+              <a:ext uri="{FF2B5EF4-FFF2-40B4-BE49-F238E27FC236}">
+                <a16:creationId xmlns="" xmlns:a16="http://schemas.microsoft.com/office/drawing/2014/main" id="{032073D1-5C86-096E-E34F-E839D76407AB}"/>
+              </a:ext>
+            </a:extLst>
+          </p:cNvPr>
+          <p:cNvSpPr txBox="1"/>
+          <p:nvPr/>
+        </p:nvSpPr>
+        <p:spPr>
+          <a:xfrm>
+            <a:off x="7595621" y="1368846"/>
+            <a:ext cx="370454" cy="169277"/>
+          </a:xfrm>
+          <a:prstGeom prst="rect">
+            <a:avLst/>
+          </a:prstGeom>
+          <a:noFill/>
+        </p:spPr>
+        <p:txBody>
+          <a:bodyPr wrap="square" rtlCol="0">
+            <a:spAutoFit/>
+          </a:bodyPr>
+          <a:lstStyle/>
+          <a:p>
+            <a:r>
+              <a:rPr lang="da-DK" sz="500" dirty="0"/>
+              <a:t>+3,3V</a:t>
+            </a:r>
+            <a:endParaRPr lang="en-US" sz="500" dirty="0"/>
+          </a:p>
+        </p:txBody>
+      </p:sp>
     </p:spTree>
     <p:extLst>
       <p:ext uri="{BB962C8B-B14F-4D97-AF65-F5344CB8AC3E}">
-        <p14:creationId xmlns:p14="http://schemas.microsoft.com/office/powerpoint/2010/main" xmlns="" val="1004649057"/>
+        <p14:creationId xmlns="" xmlns:p14="http://schemas.microsoft.com/office/powerpoint/2010/main" val="1004649057"/>
       </p:ext>
     </p:extLst>
   </p:cSld>

</xml_diff>

<commit_message>
GPIO assignment changed to avoid external pull-up resistors.
</commit_message>
<xml_diff>
--- a/Diagram.pptx
+++ b/Diagram.pptx
@@ -11,7 +11,7 @@
     <p:sldId id="259" r:id="rId5"/>
   </p:sldIdLst>
   <p:sldSz cx="9144000" cy="6858000" type="screen4x3"/>
-  <p:notesSz cx="6858000" cy="9144000"/>
+  <p:notesSz cx="9931400" cy="14351000"/>
   <p:defaultTextStyle>
     <a:defPPr>
       <a:defRPr lang="en-US"/>
@@ -109,7 +109,7 @@
   </p:defaultTextStyle>
   <p:extLst>
     <p:ext uri="{EFAFB233-063F-42B5-8137-9DF3F51BA10A}">
-      <p15:sldGuideLst xmlns="" xmlns:p15="http://schemas.microsoft.com/office/powerpoint/2012/main">
+      <p15:sldGuideLst xmlns:p15="http://schemas.microsoft.com/office/powerpoint/2012/main">
         <p15:guide id="1" orient="horz" pos="2160">
           <p15:clr>
             <a:srgbClr val="A4A3A4"/>
@@ -124,6 +124,547 @@
     </p:ext>
   </p:extLst>
 </p:presentation>
+</file>
+
+<file path=ppt/revisionInfo.xml><?xml version="1.0" encoding="utf-8"?>
+<p1510:revInfo xmlns:a="http://schemas.openxmlformats.org/drawingml/2006/main" xmlns:r="http://schemas.openxmlformats.org/officeDocument/2006/relationships" xmlns:p1510="http://schemas.microsoft.com/office/powerpoint/2015/10/main">
+  <p1510:revLst>
+    <p1510:client id="{3DC0E83A-6FB9-4BD8-8EB1-6717AFC99980}" v="34" dt="2024-09-24T13:53:02.849"/>
+  </p1510:revLst>
+</p1510:revInfo>
+</file>
+
+<file path=ppt/changesInfos/changesInfo1.xml><?xml version="1.0" encoding="utf-8"?>
+<pc:chgInfo xmlns:a="http://schemas.openxmlformats.org/drawingml/2006/main" xmlns:r="http://schemas.openxmlformats.org/officeDocument/2006/relationships" xmlns:ac="http://schemas.microsoft.com/office/drawing/2013/main/command" xmlns:pc="http://schemas.microsoft.com/office/powerpoint/2013/main/command">
+  <pc:docChgLst>
+    <pc:chgData name="Karl Johan Lisby" userId="951982a2-76f5-41c8-a4a7-deef41d3600e" providerId="ADAL" clId="{3DC0E83A-6FB9-4BD8-8EB1-6717AFC99980}"/>
+    <pc:docChg chg="undo custSel modSld">
+      <pc:chgData name="Karl Johan Lisby" userId="951982a2-76f5-41c8-a4a7-deef41d3600e" providerId="ADAL" clId="{3DC0E83A-6FB9-4BD8-8EB1-6717AFC99980}" dt="2024-09-24T14:10:38.405" v="1746" actId="1076"/>
+      <pc:docMkLst>
+        <pc:docMk/>
+      </pc:docMkLst>
+      <pc:sldChg chg="addSp delSp modSp mod">
+        <pc:chgData name="Karl Johan Lisby" userId="951982a2-76f5-41c8-a4a7-deef41d3600e" providerId="ADAL" clId="{3DC0E83A-6FB9-4BD8-8EB1-6717AFC99980}" dt="2024-09-24T14:10:38.405" v="1746" actId="1076"/>
+        <pc:sldMkLst>
+          <pc:docMk/>
+          <pc:sldMk cId="1004649057" sldId="259"/>
+        </pc:sldMkLst>
+        <pc:spChg chg="add del mod">
+          <ac:chgData name="Karl Johan Lisby" userId="951982a2-76f5-41c8-a4a7-deef41d3600e" providerId="ADAL" clId="{3DC0E83A-6FB9-4BD8-8EB1-6717AFC99980}" dt="2024-09-24T13:20:24.288" v="137" actId="478"/>
+          <ac:spMkLst>
+            <pc:docMk/>
+            <pc:sldMk cId="1004649057" sldId="259"/>
+            <ac:spMk id="11" creationId="{6DFD7309-4137-7921-BF42-394B7F6CA2A8}"/>
+          </ac:spMkLst>
+        </pc:spChg>
+        <pc:spChg chg="mod">
+          <ac:chgData name="Karl Johan Lisby" userId="951982a2-76f5-41c8-a4a7-deef41d3600e" providerId="ADAL" clId="{3DC0E83A-6FB9-4BD8-8EB1-6717AFC99980}" dt="2024-09-24T13:38:05.868" v="366" actId="1076"/>
+          <ac:spMkLst>
+            <pc:docMk/>
+            <pc:sldMk cId="1004649057" sldId="259"/>
+            <ac:spMk id="24" creationId="{6491949F-0B8B-D8B9-30F5-0C2986FAC5A2}"/>
+          </ac:spMkLst>
+        </pc:spChg>
+        <pc:spChg chg="mod">
+          <ac:chgData name="Karl Johan Lisby" userId="951982a2-76f5-41c8-a4a7-deef41d3600e" providerId="ADAL" clId="{3DC0E83A-6FB9-4BD8-8EB1-6717AFC99980}" dt="2024-09-24T13:26:04.353" v="150" actId="1076"/>
+          <ac:spMkLst>
+            <pc:docMk/>
+            <pc:sldMk cId="1004649057" sldId="259"/>
+            <ac:spMk id="100" creationId="{032073D1-5C86-096E-E34F-E839D76407AB}"/>
+          </ac:spMkLst>
+        </pc:spChg>
+        <pc:spChg chg="add mod">
+          <ac:chgData name="Karl Johan Lisby" userId="951982a2-76f5-41c8-a4a7-deef41d3600e" providerId="ADAL" clId="{3DC0E83A-6FB9-4BD8-8EB1-6717AFC99980}" dt="2024-09-24T13:38:22.127" v="376" actId="1076"/>
+          <ac:spMkLst>
+            <pc:docMk/>
+            <pc:sldMk cId="1004649057" sldId="259"/>
+            <ac:spMk id="229" creationId="{445D1F8C-9934-EF31-ACA7-B10896A3196C}"/>
+          </ac:spMkLst>
+        </pc:spChg>
+        <pc:picChg chg="add mod">
+          <ac:chgData name="Karl Johan Lisby" userId="951982a2-76f5-41c8-a4a7-deef41d3600e" providerId="ADAL" clId="{3DC0E83A-6FB9-4BD8-8EB1-6717AFC99980}" dt="2024-09-24T13:04:24.058" v="62" actId="1036"/>
+          <ac:picMkLst>
+            <pc:docMk/>
+            <pc:sldMk cId="1004649057" sldId="259"/>
+            <ac:picMk id="2" creationId="{5079BA80-EC62-5F39-BADE-1487F2631F71}"/>
+          </ac:picMkLst>
+        </pc:picChg>
+        <pc:picChg chg="add del mod">
+          <ac:chgData name="Karl Johan Lisby" userId="951982a2-76f5-41c8-a4a7-deef41d3600e" providerId="ADAL" clId="{3DC0E83A-6FB9-4BD8-8EB1-6717AFC99980}" dt="2024-09-24T13:25:48.980" v="141" actId="478"/>
+          <ac:picMkLst>
+            <pc:docMk/>
+            <pc:sldMk cId="1004649057" sldId="259"/>
+            <ac:picMk id="3" creationId="{0654794E-70E5-834C-48C3-2A676C30760E}"/>
+          </ac:picMkLst>
+        </pc:picChg>
+        <pc:picChg chg="add mod">
+          <ac:chgData name="Karl Johan Lisby" userId="951982a2-76f5-41c8-a4a7-deef41d3600e" providerId="ADAL" clId="{3DC0E83A-6FB9-4BD8-8EB1-6717AFC99980}" dt="2024-09-24T14:10:38.405" v="1746" actId="1076"/>
+          <ac:picMkLst>
+            <pc:docMk/>
+            <pc:sldMk cId="1004649057" sldId="259"/>
+            <ac:picMk id="9" creationId="{22DB966C-0E85-2632-17C2-CE23BDED3E60}"/>
+          </ac:picMkLst>
+        </pc:picChg>
+        <pc:picChg chg="add del mod">
+          <ac:chgData name="Karl Johan Lisby" userId="951982a2-76f5-41c8-a4a7-deef41d3600e" providerId="ADAL" clId="{3DC0E83A-6FB9-4BD8-8EB1-6717AFC99980}" dt="2024-09-24T13:25:48.980" v="141" actId="478"/>
+          <ac:picMkLst>
+            <pc:docMk/>
+            <pc:sldMk cId="1004649057" sldId="259"/>
+            <ac:picMk id="9" creationId="{4F0CB2A1-75EE-C8F6-6CA8-E321A9DACE40}"/>
+          </ac:picMkLst>
+        </pc:picChg>
+        <pc:picChg chg="add del mod">
+          <ac:chgData name="Karl Johan Lisby" userId="951982a2-76f5-41c8-a4a7-deef41d3600e" providerId="ADAL" clId="{3DC0E83A-6FB9-4BD8-8EB1-6717AFC99980}" dt="2024-09-24T13:25:48.980" v="141" actId="478"/>
+          <ac:picMkLst>
+            <pc:docMk/>
+            <pc:sldMk cId="1004649057" sldId="259"/>
+            <ac:picMk id="10" creationId="{F310C3F2-1CB5-128B-803C-23D5FB1DA152}"/>
+          </ac:picMkLst>
+        </pc:picChg>
+        <pc:picChg chg="add mod">
+          <ac:chgData name="Karl Johan Lisby" userId="951982a2-76f5-41c8-a4a7-deef41d3600e" providerId="ADAL" clId="{3DC0E83A-6FB9-4BD8-8EB1-6717AFC99980}" dt="2024-09-24T13:26:31.273" v="173" actId="1036"/>
+          <ac:picMkLst>
+            <pc:docMk/>
+            <pc:sldMk cId="1004649057" sldId="259"/>
+            <ac:picMk id="13" creationId="{926E0306-8E9A-0FCC-C362-6A428D0D4159}"/>
+          </ac:picMkLst>
+        </pc:picChg>
+        <pc:picChg chg="add mod">
+          <ac:chgData name="Karl Johan Lisby" userId="951982a2-76f5-41c8-a4a7-deef41d3600e" providerId="ADAL" clId="{3DC0E83A-6FB9-4BD8-8EB1-6717AFC99980}" dt="2024-09-24T13:27:12.043" v="190" actId="408"/>
+          <ac:picMkLst>
+            <pc:docMk/>
+            <pc:sldMk cId="1004649057" sldId="259"/>
+            <ac:picMk id="14" creationId="{BA09183D-BC67-B72F-4D48-2988EBB4FBF8}"/>
+          </ac:picMkLst>
+        </pc:picChg>
+        <pc:picChg chg="add mod">
+          <ac:chgData name="Karl Johan Lisby" userId="951982a2-76f5-41c8-a4a7-deef41d3600e" providerId="ADAL" clId="{3DC0E83A-6FB9-4BD8-8EB1-6717AFC99980}" dt="2024-09-24T13:27:12.043" v="190" actId="408"/>
+          <ac:picMkLst>
+            <pc:docMk/>
+            <pc:sldMk cId="1004649057" sldId="259"/>
+            <ac:picMk id="15" creationId="{0035E1AE-297D-0ED3-D171-006709B5E627}"/>
+          </ac:picMkLst>
+        </pc:picChg>
+        <pc:picChg chg="add mod">
+          <ac:chgData name="Karl Johan Lisby" userId="951982a2-76f5-41c8-a4a7-deef41d3600e" providerId="ADAL" clId="{3DC0E83A-6FB9-4BD8-8EB1-6717AFC99980}" dt="2024-09-24T13:26:59.411" v="189" actId="1038"/>
+          <ac:picMkLst>
+            <pc:docMk/>
+            <pc:sldMk cId="1004649057" sldId="259"/>
+            <ac:picMk id="16" creationId="{53AF7CB3-787C-ACE4-124D-686114819F45}"/>
+          </ac:picMkLst>
+        </pc:picChg>
+        <pc:picChg chg="add mod">
+          <ac:chgData name="Karl Johan Lisby" userId="951982a2-76f5-41c8-a4a7-deef41d3600e" providerId="ADAL" clId="{3DC0E83A-6FB9-4BD8-8EB1-6717AFC99980}" dt="2024-09-24T13:37:57.405" v="365" actId="1038"/>
+          <ac:picMkLst>
+            <pc:docMk/>
+            <pc:sldMk cId="1004649057" sldId="259"/>
+            <ac:picMk id="17" creationId="{FE3DF6AF-B29D-A8CD-ECCC-6DDAD37366C8}"/>
+          </ac:picMkLst>
+        </pc:picChg>
+        <pc:picChg chg="del mod">
+          <ac:chgData name="Karl Johan Lisby" userId="951982a2-76f5-41c8-a4a7-deef41d3600e" providerId="ADAL" clId="{3DC0E83A-6FB9-4BD8-8EB1-6717AFC99980}" dt="2024-09-24T13:28:45.834" v="199" actId="478"/>
+          <ac:picMkLst>
+            <pc:docMk/>
+            <pc:sldMk cId="1004649057" sldId="259"/>
+            <ac:picMk id="18" creationId="{AB95657D-99F1-D34C-92B6-10255E6E567F}"/>
+          </ac:picMkLst>
+        </pc:picChg>
+        <pc:picChg chg="add mod">
+          <ac:chgData name="Karl Johan Lisby" userId="951982a2-76f5-41c8-a4a7-deef41d3600e" providerId="ADAL" clId="{3DC0E83A-6FB9-4BD8-8EB1-6717AFC99980}" dt="2024-09-24T13:37:57.405" v="365" actId="1038"/>
+          <ac:picMkLst>
+            <pc:docMk/>
+            <pc:sldMk cId="1004649057" sldId="259"/>
+            <ac:picMk id="19" creationId="{8469CD3D-633E-DDBC-E304-5FC1C8D05407}"/>
+          </ac:picMkLst>
+        </pc:picChg>
+        <pc:picChg chg="del mod">
+          <ac:chgData name="Karl Johan Lisby" userId="951982a2-76f5-41c8-a4a7-deef41d3600e" providerId="ADAL" clId="{3DC0E83A-6FB9-4BD8-8EB1-6717AFC99980}" dt="2024-09-24T13:28:46.969" v="200" actId="478"/>
+          <ac:picMkLst>
+            <pc:docMk/>
+            <pc:sldMk cId="1004649057" sldId="259"/>
+            <ac:picMk id="20" creationId="{C09DE846-15F0-FDAB-B4C7-57DC529AD9DF}"/>
+          </ac:picMkLst>
+        </pc:picChg>
+        <pc:picChg chg="add mod">
+          <ac:chgData name="Karl Johan Lisby" userId="951982a2-76f5-41c8-a4a7-deef41d3600e" providerId="ADAL" clId="{3DC0E83A-6FB9-4BD8-8EB1-6717AFC99980}" dt="2024-09-24T13:37:57.405" v="365" actId="1038"/>
+          <ac:picMkLst>
+            <pc:docMk/>
+            <pc:sldMk cId="1004649057" sldId="259"/>
+            <ac:picMk id="21" creationId="{8FC55AEF-EEE4-359E-2477-E549D563E257}"/>
+          </ac:picMkLst>
+        </pc:picChg>
+        <pc:picChg chg="del mod">
+          <ac:chgData name="Karl Johan Lisby" userId="951982a2-76f5-41c8-a4a7-deef41d3600e" providerId="ADAL" clId="{3DC0E83A-6FB9-4BD8-8EB1-6717AFC99980}" dt="2024-09-24T13:28:45.834" v="199" actId="478"/>
+          <ac:picMkLst>
+            <pc:docMk/>
+            <pc:sldMk cId="1004649057" sldId="259"/>
+            <ac:picMk id="22" creationId="{68CFDBB9-9A7A-C1DC-EDEF-AB162E041FAE}"/>
+          </ac:picMkLst>
+        </pc:picChg>
+        <pc:picChg chg="mod">
+          <ac:chgData name="Karl Johan Lisby" userId="951982a2-76f5-41c8-a4a7-deef41d3600e" providerId="ADAL" clId="{3DC0E83A-6FB9-4BD8-8EB1-6717AFC99980}" dt="2024-09-24T13:37:57.405" v="365" actId="1038"/>
+          <ac:picMkLst>
+            <pc:docMk/>
+            <pc:sldMk cId="1004649057" sldId="259"/>
+            <ac:picMk id="23" creationId="{69D68710-3B44-B909-ADAC-FA9688495BE1}"/>
+          </ac:picMkLst>
+        </pc:picChg>
+        <pc:picChg chg="add del mod">
+          <ac:chgData name="Karl Johan Lisby" userId="951982a2-76f5-41c8-a4a7-deef41d3600e" providerId="ADAL" clId="{3DC0E83A-6FB9-4BD8-8EB1-6717AFC99980}" dt="2024-09-24T13:30:19.519" v="206" actId="478"/>
+          <ac:picMkLst>
+            <pc:docMk/>
+            <pc:sldMk cId="1004649057" sldId="259"/>
+            <ac:picMk id="25" creationId="{1FD3249F-2C6E-C034-5A6F-61DEA28C569A}"/>
+          </ac:picMkLst>
+        </pc:picChg>
+        <pc:picChg chg="add del mod">
+          <ac:chgData name="Karl Johan Lisby" userId="951982a2-76f5-41c8-a4a7-deef41d3600e" providerId="ADAL" clId="{3DC0E83A-6FB9-4BD8-8EB1-6717AFC99980}" dt="2024-09-24T13:35:57.465" v="279" actId="21"/>
+          <ac:picMkLst>
+            <pc:docMk/>
+            <pc:sldMk cId="1004649057" sldId="259"/>
+            <ac:picMk id="27" creationId="{604859D6-B561-383E-39E1-8E3FD238A7E5}"/>
+          </ac:picMkLst>
+        </pc:picChg>
+        <pc:picChg chg="add mod">
+          <ac:chgData name="Karl Johan Lisby" userId="951982a2-76f5-41c8-a4a7-deef41d3600e" providerId="ADAL" clId="{3DC0E83A-6FB9-4BD8-8EB1-6717AFC99980}" dt="2024-09-24T13:37:41.635" v="291" actId="552"/>
+          <ac:picMkLst>
+            <pc:docMk/>
+            <pc:sldMk cId="1004649057" sldId="259"/>
+            <ac:picMk id="30" creationId="{983780EC-44D2-5136-E21D-CF6902658D96}"/>
+          </ac:picMkLst>
+        </pc:picChg>
+        <pc:picChg chg="del">
+          <ac:chgData name="Karl Johan Lisby" userId="951982a2-76f5-41c8-a4a7-deef41d3600e" providerId="ADAL" clId="{3DC0E83A-6FB9-4BD8-8EB1-6717AFC99980}" dt="2024-09-24T13:37:17.799" v="288" actId="478"/>
+          <ac:picMkLst>
+            <pc:docMk/>
+            <pc:sldMk cId="1004649057" sldId="259"/>
+            <ac:picMk id="39" creationId="{00000000-0000-0000-0000-000000000000}"/>
+          </ac:picMkLst>
+        </pc:picChg>
+        <pc:picChg chg="del">
+          <ac:chgData name="Karl Johan Lisby" userId="951982a2-76f5-41c8-a4a7-deef41d3600e" providerId="ADAL" clId="{3DC0E83A-6FB9-4BD8-8EB1-6717AFC99980}" dt="2024-09-24T13:27:50.004" v="195" actId="478"/>
+          <ac:picMkLst>
+            <pc:docMk/>
+            <pc:sldMk cId="1004649057" sldId="259"/>
+            <ac:picMk id="64" creationId="{00000000-0000-0000-0000-000000000000}"/>
+          </ac:picMkLst>
+        </pc:picChg>
+        <pc:picChg chg="del">
+          <ac:chgData name="Karl Johan Lisby" userId="951982a2-76f5-41c8-a4a7-deef41d3600e" providerId="ADAL" clId="{3DC0E83A-6FB9-4BD8-8EB1-6717AFC99980}" dt="2024-09-24T13:27:51.592" v="196" actId="478"/>
+          <ac:picMkLst>
+            <pc:docMk/>
+            <pc:sldMk cId="1004649057" sldId="259"/>
+            <ac:picMk id="66" creationId="{00000000-0000-0000-0000-000000000000}"/>
+          </ac:picMkLst>
+        </pc:picChg>
+        <pc:picChg chg="add mod">
+          <ac:chgData name="Karl Johan Lisby" userId="951982a2-76f5-41c8-a4a7-deef41d3600e" providerId="ADAL" clId="{3DC0E83A-6FB9-4BD8-8EB1-6717AFC99980}" dt="2024-09-24T13:37:41.635" v="291" actId="552"/>
+          <ac:picMkLst>
+            <pc:docMk/>
+            <pc:sldMk cId="1004649057" sldId="259"/>
+            <ac:picMk id="227" creationId="{3EAA370D-C693-AA43-1043-5DCEAA889F37}"/>
+          </ac:picMkLst>
+        </pc:picChg>
+        <pc:picChg chg="del mod">
+          <ac:chgData name="Karl Johan Lisby" userId="951982a2-76f5-41c8-a4a7-deef41d3600e" providerId="ADAL" clId="{3DC0E83A-6FB9-4BD8-8EB1-6717AFC99980}" dt="2024-09-24T13:25:48.980" v="141" actId="478"/>
+          <ac:picMkLst>
+            <pc:docMk/>
+            <pc:sldMk cId="1004649057" sldId="259"/>
+            <ac:picMk id="234" creationId="{00000000-0000-0000-0000-000000000000}"/>
+          </ac:picMkLst>
+        </pc:picChg>
+        <pc:picChg chg="del">
+          <ac:chgData name="Karl Johan Lisby" userId="951982a2-76f5-41c8-a4a7-deef41d3600e" providerId="ADAL" clId="{3DC0E83A-6FB9-4BD8-8EB1-6717AFC99980}" dt="2024-09-24T13:27:48.019" v="194" actId="478"/>
+          <ac:picMkLst>
+            <pc:docMk/>
+            <pc:sldMk cId="1004649057" sldId="259"/>
+            <ac:picMk id="1028" creationId="{00000000-0000-0000-0000-000000000000}"/>
+          </ac:picMkLst>
+        </pc:picChg>
+        <pc:picChg chg="del mod">
+          <ac:chgData name="Karl Johan Lisby" userId="951982a2-76f5-41c8-a4a7-deef41d3600e" providerId="ADAL" clId="{3DC0E83A-6FB9-4BD8-8EB1-6717AFC99980}" dt="2024-09-24T13:36:52.223" v="282" actId="478"/>
+          <ac:picMkLst>
+            <pc:docMk/>
+            <pc:sldMk cId="1004649057" sldId="259"/>
+            <ac:picMk id="1030" creationId="{00000000-0000-0000-0000-000000000000}"/>
+          </ac:picMkLst>
+        </pc:picChg>
+        <pc:picChg chg="del mod">
+          <ac:chgData name="Karl Johan Lisby" userId="951982a2-76f5-41c8-a4a7-deef41d3600e" providerId="ADAL" clId="{3DC0E83A-6FB9-4BD8-8EB1-6717AFC99980}" dt="2024-09-24T14:10:29.119" v="1745" actId="478"/>
+          <ac:picMkLst>
+            <pc:docMk/>
+            <pc:sldMk cId="1004649057" sldId="259"/>
+            <ac:picMk id="1038" creationId="{00000000-0000-0000-0000-000000000000}"/>
+          </ac:picMkLst>
+        </pc:picChg>
+        <pc:cxnChg chg="del">
+          <ac:chgData name="Karl Johan Lisby" userId="951982a2-76f5-41c8-a4a7-deef41d3600e" providerId="ADAL" clId="{3DC0E83A-6FB9-4BD8-8EB1-6717AFC99980}" dt="2024-09-24T13:54:05.729" v="1735" actId="478"/>
+          <ac:cxnSpMkLst>
+            <pc:docMk/>
+            <pc:sldMk cId="1004649057" sldId="259"/>
+            <ac:cxnSpMk id="29" creationId="{0D49A566-5B7F-D34D-3E43-FE185127CCDB}"/>
+          </ac:cxnSpMkLst>
+        </pc:cxnChg>
+        <pc:cxnChg chg="del">
+          <ac:chgData name="Karl Johan Lisby" userId="951982a2-76f5-41c8-a4a7-deef41d3600e" providerId="ADAL" clId="{3DC0E83A-6FB9-4BD8-8EB1-6717AFC99980}" dt="2024-09-24T13:53:59.305" v="1733" actId="478"/>
+          <ac:cxnSpMkLst>
+            <pc:docMk/>
+            <pc:sldMk cId="1004649057" sldId="259"/>
+            <ac:cxnSpMk id="31" creationId="{26A481AF-3F70-BE61-B85D-BFCC35BD3BD6}"/>
+          </ac:cxnSpMkLst>
+        </pc:cxnChg>
+        <pc:cxnChg chg="add mod">
+          <ac:chgData name="Karl Johan Lisby" userId="951982a2-76f5-41c8-a4a7-deef41d3600e" providerId="ADAL" clId="{3DC0E83A-6FB9-4BD8-8EB1-6717AFC99980}" dt="2024-09-24T13:49:51.022" v="1263" actId="14100"/>
+          <ac:cxnSpMkLst>
+            <pc:docMk/>
+            <pc:sldMk cId="1004649057" sldId="259"/>
+            <ac:cxnSpMk id="33" creationId="{3AE5EB2D-68B6-38ED-6095-6C3674434A24}"/>
+          </ac:cxnSpMkLst>
+        </pc:cxnChg>
+        <pc:cxnChg chg="del">
+          <ac:chgData name="Karl Johan Lisby" userId="951982a2-76f5-41c8-a4a7-deef41d3600e" providerId="ADAL" clId="{3DC0E83A-6FB9-4BD8-8EB1-6717AFC99980}" dt="2024-09-24T13:54:00.856" v="1734" actId="478"/>
+          <ac:cxnSpMkLst>
+            <pc:docMk/>
+            <pc:sldMk cId="1004649057" sldId="259"/>
+            <ac:cxnSpMk id="34" creationId="{3D6012E6-6D5B-F289-961F-FA011B17512A}"/>
+          </ac:cxnSpMkLst>
+        </pc:cxnChg>
+        <pc:cxnChg chg="add mod">
+          <ac:chgData name="Karl Johan Lisby" userId="951982a2-76f5-41c8-a4a7-deef41d3600e" providerId="ADAL" clId="{3DC0E83A-6FB9-4BD8-8EB1-6717AFC99980}" dt="2024-09-24T13:50:40.270" v="1389" actId="14100"/>
+          <ac:cxnSpMkLst>
+            <pc:docMk/>
+            <pc:sldMk cId="1004649057" sldId="259"/>
+            <ac:cxnSpMk id="36" creationId="{ED8ECCB6-1A21-0B41-B0AE-72A27843EC0C}"/>
+          </ac:cxnSpMkLst>
+        </pc:cxnChg>
+        <pc:cxnChg chg="add mod">
+          <ac:chgData name="Karl Johan Lisby" userId="951982a2-76f5-41c8-a4a7-deef41d3600e" providerId="ADAL" clId="{3DC0E83A-6FB9-4BD8-8EB1-6717AFC99980}" dt="2024-09-24T13:50:32.190" v="1388" actId="14100"/>
+          <ac:cxnSpMkLst>
+            <pc:docMk/>
+            <pc:sldMk cId="1004649057" sldId="259"/>
+            <ac:cxnSpMk id="40" creationId="{4356C864-598A-848F-AE78-F10CB154B6CD}"/>
+          </ac:cxnSpMkLst>
+        </pc:cxnChg>
+        <pc:cxnChg chg="add mod">
+          <ac:chgData name="Karl Johan Lisby" userId="951982a2-76f5-41c8-a4a7-deef41d3600e" providerId="ADAL" clId="{3DC0E83A-6FB9-4BD8-8EB1-6717AFC99980}" dt="2024-09-24T13:51:15.602" v="1521" actId="14100"/>
+          <ac:cxnSpMkLst>
+            <pc:docMk/>
+            <pc:sldMk cId="1004649057" sldId="259"/>
+            <ac:cxnSpMk id="43" creationId="{4ADDD590-457D-BD0C-1F4F-319240BB44E6}"/>
+          </ac:cxnSpMkLst>
+        </pc:cxnChg>
+        <pc:cxnChg chg="del">
+          <ac:chgData name="Karl Johan Lisby" userId="951982a2-76f5-41c8-a4a7-deef41d3600e" providerId="ADAL" clId="{3DC0E83A-6FB9-4BD8-8EB1-6717AFC99980}" dt="2024-09-24T13:40:22.416" v="639" actId="478"/>
+          <ac:cxnSpMkLst>
+            <pc:docMk/>
+            <pc:sldMk cId="1004649057" sldId="259"/>
+            <ac:cxnSpMk id="45" creationId="{00000000-0000-0000-0000-000000000000}"/>
+          </ac:cxnSpMkLst>
+        </pc:cxnChg>
+        <pc:cxnChg chg="del">
+          <ac:chgData name="Karl Johan Lisby" userId="951982a2-76f5-41c8-a4a7-deef41d3600e" providerId="ADAL" clId="{3DC0E83A-6FB9-4BD8-8EB1-6717AFC99980}" dt="2024-09-24T13:53:55.186" v="1731" actId="478"/>
+          <ac:cxnSpMkLst>
+            <pc:docMk/>
+            <pc:sldMk cId="1004649057" sldId="259"/>
+            <ac:cxnSpMk id="47" creationId="{0A4A8CBD-1219-8D50-33BA-F5FEF58F5650}"/>
+          </ac:cxnSpMkLst>
+        </pc:cxnChg>
+        <pc:cxnChg chg="del">
+          <ac:chgData name="Karl Johan Lisby" userId="951982a2-76f5-41c8-a4a7-deef41d3600e" providerId="ADAL" clId="{3DC0E83A-6FB9-4BD8-8EB1-6717AFC99980}" dt="2024-09-24T13:40:23.933" v="640" actId="478"/>
+          <ac:cxnSpMkLst>
+            <pc:docMk/>
+            <pc:sldMk cId="1004649057" sldId="259"/>
+            <ac:cxnSpMk id="48" creationId="{00000000-0000-0000-0000-000000000000}"/>
+          </ac:cxnSpMkLst>
+        </pc:cxnChg>
+        <pc:cxnChg chg="add mod">
+          <ac:chgData name="Karl Johan Lisby" userId="951982a2-76f5-41c8-a4a7-deef41d3600e" providerId="ADAL" clId="{3DC0E83A-6FB9-4BD8-8EB1-6717AFC99980}" dt="2024-09-24T13:51:52.537" v="1530" actId="14100"/>
+          <ac:cxnSpMkLst>
+            <pc:docMk/>
+            <pc:sldMk cId="1004649057" sldId="259"/>
+            <ac:cxnSpMk id="49" creationId="{1E016C0B-4B6F-25FA-DA07-81991E28DC48}"/>
+          </ac:cxnSpMkLst>
+        </pc:cxnChg>
+        <pc:cxnChg chg="del">
+          <ac:chgData name="Karl Johan Lisby" userId="951982a2-76f5-41c8-a4a7-deef41d3600e" providerId="ADAL" clId="{3DC0E83A-6FB9-4BD8-8EB1-6717AFC99980}" dt="2024-09-24T13:53:57.468" v="1732" actId="478"/>
+          <ac:cxnSpMkLst>
+            <pc:docMk/>
+            <pc:sldMk cId="1004649057" sldId="259"/>
+            <ac:cxnSpMk id="51" creationId="{09F998D2-8EDC-52C6-38C9-7F5A3EFAED1E}"/>
+          </ac:cxnSpMkLst>
+        </pc:cxnChg>
+        <pc:cxnChg chg="add mod">
+          <ac:chgData name="Karl Johan Lisby" userId="951982a2-76f5-41c8-a4a7-deef41d3600e" providerId="ADAL" clId="{3DC0E83A-6FB9-4BD8-8EB1-6717AFC99980}" dt="2024-09-24T13:52:13.492" v="1665" actId="1036"/>
+          <ac:cxnSpMkLst>
+            <pc:docMk/>
+            <pc:sldMk cId="1004649057" sldId="259"/>
+            <ac:cxnSpMk id="52" creationId="{E79EF4FE-5BAA-7234-E5BD-FF3C59886BEA}"/>
+          </ac:cxnSpMkLst>
+        </pc:cxnChg>
+        <pc:cxnChg chg="del">
+          <ac:chgData name="Karl Johan Lisby" userId="951982a2-76f5-41c8-a4a7-deef41d3600e" providerId="ADAL" clId="{3DC0E83A-6FB9-4BD8-8EB1-6717AFC99980}" dt="2024-09-24T13:54:05.729" v="1735" actId="478"/>
+          <ac:cxnSpMkLst>
+            <pc:docMk/>
+            <pc:sldMk cId="1004649057" sldId="259"/>
+            <ac:cxnSpMk id="53" creationId="{F720A4A6-D647-0DFD-3852-25AB813A17B3}"/>
+          </ac:cxnSpMkLst>
+        </pc:cxnChg>
+        <pc:cxnChg chg="del">
+          <ac:chgData name="Karl Johan Lisby" userId="951982a2-76f5-41c8-a4a7-deef41d3600e" providerId="ADAL" clId="{3DC0E83A-6FB9-4BD8-8EB1-6717AFC99980}" dt="2024-09-24T13:53:52.611" v="1729" actId="478"/>
+          <ac:cxnSpMkLst>
+            <pc:docMk/>
+            <pc:sldMk cId="1004649057" sldId="259"/>
+            <ac:cxnSpMk id="57" creationId="{67E3784E-FCEA-17AD-5D68-82183ABFD7DD}"/>
+          </ac:cxnSpMkLst>
+        </pc:cxnChg>
+        <pc:cxnChg chg="add mod">
+          <ac:chgData name="Karl Johan Lisby" userId="951982a2-76f5-41c8-a4a7-deef41d3600e" providerId="ADAL" clId="{3DC0E83A-6FB9-4BD8-8EB1-6717AFC99980}" dt="2024-09-24T13:53:18.702" v="1726" actId="14100"/>
+          <ac:cxnSpMkLst>
+            <pc:docMk/>
+            <pc:sldMk cId="1004649057" sldId="259"/>
+            <ac:cxnSpMk id="58" creationId="{8D945EF1-09D6-BAE1-7118-2305CFA420AC}"/>
+          </ac:cxnSpMkLst>
+        </pc:cxnChg>
+        <pc:cxnChg chg="del">
+          <ac:chgData name="Karl Johan Lisby" userId="951982a2-76f5-41c8-a4a7-deef41d3600e" providerId="ADAL" clId="{3DC0E83A-6FB9-4BD8-8EB1-6717AFC99980}" dt="2024-09-24T13:53:53.830" v="1730" actId="478"/>
+          <ac:cxnSpMkLst>
+            <pc:docMk/>
+            <pc:sldMk cId="1004649057" sldId="259"/>
+            <ac:cxnSpMk id="62" creationId="{7727660B-60D5-3134-195A-D379982C0FF6}"/>
+          </ac:cxnSpMkLst>
+        </pc:cxnChg>
+        <pc:cxnChg chg="del">
+          <ac:chgData name="Karl Johan Lisby" userId="951982a2-76f5-41c8-a4a7-deef41d3600e" providerId="ADAL" clId="{3DC0E83A-6FB9-4BD8-8EB1-6717AFC99980}" dt="2024-09-24T13:54:05.729" v="1735" actId="478"/>
+          <ac:cxnSpMkLst>
+            <pc:docMk/>
+            <pc:sldMk cId="1004649057" sldId="259"/>
+            <ac:cxnSpMk id="65" creationId="{DEB4620B-C2B2-E6D6-1CC5-53201B8269D8}"/>
+          </ac:cxnSpMkLst>
+        </pc:cxnChg>
+        <pc:cxnChg chg="del">
+          <ac:chgData name="Karl Johan Lisby" userId="951982a2-76f5-41c8-a4a7-deef41d3600e" providerId="ADAL" clId="{3DC0E83A-6FB9-4BD8-8EB1-6717AFC99980}" dt="2024-09-24T13:53:51.646" v="1728" actId="478"/>
+          <ac:cxnSpMkLst>
+            <pc:docMk/>
+            <pc:sldMk cId="1004649057" sldId="259"/>
+            <ac:cxnSpMk id="75" creationId="{3915A501-B812-0A5D-9C8B-3AE6E58C67BF}"/>
+          </ac:cxnSpMkLst>
+        </pc:cxnChg>
+        <pc:cxnChg chg="del">
+          <ac:chgData name="Karl Johan Lisby" userId="951982a2-76f5-41c8-a4a7-deef41d3600e" providerId="ADAL" clId="{3DC0E83A-6FB9-4BD8-8EB1-6717AFC99980}" dt="2024-09-24T13:54:05.729" v="1735" actId="478"/>
+          <ac:cxnSpMkLst>
+            <pc:docMk/>
+            <pc:sldMk cId="1004649057" sldId="259"/>
+            <ac:cxnSpMk id="78" creationId="{862DE9C4-3ED2-79CE-4851-2EE67E8CB872}"/>
+          </ac:cxnSpMkLst>
+        </pc:cxnChg>
+        <pc:cxnChg chg="del">
+          <ac:chgData name="Karl Johan Lisby" userId="951982a2-76f5-41c8-a4a7-deef41d3600e" providerId="ADAL" clId="{3DC0E83A-6FB9-4BD8-8EB1-6717AFC99980}" dt="2024-09-24T13:53:49.906" v="1727" actId="478"/>
+          <ac:cxnSpMkLst>
+            <pc:docMk/>
+            <pc:sldMk cId="1004649057" sldId="259"/>
+            <ac:cxnSpMk id="81" creationId="{E5458755-91D9-4DEF-B2C8-89F087D1CBA1}"/>
+          </ac:cxnSpMkLst>
+        </pc:cxnChg>
+        <pc:cxnChg chg="add mod">
+          <ac:chgData name="Karl Johan Lisby" userId="951982a2-76f5-41c8-a4a7-deef41d3600e" providerId="ADAL" clId="{3DC0E83A-6FB9-4BD8-8EB1-6717AFC99980}" dt="2024-09-24T13:52:21.505" v="1666" actId="14100"/>
+          <ac:cxnSpMkLst>
+            <pc:docMk/>
+            <pc:sldMk cId="1004649057" sldId="259"/>
+            <ac:cxnSpMk id="231" creationId="{D37D587B-DF6A-9F24-86AC-157D9881356B}"/>
+          </ac:cxnSpMkLst>
+        </pc:cxnChg>
+        <pc:cxnChg chg="add mod">
+          <ac:chgData name="Karl Johan Lisby" userId="951982a2-76f5-41c8-a4a7-deef41d3600e" providerId="ADAL" clId="{3DC0E83A-6FB9-4BD8-8EB1-6717AFC99980}" dt="2024-09-24T13:51:10.897" v="1520" actId="14100"/>
+          <ac:cxnSpMkLst>
+            <pc:docMk/>
+            <pc:sldMk cId="1004649057" sldId="259"/>
+            <ac:cxnSpMk id="235" creationId="{005D11A0-CD58-0FB9-8B62-DDACDE37DB5C}"/>
+          </ac:cxnSpMkLst>
+        </pc:cxnChg>
+        <pc:cxnChg chg="add mod">
+          <ac:chgData name="Karl Johan Lisby" userId="951982a2-76f5-41c8-a4a7-deef41d3600e" providerId="ADAL" clId="{3DC0E83A-6FB9-4BD8-8EB1-6717AFC99980}" dt="2024-09-24T13:49:58.575" v="1264" actId="14100"/>
+          <ac:cxnSpMkLst>
+            <pc:docMk/>
+            <pc:sldMk cId="1004649057" sldId="259"/>
+            <ac:cxnSpMk id="236" creationId="{C5A1D8DF-B3E0-798F-8530-C5D7E698600C}"/>
+          </ac:cxnSpMkLst>
+        </pc:cxnChg>
+        <pc:cxnChg chg="add mod">
+          <ac:chgData name="Karl Johan Lisby" userId="951982a2-76f5-41c8-a4a7-deef41d3600e" providerId="ADAL" clId="{3DC0E83A-6FB9-4BD8-8EB1-6717AFC99980}" dt="2024-09-24T13:41:02.197" v="724" actId="14100"/>
+          <ac:cxnSpMkLst>
+            <pc:docMk/>
+            <pc:sldMk cId="1004649057" sldId="259"/>
+            <ac:cxnSpMk id="237" creationId="{F2FAB770-EF47-B0D6-7FC3-AF2F6D4C6807}"/>
+          </ac:cxnSpMkLst>
+        </pc:cxnChg>
+        <pc:cxnChg chg="add mod">
+          <ac:chgData name="Karl Johan Lisby" userId="951982a2-76f5-41c8-a4a7-deef41d3600e" providerId="ADAL" clId="{3DC0E83A-6FB9-4BD8-8EB1-6717AFC99980}" dt="2024-09-24T13:45:48.196" v="985" actId="14100"/>
+          <ac:cxnSpMkLst>
+            <pc:docMk/>
+            <pc:sldMk cId="1004649057" sldId="259"/>
+            <ac:cxnSpMk id="238" creationId="{68BD5F20-F01C-5483-0883-45190AA4A302}"/>
+          </ac:cxnSpMkLst>
+        </pc:cxnChg>
+        <pc:cxnChg chg="add mod">
+          <ac:chgData name="Karl Johan Lisby" userId="951982a2-76f5-41c8-a4a7-deef41d3600e" providerId="ADAL" clId="{3DC0E83A-6FB9-4BD8-8EB1-6717AFC99980}" dt="2024-09-24T13:44:22.951" v="760" actId="14100"/>
+          <ac:cxnSpMkLst>
+            <pc:docMk/>
+            <pc:sldMk cId="1004649057" sldId="259"/>
+            <ac:cxnSpMk id="239" creationId="{8C171B3C-7A62-E17F-30A3-262629949A93}"/>
+          </ac:cxnSpMkLst>
+        </pc:cxnChg>
+        <pc:cxnChg chg="add mod">
+          <ac:chgData name="Karl Johan Lisby" userId="951982a2-76f5-41c8-a4a7-deef41d3600e" providerId="ADAL" clId="{3DC0E83A-6FB9-4BD8-8EB1-6717AFC99980}" dt="2024-09-24T13:44:12.734" v="759" actId="14100"/>
+          <ac:cxnSpMkLst>
+            <pc:docMk/>
+            <pc:sldMk cId="1004649057" sldId="259"/>
+            <ac:cxnSpMk id="241" creationId="{32616580-FC2A-63A3-317B-6500287F6247}"/>
+          </ac:cxnSpMkLst>
+        </pc:cxnChg>
+        <pc:cxnChg chg="add mod">
+          <ac:chgData name="Karl Johan Lisby" userId="951982a2-76f5-41c8-a4a7-deef41d3600e" providerId="ADAL" clId="{3DC0E83A-6FB9-4BD8-8EB1-6717AFC99980}" dt="2024-09-24T13:44:04.326" v="758" actId="14100"/>
+          <ac:cxnSpMkLst>
+            <pc:docMk/>
+            <pc:sldMk cId="1004649057" sldId="259"/>
+            <ac:cxnSpMk id="243" creationId="{B47EA40F-9794-AFEA-4853-278F5596203B}"/>
+          </ac:cxnSpMkLst>
+        </pc:cxnChg>
+        <pc:cxnChg chg="add mod">
+          <ac:chgData name="Karl Johan Lisby" userId="951982a2-76f5-41c8-a4a7-deef41d3600e" providerId="ADAL" clId="{3DC0E83A-6FB9-4BD8-8EB1-6717AFC99980}" dt="2024-09-24T13:45:09.263" v="894" actId="14100"/>
+          <ac:cxnSpMkLst>
+            <pc:docMk/>
+            <pc:sldMk cId="1004649057" sldId="259"/>
+            <ac:cxnSpMk id="247" creationId="{F68B6AAE-C39F-9C98-669F-583419C6DEBD}"/>
+          </ac:cxnSpMkLst>
+        </pc:cxnChg>
+        <pc:cxnChg chg="add del mod">
+          <ac:chgData name="Karl Johan Lisby" userId="951982a2-76f5-41c8-a4a7-deef41d3600e" providerId="ADAL" clId="{3DC0E83A-6FB9-4BD8-8EB1-6717AFC99980}" dt="2024-09-24T13:52:57.705" v="1669" actId="478"/>
+          <ac:cxnSpMkLst>
+            <pc:docMk/>
+            <pc:sldMk cId="1004649057" sldId="259"/>
+            <ac:cxnSpMk id="248" creationId="{DA517367-D857-AEE2-FD2B-7C5948F33219}"/>
+          </ac:cxnSpMkLst>
+        </pc:cxnChg>
+        <pc:cxnChg chg="add mod">
+          <ac:chgData name="Karl Johan Lisby" userId="951982a2-76f5-41c8-a4a7-deef41d3600e" providerId="ADAL" clId="{3DC0E83A-6FB9-4BD8-8EB1-6717AFC99980}" dt="2024-09-24T13:46:26.624" v="1069" actId="14100"/>
+          <ac:cxnSpMkLst>
+            <pc:docMk/>
+            <pc:sldMk cId="1004649057" sldId="259"/>
+            <ac:cxnSpMk id="251" creationId="{827BE5A2-F5E2-92EB-B9E2-B2D0052420BD}"/>
+          </ac:cxnSpMkLst>
+        </pc:cxnChg>
+        <pc:cxnChg chg="add mod">
+          <ac:chgData name="Karl Johan Lisby" userId="951982a2-76f5-41c8-a4a7-deef41d3600e" providerId="ADAL" clId="{3DC0E83A-6FB9-4BD8-8EB1-6717AFC99980}" dt="2024-09-24T13:46:15.690" v="1068" actId="14100"/>
+          <ac:cxnSpMkLst>
+            <pc:docMk/>
+            <pc:sldMk cId="1004649057" sldId="259"/>
+            <ac:cxnSpMk id="254" creationId="{FA3B054A-EC21-3392-0305-0A76CB7B9D8A}"/>
+          </ac:cxnSpMkLst>
+        </pc:cxnChg>
+      </pc:sldChg>
+    </pc:docChg>
+  </pc:docChgLst>
+</pc:chgInfo>
 </file>
 
 <file path=ppt/slideLayouts/slideLayout1.xml><?xml version="1.0" encoding="utf-8"?>
@@ -306,7 +847,7 @@
             <a:fld id="{1D8BD707-D9CF-40AE-B4C6-C98DA3205C09}" type="datetimeFigureOut">
               <a:rPr lang="en-US" smtClean="0"/>
               <a:pPr/>
-              <a:t>9/16/2024</a:t>
+              <a:t>9/24/2024</a:t>
             </a:fld>
             <a:endParaRPr lang="en-US"/>
           </a:p>
@@ -471,7 +1012,7 @@
             <a:fld id="{1D8BD707-D9CF-40AE-B4C6-C98DA3205C09}" type="datetimeFigureOut">
               <a:rPr lang="en-US" smtClean="0"/>
               <a:pPr/>
-              <a:t>9/16/2024</a:t>
+              <a:t>9/24/2024</a:t>
             </a:fld>
             <a:endParaRPr lang="en-US"/>
           </a:p>
@@ -646,7 +1187,7 @@
             <a:fld id="{1D8BD707-D9CF-40AE-B4C6-C98DA3205C09}" type="datetimeFigureOut">
               <a:rPr lang="en-US" smtClean="0"/>
               <a:pPr/>
-              <a:t>9/16/2024</a:t>
+              <a:t>9/24/2024</a:t>
             </a:fld>
             <a:endParaRPr lang="en-US"/>
           </a:p>
@@ -811,7 +1352,7 @@
             <a:fld id="{1D8BD707-D9CF-40AE-B4C6-C98DA3205C09}" type="datetimeFigureOut">
               <a:rPr lang="en-US" smtClean="0"/>
               <a:pPr/>
-              <a:t>9/16/2024</a:t>
+              <a:t>9/24/2024</a:t>
             </a:fld>
             <a:endParaRPr lang="en-US"/>
           </a:p>
@@ -1053,7 +1594,7 @@
             <a:fld id="{1D8BD707-D9CF-40AE-B4C6-C98DA3205C09}" type="datetimeFigureOut">
               <a:rPr lang="en-US" smtClean="0"/>
               <a:pPr/>
-              <a:t>9/16/2024</a:t>
+              <a:t>9/24/2024</a:t>
             </a:fld>
             <a:endParaRPr lang="en-US"/>
           </a:p>
@@ -1335,7 +1876,7 @@
             <a:fld id="{1D8BD707-D9CF-40AE-B4C6-C98DA3205C09}" type="datetimeFigureOut">
               <a:rPr lang="en-US" smtClean="0"/>
               <a:pPr/>
-              <a:t>9/16/2024</a:t>
+              <a:t>9/24/2024</a:t>
             </a:fld>
             <a:endParaRPr lang="en-US"/>
           </a:p>
@@ -1751,7 +2292,7 @@
             <a:fld id="{1D8BD707-D9CF-40AE-B4C6-C98DA3205C09}" type="datetimeFigureOut">
               <a:rPr lang="en-US" smtClean="0"/>
               <a:pPr/>
-              <a:t>9/16/2024</a:t>
+              <a:t>9/24/2024</a:t>
             </a:fld>
             <a:endParaRPr lang="en-US"/>
           </a:p>
@@ -1865,7 +2406,7 @@
             <a:fld id="{1D8BD707-D9CF-40AE-B4C6-C98DA3205C09}" type="datetimeFigureOut">
               <a:rPr lang="en-US" smtClean="0"/>
               <a:pPr/>
-              <a:t>9/16/2024</a:t>
+              <a:t>9/24/2024</a:t>
             </a:fld>
             <a:endParaRPr lang="en-US"/>
           </a:p>
@@ -1957,7 +2498,7 @@
             <a:fld id="{1D8BD707-D9CF-40AE-B4C6-C98DA3205C09}" type="datetimeFigureOut">
               <a:rPr lang="en-US" smtClean="0"/>
               <a:pPr/>
-              <a:t>9/16/2024</a:t>
+              <a:t>9/24/2024</a:t>
             </a:fld>
             <a:endParaRPr lang="en-US"/>
           </a:p>
@@ -2229,7 +2770,7 @@
             <a:fld id="{1D8BD707-D9CF-40AE-B4C6-C98DA3205C09}" type="datetimeFigureOut">
               <a:rPr lang="en-US" smtClean="0"/>
               <a:pPr/>
-              <a:t>9/16/2024</a:t>
+              <a:t>9/24/2024</a:t>
             </a:fld>
             <a:endParaRPr lang="en-US"/>
           </a:p>
@@ -2478,7 +3019,7 @@
             <a:fld id="{1D8BD707-D9CF-40AE-B4C6-C98DA3205C09}" type="datetimeFigureOut">
               <a:rPr lang="en-US" smtClean="0"/>
               <a:pPr/>
-              <a:t>9/16/2024</a:t>
+              <a:t>9/24/2024</a:t>
             </a:fld>
             <a:endParaRPr lang="en-US"/>
           </a:p>
@@ -2686,7 +3227,7 @@
             <a:fld id="{1D8BD707-D9CF-40AE-B4C6-C98DA3205C09}" type="datetimeFigureOut">
               <a:rPr lang="en-US" smtClean="0"/>
               <a:pPr/>
-              <a:t>9/16/2024</a:t>
+              <a:t>9/24/2024</a:t>
             </a:fld>
             <a:endParaRPr lang="en-US"/>
           </a:p>
@@ -5050,7 +5591,7 @@
           <p:cNvPr id="3" name="Straight Connector 2">
             <a:extLst>
               <a:ext uri="{FF2B5EF4-FFF2-40B4-BE49-F238E27FC236}">
-                <a16:creationId xmlns="" xmlns:a16="http://schemas.microsoft.com/office/drawing/2014/main" id="{576723D5-C875-83D8-4E57-4E9EB941DFA8}"/>
+                <a16:creationId xmlns:a16="http://schemas.microsoft.com/office/drawing/2014/main" id="{576723D5-C875-83D8-4E57-4E9EB941DFA8}"/>
               </a:ext>
             </a:extLst>
           </p:cNvPr>
@@ -5091,7 +5632,7 @@
           <p:cNvPr id="5" name="Straight Connector 4">
             <a:extLst>
               <a:ext uri="{FF2B5EF4-FFF2-40B4-BE49-F238E27FC236}">
-                <a16:creationId xmlns="" xmlns:a16="http://schemas.microsoft.com/office/drawing/2014/main" id="{FE28DF91-3789-901B-5087-6AC47B0ADEED}"/>
+                <a16:creationId xmlns:a16="http://schemas.microsoft.com/office/drawing/2014/main" id="{FE28DF91-3789-901B-5087-6AC47B0ADEED}"/>
               </a:ext>
             </a:extLst>
           </p:cNvPr>
@@ -6963,7 +7504,7 @@
           <p:cNvPr id="3" name="Rectangle 2">
             <a:extLst>
               <a:ext uri="{FF2B5EF4-FFF2-40B4-BE49-F238E27FC236}">
-                <a16:creationId xmlns="" xmlns:a16="http://schemas.microsoft.com/office/drawing/2014/main" id="{FFEF0871-0309-1572-391B-5985ABE4CE01}"/>
+                <a16:creationId xmlns:a16="http://schemas.microsoft.com/office/drawing/2014/main" id="{FFEF0871-0309-1572-391B-5985ABE4CE01}"/>
               </a:ext>
             </a:extLst>
           </p:cNvPr>
@@ -7017,7 +7558,7 @@
           <p:cNvPr id="5" name="Rectangle 4">
             <a:extLst>
               <a:ext uri="{FF2B5EF4-FFF2-40B4-BE49-F238E27FC236}">
-                <a16:creationId xmlns="" xmlns:a16="http://schemas.microsoft.com/office/drawing/2014/main" id="{22B14C85-B862-AC4B-4E24-B2666F986BDA}"/>
+                <a16:creationId xmlns:a16="http://schemas.microsoft.com/office/drawing/2014/main" id="{22B14C85-B862-AC4B-4E24-B2666F986BDA}"/>
               </a:ext>
             </a:extLst>
           </p:cNvPr>
@@ -7071,7 +7612,7 @@
           <p:cNvPr id="2" name="TextBox 1">
             <a:extLst>
               <a:ext uri="{FF2B5EF4-FFF2-40B4-BE49-F238E27FC236}">
-                <a16:creationId xmlns="" xmlns:a16="http://schemas.microsoft.com/office/drawing/2014/main" id="{F62B988E-ABD2-B6BD-8DE5-484D49EFC299}"/>
+                <a16:creationId xmlns:a16="http://schemas.microsoft.com/office/drawing/2014/main" id="{F62B988E-ABD2-B6BD-8DE5-484D49EFC299}"/>
               </a:ext>
             </a:extLst>
           </p:cNvPr>
@@ -7107,7 +7648,7 @@
           <p:cNvPr id="6" name="TextBox 5">
             <a:extLst>
               <a:ext uri="{FF2B5EF4-FFF2-40B4-BE49-F238E27FC236}">
-                <a16:creationId xmlns="" xmlns:a16="http://schemas.microsoft.com/office/drawing/2014/main" id="{032073D1-5C86-096E-E34F-E839D76407AB}"/>
+                <a16:creationId xmlns:a16="http://schemas.microsoft.com/office/drawing/2014/main" id="{032073D1-5C86-096E-E34F-E839D76407AB}"/>
               </a:ext>
             </a:extLst>
           </p:cNvPr>
@@ -7143,7 +7684,7 @@
           <p:cNvPr id="7" name="Straight Connector 6">
             <a:extLst>
               <a:ext uri="{FF2B5EF4-FFF2-40B4-BE49-F238E27FC236}">
-                <a16:creationId xmlns="" xmlns:a16="http://schemas.microsoft.com/office/drawing/2014/main" id="{31790475-B929-D740-4390-015E0BD2F48D}"/>
+                <a16:creationId xmlns:a16="http://schemas.microsoft.com/office/drawing/2014/main" id="{31790475-B929-D740-4390-015E0BD2F48D}"/>
               </a:ext>
             </a:extLst>
           </p:cNvPr>
@@ -7184,7 +7725,7 @@
           <p:cNvPr id="8" name="Straight Connector 7">
             <a:extLst>
               <a:ext uri="{FF2B5EF4-FFF2-40B4-BE49-F238E27FC236}">
-                <a16:creationId xmlns="" xmlns:a16="http://schemas.microsoft.com/office/drawing/2014/main" id="{46648A93-25ED-D0F3-F7B8-144008FB16B7}"/>
+                <a16:creationId xmlns:a16="http://schemas.microsoft.com/office/drawing/2014/main" id="{46648A93-25ED-D0F3-F7B8-144008FB16B7}"/>
               </a:ext>
             </a:extLst>
           </p:cNvPr>
@@ -7225,7 +7766,7 @@
     </p:spTree>
     <p:extLst>
       <p:ext uri="{BB962C8B-B14F-4D97-AF65-F5344CB8AC3E}">
-        <p14:creationId xmlns="" xmlns:p14="http://schemas.microsoft.com/office/powerpoint/2010/main" val="1879124536"/>
+        <p14:creationId xmlns:p14="http://schemas.microsoft.com/office/powerpoint/2010/main" val="1879124536"/>
       </p:ext>
     </p:extLst>
   </p:cSld>
@@ -8515,7 +9056,7 @@
           <p:cNvPr id="3" name="Rectangle 2">
             <a:extLst>
               <a:ext uri="{FF2B5EF4-FFF2-40B4-BE49-F238E27FC236}">
-                <a16:creationId xmlns="" xmlns:a16="http://schemas.microsoft.com/office/drawing/2014/main" id="{FFEF0871-0309-1572-391B-5985ABE4CE01}"/>
+                <a16:creationId xmlns:a16="http://schemas.microsoft.com/office/drawing/2014/main" id="{FFEF0871-0309-1572-391B-5985ABE4CE01}"/>
               </a:ext>
             </a:extLst>
           </p:cNvPr>
@@ -8569,7 +9110,7 @@
           <p:cNvPr id="5" name="Rectangle 4">
             <a:extLst>
               <a:ext uri="{FF2B5EF4-FFF2-40B4-BE49-F238E27FC236}">
-                <a16:creationId xmlns="" xmlns:a16="http://schemas.microsoft.com/office/drawing/2014/main" id="{22B14C85-B862-AC4B-4E24-B2666F986BDA}"/>
+                <a16:creationId xmlns:a16="http://schemas.microsoft.com/office/drawing/2014/main" id="{22B14C85-B862-AC4B-4E24-B2666F986BDA}"/>
               </a:ext>
             </a:extLst>
           </p:cNvPr>
@@ -8623,7 +9164,7 @@
           <p:cNvPr id="2" name="TextBox 1">
             <a:extLst>
               <a:ext uri="{FF2B5EF4-FFF2-40B4-BE49-F238E27FC236}">
-                <a16:creationId xmlns="" xmlns:a16="http://schemas.microsoft.com/office/drawing/2014/main" id="{F62B988E-ABD2-B6BD-8DE5-484D49EFC299}"/>
+                <a16:creationId xmlns:a16="http://schemas.microsoft.com/office/drawing/2014/main" id="{F62B988E-ABD2-B6BD-8DE5-484D49EFC299}"/>
               </a:ext>
             </a:extLst>
           </p:cNvPr>
@@ -8659,7 +9200,7 @@
           <p:cNvPr id="6" name="TextBox 5">
             <a:extLst>
               <a:ext uri="{FF2B5EF4-FFF2-40B4-BE49-F238E27FC236}">
-                <a16:creationId xmlns="" xmlns:a16="http://schemas.microsoft.com/office/drawing/2014/main" id="{032073D1-5C86-096E-E34F-E839D76407AB}"/>
+                <a16:creationId xmlns:a16="http://schemas.microsoft.com/office/drawing/2014/main" id="{032073D1-5C86-096E-E34F-E839D76407AB}"/>
               </a:ext>
             </a:extLst>
           </p:cNvPr>
@@ -8695,7 +9236,7 @@
           <p:cNvPr id="18" name="Picture 17">
             <a:extLst>
               <a:ext uri="{FF2B5EF4-FFF2-40B4-BE49-F238E27FC236}">
-                <a16:creationId xmlns="" xmlns:a16="http://schemas.microsoft.com/office/drawing/2014/main" id="{AB95657D-99F1-D34C-92B6-10255E6E567F}"/>
+                <a16:creationId xmlns:a16="http://schemas.microsoft.com/office/drawing/2014/main" id="{AB95657D-99F1-D34C-92B6-10255E6E567F}"/>
               </a:ext>
             </a:extLst>
           </p:cNvPr>
@@ -8725,7 +9266,7 @@
           <p:cNvPr id="20" name="Picture 19">
             <a:extLst>
               <a:ext uri="{FF2B5EF4-FFF2-40B4-BE49-F238E27FC236}">
-                <a16:creationId xmlns="" xmlns:a16="http://schemas.microsoft.com/office/drawing/2014/main" id="{C09DE846-15F0-FDAB-B4C7-57DC529AD9DF}"/>
+                <a16:creationId xmlns:a16="http://schemas.microsoft.com/office/drawing/2014/main" id="{C09DE846-15F0-FDAB-B4C7-57DC529AD9DF}"/>
               </a:ext>
             </a:extLst>
           </p:cNvPr>
@@ -8755,7 +9296,7 @@
           <p:cNvPr id="22" name="Picture 21">
             <a:extLst>
               <a:ext uri="{FF2B5EF4-FFF2-40B4-BE49-F238E27FC236}">
-                <a16:creationId xmlns="" xmlns:a16="http://schemas.microsoft.com/office/drawing/2014/main" id="{68CFDBB9-9A7A-C1DC-EDEF-AB162E041FAE}"/>
+                <a16:creationId xmlns:a16="http://schemas.microsoft.com/office/drawing/2014/main" id="{68CFDBB9-9A7A-C1DC-EDEF-AB162E041FAE}"/>
               </a:ext>
             </a:extLst>
           </p:cNvPr>
@@ -8785,7 +9326,7 @@
           <p:cNvPr id="23" name="Picture 22">
             <a:extLst>
               <a:ext uri="{FF2B5EF4-FFF2-40B4-BE49-F238E27FC236}">
-                <a16:creationId xmlns="" xmlns:a16="http://schemas.microsoft.com/office/drawing/2014/main" id="{69D68710-3B44-B909-ADAC-FA9688495BE1}"/>
+                <a16:creationId xmlns:a16="http://schemas.microsoft.com/office/drawing/2014/main" id="{69D68710-3B44-B909-ADAC-FA9688495BE1}"/>
               </a:ext>
             </a:extLst>
           </p:cNvPr>
@@ -8815,7 +9356,7 @@
           <p:cNvPr id="24" name="TextBox 23">
             <a:extLst>
               <a:ext uri="{FF2B5EF4-FFF2-40B4-BE49-F238E27FC236}">
-                <a16:creationId xmlns="" xmlns:a16="http://schemas.microsoft.com/office/drawing/2014/main" id="{6491949F-0B8B-D8B9-30F5-0C2986FAC5A2}"/>
+                <a16:creationId xmlns:a16="http://schemas.microsoft.com/office/drawing/2014/main" id="{6491949F-0B8B-D8B9-30F5-0C2986FAC5A2}"/>
               </a:ext>
             </a:extLst>
           </p:cNvPr>
@@ -8851,7 +9392,7 @@
           <p:cNvPr id="29" name="Straight Connector 28">
             <a:extLst>
               <a:ext uri="{FF2B5EF4-FFF2-40B4-BE49-F238E27FC236}">
-                <a16:creationId xmlns="" xmlns:a16="http://schemas.microsoft.com/office/drawing/2014/main" id="{0D49A566-5B7F-D34D-3E43-FE185127CCDB}"/>
+                <a16:creationId xmlns:a16="http://schemas.microsoft.com/office/drawing/2014/main" id="{0D49A566-5B7F-D34D-3E43-FE185127CCDB}"/>
               </a:ext>
             </a:extLst>
           </p:cNvPr>
@@ -8887,7 +9428,7 @@
           <p:cNvPr id="31" name="Straight Connector 30">
             <a:extLst>
               <a:ext uri="{FF2B5EF4-FFF2-40B4-BE49-F238E27FC236}">
-                <a16:creationId xmlns="" xmlns:a16="http://schemas.microsoft.com/office/drawing/2014/main" id="{26A481AF-3F70-BE61-B85D-BFCC35BD3BD6}"/>
+                <a16:creationId xmlns:a16="http://schemas.microsoft.com/office/drawing/2014/main" id="{26A481AF-3F70-BE61-B85D-BFCC35BD3BD6}"/>
               </a:ext>
             </a:extLst>
           </p:cNvPr>
@@ -8925,7 +9466,7 @@
           <p:cNvPr id="34" name="Straight Connector 33">
             <a:extLst>
               <a:ext uri="{FF2B5EF4-FFF2-40B4-BE49-F238E27FC236}">
-                <a16:creationId xmlns="" xmlns:a16="http://schemas.microsoft.com/office/drawing/2014/main" id="{3D6012E6-6D5B-F289-961F-FA011B17512A}"/>
+                <a16:creationId xmlns:a16="http://schemas.microsoft.com/office/drawing/2014/main" id="{3D6012E6-6D5B-F289-961F-FA011B17512A}"/>
               </a:ext>
             </a:extLst>
           </p:cNvPr>
@@ -8963,7 +9504,7 @@
           <p:cNvPr id="47" name="Straight Connector 46">
             <a:extLst>
               <a:ext uri="{FF2B5EF4-FFF2-40B4-BE49-F238E27FC236}">
-                <a16:creationId xmlns="" xmlns:a16="http://schemas.microsoft.com/office/drawing/2014/main" id="{0A4A8CBD-1219-8D50-33BA-F5FEF58F5650}"/>
+                <a16:creationId xmlns:a16="http://schemas.microsoft.com/office/drawing/2014/main" id="{0A4A8CBD-1219-8D50-33BA-F5FEF58F5650}"/>
               </a:ext>
             </a:extLst>
           </p:cNvPr>
@@ -9001,7 +9542,7 @@
           <p:cNvPr id="51" name="Straight Connector 50">
             <a:extLst>
               <a:ext uri="{FF2B5EF4-FFF2-40B4-BE49-F238E27FC236}">
-                <a16:creationId xmlns="" xmlns:a16="http://schemas.microsoft.com/office/drawing/2014/main" id="{09F998D2-8EDC-52C6-38C9-7F5A3EFAED1E}"/>
+                <a16:creationId xmlns:a16="http://schemas.microsoft.com/office/drawing/2014/main" id="{09F998D2-8EDC-52C6-38C9-7F5A3EFAED1E}"/>
               </a:ext>
             </a:extLst>
           </p:cNvPr>
@@ -9037,7 +9578,7 @@
           <p:cNvPr id="53" name="Straight Connector 52">
             <a:extLst>
               <a:ext uri="{FF2B5EF4-FFF2-40B4-BE49-F238E27FC236}">
-                <a16:creationId xmlns="" xmlns:a16="http://schemas.microsoft.com/office/drawing/2014/main" id="{F720A4A6-D647-0DFD-3852-25AB813A17B3}"/>
+                <a16:creationId xmlns:a16="http://schemas.microsoft.com/office/drawing/2014/main" id="{F720A4A6-D647-0DFD-3852-25AB813A17B3}"/>
               </a:ext>
             </a:extLst>
           </p:cNvPr>
@@ -9073,7 +9614,7 @@
           <p:cNvPr id="57" name="Straight Connector 56">
             <a:extLst>
               <a:ext uri="{FF2B5EF4-FFF2-40B4-BE49-F238E27FC236}">
-                <a16:creationId xmlns="" xmlns:a16="http://schemas.microsoft.com/office/drawing/2014/main" id="{67E3784E-FCEA-17AD-5D68-82183ABFD7DD}"/>
+                <a16:creationId xmlns:a16="http://schemas.microsoft.com/office/drawing/2014/main" id="{67E3784E-FCEA-17AD-5D68-82183ABFD7DD}"/>
               </a:ext>
             </a:extLst>
           </p:cNvPr>
@@ -9111,7 +9652,7 @@
           <p:cNvPr id="62" name="Straight Connector 61">
             <a:extLst>
               <a:ext uri="{FF2B5EF4-FFF2-40B4-BE49-F238E27FC236}">
-                <a16:creationId xmlns="" xmlns:a16="http://schemas.microsoft.com/office/drawing/2014/main" id="{7727660B-60D5-3134-195A-D379982C0FF6}"/>
+                <a16:creationId xmlns:a16="http://schemas.microsoft.com/office/drawing/2014/main" id="{7727660B-60D5-3134-195A-D379982C0FF6}"/>
               </a:ext>
             </a:extLst>
           </p:cNvPr>
@@ -9149,7 +9690,7 @@
           <p:cNvPr id="65" name="Straight Connector 64">
             <a:extLst>
               <a:ext uri="{FF2B5EF4-FFF2-40B4-BE49-F238E27FC236}">
-                <a16:creationId xmlns="" xmlns:a16="http://schemas.microsoft.com/office/drawing/2014/main" id="{DEB4620B-C2B2-E6D6-1CC5-53201B8269D8}"/>
+                <a16:creationId xmlns:a16="http://schemas.microsoft.com/office/drawing/2014/main" id="{DEB4620B-C2B2-E6D6-1CC5-53201B8269D8}"/>
               </a:ext>
             </a:extLst>
           </p:cNvPr>
@@ -9187,7 +9728,7 @@
           <p:cNvPr id="75" name="Straight Connector 74">
             <a:extLst>
               <a:ext uri="{FF2B5EF4-FFF2-40B4-BE49-F238E27FC236}">
-                <a16:creationId xmlns="" xmlns:a16="http://schemas.microsoft.com/office/drawing/2014/main" id="{3915A501-B812-0A5D-9C8B-3AE6E58C67BF}"/>
+                <a16:creationId xmlns:a16="http://schemas.microsoft.com/office/drawing/2014/main" id="{3915A501-B812-0A5D-9C8B-3AE6E58C67BF}"/>
               </a:ext>
             </a:extLst>
           </p:cNvPr>
@@ -9225,7 +9766,7 @@
           <p:cNvPr id="78" name="Straight Connector 77">
             <a:extLst>
               <a:ext uri="{FF2B5EF4-FFF2-40B4-BE49-F238E27FC236}">
-                <a16:creationId xmlns="" xmlns:a16="http://schemas.microsoft.com/office/drawing/2014/main" id="{862DE9C4-3ED2-79CE-4851-2EE67E8CB872}"/>
+                <a16:creationId xmlns:a16="http://schemas.microsoft.com/office/drawing/2014/main" id="{862DE9C4-3ED2-79CE-4851-2EE67E8CB872}"/>
               </a:ext>
             </a:extLst>
           </p:cNvPr>
@@ -9263,7 +9804,7 @@
           <p:cNvPr id="81" name="Straight Connector 80">
             <a:extLst>
               <a:ext uri="{FF2B5EF4-FFF2-40B4-BE49-F238E27FC236}">
-                <a16:creationId xmlns="" xmlns:a16="http://schemas.microsoft.com/office/drawing/2014/main" id="{E5458755-91D9-4DEF-B2C8-89F087D1CBA1}"/>
+                <a16:creationId xmlns:a16="http://schemas.microsoft.com/office/drawing/2014/main" id="{E5458755-91D9-4DEF-B2C8-89F087D1CBA1}"/>
               </a:ext>
             </a:extLst>
           </p:cNvPr>
@@ -9301,7 +9842,7 @@
           <p:cNvPr id="61" name="Straight Connector 60">
             <a:extLst>
               <a:ext uri="{FF2B5EF4-FFF2-40B4-BE49-F238E27FC236}">
-                <a16:creationId xmlns="" xmlns:a16="http://schemas.microsoft.com/office/drawing/2014/main" id="{31790475-B929-D740-4390-015E0BD2F48D}"/>
+                <a16:creationId xmlns:a16="http://schemas.microsoft.com/office/drawing/2014/main" id="{31790475-B929-D740-4390-015E0BD2F48D}"/>
               </a:ext>
             </a:extLst>
           </p:cNvPr>
@@ -9342,7 +9883,7 @@
           <p:cNvPr id="63" name="Straight Connector 62">
             <a:extLst>
               <a:ext uri="{FF2B5EF4-FFF2-40B4-BE49-F238E27FC236}">
-                <a16:creationId xmlns="" xmlns:a16="http://schemas.microsoft.com/office/drawing/2014/main" id="{46648A93-25ED-D0F3-F7B8-144008FB16B7}"/>
+                <a16:creationId xmlns:a16="http://schemas.microsoft.com/office/drawing/2014/main" id="{46648A93-25ED-D0F3-F7B8-144008FB16B7}"/>
               </a:ext>
             </a:extLst>
           </p:cNvPr>
@@ -9383,7 +9924,7 @@
     </p:spTree>
     <p:extLst>
       <p:ext uri="{BB962C8B-B14F-4D97-AF65-F5344CB8AC3E}">
-        <p14:creationId xmlns="" xmlns:p14="http://schemas.microsoft.com/office/powerpoint/2010/main" val="1004649057"/>
+        <p14:creationId xmlns:p14="http://schemas.microsoft.com/office/powerpoint/2010/main" val="1004649057"/>
       </p:ext>
     </p:extLst>
   </p:cSld>
@@ -9508,7 +10049,7 @@
       </p:pic>
       <p:pic>
         <p:nvPicPr>
-          <p:cNvPr id="1030" name="Picture 6"/>
+          <p:cNvPr id="1037" name="Picture 13"/>
           <p:cNvPicPr>
             <a:picLocks noChangeAspect="1" noChangeArrowheads="1"/>
           </p:cNvPicPr>
@@ -9523,8 +10064,8 @@
         </p:blipFill>
         <p:spPr bwMode="auto">
           <a:xfrm>
-            <a:off x="7404197" y="3574080"/>
-            <a:ext cx="457200" cy="436944"/>
+            <a:off x="7154864" y="2495550"/>
+            <a:ext cx="851671" cy="947738"/>
           </a:xfrm>
           <a:prstGeom prst="rect">
             <a:avLst/>
@@ -9540,134 +10081,6 @@
       </p:pic>
       <p:pic>
         <p:nvPicPr>
-          <p:cNvPr id="39" name="Picture 6"/>
-          <p:cNvPicPr>
-            <a:picLocks noChangeAspect="1" noChangeArrowheads="1"/>
-          </p:cNvPicPr>
-          <p:nvPr/>
-        </p:nvPicPr>
-        <p:blipFill>
-          <a:blip r:embed="rId4" cstate="print"/>
-          <a:srcRect/>
-          <a:stretch>
-            <a:fillRect/>
-          </a:stretch>
-        </p:blipFill>
-        <p:spPr bwMode="auto">
-          <a:xfrm>
-            <a:off x="7404197" y="3952485"/>
-            <a:ext cx="457200" cy="436944"/>
-          </a:xfrm>
-          <a:prstGeom prst="rect">
-            <a:avLst/>
-          </a:prstGeom>
-          <a:noFill/>
-          <a:ln w="9525">
-            <a:noFill/>
-            <a:miter lim="800000"/>
-            <a:headEnd/>
-            <a:tailEnd/>
-          </a:ln>
-        </p:spPr>
-      </p:pic>
-      <p:cxnSp>
-        <p:nvCxnSpPr>
-          <p:cNvPr id="45" name="Elbow Connector 44"/>
-          <p:cNvCxnSpPr/>
-          <p:nvPr/>
-        </p:nvCxnSpPr>
-        <p:spPr>
-          <a:xfrm rot="10800000">
-            <a:off x="6400625" y="3537810"/>
-            <a:ext cx="966305" cy="363364"/>
-          </a:xfrm>
-          <a:prstGeom prst="bentConnector3">
-            <a:avLst>
-              <a:gd name="adj1" fmla="val 26033"/>
-            </a:avLst>
-          </a:prstGeom>
-        </p:spPr>
-        <p:style>
-          <a:lnRef idx="1">
-            <a:schemeClr val="accent1"/>
-          </a:lnRef>
-          <a:fillRef idx="0">
-            <a:schemeClr val="accent1"/>
-          </a:fillRef>
-          <a:effectRef idx="0">
-            <a:schemeClr val="accent1"/>
-          </a:effectRef>
-          <a:fontRef idx="minor">
-            <a:schemeClr val="tx1"/>
-          </a:fontRef>
-        </p:style>
-      </p:cxnSp>
-      <p:cxnSp>
-        <p:nvCxnSpPr>
-          <p:cNvPr id="48" name="Elbow Connector 47"/>
-          <p:cNvCxnSpPr/>
-          <p:nvPr/>
-        </p:nvCxnSpPr>
-        <p:spPr>
-          <a:xfrm rot="10800000">
-            <a:off x="6392636" y="3597708"/>
-            <a:ext cx="970300" cy="674817"/>
-          </a:xfrm>
-          <a:prstGeom prst="bentConnector3">
-            <a:avLst>
-              <a:gd name="adj1" fmla="val 31893"/>
-            </a:avLst>
-          </a:prstGeom>
-        </p:spPr>
-        <p:style>
-          <a:lnRef idx="1">
-            <a:schemeClr val="accent1"/>
-          </a:lnRef>
-          <a:fillRef idx="0">
-            <a:schemeClr val="accent1"/>
-          </a:fillRef>
-          <a:effectRef idx="0">
-            <a:schemeClr val="accent1"/>
-          </a:effectRef>
-          <a:fontRef idx="minor">
-            <a:schemeClr val="tx1"/>
-          </a:fontRef>
-        </p:style>
-      </p:cxnSp>
-      <p:pic>
-        <p:nvPicPr>
-          <p:cNvPr id="1037" name="Picture 13"/>
-          <p:cNvPicPr>
-            <a:picLocks noChangeAspect="1" noChangeArrowheads="1"/>
-          </p:cNvPicPr>
-          <p:nvPr/>
-        </p:nvPicPr>
-        <p:blipFill>
-          <a:blip r:embed="rId5" cstate="print"/>
-          <a:srcRect/>
-          <a:stretch>
-            <a:fillRect/>
-          </a:stretch>
-        </p:blipFill>
-        <p:spPr bwMode="auto">
-          <a:xfrm>
-            <a:off x="7154864" y="2495550"/>
-            <a:ext cx="851671" cy="947738"/>
-          </a:xfrm>
-          <a:prstGeom prst="rect">
-            <a:avLst/>
-          </a:prstGeom>
-          <a:noFill/>
-          <a:ln w="9525">
-            <a:noFill/>
-            <a:miter lim="800000"/>
-            <a:headEnd/>
-            <a:tailEnd/>
-          </a:ln>
-        </p:spPr>
-      </p:pic>
-      <p:pic>
-        <p:nvPicPr>
           <p:cNvPr id="110" name="Picture 12"/>
           <p:cNvPicPr>
             <a:picLocks noChangeAspect="1" noChangeArrowheads="1"/>
@@ -9675,7 +10088,7 @@
           <p:nvPr/>
         </p:nvPicPr>
         <p:blipFill>
-          <a:blip r:embed="rId6" cstate="print"/>
+          <a:blip r:embed="rId5" cstate="print"/>
           <a:srcRect/>
           <a:stretch>
             <a:fillRect/>
@@ -10138,44 +10551,12 @@
           </a:p>
         </p:txBody>
       </p:sp>
-      <p:pic>
-        <p:nvPicPr>
-          <p:cNvPr id="1038" name="Picture 14"/>
-          <p:cNvPicPr>
-            <a:picLocks noChangeAspect="1" noChangeArrowheads="1"/>
-          </p:cNvPicPr>
-          <p:nvPr/>
-        </p:nvPicPr>
-        <p:blipFill>
-          <a:blip r:embed="rId7" cstate="print"/>
-          <a:srcRect/>
-          <a:stretch>
-            <a:fillRect/>
-          </a:stretch>
-        </p:blipFill>
-        <p:spPr bwMode="auto">
-          <a:xfrm>
-            <a:off x="1243799" y="2079625"/>
-            <a:ext cx="2005982" cy="736600"/>
-          </a:xfrm>
-          <a:prstGeom prst="rect">
-            <a:avLst/>
-          </a:prstGeom>
-          <a:noFill/>
-          <a:ln w="9525">
-            <a:noFill/>
-            <a:miter lim="800000"/>
-            <a:headEnd/>
-            <a:tailEnd/>
-          </a:ln>
-        </p:spPr>
-      </p:pic>
       <p:sp>
         <p:nvSpPr>
           <p:cNvPr id="5" name="Rectangle 4">
             <a:extLst>
               <a:ext uri="{FF2B5EF4-FFF2-40B4-BE49-F238E27FC236}">
-                <a16:creationId xmlns="" xmlns:a16="http://schemas.microsoft.com/office/drawing/2014/main" id="{22B14C85-B862-AC4B-4E24-B2666F986BDA}"/>
+                <a16:creationId xmlns:a16="http://schemas.microsoft.com/office/drawing/2014/main" id="{22B14C85-B862-AC4B-4E24-B2666F986BDA}"/>
               </a:ext>
             </a:extLst>
           </p:cNvPr>
@@ -10229,7 +10610,7 @@
           <p:cNvPr id="6" name="TextBox 5">
             <a:extLst>
               <a:ext uri="{FF2B5EF4-FFF2-40B4-BE49-F238E27FC236}">
-                <a16:creationId xmlns="" xmlns:a16="http://schemas.microsoft.com/office/drawing/2014/main" id="{032073D1-5C86-096E-E34F-E839D76407AB}"/>
+                <a16:creationId xmlns:a16="http://schemas.microsoft.com/office/drawing/2014/main" id="{032073D1-5C86-096E-E34F-E839D76407AB}"/>
               </a:ext>
             </a:extLst>
           </p:cNvPr>
@@ -10262,10 +10643,10 @@
       </p:sp>
       <p:pic>
         <p:nvPicPr>
-          <p:cNvPr id="18" name="Picture 17">
+          <p:cNvPr id="23" name="Picture 22">
             <a:extLst>
               <a:ext uri="{FF2B5EF4-FFF2-40B4-BE49-F238E27FC236}">
-                <a16:creationId xmlns="" xmlns:a16="http://schemas.microsoft.com/office/drawing/2014/main" id="{AB95657D-99F1-D34C-92B6-10255E6E567F}"/>
+                <a16:creationId xmlns:a16="http://schemas.microsoft.com/office/drawing/2014/main" id="{69D68710-3B44-B909-ADAC-FA9688495BE1}"/>
               </a:ext>
             </a:extLst>
           </p:cNvPr>
@@ -10275,105 +10656,15 @@
           <p:nvPr/>
         </p:nvPicPr>
         <p:blipFill>
-          <a:blip r:embed="rId8" cstate="print"/>
+          <a:blip r:embed="rId6" cstate="print"/>
           <a:stretch>
             <a:fillRect/>
           </a:stretch>
         </p:blipFill>
         <p:spPr>
           <a:xfrm>
-            <a:off x="4354385" y="2512623"/>
-            <a:ext cx="264727" cy="281377"/>
-          </a:xfrm>
-          <a:prstGeom prst="rect">
-            <a:avLst/>
-          </a:prstGeom>
-        </p:spPr>
-      </p:pic>
-      <p:pic>
-        <p:nvPicPr>
-          <p:cNvPr id="20" name="Picture 19">
-            <a:extLst>
-              <a:ext uri="{FF2B5EF4-FFF2-40B4-BE49-F238E27FC236}">
-                <a16:creationId xmlns="" xmlns:a16="http://schemas.microsoft.com/office/drawing/2014/main" id="{C09DE846-15F0-FDAB-B4C7-57DC529AD9DF}"/>
-              </a:ext>
-            </a:extLst>
-          </p:cNvPr>
-          <p:cNvPicPr>
-            <a:picLocks noChangeAspect="1"/>
-          </p:cNvPicPr>
-          <p:nvPr/>
-        </p:nvPicPr>
-        <p:blipFill>
-          <a:blip r:embed="rId8" cstate="print"/>
-          <a:stretch>
-            <a:fillRect/>
-          </a:stretch>
-        </p:blipFill>
-        <p:spPr>
-          <a:xfrm>
-            <a:off x="4354385" y="2242476"/>
-            <a:ext cx="264727" cy="281377"/>
-          </a:xfrm>
-          <a:prstGeom prst="rect">
-            <a:avLst/>
-          </a:prstGeom>
-        </p:spPr>
-      </p:pic>
-      <p:pic>
-        <p:nvPicPr>
-          <p:cNvPr id="22" name="Picture 21">
-            <a:extLst>
-              <a:ext uri="{FF2B5EF4-FFF2-40B4-BE49-F238E27FC236}">
-                <a16:creationId xmlns="" xmlns:a16="http://schemas.microsoft.com/office/drawing/2014/main" id="{68CFDBB9-9A7A-C1DC-EDEF-AB162E041FAE}"/>
-              </a:ext>
-            </a:extLst>
-          </p:cNvPr>
-          <p:cNvPicPr>
-            <a:picLocks noChangeAspect="1"/>
-          </p:cNvPicPr>
-          <p:nvPr/>
-        </p:nvPicPr>
-        <p:blipFill>
-          <a:blip r:embed="rId8" cstate="print"/>
-          <a:stretch>
-            <a:fillRect/>
-          </a:stretch>
-        </p:blipFill>
-        <p:spPr>
-          <a:xfrm>
-            <a:off x="4354385" y="1972330"/>
-            <a:ext cx="264727" cy="281377"/>
-          </a:xfrm>
-          <a:prstGeom prst="rect">
-            <a:avLst/>
-          </a:prstGeom>
-        </p:spPr>
-      </p:pic>
-      <p:pic>
-        <p:nvPicPr>
-          <p:cNvPr id="23" name="Picture 22">
-            <a:extLst>
-              <a:ext uri="{FF2B5EF4-FFF2-40B4-BE49-F238E27FC236}">
-                <a16:creationId xmlns="" xmlns:a16="http://schemas.microsoft.com/office/drawing/2014/main" id="{69D68710-3B44-B909-ADAC-FA9688495BE1}"/>
-              </a:ext>
-            </a:extLst>
-          </p:cNvPr>
-          <p:cNvPicPr>
-            <a:picLocks noChangeAspect="1"/>
-          </p:cNvPicPr>
-          <p:nvPr/>
-        </p:nvPicPr>
-        <p:blipFill>
-          <a:blip r:embed="rId8" cstate="print"/>
-          <a:stretch>
-            <a:fillRect/>
-          </a:stretch>
-        </p:blipFill>
-        <p:spPr>
-          <a:xfrm>
-            <a:off x="4354385" y="1702184"/>
-            <a:ext cx="264727" cy="281377"/>
+            <a:off x="7471930" y="4011802"/>
+            <a:ext cx="196079" cy="208411"/>
           </a:xfrm>
           <a:prstGeom prst="rect">
             <a:avLst/>
@@ -10385,7 +10676,7 @@
           <p:cNvPr id="24" name="TextBox 23">
             <a:extLst>
               <a:ext uri="{FF2B5EF4-FFF2-40B4-BE49-F238E27FC236}">
-                <a16:creationId xmlns="" xmlns:a16="http://schemas.microsoft.com/office/drawing/2014/main" id="{6491949F-0B8B-D8B9-30F5-0C2986FAC5A2}"/>
+                <a16:creationId xmlns:a16="http://schemas.microsoft.com/office/drawing/2014/main" id="{6491949F-0B8B-D8B9-30F5-0C2986FAC5A2}"/>
               </a:ext>
             </a:extLst>
           </p:cNvPr>
@@ -10394,8 +10685,8 @@
         </p:nvSpPr>
         <p:spPr>
           <a:xfrm>
-            <a:off x="4550464" y="2059643"/>
-            <a:ext cx="572272" cy="338554"/>
+            <a:off x="7590348" y="4279536"/>
+            <a:ext cx="572272" cy="169277"/>
           </a:xfrm>
           <a:prstGeom prst="rect">
             <a:avLst/>
@@ -10409,463 +10700,13 @@
           <a:lstStyle/>
           <a:p>
             <a:r>
-              <a:rPr lang="da-DK" sz="800" dirty="0"/>
+              <a:rPr lang="da-DK" sz="500" dirty="0"/>
               <a:t>IR sensors</a:t>
             </a:r>
-            <a:endParaRPr lang="en-US" sz="800" dirty="0"/>
+            <a:endParaRPr lang="en-US" sz="500" dirty="0"/>
           </a:p>
         </p:txBody>
       </p:sp>
-      <p:cxnSp>
-        <p:nvCxnSpPr>
-          <p:cNvPr id="29" name="Straight Connector 28">
-            <a:extLst>
-              <a:ext uri="{FF2B5EF4-FFF2-40B4-BE49-F238E27FC236}">
-                <a16:creationId xmlns="" xmlns:a16="http://schemas.microsoft.com/office/drawing/2014/main" id="{0D49A566-5B7F-D34D-3E43-FE185127CCDB}"/>
-              </a:ext>
-            </a:extLst>
-          </p:cNvPr>
-          <p:cNvCxnSpPr/>
-          <p:nvPr/>
-        </p:nvCxnSpPr>
-        <p:spPr>
-          <a:xfrm flipH="1">
-            <a:off x="4167717" y="2982781"/>
-            <a:ext cx="84666" cy="0"/>
-          </a:xfrm>
-          <a:prstGeom prst="line">
-            <a:avLst/>
-          </a:prstGeom>
-        </p:spPr>
-        <p:style>
-          <a:lnRef idx="1">
-            <a:schemeClr val="accent1"/>
-          </a:lnRef>
-          <a:fillRef idx="0">
-            <a:schemeClr val="accent1"/>
-          </a:fillRef>
-          <a:effectRef idx="0">
-            <a:schemeClr val="accent1"/>
-          </a:effectRef>
-          <a:fontRef idx="minor">
-            <a:schemeClr val="tx1"/>
-          </a:fontRef>
-        </p:style>
-      </p:cxnSp>
-      <p:cxnSp>
-        <p:nvCxnSpPr>
-          <p:cNvPr id="31" name="Straight Connector 30">
-            <a:extLst>
-              <a:ext uri="{FF2B5EF4-FFF2-40B4-BE49-F238E27FC236}">
-                <a16:creationId xmlns="" xmlns:a16="http://schemas.microsoft.com/office/drawing/2014/main" id="{26A481AF-3F70-BE61-B85D-BFCC35BD3BD6}"/>
-              </a:ext>
-            </a:extLst>
-          </p:cNvPr>
-          <p:cNvCxnSpPr>
-            <a:cxnSpLocks/>
-          </p:cNvCxnSpPr>
-          <p:nvPr/>
-        </p:nvCxnSpPr>
-        <p:spPr>
-          <a:xfrm flipV="1">
-            <a:off x="4167717" y="2667000"/>
-            <a:ext cx="0" cy="315781"/>
-          </a:xfrm>
-          <a:prstGeom prst="line">
-            <a:avLst/>
-          </a:prstGeom>
-        </p:spPr>
-        <p:style>
-          <a:lnRef idx="1">
-            <a:schemeClr val="accent1"/>
-          </a:lnRef>
-          <a:fillRef idx="0">
-            <a:schemeClr val="accent1"/>
-          </a:fillRef>
-          <a:effectRef idx="0">
-            <a:schemeClr val="accent1"/>
-          </a:effectRef>
-          <a:fontRef idx="minor">
-            <a:schemeClr val="tx1"/>
-          </a:fontRef>
-        </p:style>
-      </p:cxnSp>
-      <p:cxnSp>
-        <p:nvCxnSpPr>
-          <p:cNvPr id="34" name="Straight Connector 33">
-            <a:extLst>
-              <a:ext uri="{FF2B5EF4-FFF2-40B4-BE49-F238E27FC236}">
-                <a16:creationId xmlns="" xmlns:a16="http://schemas.microsoft.com/office/drawing/2014/main" id="{3D6012E6-6D5B-F289-961F-FA011B17512A}"/>
-              </a:ext>
-            </a:extLst>
-          </p:cNvPr>
-          <p:cNvCxnSpPr>
-            <a:cxnSpLocks/>
-          </p:cNvCxnSpPr>
-          <p:nvPr/>
-        </p:nvCxnSpPr>
-        <p:spPr>
-          <a:xfrm>
-            <a:off x="4171950" y="2665237"/>
-            <a:ext cx="223252" cy="0"/>
-          </a:xfrm>
-          <a:prstGeom prst="line">
-            <a:avLst/>
-          </a:prstGeom>
-        </p:spPr>
-        <p:style>
-          <a:lnRef idx="1">
-            <a:schemeClr val="accent1"/>
-          </a:lnRef>
-          <a:fillRef idx="0">
-            <a:schemeClr val="accent1"/>
-          </a:fillRef>
-          <a:effectRef idx="0">
-            <a:schemeClr val="accent1"/>
-          </a:effectRef>
-          <a:fontRef idx="minor">
-            <a:schemeClr val="tx1"/>
-          </a:fontRef>
-        </p:style>
-      </p:cxnSp>
-      <p:cxnSp>
-        <p:nvCxnSpPr>
-          <p:cNvPr id="47" name="Straight Connector 46">
-            <a:extLst>
-              <a:ext uri="{FF2B5EF4-FFF2-40B4-BE49-F238E27FC236}">
-                <a16:creationId xmlns="" xmlns:a16="http://schemas.microsoft.com/office/drawing/2014/main" id="{0A4A8CBD-1219-8D50-33BA-F5FEF58F5650}"/>
-              </a:ext>
-            </a:extLst>
-          </p:cNvPr>
-          <p:cNvCxnSpPr>
-            <a:cxnSpLocks/>
-          </p:cNvCxnSpPr>
-          <p:nvPr/>
-        </p:nvCxnSpPr>
-        <p:spPr>
-          <a:xfrm flipH="1">
-            <a:off x="4087283" y="2400098"/>
-            <a:ext cx="315785" cy="0"/>
-          </a:xfrm>
-          <a:prstGeom prst="line">
-            <a:avLst/>
-          </a:prstGeom>
-        </p:spPr>
-        <p:style>
-          <a:lnRef idx="1">
-            <a:schemeClr val="accent1"/>
-          </a:lnRef>
-          <a:fillRef idx="0">
-            <a:schemeClr val="accent1"/>
-          </a:fillRef>
-          <a:effectRef idx="0">
-            <a:schemeClr val="accent1"/>
-          </a:effectRef>
-          <a:fontRef idx="minor">
-            <a:schemeClr val="tx1"/>
-          </a:fontRef>
-        </p:style>
-      </p:cxnSp>
-      <p:cxnSp>
-        <p:nvCxnSpPr>
-          <p:cNvPr id="51" name="Straight Connector 50">
-            <a:extLst>
-              <a:ext uri="{FF2B5EF4-FFF2-40B4-BE49-F238E27FC236}">
-                <a16:creationId xmlns="" xmlns:a16="http://schemas.microsoft.com/office/drawing/2014/main" id="{09F998D2-8EDC-52C6-38C9-7F5A3EFAED1E}"/>
-              </a:ext>
-            </a:extLst>
-          </p:cNvPr>
-          <p:cNvCxnSpPr/>
-          <p:nvPr/>
-        </p:nvCxnSpPr>
-        <p:spPr>
-          <a:xfrm>
-            <a:off x="4091517" y="2406650"/>
-            <a:ext cx="0" cy="635000"/>
-          </a:xfrm>
-          <a:prstGeom prst="line">
-            <a:avLst/>
-          </a:prstGeom>
-        </p:spPr>
-        <p:style>
-          <a:lnRef idx="1">
-            <a:schemeClr val="accent1"/>
-          </a:lnRef>
-          <a:fillRef idx="0">
-            <a:schemeClr val="accent1"/>
-          </a:fillRef>
-          <a:effectRef idx="0">
-            <a:schemeClr val="accent1"/>
-          </a:effectRef>
-          <a:fontRef idx="minor">
-            <a:schemeClr val="tx1"/>
-          </a:fontRef>
-        </p:style>
-      </p:cxnSp>
-      <p:cxnSp>
-        <p:nvCxnSpPr>
-          <p:cNvPr id="53" name="Straight Connector 52">
-            <a:extLst>
-              <a:ext uri="{FF2B5EF4-FFF2-40B4-BE49-F238E27FC236}">
-                <a16:creationId xmlns="" xmlns:a16="http://schemas.microsoft.com/office/drawing/2014/main" id="{F720A4A6-D647-0DFD-3852-25AB813A17B3}"/>
-              </a:ext>
-            </a:extLst>
-          </p:cNvPr>
-          <p:cNvCxnSpPr/>
-          <p:nvPr/>
-        </p:nvCxnSpPr>
-        <p:spPr>
-          <a:xfrm>
-            <a:off x="4089400" y="3048000"/>
-            <a:ext cx="179917" cy="0"/>
-          </a:xfrm>
-          <a:prstGeom prst="line">
-            <a:avLst/>
-          </a:prstGeom>
-        </p:spPr>
-        <p:style>
-          <a:lnRef idx="1">
-            <a:schemeClr val="accent1"/>
-          </a:lnRef>
-          <a:fillRef idx="0">
-            <a:schemeClr val="accent1"/>
-          </a:fillRef>
-          <a:effectRef idx="0">
-            <a:schemeClr val="accent1"/>
-          </a:effectRef>
-          <a:fontRef idx="minor">
-            <a:schemeClr val="tx1"/>
-          </a:fontRef>
-        </p:style>
-      </p:cxnSp>
-      <p:cxnSp>
-        <p:nvCxnSpPr>
-          <p:cNvPr id="57" name="Straight Connector 56">
-            <a:extLst>
-              <a:ext uri="{FF2B5EF4-FFF2-40B4-BE49-F238E27FC236}">
-                <a16:creationId xmlns="" xmlns:a16="http://schemas.microsoft.com/office/drawing/2014/main" id="{67E3784E-FCEA-17AD-5D68-82183ABFD7DD}"/>
-              </a:ext>
-            </a:extLst>
-          </p:cNvPr>
-          <p:cNvCxnSpPr>
-            <a:cxnSpLocks/>
-          </p:cNvCxnSpPr>
-          <p:nvPr/>
-        </p:nvCxnSpPr>
-        <p:spPr>
-          <a:xfrm flipH="1">
-            <a:off x="4002617" y="2127836"/>
-            <a:ext cx="379285" cy="0"/>
-          </a:xfrm>
-          <a:prstGeom prst="line">
-            <a:avLst/>
-          </a:prstGeom>
-        </p:spPr>
-        <p:style>
-          <a:lnRef idx="1">
-            <a:schemeClr val="accent1"/>
-          </a:lnRef>
-          <a:fillRef idx="0">
-            <a:schemeClr val="accent1"/>
-          </a:fillRef>
-          <a:effectRef idx="0">
-            <a:schemeClr val="accent1"/>
-          </a:effectRef>
-          <a:fontRef idx="minor">
-            <a:schemeClr val="tx1"/>
-          </a:fontRef>
-        </p:style>
-      </p:cxnSp>
-      <p:cxnSp>
-        <p:nvCxnSpPr>
-          <p:cNvPr id="62" name="Straight Connector 61">
-            <a:extLst>
-              <a:ext uri="{FF2B5EF4-FFF2-40B4-BE49-F238E27FC236}">
-                <a16:creationId xmlns="" xmlns:a16="http://schemas.microsoft.com/office/drawing/2014/main" id="{7727660B-60D5-3134-195A-D379982C0FF6}"/>
-              </a:ext>
-            </a:extLst>
-          </p:cNvPr>
-          <p:cNvCxnSpPr>
-            <a:cxnSpLocks/>
-          </p:cNvCxnSpPr>
-          <p:nvPr/>
-        </p:nvCxnSpPr>
-        <p:spPr>
-          <a:xfrm>
-            <a:off x="4002617" y="2127250"/>
-            <a:ext cx="0" cy="994833"/>
-          </a:xfrm>
-          <a:prstGeom prst="line">
-            <a:avLst/>
-          </a:prstGeom>
-        </p:spPr>
-        <p:style>
-          <a:lnRef idx="1">
-            <a:schemeClr val="accent1"/>
-          </a:lnRef>
-          <a:fillRef idx="0">
-            <a:schemeClr val="accent1"/>
-          </a:fillRef>
-          <a:effectRef idx="0">
-            <a:schemeClr val="accent1"/>
-          </a:effectRef>
-          <a:fontRef idx="minor">
-            <a:schemeClr val="tx1"/>
-          </a:fontRef>
-        </p:style>
-      </p:cxnSp>
-      <p:cxnSp>
-        <p:nvCxnSpPr>
-          <p:cNvPr id="65" name="Straight Connector 64">
-            <a:extLst>
-              <a:ext uri="{FF2B5EF4-FFF2-40B4-BE49-F238E27FC236}">
-                <a16:creationId xmlns="" xmlns:a16="http://schemas.microsoft.com/office/drawing/2014/main" id="{DEB4620B-C2B2-E6D6-1CC5-53201B8269D8}"/>
-              </a:ext>
-            </a:extLst>
-          </p:cNvPr>
-          <p:cNvCxnSpPr>
-            <a:cxnSpLocks/>
-          </p:cNvCxnSpPr>
-          <p:nvPr/>
-        </p:nvCxnSpPr>
-        <p:spPr>
-          <a:xfrm>
-            <a:off x="3998383" y="3115733"/>
-            <a:ext cx="258234" cy="0"/>
-          </a:xfrm>
-          <a:prstGeom prst="line">
-            <a:avLst/>
-          </a:prstGeom>
-        </p:spPr>
-        <p:style>
-          <a:lnRef idx="1">
-            <a:schemeClr val="accent1"/>
-          </a:lnRef>
-          <a:fillRef idx="0">
-            <a:schemeClr val="accent1"/>
-          </a:fillRef>
-          <a:effectRef idx="0">
-            <a:schemeClr val="accent1"/>
-          </a:effectRef>
-          <a:fontRef idx="minor">
-            <a:schemeClr val="tx1"/>
-          </a:fontRef>
-        </p:style>
-      </p:cxnSp>
-      <p:cxnSp>
-        <p:nvCxnSpPr>
-          <p:cNvPr id="75" name="Straight Connector 74">
-            <a:extLst>
-              <a:ext uri="{FF2B5EF4-FFF2-40B4-BE49-F238E27FC236}">
-                <a16:creationId xmlns="" xmlns:a16="http://schemas.microsoft.com/office/drawing/2014/main" id="{3915A501-B812-0A5D-9C8B-3AE6E58C67BF}"/>
-              </a:ext>
-            </a:extLst>
-          </p:cNvPr>
-          <p:cNvCxnSpPr>
-            <a:cxnSpLocks/>
-          </p:cNvCxnSpPr>
-          <p:nvPr/>
-        </p:nvCxnSpPr>
-        <p:spPr>
-          <a:xfrm>
-            <a:off x="3903133" y="1856317"/>
-            <a:ext cx="491067" cy="0"/>
-          </a:xfrm>
-          <a:prstGeom prst="line">
-            <a:avLst/>
-          </a:prstGeom>
-        </p:spPr>
-        <p:style>
-          <a:lnRef idx="1">
-            <a:schemeClr val="accent1"/>
-          </a:lnRef>
-          <a:fillRef idx="0">
-            <a:schemeClr val="accent1"/>
-          </a:fillRef>
-          <a:effectRef idx="0">
-            <a:schemeClr val="accent1"/>
-          </a:effectRef>
-          <a:fontRef idx="minor">
-            <a:schemeClr val="tx1"/>
-          </a:fontRef>
-        </p:style>
-      </p:cxnSp>
-      <p:cxnSp>
-        <p:nvCxnSpPr>
-          <p:cNvPr id="78" name="Straight Connector 77">
-            <a:extLst>
-              <a:ext uri="{FF2B5EF4-FFF2-40B4-BE49-F238E27FC236}">
-                <a16:creationId xmlns="" xmlns:a16="http://schemas.microsoft.com/office/drawing/2014/main" id="{862DE9C4-3ED2-79CE-4851-2EE67E8CB872}"/>
-              </a:ext>
-            </a:extLst>
-          </p:cNvPr>
-          <p:cNvCxnSpPr>
-            <a:cxnSpLocks/>
-          </p:cNvCxnSpPr>
-          <p:nvPr/>
-        </p:nvCxnSpPr>
-        <p:spPr>
-          <a:xfrm>
-            <a:off x="3898900" y="3181350"/>
-            <a:ext cx="361949" cy="0"/>
-          </a:xfrm>
-          <a:prstGeom prst="line">
-            <a:avLst/>
-          </a:prstGeom>
-        </p:spPr>
-        <p:style>
-          <a:lnRef idx="1">
-            <a:schemeClr val="accent1"/>
-          </a:lnRef>
-          <a:fillRef idx="0">
-            <a:schemeClr val="accent1"/>
-          </a:fillRef>
-          <a:effectRef idx="0">
-            <a:schemeClr val="accent1"/>
-          </a:effectRef>
-          <a:fontRef idx="minor">
-            <a:schemeClr val="tx1"/>
-          </a:fontRef>
-        </p:style>
-      </p:cxnSp>
-      <p:cxnSp>
-        <p:nvCxnSpPr>
-          <p:cNvPr id="81" name="Straight Connector 80">
-            <a:extLst>
-              <a:ext uri="{FF2B5EF4-FFF2-40B4-BE49-F238E27FC236}">
-                <a16:creationId xmlns="" xmlns:a16="http://schemas.microsoft.com/office/drawing/2014/main" id="{E5458755-91D9-4DEF-B2C8-89F087D1CBA1}"/>
-              </a:ext>
-            </a:extLst>
-          </p:cNvPr>
-          <p:cNvCxnSpPr>
-            <a:cxnSpLocks/>
-          </p:cNvCxnSpPr>
-          <p:nvPr/>
-        </p:nvCxnSpPr>
-        <p:spPr>
-          <a:xfrm>
-            <a:off x="3905250" y="1858433"/>
-            <a:ext cx="0" cy="1318684"/>
-          </a:xfrm>
-          <a:prstGeom prst="line">
-            <a:avLst/>
-          </a:prstGeom>
-        </p:spPr>
-        <p:style>
-          <a:lnRef idx="1">
-            <a:schemeClr val="accent1"/>
-          </a:lnRef>
-          <a:fillRef idx="0">
-            <a:schemeClr val="accent1"/>
-          </a:fillRef>
-          <a:effectRef idx="0">
-            <a:schemeClr val="accent1"/>
-          </a:effectRef>
-          <a:fontRef idx="minor">
-            <a:schemeClr val="tx1"/>
-          </a:fontRef>
-        </p:style>
-      </p:cxnSp>
       <p:pic>
         <p:nvPicPr>
           <p:cNvPr id="1026" name="Picture 2"/>
@@ -10875,7 +10716,7 @@
           <p:nvPr/>
         </p:nvPicPr>
         <p:blipFill>
-          <a:blip r:embed="rId9" cstate="print"/>
+          <a:blip r:embed="rId7" cstate="print"/>
           <a:srcRect/>
           <a:stretch>
             <a:fillRect/>
@@ -10885,105 +10726,6 @@
           <a:xfrm>
             <a:off x="6728192" y="571499"/>
             <a:ext cx="743077" cy="1181101"/>
-          </a:xfrm>
-          <a:prstGeom prst="rect">
-            <a:avLst/>
-          </a:prstGeom>
-          <a:noFill/>
-          <a:ln w="9525">
-            <a:noFill/>
-            <a:miter lim="800000"/>
-            <a:headEnd/>
-            <a:tailEnd/>
-          </a:ln>
-          <a:effectLst/>
-        </p:spPr>
-      </p:pic>
-      <p:pic>
-        <p:nvPicPr>
-          <p:cNvPr id="1028" name="Picture 4"/>
-          <p:cNvPicPr>
-            <a:picLocks noChangeAspect="1" noChangeArrowheads="1"/>
-          </p:cNvPicPr>
-          <p:nvPr/>
-        </p:nvPicPr>
-        <p:blipFill>
-          <a:blip r:embed="rId10" cstate="print"/>
-          <a:srcRect/>
-          <a:stretch>
-            <a:fillRect/>
-          </a:stretch>
-        </p:blipFill>
-        <p:spPr bwMode="auto">
-          <a:xfrm>
-            <a:off x="4259743" y="1917699"/>
-            <a:ext cx="63019" cy="207963"/>
-          </a:xfrm>
-          <a:prstGeom prst="rect">
-            <a:avLst/>
-          </a:prstGeom>
-          <a:noFill/>
-          <a:ln w="9525">
-            <a:noFill/>
-            <a:miter lim="800000"/>
-            <a:headEnd/>
-            <a:tailEnd/>
-          </a:ln>
-          <a:effectLst/>
-        </p:spPr>
-      </p:pic>
-      <p:pic>
-        <p:nvPicPr>
-          <p:cNvPr id="64" name="Picture 4"/>
-          <p:cNvPicPr>
-            <a:picLocks noChangeAspect="1" noChangeArrowheads="1"/>
-          </p:cNvPicPr>
-          <p:nvPr/>
-        </p:nvPicPr>
-        <p:blipFill>
-          <a:blip r:embed="rId10" cstate="print"/>
-          <a:srcRect/>
-          <a:stretch>
-            <a:fillRect/>
-          </a:stretch>
-        </p:blipFill>
-        <p:spPr bwMode="auto">
-          <a:xfrm>
-            <a:off x="4259743" y="2187574"/>
-            <a:ext cx="63019" cy="207963"/>
-          </a:xfrm>
-          <a:prstGeom prst="rect">
-            <a:avLst/>
-          </a:prstGeom>
-          <a:noFill/>
-          <a:ln w="9525">
-            <a:noFill/>
-            <a:miter lim="800000"/>
-            <a:headEnd/>
-            <a:tailEnd/>
-          </a:ln>
-          <a:effectLst/>
-        </p:spPr>
-      </p:pic>
-      <p:pic>
-        <p:nvPicPr>
-          <p:cNvPr id="66" name="Picture 4"/>
-          <p:cNvPicPr>
-            <a:picLocks noChangeAspect="1" noChangeArrowheads="1"/>
-          </p:cNvPicPr>
-          <p:nvPr/>
-        </p:nvPicPr>
-        <p:blipFill>
-          <a:blip r:embed="rId10" cstate="print"/>
-          <a:srcRect/>
-          <a:stretch>
-            <a:fillRect/>
-          </a:stretch>
-        </p:blipFill>
-        <p:spPr bwMode="auto">
-          <a:xfrm>
-            <a:off x="4262918" y="2454274"/>
-            <a:ext cx="63019" cy="207963"/>
           </a:xfrm>
           <a:prstGeom prst="rect">
             <a:avLst/>
@@ -11277,7 +11019,7 @@
           <p:nvPr/>
         </p:nvPicPr>
         <p:blipFill>
-          <a:blip r:embed="rId10" cstate="print"/>
+          <a:blip r:embed="rId8" cstate="print"/>
           <a:srcRect/>
           <a:stretch>
             <a:fillRect/>
@@ -11310,7 +11052,7 @@
           <p:nvPr/>
         </p:nvPicPr>
         <p:blipFill>
-          <a:blip r:embed="rId10" cstate="print"/>
+          <a:blip r:embed="rId8" cstate="print"/>
           <a:srcRect/>
           <a:stretch>
             <a:fillRect/>
@@ -11343,7 +11085,7 @@
           <p:nvPr/>
         </p:nvPicPr>
         <p:blipFill>
-          <a:blip r:embed="rId10" cstate="print"/>
+          <a:blip r:embed="rId8" cstate="print"/>
           <a:srcRect/>
           <a:stretch>
             <a:fillRect/>
@@ -11372,7 +11114,7 @@
           <p:cNvPr id="99" name="TextBox 98">
             <a:extLst>
               <a:ext uri="{FF2B5EF4-FFF2-40B4-BE49-F238E27FC236}">
-                <a16:creationId xmlns="" xmlns:a16="http://schemas.microsoft.com/office/drawing/2014/main" id="{032073D1-5C86-096E-E34F-E839D76407AB}"/>
+                <a16:creationId xmlns:a16="http://schemas.microsoft.com/office/drawing/2014/main" id="{032073D1-5C86-096E-E34F-E839D76407AB}"/>
               </a:ext>
             </a:extLst>
           </p:cNvPr>
@@ -11408,7 +11150,7 @@
           <p:cNvPr id="100" name="TextBox 99">
             <a:extLst>
               <a:ext uri="{FF2B5EF4-FFF2-40B4-BE49-F238E27FC236}">
-                <a16:creationId xmlns="" xmlns:a16="http://schemas.microsoft.com/office/drawing/2014/main" id="{032073D1-5C86-096E-E34F-E839D76407AB}"/>
+                <a16:creationId xmlns:a16="http://schemas.microsoft.com/office/drawing/2014/main" id="{032073D1-5C86-096E-E34F-E839D76407AB}"/>
               </a:ext>
             </a:extLst>
           </p:cNvPr>
@@ -11417,8 +11159,8 @@
         </p:nvSpPr>
         <p:spPr>
           <a:xfrm>
-            <a:off x="4045971" y="1676821"/>
-            <a:ext cx="370454" cy="169277"/>
+            <a:off x="4485904" y="4877488"/>
+            <a:ext cx="567465" cy="169277"/>
           </a:xfrm>
           <a:prstGeom prst="rect">
             <a:avLst/>
@@ -11432,8 +11174,12 @@
           <a:lstStyle/>
           <a:p>
             <a:r>
-              <a:rPr lang="da-DK" sz="500" dirty="0" smtClean="0"/>
-              <a:t>270R</a:t>
+              <a:rPr lang="da-DK" sz="500" dirty="0"/>
+              <a:t>IR </a:t>
+            </a:r>
+            <a:r>
+              <a:rPr lang="da-DK" sz="500" dirty="0" err="1"/>
+              <a:t>LEDs</a:t>
             </a:r>
             <a:endParaRPr lang="en-US" sz="500" dirty="0"/>
           </a:p>
@@ -11444,7 +11190,7 @@
           <p:cNvPr id="101" name="TextBox 100">
             <a:extLst>
               <a:ext uri="{FF2B5EF4-FFF2-40B4-BE49-F238E27FC236}">
-                <a16:creationId xmlns="" xmlns:a16="http://schemas.microsoft.com/office/drawing/2014/main" id="{032073D1-5C86-096E-E34F-E839D76407AB}"/>
+                <a16:creationId xmlns:a16="http://schemas.microsoft.com/office/drawing/2014/main" id="{032073D1-5C86-096E-E34F-E839D76407AB}"/>
               </a:ext>
             </a:extLst>
           </p:cNvPr>
@@ -11468,7 +11214,7 @@
           <a:lstStyle/>
           <a:p>
             <a:r>
-              <a:rPr lang="da-DK" sz="500" dirty="0" smtClean="0"/>
+              <a:rPr lang="da-DK" sz="500" dirty="0"/>
               <a:t>4K7</a:t>
             </a:r>
             <a:endParaRPr lang="en-US" sz="500" dirty="0"/>
@@ -12718,7 +12464,7 @@
           <p:nvPr/>
         </p:nvPicPr>
         <p:blipFill>
-          <a:blip r:embed="rId11" cstate="print"/>
+          <a:blip r:embed="rId9" cstate="print"/>
           <a:srcRect/>
           <a:stretch>
             <a:fillRect/>
@@ -12751,7 +12497,7 @@
           <p:nvPr/>
         </p:nvPicPr>
         <p:blipFill>
-          <a:blip r:embed="rId6" cstate="print"/>
+          <a:blip r:embed="rId5" cstate="print"/>
           <a:srcRect/>
           <a:stretch>
             <a:fillRect/>
@@ -12869,7 +12615,7 @@
           <p:cNvPr id="185" name="TextBox 184">
             <a:extLst>
               <a:ext uri="{FF2B5EF4-FFF2-40B4-BE49-F238E27FC236}">
-                <a16:creationId xmlns="" xmlns:a16="http://schemas.microsoft.com/office/drawing/2014/main" id="{032073D1-5C86-096E-E34F-E839D76407AB}"/>
+                <a16:creationId xmlns:a16="http://schemas.microsoft.com/office/drawing/2014/main" id="{032073D1-5C86-096E-E34F-E839D76407AB}"/>
               </a:ext>
             </a:extLst>
           </p:cNvPr>
@@ -12893,7 +12639,7 @@
           <a:lstStyle/>
           <a:p>
             <a:r>
-              <a:rPr lang="da-DK" sz="500" dirty="0" smtClean="0"/>
+              <a:rPr lang="da-DK" sz="500" dirty="0"/>
               <a:t>+5V</a:t>
             </a:r>
             <a:endParaRPr lang="en-US" sz="500" dirty="0"/>
@@ -13710,39 +13456,6 @@
           </a:fontRef>
         </p:style>
       </p:cxnSp>
-      <p:pic>
-        <p:nvPicPr>
-          <p:cNvPr id="234" name="Picture 4"/>
-          <p:cNvPicPr>
-            <a:picLocks noChangeAspect="1" noChangeArrowheads="1"/>
-          </p:cNvPicPr>
-          <p:nvPr/>
-        </p:nvPicPr>
-        <p:blipFill>
-          <a:blip r:embed="rId10" cstate="print"/>
-          <a:srcRect/>
-          <a:stretch>
-            <a:fillRect/>
-          </a:stretch>
-        </p:blipFill>
-        <p:spPr bwMode="auto">
-          <a:xfrm>
-            <a:off x="4262918" y="1647824"/>
-            <a:ext cx="63019" cy="207963"/>
-          </a:xfrm>
-          <a:prstGeom prst="rect">
-            <a:avLst/>
-          </a:prstGeom>
-          <a:noFill/>
-          <a:ln w="9525">
-            <a:noFill/>
-            <a:miter lim="800000"/>
-            <a:headEnd/>
-            <a:tailEnd/>
-          </a:ln>
-          <a:effectLst/>
-        </p:spPr>
-      </p:pic>
       <p:cxnSp>
         <p:nvCxnSpPr>
           <p:cNvPr id="136" name="Straight Connector 135"/>
@@ -13778,7 +13491,7 @@
           <p:cNvPr id="138" name="TextBox 137">
             <a:extLst>
               <a:ext uri="{FF2B5EF4-FFF2-40B4-BE49-F238E27FC236}">
-                <a16:creationId xmlns="" xmlns:a16="http://schemas.microsoft.com/office/drawing/2014/main" id="{032073D1-5C86-096E-E34F-E839D76407AB}"/>
+                <a16:creationId xmlns:a16="http://schemas.microsoft.com/office/drawing/2014/main" id="{032073D1-5C86-096E-E34F-E839D76407AB}"/>
               </a:ext>
             </a:extLst>
           </p:cNvPr>
@@ -13809,10 +13522,1068 @@
           </a:p>
         </p:txBody>
       </p:sp>
+      <p:pic>
+        <p:nvPicPr>
+          <p:cNvPr id="2" name="Picture 12">
+            <a:extLst>
+              <a:ext uri="{FF2B5EF4-FFF2-40B4-BE49-F238E27FC236}">
+                <a16:creationId xmlns:a16="http://schemas.microsoft.com/office/drawing/2014/main" id="{5079BA80-EC62-5F39-BADE-1487F2631F71}"/>
+              </a:ext>
+            </a:extLst>
+          </p:cNvPr>
+          <p:cNvPicPr>
+            <a:picLocks noChangeAspect="1" noChangeArrowheads="1"/>
+          </p:cNvPicPr>
+          <p:nvPr/>
+        </p:nvPicPr>
+        <p:blipFill>
+          <a:blip r:embed="rId5" cstate="print"/>
+          <a:srcRect/>
+          <a:stretch>
+            <a:fillRect/>
+          </a:stretch>
+        </p:blipFill>
+        <p:spPr bwMode="auto">
+          <a:xfrm>
+            <a:off x="7028258" y="1862114"/>
+            <a:ext cx="138882" cy="134253"/>
+          </a:xfrm>
+          <a:prstGeom prst="rect">
+            <a:avLst/>
+          </a:prstGeom>
+          <a:noFill/>
+          <a:ln w="9525">
+            <a:noFill/>
+            <a:miter lim="800000"/>
+            <a:headEnd/>
+            <a:tailEnd/>
+          </a:ln>
+        </p:spPr>
+      </p:pic>
+      <p:pic>
+        <p:nvPicPr>
+          <p:cNvPr id="13" name="Picture 12">
+            <a:extLst>
+              <a:ext uri="{FF2B5EF4-FFF2-40B4-BE49-F238E27FC236}">
+                <a16:creationId xmlns:a16="http://schemas.microsoft.com/office/drawing/2014/main" id="{926E0306-8E9A-0FCC-C362-6A428D0D4159}"/>
+              </a:ext>
+            </a:extLst>
+          </p:cNvPr>
+          <p:cNvPicPr>
+            <a:picLocks noChangeAspect="1"/>
+          </p:cNvPicPr>
+          <p:nvPr/>
+        </p:nvPicPr>
+        <p:blipFill>
+          <a:blip r:embed="rId10"/>
+          <a:stretch>
+            <a:fillRect/>
+          </a:stretch>
+        </p:blipFill>
+        <p:spPr>
+          <a:xfrm>
+            <a:off x="4291252" y="4429124"/>
+            <a:ext cx="213682" cy="489789"/>
+          </a:xfrm>
+          <a:prstGeom prst="rect">
+            <a:avLst/>
+          </a:prstGeom>
+        </p:spPr>
+      </p:pic>
+      <p:pic>
+        <p:nvPicPr>
+          <p:cNvPr id="14" name="Picture 13">
+            <a:extLst>
+              <a:ext uri="{FF2B5EF4-FFF2-40B4-BE49-F238E27FC236}">
+                <a16:creationId xmlns:a16="http://schemas.microsoft.com/office/drawing/2014/main" id="{BA09183D-BC67-B72F-4D48-2988EBB4FBF8}"/>
+              </a:ext>
+            </a:extLst>
+          </p:cNvPr>
+          <p:cNvPicPr>
+            <a:picLocks noChangeAspect="1"/>
+          </p:cNvPicPr>
+          <p:nvPr/>
+        </p:nvPicPr>
+        <p:blipFill>
+          <a:blip r:embed="rId10"/>
+          <a:stretch>
+            <a:fillRect/>
+          </a:stretch>
+        </p:blipFill>
+        <p:spPr>
+          <a:xfrm>
+            <a:off x="4488102" y="4429124"/>
+            <a:ext cx="213682" cy="489789"/>
+          </a:xfrm>
+          <a:prstGeom prst="rect">
+            <a:avLst/>
+          </a:prstGeom>
+        </p:spPr>
+      </p:pic>
+      <p:pic>
+        <p:nvPicPr>
+          <p:cNvPr id="15" name="Picture 14">
+            <a:extLst>
+              <a:ext uri="{FF2B5EF4-FFF2-40B4-BE49-F238E27FC236}">
+                <a16:creationId xmlns:a16="http://schemas.microsoft.com/office/drawing/2014/main" id="{0035E1AE-297D-0ED3-D171-006709B5E627}"/>
+              </a:ext>
+            </a:extLst>
+          </p:cNvPr>
+          <p:cNvPicPr>
+            <a:picLocks noChangeAspect="1"/>
+          </p:cNvPicPr>
+          <p:nvPr/>
+        </p:nvPicPr>
+        <p:blipFill>
+          <a:blip r:embed="rId10"/>
+          <a:stretch>
+            <a:fillRect/>
+          </a:stretch>
+        </p:blipFill>
+        <p:spPr>
+          <a:xfrm>
+            <a:off x="4684952" y="4429124"/>
+            <a:ext cx="213682" cy="489789"/>
+          </a:xfrm>
+          <a:prstGeom prst="rect">
+            <a:avLst/>
+          </a:prstGeom>
+        </p:spPr>
+      </p:pic>
+      <p:pic>
+        <p:nvPicPr>
+          <p:cNvPr id="16" name="Picture 15">
+            <a:extLst>
+              <a:ext uri="{FF2B5EF4-FFF2-40B4-BE49-F238E27FC236}">
+                <a16:creationId xmlns:a16="http://schemas.microsoft.com/office/drawing/2014/main" id="{53AF7CB3-787C-ACE4-124D-686114819F45}"/>
+              </a:ext>
+            </a:extLst>
+          </p:cNvPr>
+          <p:cNvPicPr>
+            <a:picLocks noChangeAspect="1"/>
+          </p:cNvPicPr>
+          <p:nvPr/>
+        </p:nvPicPr>
+        <p:blipFill>
+          <a:blip r:embed="rId10"/>
+          <a:stretch>
+            <a:fillRect/>
+          </a:stretch>
+        </p:blipFill>
+        <p:spPr>
+          <a:xfrm>
+            <a:off x="4881802" y="4429124"/>
+            <a:ext cx="213682" cy="489789"/>
+          </a:xfrm>
+          <a:prstGeom prst="rect">
+            <a:avLst/>
+          </a:prstGeom>
+        </p:spPr>
+      </p:pic>
+      <p:pic>
+        <p:nvPicPr>
+          <p:cNvPr id="17" name="Picture 16">
+            <a:extLst>
+              <a:ext uri="{FF2B5EF4-FFF2-40B4-BE49-F238E27FC236}">
+                <a16:creationId xmlns:a16="http://schemas.microsoft.com/office/drawing/2014/main" id="{FE3DF6AF-B29D-A8CD-ECCC-6DDAD37366C8}"/>
+              </a:ext>
+            </a:extLst>
+          </p:cNvPr>
+          <p:cNvPicPr>
+            <a:picLocks noChangeAspect="1"/>
+          </p:cNvPicPr>
+          <p:nvPr/>
+        </p:nvPicPr>
+        <p:blipFill>
+          <a:blip r:embed="rId6" cstate="print"/>
+          <a:stretch>
+            <a:fillRect/>
+          </a:stretch>
+        </p:blipFill>
+        <p:spPr>
+          <a:xfrm>
+            <a:off x="7471930" y="4164202"/>
+            <a:ext cx="196079" cy="208411"/>
+          </a:xfrm>
+          <a:prstGeom prst="rect">
+            <a:avLst/>
+          </a:prstGeom>
+        </p:spPr>
+      </p:pic>
+      <p:pic>
+        <p:nvPicPr>
+          <p:cNvPr id="19" name="Picture 18">
+            <a:extLst>
+              <a:ext uri="{FF2B5EF4-FFF2-40B4-BE49-F238E27FC236}">
+                <a16:creationId xmlns:a16="http://schemas.microsoft.com/office/drawing/2014/main" id="{8469CD3D-633E-DDBC-E304-5FC1C8D05407}"/>
+              </a:ext>
+            </a:extLst>
+          </p:cNvPr>
+          <p:cNvPicPr>
+            <a:picLocks noChangeAspect="1"/>
+          </p:cNvPicPr>
+          <p:nvPr/>
+        </p:nvPicPr>
+        <p:blipFill>
+          <a:blip r:embed="rId6" cstate="print"/>
+          <a:stretch>
+            <a:fillRect/>
+          </a:stretch>
+        </p:blipFill>
+        <p:spPr>
+          <a:xfrm>
+            <a:off x="7471930" y="4316602"/>
+            <a:ext cx="196079" cy="208411"/>
+          </a:xfrm>
+          <a:prstGeom prst="rect">
+            <a:avLst/>
+          </a:prstGeom>
+        </p:spPr>
+      </p:pic>
+      <p:pic>
+        <p:nvPicPr>
+          <p:cNvPr id="21" name="Picture 20">
+            <a:extLst>
+              <a:ext uri="{FF2B5EF4-FFF2-40B4-BE49-F238E27FC236}">
+                <a16:creationId xmlns:a16="http://schemas.microsoft.com/office/drawing/2014/main" id="{8FC55AEF-EEE4-359E-2477-E549D563E257}"/>
+              </a:ext>
+            </a:extLst>
+          </p:cNvPr>
+          <p:cNvPicPr>
+            <a:picLocks noChangeAspect="1"/>
+          </p:cNvPicPr>
+          <p:nvPr/>
+        </p:nvPicPr>
+        <p:blipFill>
+          <a:blip r:embed="rId6" cstate="print"/>
+          <a:stretch>
+            <a:fillRect/>
+          </a:stretch>
+        </p:blipFill>
+        <p:spPr>
+          <a:xfrm>
+            <a:off x="7471930" y="4469002"/>
+            <a:ext cx="196079" cy="208411"/>
+          </a:xfrm>
+          <a:prstGeom prst="rect">
+            <a:avLst/>
+          </a:prstGeom>
+        </p:spPr>
+      </p:pic>
+      <p:pic>
+        <p:nvPicPr>
+          <p:cNvPr id="30" name="Picture 29">
+            <a:extLst>
+              <a:ext uri="{FF2B5EF4-FFF2-40B4-BE49-F238E27FC236}">
+                <a16:creationId xmlns:a16="http://schemas.microsoft.com/office/drawing/2014/main" id="{983780EC-44D2-5136-E21D-CF6902658D96}"/>
+              </a:ext>
+            </a:extLst>
+          </p:cNvPr>
+          <p:cNvPicPr>
+            <a:picLocks noChangeAspect="1"/>
+          </p:cNvPicPr>
+          <p:nvPr/>
+        </p:nvPicPr>
+        <p:blipFill>
+          <a:blip r:embed="rId11"/>
+          <a:stretch>
+            <a:fillRect/>
+          </a:stretch>
+        </p:blipFill>
+        <p:spPr>
+          <a:xfrm>
+            <a:off x="7427913" y="3587541"/>
+            <a:ext cx="298586" cy="169277"/>
+          </a:xfrm>
+          <a:prstGeom prst="rect">
+            <a:avLst/>
+          </a:prstGeom>
+        </p:spPr>
+      </p:pic>
+      <p:pic>
+        <p:nvPicPr>
+          <p:cNvPr id="227" name="Picture 226">
+            <a:extLst>
+              <a:ext uri="{FF2B5EF4-FFF2-40B4-BE49-F238E27FC236}">
+                <a16:creationId xmlns:a16="http://schemas.microsoft.com/office/drawing/2014/main" id="{3EAA370D-C693-AA43-1043-5DCEAA889F37}"/>
+              </a:ext>
+            </a:extLst>
+          </p:cNvPr>
+          <p:cNvPicPr>
+            <a:picLocks noChangeAspect="1"/>
+          </p:cNvPicPr>
+          <p:nvPr/>
+        </p:nvPicPr>
+        <p:blipFill>
+          <a:blip r:embed="rId11"/>
+          <a:stretch>
+            <a:fillRect/>
+          </a:stretch>
+        </p:blipFill>
+        <p:spPr>
+          <a:xfrm>
+            <a:off x="7427913" y="3785616"/>
+            <a:ext cx="298586" cy="169277"/>
+          </a:xfrm>
+          <a:prstGeom prst="rect">
+            <a:avLst/>
+          </a:prstGeom>
+        </p:spPr>
+      </p:pic>
+      <p:sp>
+        <p:nvSpPr>
+          <p:cNvPr id="229" name="TextBox 228">
+            <a:extLst>
+              <a:ext uri="{FF2B5EF4-FFF2-40B4-BE49-F238E27FC236}">
+                <a16:creationId xmlns:a16="http://schemas.microsoft.com/office/drawing/2014/main" id="{445D1F8C-9934-EF31-ACA7-B10896A3196C}"/>
+              </a:ext>
+            </a:extLst>
+          </p:cNvPr>
+          <p:cNvSpPr txBox="1"/>
+          <p:nvPr/>
+        </p:nvSpPr>
+        <p:spPr>
+          <a:xfrm>
+            <a:off x="7658100" y="3700220"/>
+            <a:ext cx="572272" cy="169277"/>
+          </a:xfrm>
+          <a:prstGeom prst="rect">
+            <a:avLst/>
+          </a:prstGeom>
+          <a:noFill/>
+        </p:spPr>
+        <p:txBody>
+          <a:bodyPr wrap="square" rtlCol="0">
+            <a:spAutoFit/>
+          </a:bodyPr>
+          <a:lstStyle/>
+          <a:p>
+            <a:r>
+              <a:rPr lang="da-DK" sz="500" dirty="0"/>
+              <a:t>end-stop</a:t>
+            </a:r>
+            <a:endParaRPr lang="en-US" sz="500" dirty="0"/>
+          </a:p>
+        </p:txBody>
+      </p:sp>
+      <p:cxnSp>
+        <p:nvCxnSpPr>
+          <p:cNvPr id="231" name="Straight Connector 230">
+            <a:extLst>
+              <a:ext uri="{FF2B5EF4-FFF2-40B4-BE49-F238E27FC236}">
+                <a16:creationId xmlns:a16="http://schemas.microsoft.com/office/drawing/2014/main" id="{D37D587B-DF6A-9F24-86AC-157D9881356B}"/>
+              </a:ext>
+            </a:extLst>
+          </p:cNvPr>
+          <p:cNvCxnSpPr>
+            <a:cxnSpLocks/>
+          </p:cNvCxnSpPr>
+          <p:nvPr/>
+        </p:nvCxnSpPr>
+        <p:spPr>
+          <a:xfrm flipH="1" flipV="1">
+            <a:off x="6415089" y="2914650"/>
+            <a:ext cx="654027" cy="614"/>
+          </a:xfrm>
+          <a:prstGeom prst="line">
+            <a:avLst/>
+          </a:prstGeom>
+        </p:spPr>
+        <p:style>
+          <a:lnRef idx="1">
+            <a:schemeClr val="accent1"/>
+          </a:lnRef>
+          <a:fillRef idx="0">
+            <a:schemeClr val="accent1"/>
+          </a:fillRef>
+          <a:effectRef idx="0">
+            <a:schemeClr val="accent1"/>
+          </a:effectRef>
+          <a:fontRef idx="minor">
+            <a:schemeClr val="tx1"/>
+          </a:fontRef>
+        </p:style>
+      </p:cxnSp>
+      <p:cxnSp>
+        <p:nvCxnSpPr>
+          <p:cNvPr id="235" name="Straight Connector 234">
+            <a:extLst>
+              <a:ext uri="{FF2B5EF4-FFF2-40B4-BE49-F238E27FC236}">
+                <a16:creationId xmlns:a16="http://schemas.microsoft.com/office/drawing/2014/main" id="{005D11A0-CD58-0FB9-8B62-DDACDE37DB5C}"/>
+              </a:ext>
+            </a:extLst>
+          </p:cNvPr>
+          <p:cNvCxnSpPr>
+            <a:cxnSpLocks/>
+          </p:cNvCxnSpPr>
+          <p:nvPr/>
+        </p:nvCxnSpPr>
+        <p:spPr>
+          <a:xfrm flipH="1">
+            <a:off x="6415089" y="3327400"/>
+            <a:ext cx="576261" cy="0"/>
+          </a:xfrm>
+          <a:prstGeom prst="line">
+            <a:avLst/>
+          </a:prstGeom>
+        </p:spPr>
+        <p:style>
+          <a:lnRef idx="1">
+            <a:schemeClr val="accent1"/>
+          </a:lnRef>
+          <a:fillRef idx="0">
+            <a:schemeClr val="accent1"/>
+          </a:fillRef>
+          <a:effectRef idx="0">
+            <a:schemeClr val="accent1"/>
+          </a:effectRef>
+          <a:fontRef idx="minor">
+            <a:schemeClr val="tx1"/>
+          </a:fontRef>
+        </p:style>
+      </p:cxnSp>
+      <p:cxnSp>
+        <p:nvCxnSpPr>
+          <p:cNvPr id="236" name="Straight Connector 235">
+            <a:extLst>
+              <a:ext uri="{FF2B5EF4-FFF2-40B4-BE49-F238E27FC236}">
+                <a16:creationId xmlns:a16="http://schemas.microsoft.com/office/drawing/2014/main" id="{C5A1D8DF-B3E0-798F-8530-C5D7E698600C}"/>
+              </a:ext>
+            </a:extLst>
+          </p:cNvPr>
+          <p:cNvCxnSpPr>
+            <a:cxnSpLocks/>
+          </p:cNvCxnSpPr>
+          <p:nvPr/>
+        </p:nvCxnSpPr>
+        <p:spPr>
+          <a:xfrm flipH="1">
+            <a:off x="6418264" y="3393111"/>
+            <a:ext cx="498452" cy="964"/>
+          </a:xfrm>
+          <a:prstGeom prst="line">
+            <a:avLst/>
+          </a:prstGeom>
+        </p:spPr>
+        <p:style>
+          <a:lnRef idx="1">
+            <a:schemeClr val="accent1"/>
+          </a:lnRef>
+          <a:fillRef idx="0">
+            <a:schemeClr val="accent1"/>
+          </a:fillRef>
+          <a:effectRef idx="0">
+            <a:schemeClr val="accent1"/>
+          </a:effectRef>
+          <a:fontRef idx="minor">
+            <a:schemeClr val="tx1"/>
+          </a:fontRef>
+        </p:style>
+      </p:cxnSp>
+      <p:cxnSp>
+        <p:nvCxnSpPr>
+          <p:cNvPr id="237" name="Straight Connector 236">
+            <a:extLst>
+              <a:ext uri="{FF2B5EF4-FFF2-40B4-BE49-F238E27FC236}">
+                <a16:creationId xmlns:a16="http://schemas.microsoft.com/office/drawing/2014/main" id="{F2FAB770-EF47-B0D6-7FC3-AF2F6D4C6807}"/>
+              </a:ext>
+            </a:extLst>
+          </p:cNvPr>
+          <p:cNvCxnSpPr>
+            <a:cxnSpLocks/>
+          </p:cNvCxnSpPr>
+          <p:nvPr/>
+        </p:nvCxnSpPr>
+        <p:spPr>
+          <a:xfrm flipH="1">
+            <a:off x="6424614" y="3673475"/>
+            <a:ext cx="301111" cy="0"/>
+          </a:xfrm>
+          <a:prstGeom prst="line">
+            <a:avLst/>
+          </a:prstGeom>
+        </p:spPr>
+        <p:style>
+          <a:lnRef idx="1">
+            <a:schemeClr val="accent1"/>
+          </a:lnRef>
+          <a:fillRef idx="0">
+            <a:schemeClr val="accent1"/>
+          </a:fillRef>
+          <a:effectRef idx="0">
+            <a:schemeClr val="accent1"/>
+          </a:effectRef>
+          <a:fontRef idx="minor">
+            <a:schemeClr val="tx1"/>
+          </a:fontRef>
+        </p:style>
+      </p:cxnSp>
+      <p:cxnSp>
+        <p:nvCxnSpPr>
+          <p:cNvPr id="238" name="Straight Connector 237">
+            <a:extLst>
+              <a:ext uri="{FF2B5EF4-FFF2-40B4-BE49-F238E27FC236}">
+                <a16:creationId xmlns:a16="http://schemas.microsoft.com/office/drawing/2014/main" id="{68BD5F20-F01C-5483-0883-45190AA4A302}"/>
+              </a:ext>
+            </a:extLst>
+          </p:cNvPr>
+          <p:cNvCxnSpPr>
+            <a:cxnSpLocks/>
+          </p:cNvCxnSpPr>
+          <p:nvPr/>
+        </p:nvCxnSpPr>
+        <p:spPr>
+          <a:xfrm flipH="1" flipV="1">
+            <a:off x="6411914" y="3530600"/>
+            <a:ext cx="428610" cy="271"/>
+          </a:xfrm>
+          <a:prstGeom prst="line">
+            <a:avLst/>
+          </a:prstGeom>
+        </p:spPr>
+        <p:style>
+          <a:lnRef idx="1">
+            <a:schemeClr val="accent1"/>
+          </a:lnRef>
+          <a:fillRef idx="0">
+            <a:schemeClr val="accent1"/>
+          </a:fillRef>
+          <a:effectRef idx="0">
+            <a:schemeClr val="accent1"/>
+          </a:effectRef>
+          <a:fontRef idx="minor">
+            <a:schemeClr val="tx1"/>
+          </a:fontRef>
+        </p:style>
+      </p:cxnSp>
+      <p:cxnSp>
+        <p:nvCxnSpPr>
+          <p:cNvPr id="239" name="Straight Connector 238">
+            <a:extLst>
+              <a:ext uri="{FF2B5EF4-FFF2-40B4-BE49-F238E27FC236}">
+                <a16:creationId xmlns:a16="http://schemas.microsoft.com/office/drawing/2014/main" id="{8C171B3C-7A62-E17F-30A3-262629949A93}"/>
+              </a:ext>
+            </a:extLst>
+          </p:cNvPr>
+          <p:cNvCxnSpPr>
+            <a:cxnSpLocks/>
+          </p:cNvCxnSpPr>
+          <p:nvPr/>
+        </p:nvCxnSpPr>
+        <p:spPr>
+          <a:xfrm flipH="1">
+            <a:off x="6415089" y="3603625"/>
+            <a:ext cx="361949" cy="0"/>
+          </a:xfrm>
+          <a:prstGeom prst="line">
+            <a:avLst/>
+          </a:prstGeom>
+        </p:spPr>
+        <p:style>
+          <a:lnRef idx="1">
+            <a:schemeClr val="accent1"/>
+          </a:lnRef>
+          <a:fillRef idx="0">
+            <a:schemeClr val="accent1"/>
+          </a:fillRef>
+          <a:effectRef idx="0">
+            <a:schemeClr val="accent1"/>
+          </a:effectRef>
+          <a:fontRef idx="minor">
+            <a:schemeClr val="tx1"/>
+          </a:fontRef>
+        </p:style>
+      </p:cxnSp>
+      <p:cxnSp>
+        <p:nvCxnSpPr>
+          <p:cNvPr id="241" name="Straight Connector 240">
+            <a:extLst>
+              <a:ext uri="{FF2B5EF4-FFF2-40B4-BE49-F238E27FC236}">
+                <a16:creationId xmlns:a16="http://schemas.microsoft.com/office/drawing/2014/main" id="{32616580-FC2A-63A3-317B-6500287F6247}"/>
+              </a:ext>
+            </a:extLst>
+          </p:cNvPr>
+          <p:cNvCxnSpPr>
+            <a:cxnSpLocks/>
+          </p:cNvCxnSpPr>
+          <p:nvPr/>
+        </p:nvCxnSpPr>
+        <p:spPr>
+          <a:xfrm flipV="1">
+            <a:off x="6725725" y="3672179"/>
+            <a:ext cx="0" cy="915696"/>
+          </a:xfrm>
+          <a:prstGeom prst="line">
+            <a:avLst/>
+          </a:prstGeom>
+        </p:spPr>
+        <p:style>
+          <a:lnRef idx="1">
+            <a:schemeClr val="accent1"/>
+          </a:lnRef>
+          <a:fillRef idx="0">
+            <a:schemeClr val="accent1"/>
+          </a:fillRef>
+          <a:effectRef idx="0">
+            <a:schemeClr val="accent1"/>
+          </a:effectRef>
+          <a:fontRef idx="minor">
+            <a:schemeClr val="tx1"/>
+          </a:fontRef>
+        </p:style>
+      </p:cxnSp>
+      <p:cxnSp>
+        <p:nvCxnSpPr>
+          <p:cNvPr id="243" name="Straight Connector 242">
+            <a:extLst>
+              <a:ext uri="{FF2B5EF4-FFF2-40B4-BE49-F238E27FC236}">
+                <a16:creationId xmlns:a16="http://schemas.microsoft.com/office/drawing/2014/main" id="{B47EA40F-9794-AFEA-4853-278F5596203B}"/>
+              </a:ext>
+            </a:extLst>
+          </p:cNvPr>
+          <p:cNvCxnSpPr>
+            <a:cxnSpLocks/>
+          </p:cNvCxnSpPr>
+          <p:nvPr/>
+        </p:nvCxnSpPr>
+        <p:spPr>
+          <a:xfrm flipH="1">
+            <a:off x="6725725" y="4587875"/>
+            <a:ext cx="771429" cy="0"/>
+          </a:xfrm>
+          <a:prstGeom prst="line">
+            <a:avLst/>
+          </a:prstGeom>
+        </p:spPr>
+        <p:style>
+          <a:lnRef idx="1">
+            <a:schemeClr val="accent1"/>
+          </a:lnRef>
+          <a:fillRef idx="0">
+            <a:schemeClr val="accent1"/>
+          </a:fillRef>
+          <a:effectRef idx="0">
+            <a:schemeClr val="accent1"/>
+          </a:effectRef>
+          <a:fontRef idx="minor">
+            <a:schemeClr val="tx1"/>
+          </a:fontRef>
+        </p:style>
+      </p:cxnSp>
+      <p:cxnSp>
+        <p:nvCxnSpPr>
+          <p:cNvPr id="247" name="Straight Connector 246">
+            <a:extLst>
+              <a:ext uri="{FF2B5EF4-FFF2-40B4-BE49-F238E27FC236}">
+                <a16:creationId xmlns:a16="http://schemas.microsoft.com/office/drawing/2014/main" id="{F68B6AAE-C39F-9C98-669F-583419C6DEBD}"/>
+              </a:ext>
+            </a:extLst>
+          </p:cNvPr>
+          <p:cNvCxnSpPr>
+            <a:cxnSpLocks/>
+          </p:cNvCxnSpPr>
+          <p:nvPr/>
+        </p:nvCxnSpPr>
+        <p:spPr>
+          <a:xfrm flipV="1">
+            <a:off x="6777038" y="3597566"/>
+            <a:ext cx="0" cy="831558"/>
+          </a:xfrm>
+          <a:prstGeom prst="line">
+            <a:avLst/>
+          </a:prstGeom>
+        </p:spPr>
+        <p:style>
+          <a:lnRef idx="1">
+            <a:schemeClr val="accent1"/>
+          </a:lnRef>
+          <a:fillRef idx="0">
+            <a:schemeClr val="accent1"/>
+          </a:fillRef>
+          <a:effectRef idx="0">
+            <a:schemeClr val="accent1"/>
+          </a:effectRef>
+          <a:fontRef idx="minor">
+            <a:schemeClr val="tx1"/>
+          </a:fontRef>
+        </p:style>
+      </p:cxnSp>
+      <p:cxnSp>
+        <p:nvCxnSpPr>
+          <p:cNvPr id="251" name="Straight Connector 250">
+            <a:extLst>
+              <a:ext uri="{FF2B5EF4-FFF2-40B4-BE49-F238E27FC236}">
+                <a16:creationId xmlns:a16="http://schemas.microsoft.com/office/drawing/2014/main" id="{827BE5A2-F5E2-92EB-B9E2-B2D0052420BD}"/>
+              </a:ext>
+            </a:extLst>
+          </p:cNvPr>
+          <p:cNvCxnSpPr>
+            <a:cxnSpLocks/>
+          </p:cNvCxnSpPr>
+          <p:nvPr/>
+        </p:nvCxnSpPr>
+        <p:spPr>
+          <a:xfrm flipV="1">
+            <a:off x="6840524" y="3530871"/>
+            <a:ext cx="0" cy="748665"/>
+          </a:xfrm>
+          <a:prstGeom prst="line">
+            <a:avLst/>
+          </a:prstGeom>
+        </p:spPr>
+        <p:style>
+          <a:lnRef idx="1">
+            <a:schemeClr val="accent1"/>
+          </a:lnRef>
+          <a:fillRef idx="0">
+            <a:schemeClr val="accent1"/>
+          </a:fillRef>
+          <a:effectRef idx="0">
+            <a:schemeClr val="accent1"/>
+          </a:effectRef>
+          <a:fontRef idx="minor">
+            <a:schemeClr val="tx1"/>
+          </a:fontRef>
+        </p:style>
+      </p:cxnSp>
+      <p:cxnSp>
+        <p:nvCxnSpPr>
+          <p:cNvPr id="254" name="Straight Connector 253">
+            <a:extLst>
+              <a:ext uri="{FF2B5EF4-FFF2-40B4-BE49-F238E27FC236}">
+                <a16:creationId xmlns:a16="http://schemas.microsoft.com/office/drawing/2014/main" id="{FA3B054A-EC21-3392-0305-0A76CB7B9D8A}"/>
+              </a:ext>
+            </a:extLst>
+          </p:cNvPr>
+          <p:cNvCxnSpPr>
+            <a:cxnSpLocks/>
+          </p:cNvCxnSpPr>
+          <p:nvPr/>
+        </p:nvCxnSpPr>
+        <p:spPr>
+          <a:xfrm flipH="1">
+            <a:off x="6840524" y="4279868"/>
+            <a:ext cx="651848" cy="0"/>
+          </a:xfrm>
+          <a:prstGeom prst="line">
+            <a:avLst/>
+          </a:prstGeom>
+        </p:spPr>
+        <p:style>
+          <a:lnRef idx="1">
+            <a:schemeClr val="accent1"/>
+          </a:lnRef>
+          <a:fillRef idx="0">
+            <a:schemeClr val="accent1"/>
+          </a:fillRef>
+          <a:effectRef idx="0">
+            <a:schemeClr val="accent1"/>
+          </a:effectRef>
+          <a:fontRef idx="minor">
+            <a:schemeClr val="tx1"/>
+          </a:fontRef>
+        </p:style>
+      </p:cxnSp>
+      <p:cxnSp>
+        <p:nvCxnSpPr>
+          <p:cNvPr id="33" name="Straight Connector 32">
+            <a:extLst>
+              <a:ext uri="{FF2B5EF4-FFF2-40B4-BE49-F238E27FC236}">
+                <a16:creationId xmlns:a16="http://schemas.microsoft.com/office/drawing/2014/main" id="{3AE5EB2D-68B6-38ED-6095-6C3674434A24}"/>
+              </a:ext>
+            </a:extLst>
+          </p:cNvPr>
+          <p:cNvCxnSpPr>
+            <a:cxnSpLocks/>
+          </p:cNvCxnSpPr>
+          <p:nvPr/>
+        </p:nvCxnSpPr>
+        <p:spPr>
+          <a:xfrm flipH="1">
+            <a:off x="6916716" y="4127471"/>
+            <a:ext cx="569300" cy="6999"/>
+          </a:xfrm>
+          <a:prstGeom prst="line">
+            <a:avLst/>
+          </a:prstGeom>
+        </p:spPr>
+        <p:style>
+          <a:lnRef idx="1">
+            <a:schemeClr val="accent1"/>
+          </a:lnRef>
+          <a:fillRef idx="0">
+            <a:schemeClr val="accent1"/>
+          </a:fillRef>
+          <a:effectRef idx="0">
+            <a:schemeClr val="accent1"/>
+          </a:effectRef>
+          <a:fontRef idx="minor">
+            <a:schemeClr val="tx1"/>
+          </a:fontRef>
+        </p:style>
+      </p:cxnSp>
+      <p:cxnSp>
+        <p:nvCxnSpPr>
+          <p:cNvPr id="36" name="Straight Connector 35">
+            <a:extLst>
+              <a:ext uri="{FF2B5EF4-FFF2-40B4-BE49-F238E27FC236}">
+                <a16:creationId xmlns:a16="http://schemas.microsoft.com/office/drawing/2014/main" id="{ED8ECCB6-1A21-0B41-B0AE-72A27843EC0C}"/>
+              </a:ext>
+            </a:extLst>
+          </p:cNvPr>
+          <p:cNvCxnSpPr>
+            <a:cxnSpLocks/>
+          </p:cNvCxnSpPr>
+          <p:nvPr/>
+        </p:nvCxnSpPr>
+        <p:spPr>
+          <a:xfrm flipV="1">
+            <a:off x="6916716" y="3393111"/>
+            <a:ext cx="0" cy="738763"/>
+          </a:xfrm>
+          <a:prstGeom prst="line">
+            <a:avLst/>
+          </a:prstGeom>
+        </p:spPr>
+        <p:style>
+          <a:lnRef idx="1">
+            <a:schemeClr val="accent1"/>
+          </a:lnRef>
+          <a:fillRef idx="0">
+            <a:schemeClr val="accent1"/>
+          </a:fillRef>
+          <a:effectRef idx="0">
+            <a:schemeClr val="accent1"/>
+          </a:effectRef>
+          <a:fontRef idx="minor">
+            <a:schemeClr val="tx1"/>
+          </a:fontRef>
+        </p:style>
+      </p:cxnSp>
+      <p:cxnSp>
+        <p:nvCxnSpPr>
+          <p:cNvPr id="40" name="Straight Connector 39">
+            <a:extLst>
+              <a:ext uri="{FF2B5EF4-FFF2-40B4-BE49-F238E27FC236}">
+                <a16:creationId xmlns:a16="http://schemas.microsoft.com/office/drawing/2014/main" id="{4356C864-598A-848F-AE78-F10CB154B6CD}"/>
+              </a:ext>
+            </a:extLst>
+          </p:cNvPr>
+          <p:cNvCxnSpPr>
+            <a:cxnSpLocks/>
+          </p:cNvCxnSpPr>
+          <p:nvPr/>
+        </p:nvCxnSpPr>
+        <p:spPr>
+          <a:xfrm flipH="1">
+            <a:off x="6991350" y="3852816"/>
+            <a:ext cx="432740" cy="5157"/>
+          </a:xfrm>
+          <a:prstGeom prst="line">
+            <a:avLst/>
+          </a:prstGeom>
+        </p:spPr>
+        <p:style>
+          <a:lnRef idx="1">
+            <a:schemeClr val="accent1"/>
+          </a:lnRef>
+          <a:fillRef idx="0">
+            <a:schemeClr val="accent1"/>
+          </a:fillRef>
+          <a:effectRef idx="0">
+            <a:schemeClr val="accent1"/>
+          </a:effectRef>
+          <a:fontRef idx="minor">
+            <a:schemeClr val="tx1"/>
+          </a:fontRef>
+        </p:style>
+      </p:cxnSp>
+      <p:cxnSp>
+        <p:nvCxnSpPr>
+          <p:cNvPr id="43" name="Straight Connector 42">
+            <a:extLst>
+              <a:ext uri="{FF2B5EF4-FFF2-40B4-BE49-F238E27FC236}">
+                <a16:creationId xmlns:a16="http://schemas.microsoft.com/office/drawing/2014/main" id="{4ADDD590-457D-BD0C-1F4F-319240BB44E6}"/>
+              </a:ext>
+            </a:extLst>
+          </p:cNvPr>
+          <p:cNvCxnSpPr>
+            <a:cxnSpLocks/>
+          </p:cNvCxnSpPr>
+          <p:nvPr/>
+        </p:nvCxnSpPr>
+        <p:spPr>
+          <a:xfrm flipH="1" flipV="1">
+            <a:off x="6991350" y="3327400"/>
+            <a:ext cx="4728" cy="531392"/>
+          </a:xfrm>
+          <a:prstGeom prst="line">
+            <a:avLst/>
+          </a:prstGeom>
+        </p:spPr>
+        <p:style>
+          <a:lnRef idx="1">
+            <a:schemeClr val="accent1"/>
+          </a:lnRef>
+          <a:fillRef idx="0">
+            <a:schemeClr val="accent1"/>
+          </a:fillRef>
+          <a:effectRef idx="0">
+            <a:schemeClr val="accent1"/>
+          </a:effectRef>
+          <a:fontRef idx="minor">
+            <a:schemeClr val="tx1"/>
+          </a:fontRef>
+        </p:style>
+      </p:cxnSp>
+      <p:cxnSp>
+        <p:nvCxnSpPr>
+          <p:cNvPr id="49" name="Straight Connector 48">
+            <a:extLst>
+              <a:ext uri="{FF2B5EF4-FFF2-40B4-BE49-F238E27FC236}">
+                <a16:creationId xmlns:a16="http://schemas.microsoft.com/office/drawing/2014/main" id="{1E016C0B-4B6F-25FA-DA07-81991E28DC48}"/>
+              </a:ext>
+            </a:extLst>
+          </p:cNvPr>
+          <p:cNvCxnSpPr>
+            <a:cxnSpLocks/>
+          </p:cNvCxnSpPr>
+          <p:nvPr/>
+        </p:nvCxnSpPr>
+        <p:spPr>
+          <a:xfrm flipH="1">
+            <a:off x="7070711" y="3656578"/>
+            <a:ext cx="374739" cy="0"/>
+          </a:xfrm>
+          <a:prstGeom prst="line">
+            <a:avLst/>
+          </a:prstGeom>
+        </p:spPr>
+        <p:style>
+          <a:lnRef idx="1">
+            <a:schemeClr val="accent1"/>
+          </a:lnRef>
+          <a:fillRef idx="0">
+            <a:schemeClr val="accent1"/>
+          </a:fillRef>
+          <a:effectRef idx="0">
+            <a:schemeClr val="accent1"/>
+          </a:effectRef>
+          <a:fontRef idx="minor">
+            <a:schemeClr val="tx1"/>
+          </a:fontRef>
+        </p:style>
+      </p:cxnSp>
+      <p:cxnSp>
+        <p:nvCxnSpPr>
+          <p:cNvPr id="52" name="Straight Connector 51">
+            <a:extLst>
+              <a:ext uri="{FF2B5EF4-FFF2-40B4-BE49-F238E27FC236}">
+                <a16:creationId xmlns:a16="http://schemas.microsoft.com/office/drawing/2014/main" id="{E79EF4FE-5BAA-7234-E5BD-FF3C59886BEA}"/>
+              </a:ext>
+            </a:extLst>
+          </p:cNvPr>
+          <p:cNvCxnSpPr>
+            <a:cxnSpLocks/>
+          </p:cNvCxnSpPr>
+          <p:nvPr/>
+        </p:nvCxnSpPr>
+        <p:spPr>
+          <a:xfrm flipV="1">
+            <a:off x="7069116" y="2915264"/>
+            <a:ext cx="0" cy="738763"/>
+          </a:xfrm>
+          <a:prstGeom prst="line">
+            <a:avLst/>
+          </a:prstGeom>
+        </p:spPr>
+        <p:style>
+          <a:lnRef idx="1">
+            <a:schemeClr val="accent1"/>
+          </a:lnRef>
+          <a:fillRef idx="0">
+            <a:schemeClr val="accent1"/>
+          </a:fillRef>
+          <a:effectRef idx="0">
+            <a:schemeClr val="accent1"/>
+          </a:effectRef>
+          <a:fontRef idx="minor">
+            <a:schemeClr val="tx1"/>
+          </a:fontRef>
+        </p:style>
+      </p:cxnSp>
+      <p:cxnSp>
+        <p:nvCxnSpPr>
+          <p:cNvPr id="58" name="Straight Connector 57">
+            <a:extLst>
+              <a:ext uri="{FF2B5EF4-FFF2-40B4-BE49-F238E27FC236}">
+                <a16:creationId xmlns:a16="http://schemas.microsoft.com/office/drawing/2014/main" id="{8D945EF1-09D6-BAE1-7118-2305CFA420AC}"/>
+              </a:ext>
+            </a:extLst>
+          </p:cNvPr>
+          <p:cNvCxnSpPr>
+            <a:cxnSpLocks/>
+          </p:cNvCxnSpPr>
+          <p:nvPr/>
+        </p:nvCxnSpPr>
+        <p:spPr>
+          <a:xfrm flipH="1">
+            <a:off x="6777038" y="4432268"/>
+            <a:ext cx="718507" cy="0"/>
+          </a:xfrm>
+          <a:prstGeom prst="line">
+            <a:avLst/>
+          </a:prstGeom>
+        </p:spPr>
+        <p:style>
+          <a:lnRef idx="1">
+            <a:schemeClr val="accent1"/>
+          </a:lnRef>
+          <a:fillRef idx="0">
+            <a:schemeClr val="accent1"/>
+          </a:fillRef>
+          <a:effectRef idx="0">
+            <a:schemeClr val="accent1"/>
+          </a:effectRef>
+          <a:fontRef idx="minor">
+            <a:schemeClr val="tx1"/>
+          </a:fontRef>
+        </p:style>
+      </p:cxnSp>
+      <p:pic>
+        <p:nvPicPr>
+          <p:cNvPr id="9" name="Picture 8">
+            <a:extLst>
+              <a:ext uri="{FF2B5EF4-FFF2-40B4-BE49-F238E27FC236}">
+                <a16:creationId xmlns:a16="http://schemas.microsoft.com/office/drawing/2014/main" id="{22DB966C-0E85-2632-17C2-CE23BDED3E60}"/>
+              </a:ext>
+            </a:extLst>
+          </p:cNvPr>
+          <p:cNvPicPr>
+            <a:picLocks noChangeAspect="1"/>
+          </p:cNvPicPr>
+          <p:nvPr/>
+        </p:nvPicPr>
+        <p:blipFill>
+          <a:blip r:embed="rId12"/>
+          <a:stretch>
+            <a:fillRect/>
+          </a:stretch>
+        </p:blipFill>
+        <p:spPr>
+          <a:xfrm>
+            <a:off x="1273070" y="2105384"/>
+            <a:ext cx="2005982" cy="706375"/>
+          </a:xfrm>
+          <a:prstGeom prst="rect">
+            <a:avLst/>
+          </a:prstGeom>
+        </p:spPr>
+      </p:pic>
     </p:spTree>
     <p:extLst>
       <p:ext uri="{BB962C8B-B14F-4D97-AF65-F5344CB8AC3E}">
-        <p14:creationId xmlns="" xmlns:p14="http://schemas.microsoft.com/office/powerpoint/2010/main" val="1004649057"/>
+        <p14:creationId xmlns:p14="http://schemas.microsoft.com/office/powerpoint/2010/main" val="1004649057"/>
       </p:ext>
     </p:extLst>
   </p:cSld>

</xml_diff>

<commit_message>
1K resistor at output of DCC decoder re-introduced. DCCInterface class changed to react to adresses only and not state.
</commit_message>
<xml_diff>
--- a/Diagram.pptx
+++ b/Diagram.pptx
@@ -109,7 +109,7 @@
   </p:defaultTextStyle>
   <p:extLst>
     <p:ext uri="{EFAFB233-063F-42B5-8137-9DF3F51BA10A}">
-      <p15:sldGuideLst xmlns:p15="http://schemas.microsoft.com/office/powerpoint/2012/main">
+      <p15:sldGuideLst xmlns:p15="http://schemas.microsoft.com/office/powerpoint/2012/main" xmlns="">
         <p15:guide id="1" orient="horz" pos="2160">
           <p15:clr>
             <a:srgbClr val="A4A3A4"/>
@@ -5591,7 +5591,7 @@
           <p:cNvPr id="3" name="Straight Connector 2">
             <a:extLst>
               <a:ext uri="{FF2B5EF4-FFF2-40B4-BE49-F238E27FC236}">
-                <a16:creationId xmlns:a16="http://schemas.microsoft.com/office/drawing/2014/main" id="{576723D5-C875-83D8-4E57-4E9EB941DFA8}"/>
+                <a16:creationId xmlns:a16="http://schemas.microsoft.com/office/drawing/2014/main" xmlns="" id="{576723D5-C875-83D8-4E57-4E9EB941DFA8}"/>
               </a:ext>
             </a:extLst>
           </p:cNvPr>
@@ -5632,7 +5632,7 @@
           <p:cNvPr id="5" name="Straight Connector 4">
             <a:extLst>
               <a:ext uri="{FF2B5EF4-FFF2-40B4-BE49-F238E27FC236}">
-                <a16:creationId xmlns:a16="http://schemas.microsoft.com/office/drawing/2014/main" id="{FE28DF91-3789-901B-5087-6AC47B0ADEED}"/>
+                <a16:creationId xmlns:a16="http://schemas.microsoft.com/office/drawing/2014/main" xmlns="" id="{FE28DF91-3789-901B-5087-6AC47B0ADEED}"/>
               </a:ext>
             </a:extLst>
           </p:cNvPr>
@@ -7504,7 +7504,7 @@
           <p:cNvPr id="3" name="Rectangle 2">
             <a:extLst>
               <a:ext uri="{FF2B5EF4-FFF2-40B4-BE49-F238E27FC236}">
-                <a16:creationId xmlns:a16="http://schemas.microsoft.com/office/drawing/2014/main" id="{FFEF0871-0309-1572-391B-5985ABE4CE01}"/>
+                <a16:creationId xmlns:a16="http://schemas.microsoft.com/office/drawing/2014/main" xmlns="" id="{FFEF0871-0309-1572-391B-5985ABE4CE01}"/>
               </a:ext>
             </a:extLst>
           </p:cNvPr>
@@ -7558,7 +7558,7 @@
           <p:cNvPr id="5" name="Rectangle 4">
             <a:extLst>
               <a:ext uri="{FF2B5EF4-FFF2-40B4-BE49-F238E27FC236}">
-                <a16:creationId xmlns:a16="http://schemas.microsoft.com/office/drawing/2014/main" id="{22B14C85-B862-AC4B-4E24-B2666F986BDA}"/>
+                <a16:creationId xmlns:a16="http://schemas.microsoft.com/office/drawing/2014/main" xmlns="" id="{22B14C85-B862-AC4B-4E24-B2666F986BDA}"/>
               </a:ext>
             </a:extLst>
           </p:cNvPr>
@@ -7612,7 +7612,7 @@
           <p:cNvPr id="2" name="TextBox 1">
             <a:extLst>
               <a:ext uri="{FF2B5EF4-FFF2-40B4-BE49-F238E27FC236}">
-                <a16:creationId xmlns:a16="http://schemas.microsoft.com/office/drawing/2014/main" id="{F62B988E-ABD2-B6BD-8DE5-484D49EFC299}"/>
+                <a16:creationId xmlns:a16="http://schemas.microsoft.com/office/drawing/2014/main" xmlns="" id="{F62B988E-ABD2-B6BD-8DE5-484D49EFC299}"/>
               </a:ext>
             </a:extLst>
           </p:cNvPr>
@@ -7648,7 +7648,7 @@
           <p:cNvPr id="6" name="TextBox 5">
             <a:extLst>
               <a:ext uri="{FF2B5EF4-FFF2-40B4-BE49-F238E27FC236}">
-                <a16:creationId xmlns:a16="http://schemas.microsoft.com/office/drawing/2014/main" id="{032073D1-5C86-096E-E34F-E839D76407AB}"/>
+                <a16:creationId xmlns:a16="http://schemas.microsoft.com/office/drawing/2014/main" xmlns="" id="{032073D1-5C86-096E-E34F-E839D76407AB}"/>
               </a:ext>
             </a:extLst>
           </p:cNvPr>
@@ -7684,7 +7684,7 @@
           <p:cNvPr id="7" name="Straight Connector 6">
             <a:extLst>
               <a:ext uri="{FF2B5EF4-FFF2-40B4-BE49-F238E27FC236}">
-                <a16:creationId xmlns:a16="http://schemas.microsoft.com/office/drawing/2014/main" id="{31790475-B929-D740-4390-015E0BD2F48D}"/>
+                <a16:creationId xmlns:a16="http://schemas.microsoft.com/office/drawing/2014/main" xmlns="" id="{31790475-B929-D740-4390-015E0BD2F48D}"/>
               </a:ext>
             </a:extLst>
           </p:cNvPr>
@@ -7725,7 +7725,7 @@
           <p:cNvPr id="8" name="Straight Connector 7">
             <a:extLst>
               <a:ext uri="{FF2B5EF4-FFF2-40B4-BE49-F238E27FC236}">
-                <a16:creationId xmlns:a16="http://schemas.microsoft.com/office/drawing/2014/main" id="{46648A93-25ED-D0F3-F7B8-144008FB16B7}"/>
+                <a16:creationId xmlns:a16="http://schemas.microsoft.com/office/drawing/2014/main" xmlns="" id="{46648A93-25ED-D0F3-F7B8-144008FB16B7}"/>
               </a:ext>
             </a:extLst>
           </p:cNvPr>
@@ -7766,7 +7766,7 @@
     </p:spTree>
     <p:extLst>
       <p:ext uri="{BB962C8B-B14F-4D97-AF65-F5344CB8AC3E}">
-        <p14:creationId xmlns:p14="http://schemas.microsoft.com/office/powerpoint/2010/main" val="1879124536"/>
+        <p14:creationId xmlns:p14="http://schemas.microsoft.com/office/powerpoint/2010/main" xmlns="" val="1879124536"/>
       </p:ext>
     </p:extLst>
   </p:cSld>
@@ -9056,7 +9056,7 @@
           <p:cNvPr id="3" name="Rectangle 2">
             <a:extLst>
               <a:ext uri="{FF2B5EF4-FFF2-40B4-BE49-F238E27FC236}">
-                <a16:creationId xmlns:a16="http://schemas.microsoft.com/office/drawing/2014/main" id="{FFEF0871-0309-1572-391B-5985ABE4CE01}"/>
+                <a16:creationId xmlns:a16="http://schemas.microsoft.com/office/drawing/2014/main" xmlns="" id="{FFEF0871-0309-1572-391B-5985ABE4CE01}"/>
               </a:ext>
             </a:extLst>
           </p:cNvPr>
@@ -9110,7 +9110,7 @@
           <p:cNvPr id="5" name="Rectangle 4">
             <a:extLst>
               <a:ext uri="{FF2B5EF4-FFF2-40B4-BE49-F238E27FC236}">
-                <a16:creationId xmlns:a16="http://schemas.microsoft.com/office/drawing/2014/main" id="{22B14C85-B862-AC4B-4E24-B2666F986BDA}"/>
+                <a16:creationId xmlns:a16="http://schemas.microsoft.com/office/drawing/2014/main" xmlns="" id="{22B14C85-B862-AC4B-4E24-B2666F986BDA}"/>
               </a:ext>
             </a:extLst>
           </p:cNvPr>
@@ -9164,7 +9164,7 @@
           <p:cNvPr id="2" name="TextBox 1">
             <a:extLst>
               <a:ext uri="{FF2B5EF4-FFF2-40B4-BE49-F238E27FC236}">
-                <a16:creationId xmlns:a16="http://schemas.microsoft.com/office/drawing/2014/main" id="{F62B988E-ABD2-B6BD-8DE5-484D49EFC299}"/>
+                <a16:creationId xmlns:a16="http://schemas.microsoft.com/office/drawing/2014/main" xmlns="" id="{F62B988E-ABD2-B6BD-8DE5-484D49EFC299}"/>
               </a:ext>
             </a:extLst>
           </p:cNvPr>
@@ -9200,7 +9200,7 @@
           <p:cNvPr id="6" name="TextBox 5">
             <a:extLst>
               <a:ext uri="{FF2B5EF4-FFF2-40B4-BE49-F238E27FC236}">
-                <a16:creationId xmlns:a16="http://schemas.microsoft.com/office/drawing/2014/main" id="{032073D1-5C86-096E-E34F-E839D76407AB}"/>
+                <a16:creationId xmlns:a16="http://schemas.microsoft.com/office/drawing/2014/main" xmlns="" id="{032073D1-5C86-096E-E34F-E839D76407AB}"/>
               </a:ext>
             </a:extLst>
           </p:cNvPr>
@@ -9236,7 +9236,7 @@
           <p:cNvPr id="18" name="Picture 17">
             <a:extLst>
               <a:ext uri="{FF2B5EF4-FFF2-40B4-BE49-F238E27FC236}">
-                <a16:creationId xmlns:a16="http://schemas.microsoft.com/office/drawing/2014/main" id="{AB95657D-99F1-D34C-92B6-10255E6E567F}"/>
+                <a16:creationId xmlns:a16="http://schemas.microsoft.com/office/drawing/2014/main" xmlns="" id="{AB95657D-99F1-D34C-92B6-10255E6E567F}"/>
               </a:ext>
             </a:extLst>
           </p:cNvPr>
@@ -9266,7 +9266,7 @@
           <p:cNvPr id="20" name="Picture 19">
             <a:extLst>
               <a:ext uri="{FF2B5EF4-FFF2-40B4-BE49-F238E27FC236}">
-                <a16:creationId xmlns:a16="http://schemas.microsoft.com/office/drawing/2014/main" id="{C09DE846-15F0-FDAB-B4C7-57DC529AD9DF}"/>
+                <a16:creationId xmlns:a16="http://schemas.microsoft.com/office/drawing/2014/main" xmlns="" id="{C09DE846-15F0-FDAB-B4C7-57DC529AD9DF}"/>
               </a:ext>
             </a:extLst>
           </p:cNvPr>
@@ -9296,7 +9296,7 @@
           <p:cNvPr id="22" name="Picture 21">
             <a:extLst>
               <a:ext uri="{FF2B5EF4-FFF2-40B4-BE49-F238E27FC236}">
-                <a16:creationId xmlns:a16="http://schemas.microsoft.com/office/drawing/2014/main" id="{68CFDBB9-9A7A-C1DC-EDEF-AB162E041FAE}"/>
+                <a16:creationId xmlns:a16="http://schemas.microsoft.com/office/drawing/2014/main" xmlns="" id="{68CFDBB9-9A7A-C1DC-EDEF-AB162E041FAE}"/>
               </a:ext>
             </a:extLst>
           </p:cNvPr>
@@ -9326,7 +9326,7 @@
           <p:cNvPr id="23" name="Picture 22">
             <a:extLst>
               <a:ext uri="{FF2B5EF4-FFF2-40B4-BE49-F238E27FC236}">
-                <a16:creationId xmlns:a16="http://schemas.microsoft.com/office/drawing/2014/main" id="{69D68710-3B44-B909-ADAC-FA9688495BE1}"/>
+                <a16:creationId xmlns:a16="http://schemas.microsoft.com/office/drawing/2014/main" xmlns="" id="{69D68710-3B44-B909-ADAC-FA9688495BE1}"/>
               </a:ext>
             </a:extLst>
           </p:cNvPr>
@@ -9356,7 +9356,7 @@
           <p:cNvPr id="24" name="TextBox 23">
             <a:extLst>
               <a:ext uri="{FF2B5EF4-FFF2-40B4-BE49-F238E27FC236}">
-                <a16:creationId xmlns:a16="http://schemas.microsoft.com/office/drawing/2014/main" id="{6491949F-0B8B-D8B9-30F5-0C2986FAC5A2}"/>
+                <a16:creationId xmlns:a16="http://schemas.microsoft.com/office/drawing/2014/main" xmlns="" id="{6491949F-0B8B-D8B9-30F5-0C2986FAC5A2}"/>
               </a:ext>
             </a:extLst>
           </p:cNvPr>
@@ -9392,7 +9392,7 @@
           <p:cNvPr id="29" name="Straight Connector 28">
             <a:extLst>
               <a:ext uri="{FF2B5EF4-FFF2-40B4-BE49-F238E27FC236}">
-                <a16:creationId xmlns:a16="http://schemas.microsoft.com/office/drawing/2014/main" id="{0D49A566-5B7F-D34D-3E43-FE185127CCDB}"/>
+                <a16:creationId xmlns:a16="http://schemas.microsoft.com/office/drawing/2014/main" xmlns="" id="{0D49A566-5B7F-D34D-3E43-FE185127CCDB}"/>
               </a:ext>
             </a:extLst>
           </p:cNvPr>
@@ -9428,7 +9428,7 @@
           <p:cNvPr id="31" name="Straight Connector 30">
             <a:extLst>
               <a:ext uri="{FF2B5EF4-FFF2-40B4-BE49-F238E27FC236}">
-                <a16:creationId xmlns:a16="http://schemas.microsoft.com/office/drawing/2014/main" id="{26A481AF-3F70-BE61-B85D-BFCC35BD3BD6}"/>
+                <a16:creationId xmlns:a16="http://schemas.microsoft.com/office/drawing/2014/main" xmlns="" id="{26A481AF-3F70-BE61-B85D-BFCC35BD3BD6}"/>
               </a:ext>
             </a:extLst>
           </p:cNvPr>
@@ -9466,7 +9466,7 @@
           <p:cNvPr id="34" name="Straight Connector 33">
             <a:extLst>
               <a:ext uri="{FF2B5EF4-FFF2-40B4-BE49-F238E27FC236}">
-                <a16:creationId xmlns:a16="http://schemas.microsoft.com/office/drawing/2014/main" id="{3D6012E6-6D5B-F289-961F-FA011B17512A}"/>
+                <a16:creationId xmlns:a16="http://schemas.microsoft.com/office/drawing/2014/main" xmlns="" id="{3D6012E6-6D5B-F289-961F-FA011B17512A}"/>
               </a:ext>
             </a:extLst>
           </p:cNvPr>
@@ -9504,7 +9504,7 @@
           <p:cNvPr id="47" name="Straight Connector 46">
             <a:extLst>
               <a:ext uri="{FF2B5EF4-FFF2-40B4-BE49-F238E27FC236}">
-                <a16:creationId xmlns:a16="http://schemas.microsoft.com/office/drawing/2014/main" id="{0A4A8CBD-1219-8D50-33BA-F5FEF58F5650}"/>
+                <a16:creationId xmlns:a16="http://schemas.microsoft.com/office/drawing/2014/main" xmlns="" id="{0A4A8CBD-1219-8D50-33BA-F5FEF58F5650}"/>
               </a:ext>
             </a:extLst>
           </p:cNvPr>
@@ -9542,7 +9542,7 @@
           <p:cNvPr id="51" name="Straight Connector 50">
             <a:extLst>
               <a:ext uri="{FF2B5EF4-FFF2-40B4-BE49-F238E27FC236}">
-                <a16:creationId xmlns:a16="http://schemas.microsoft.com/office/drawing/2014/main" id="{09F998D2-8EDC-52C6-38C9-7F5A3EFAED1E}"/>
+                <a16:creationId xmlns:a16="http://schemas.microsoft.com/office/drawing/2014/main" xmlns="" id="{09F998D2-8EDC-52C6-38C9-7F5A3EFAED1E}"/>
               </a:ext>
             </a:extLst>
           </p:cNvPr>
@@ -9578,7 +9578,7 @@
           <p:cNvPr id="53" name="Straight Connector 52">
             <a:extLst>
               <a:ext uri="{FF2B5EF4-FFF2-40B4-BE49-F238E27FC236}">
-                <a16:creationId xmlns:a16="http://schemas.microsoft.com/office/drawing/2014/main" id="{F720A4A6-D647-0DFD-3852-25AB813A17B3}"/>
+                <a16:creationId xmlns:a16="http://schemas.microsoft.com/office/drawing/2014/main" xmlns="" id="{F720A4A6-D647-0DFD-3852-25AB813A17B3}"/>
               </a:ext>
             </a:extLst>
           </p:cNvPr>
@@ -9614,7 +9614,7 @@
           <p:cNvPr id="57" name="Straight Connector 56">
             <a:extLst>
               <a:ext uri="{FF2B5EF4-FFF2-40B4-BE49-F238E27FC236}">
-                <a16:creationId xmlns:a16="http://schemas.microsoft.com/office/drawing/2014/main" id="{67E3784E-FCEA-17AD-5D68-82183ABFD7DD}"/>
+                <a16:creationId xmlns:a16="http://schemas.microsoft.com/office/drawing/2014/main" xmlns="" id="{67E3784E-FCEA-17AD-5D68-82183ABFD7DD}"/>
               </a:ext>
             </a:extLst>
           </p:cNvPr>
@@ -9652,7 +9652,7 @@
           <p:cNvPr id="62" name="Straight Connector 61">
             <a:extLst>
               <a:ext uri="{FF2B5EF4-FFF2-40B4-BE49-F238E27FC236}">
-                <a16:creationId xmlns:a16="http://schemas.microsoft.com/office/drawing/2014/main" id="{7727660B-60D5-3134-195A-D379982C0FF6}"/>
+                <a16:creationId xmlns:a16="http://schemas.microsoft.com/office/drawing/2014/main" xmlns="" id="{7727660B-60D5-3134-195A-D379982C0FF6}"/>
               </a:ext>
             </a:extLst>
           </p:cNvPr>
@@ -9690,7 +9690,7 @@
           <p:cNvPr id="65" name="Straight Connector 64">
             <a:extLst>
               <a:ext uri="{FF2B5EF4-FFF2-40B4-BE49-F238E27FC236}">
-                <a16:creationId xmlns:a16="http://schemas.microsoft.com/office/drawing/2014/main" id="{DEB4620B-C2B2-E6D6-1CC5-53201B8269D8}"/>
+                <a16:creationId xmlns:a16="http://schemas.microsoft.com/office/drawing/2014/main" xmlns="" id="{DEB4620B-C2B2-E6D6-1CC5-53201B8269D8}"/>
               </a:ext>
             </a:extLst>
           </p:cNvPr>
@@ -9728,7 +9728,7 @@
           <p:cNvPr id="75" name="Straight Connector 74">
             <a:extLst>
               <a:ext uri="{FF2B5EF4-FFF2-40B4-BE49-F238E27FC236}">
-                <a16:creationId xmlns:a16="http://schemas.microsoft.com/office/drawing/2014/main" id="{3915A501-B812-0A5D-9C8B-3AE6E58C67BF}"/>
+                <a16:creationId xmlns:a16="http://schemas.microsoft.com/office/drawing/2014/main" xmlns="" id="{3915A501-B812-0A5D-9C8B-3AE6E58C67BF}"/>
               </a:ext>
             </a:extLst>
           </p:cNvPr>
@@ -9766,7 +9766,7 @@
           <p:cNvPr id="78" name="Straight Connector 77">
             <a:extLst>
               <a:ext uri="{FF2B5EF4-FFF2-40B4-BE49-F238E27FC236}">
-                <a16:creationId xmlns:a16="http://schemas.microsoft.com/office/drawing/2014/main" id="{862DE9C4-3ED2-79CE-4851-2EE67E8CB872}"/>
+                <a16:creationId xmlns:a16="http://schemas.microsoft.com/office/drawing/2014/main" xmlns="" id="{862DE9C4-3ED2-79CE-4851-2EE67E8CB872}"/>
               </a:ext>
             </a:extLst>
           </p:cNvPr>
@@ -9804,7 +9804,7 @@
           <p:cNvPr id="81" name="Straight Connector 80">
             <a:extLst>
               <a:ext uri="{FF2B5EF4-FFF2-40B4-BE49-F238E27FC236}">
-                <a16:creationId xmlns:a16="http://schemas.microsoft.com/office/drawing/2014/main" id="{E5458755-91D9-4DEF-B2C8-89F087D1CBA1}"/>
+                <a16:creationId xmlns:a16="http://schemas.microsoft.com/office/drawing/2014/main" xmlns="" id="{E5458755-91D9-4DEF-B2C8-89F087D1CBA1}"/>
               </a:ext>
             </a:extLst>
           </p:cNvPr>
@@ -9842,7 +9842,7 @@
           <p:cNvPr id="61" name="Straight Connector 60">
             <a:extLst>
               <a:ext uri="{FF2B5EF4-FFF2-40B4-BE49-F238E27FC236}">
-                <a16:creationId xmlns:a16="http://schemas.microsoft.com/office/drawing/2014/main" id="{31790475-B929-D740-4390-015E0BD2F48D}"/>
+                <a16:creationId xmlns:a16="http://schemas.microsoft.com/office/drawing/2014/main" xmlns="" id="{31790475-B929-D740-4390-015E0BD2F48D}"/>
               </a:ext>
             </a:extLst>
           </p:cNvPr>
@@ -9883,7 +9883,7 @@
           <p:cNvPr id="63" name="Straight Connector 62">
             <a:extLst>
               <a:ext uri="{FF2B5EF4-FFF2-40B4-BE49-F238E27FC236}">
-                <a16:creationId xmlns:a16="http://schemas.microsoft.com/office/drawing/2014/main" id="{46648A93-25ED-D0F3-F7B8-144008FB16B7}"/>
+                <a16:creationId xmlns:a16="http://schemas.microsoft.com/office/drawing/2014/main" xmlns="" id="{46648A93-25ED-D0F3-F7B8-144008FB16B7}"/>
               </a:ext>
             </a:extLst>
           </p:cNvPr>
@@ -9924,7 +9924,7 @@
     </p:spTree>
     <p:extLst>
       <p:ext uri="{BB962C8B-B14F-4D97-AF65-F5344CB8AC3E}">
-        <p14:creationId xmlns:p14="http://schemas.microsoft.com/office/powerpoint/2010/main" val="1004649057"/>
+        <p14:creationId xmlns:p14="http://schemas.microsoft.com/office/powerpoint/2010/main" xmlns="" val="1004649057"/>
       </p:ext>
     </p:extLst>
   </p:cSld>
@@ -10556,7 +10556,7 @@
           <p:cNvPr id="5" name="Rectangle 4">
             <a:extLst>
               <a:ext uri="{FF2B5EF4-FFF2-40B4-BE49-F238E27FC236}">
-                <a16:creationId xmlns:a16="http://schemas.microsoft.com/office/drawing/2014/main" id="{22B14C85-B862-AC4B-4E24-B2666F986BDA}"/>
+                <a16:creationId xmlns:a16="http://schemas.microsoft.com/office/drawing/2014/main" xmlns="" id="{22B14C85-B862-AC4B-4E24-B2666F986BDA}"/>
               </a:ext>
             </a:extLst>
           </p:cNvPr>
@@ -10610,7 +10610,7 @@
           <p:cNvPr id="6" name="TextBox 5">
             <a:extLst>
               <a:ext uri="{FF2B5EF4-FFF2-40B4-BE49-F238E27FC236}">
-                <a16:creationId xmlns:a16="http://schemas.microsoft.com/office/drawing/2014/main" id="{032073D1-5C86-096E-E34F-E839D76407AB}"/>
+                <a16:creationId xmlns:a16="http://schemas.microsoft.com/office/drawing/2014/main" xmlns="" id="{032073D1-5C86-096E-E34F-E839D76407AB}"/>
               </a:ext>
             </a:extLst>
           </p:cNvPr>
@@ -10646,7 +10646,7 @@
           <p:cNvPr id="23" name="Picture 22">
             <a:extLst>
               <a:ext uri="{FF2B5EF4-FFF2-40B4-BE49-F238E27FC236}">
-                <a16:creationId xmlns:a16="http://schemas.microsoft.com/office/drawing/2014/main" id="{69D68710-3B44-B909-ADAC-FA9688495BE1}"/>
+                <a16:creationId xmlns:a16="http://schemas.microsoft.com/office/drawing/2014/main" xmlns="" id="{69D68710-3B44-B909-ADAC-FA9688495BE1}"/>
               </a:ext>
             </a:extLst>
           </p:cNvPr>
@@ -10676,7 +10676,7 @@
           <p:cNvPr id="24" name="TextBox 23">
             <a:extLst>
               <a:ext uri="{FF2B5EF4-FFF2-40B4-BE49-F238E27FC236}">
-                <a16:creationId xmlns:a16="http://schemas.microsoft.com/office/drawing/2014/main" id="{6491949F-0B8B-D8B9-30F5-0C2986FAC5A2}"/>
+                <a16:creationId xmlns:a16="http://schemas.microsoft.com/office/drawing/2014/main" xmlns="" id="{6491949F-0B8B-D8B9-30F5-0C2986FAC5A2}"/>
               </a:ext>
             </a:extLst>
           </p:cNvPr>
@@ -11114,7 +11114,7 @@
           <p:cNvPr id="99" name="TextBox 98">
             <a:extLst>
               <a:ext uri="{FF2B5EF4-FFF2-40B4-BE49-F238E27FC236}">
-                <a16:creationId xmlns:a16="http://schemas.microsoft.com/office/drawing/2014/main" id="{032073D1-5C86-096E-E34F-E839D76407AB}"/>
+                <a16:creationId xmlns:a16="http://schemas.microsoft.com/office/drawing/2014/main" xmlns="" id="{032073D1-5C86-096E-E34F-E839D76407AB}"/>
               </a:ext>
             </a:extLst>
           </p:cNvPr>
@@ -11150,7 +11150,7 @@
           <p:cNvPr id="100" name="TextBox 99">
             <a:extLst>
               <a:ext uri="{FF2B5EF4-FFF2-40B4-BE49-F238E27FC236}">
-                <a16:creationId xmlns:a16="http://schemas.microsoft.com/office/drawing/2014/main" id="{032073D1-5C86-096E-E34F-E839D76407AB}"/>
+                <a16:creationId xmlns:a16="http://schemas.microsoft.com/office/drawing/2014/main" xmlns="" id="{032073D1-5C86-096E-E34F-E839D76407AB}"/>
               </a:ext>
             </a:extLst>
           </p:cNvPr>
@@ -11190,7 +11190,7 @@
           <p:cNvPr id="101" name="TextBox 100">
             <a:extLst>
               <a:ext uri="{FF2B5EF4-FFF2-40B4-BE49-F238E27FC236}">
-                <a16:creationId xmlns:a16="http://schemas.microsoft.com/office/drawing/2014/main" id="{032073D1-5C86-096E-E34F-E839D76407AB}"/>
+                <a16:creationId xmlns:a16="http://schemas.microsoft.com/office/drawing/2014/main" xmlns="" id="{032073D1-5C86-096E-E34F-E839D76407AB}"/>
               </a:ext>
             </a:extLst>
           </p:cNvPr>
@@ -12615,7 +12615,7 @@
           <p:cNvPr id="185" name="TextBox 184">
             <a:extLst>
               <a:ext uri="{FF2B5EF4-FFF2-40B4-BE49-F238E27FC236}">
-                <a16:creationId xmlns:a16="http://schemas.microsoft.com/office/drawing/2014/main" id="{032073D1-5C86-096E-E34F-E839D76407AB}"/>
+                <a16:creationId xmlns:a16="http://schemas.microsoft.com/office/drawing/2014/main" xmlns="" id="{032073D1-5C86-096E-E34F-E839D76407AB}"/>
               </a:ext>
             </a:extLst>
           </p:cNvPr>
@@ -13491,7 +13491,7 @@
           <p:cNvPr id="138" name="TextBox 137">
             <a:extLst>
               <a:ext uri="{FF2B5EF4-FFF2-40B4-BE49-F238E27FC236}">
-                <a16:creationId xmlns:a16="http://schemas.microsoft.com/office/drawing/2014/main" id="{032073D1-5C86-096E-E34F-E839D76407AB}"/>
+                <a16:creationId xmlns:a16="http://schemas.microsoft.com/office/drawing/2014/main" xmlns="" id="{032073D1-5C86-096E-E34F-E839D76407AB}"/>
               </a:ext>
             </a:extLst>
           </p:cNvPr>
@@ -13527,7 +13527,7 @@
           <p:cNvPr id="2" name="Picture 12">
             <a:extLst>
               <a:ext uri="{FF2B5EF4-FFF2-40B4-BE49-F238E27FC236}">
-                <a16:creationId xmlns:a16="http://schemas.microsoft.com/office/drawing/2014/main" id="{5079BA80-EC62-5F39-BADE-1487F2631F71}"/>
+                <a16:creationId xmlns:a16="http://schemas.microsoft.com/office/drawing/2014/main" xmlns="" id="{5079BA80-EC62-5F39-BADE-1487F2631F71}"/>
               </a:ext>
             </a:extLst>
           </p:cNvPr>
@@ -13565,7 +13565,7 @@
           <p:cNvPr id="13" name="Picture 12">
             <a:extLst>
               <a:ext uri="{FF2B5EF4-FFF2-40B4-BE49-F238E27FC236}">
-                <a16:creationId xmlns:a16="http://schemas.microsoft.com/office/drawing/2014/main" id="{926E0306-8E9A-0FCC-C362-6A428D0D4159}"/>
+                <a16:creationId xmlns:a16="http://schemas.microsoft.com/office/drawing/2014/main" xmlns="" id="{926E0306-8E9A-0FCC-C362-6A428D0D4159}"/>
               </a:ext>
             </a:extLst>
           </p:cNvPr>
@@ -13575,7 +13575,7 @@
           <p:nvPr/>
         </p:nvPicPr>
         <p:blipFill>
-          <a:blip r:embed="rId10"/>
+          <a:blip r:embed="rId10" cstate="print"/>
           <a:stretch>
             <a:fillRect/>
           </a:stretch>
@@ -13595,7 +13595,7 @@
           <p:cNvPr id="14" name="Picture 13">
             <a:extLst>
               <a:ext uri="{FF2B5EF4-FFF2-40B4-BE49-F238E27FC236}">
-                <a16:creationId xmlns:a16="http://schemas.microsoft.com/office/drawing/2014/main" id="{BA09183D-BC67-B72F-4D48-2988EBB4FBF8}"/>
+                <a16:creationId xmlns:a16="http://schemas.microsoft.com/office/drawing/2014/main" xmlns="" id="{BA09183D-BC67-B72F-4D48-2988EBB4FBF8}"/>
               </a:ext>
             </a:extLst>
           </p:cNvPr>
@@ -13605,7 +13605,7 @@
           <p:nvPr/>
         </p:nvPicPr>
         <p:blipFill>
-          <a:blip r:embed="rId10"/>
+          <a:blip r:embed="rId10" cstate="print"/>
           <a:stretch>
             <a:fillRect/>
           </a:stretch>
@@ -13625,7 +13625,7 @@
           <p:cNvPr id="15" name="Picture 14">
             <a:extLst>
               <a:ext uri="{FF2B5EF4-FFF2-40B4-BE49-F238E27FC236}">
-                <a16:creationId xmlns:a16="http://schemas.microsoft.com/office/drawing/2014/main" id="{0035E1AE-297D-0ED3-D171-006709B5E627}"/>
+                <a16:creationId xmlns:a16="http://schemas.microsoft.com/office/drawing/2014/main" xmlns="" id="{0035E1AE-297D-0ED3-D171-006709B5E627}"/>
               </a:ext>
             </a:extLst>
           </p:cNvPr>
@@ -13635,7 +13635,7 @@
           <p:nvPr/>
         </p:nvPicPr>
         <p:blipFill>
-          <a:blip r:embed="rId10"/>
+          <a:blip r:embed="rId10" cstate="print"/>
           <a:stretch>
             <a:fillRect/>
           </a:stretch>
@@ -13655,7 +13655,7 @@
           <p:cNvPr id="16" name="Picture 15">
             <a:extLst>
               <a:ext uri="{FF2B5EF4-FFF2-40B4-BE49-F238E27FC236}">
-                <a16:creationId xmlns:a16="http://schemas.microsoft.com/office/drawing/2014/main" id="{53AF7CB3-787C-ACE4-124D-686114819F45}"/>
+                <a16:creationId xmlns:a16="http://schemas.microsoft.com/office/drawing/2014/main" xmlns="" id="{53AF7CB3-787C-ACE4-124D-686114819F45}"/>
               </a:ext>
             </a:extLst>
           </p:cNvPr>
@@ -13665,7 +13665,7 @@
           <p:nvPr/>
         </p:nvPicPr>
         <p:blipFill>
-          <a:blip r:embed="rId10"/>
+          <a:blip r:embed="rId10" cstate="print"/>
           <a:stretch>
             <a:fillRect/>
           </a:stretch>
@@ -13685,7 +13685,7 @@
           <p:cNvPr id="17" name="Picture 16">
             <a:extLst>
               <a:ext uri="{FF2B5EF4-FFF2-40B4-BE49-F238E27FC236}">
-                <a16:creationId xmlns:a16="http://schemas.microsoft.com/office/drawing/2014/main" id="{FE3DF6AF-B29D-A8CD-ECCC-6DDAD37366C8}"/>
+                <a16:creationId xmlns:a16="http://schemas.microsoft.com/office/drawing/2014/main" xmlns="" id="{FE3DF6AF-B29D-A8CD-ECCC-6DDAD37366C8}"/>
               </a:ext>
             </a:extLst>
           </p:cNvPr>
@@ -13715,7 +13715,7 @@
           <p:cNvPr id="19" name="Picture 18">
             <a:extLst>
               <a:ext uri="{FF2B5EF4-FFF2-40B4-BE49-F238E27FC236}">
-                <a16:creationId xmlns:a16="http://schemas.microsoft.com/office/drawing/2014/main" id="{8469CD3D-633E-DDBC-E304-5FC1C8D05407}"/>
+                <a16:creationId xmlns:a16="http://schemas.microsoft.com/office/drawing/2014/main" xmlns="" id="{8469CD3D-633E-DDBC-E304-5FC1C8D05407}"/>
               </a:ext>
             </a:extLst>
           </p:cNvPr>
@@ -13745,7 +13745,7 @@
           <p:cNvPr id="21" name="Picture 20">
             <a:extLst>
               <a:ext uri="{FF2B5EF4-FFF2-40B4-BE49-F238E27FC236}">
-                <a16:creationId xmlns:a16="http://schemas.microsoft.com/office/drawing/2014/main" id="{8FC55AEF-EEE4-359E-2477-E549D563E257}"/>
+                <a16:creationId xmlns:a16="http://schemas.microsoft.com/office/drawing/2014/main" xmlns="" id="{8FC55AEF-EEE4-359E-2477-E549D563E257}"/>
               </a:ext>
             </a:extLst>
           </p:cNvPr>
@@ -13775,7 +13775,7 @@
           <p:cNvPr id="30" name="Picture 29">
             <a:extLst>
               <a:ext uri="{FF2B5EF4-FFF2-40B4-BE49-F238E27FC236}">
-                <a16:creationId xmlns:a16="http://schemas.microsoft.com/office/drawing/2014/main" id="{983780EC-44D2-5136-E21D-CF6902658D96}"/>
+                <a16:creationId xmlns:a16="http://schemas.microsoft.com/office/drawing/2014/main" xmlns="" id="{983780EC-44D2-5136-E21D-CF6902658D96}"/>
               </a:ext>
             </a:extLst>
           </p:cNvPr>
@@ -13785,7 +13785,7 @@
           <p:nvPr/>
         </p:nvPicPr>
         <p:blipFill>
-          <a:blip r:embed="rId11"/>
+          <a:blip r:embed="rId11" cstate="print"/>
           <a:stretch>
             <a:fillRect/>
           </a:stretch>
@@ -13805,7 +13805,7 @@
           <p:cNvPr id="227" name="Picture 226">
             <a:extLst>
               <a:ext uri="{FF2B5EF4-FFF2-40B4-BE49-F238E27FC236}">
-                <a16:creationId xmlns:a16="http://schemas.microsoft.com/office/drawing/2014/main" id="{3EAA370D-C693-AA43-1043-5DCEAA889F37}"/>
+                <a16:creationId xmlns:a16="http://schemas.microsoft.com/office/drawing/2014/main" xmlns="" id="{3EAA370D-C693-AA43-1043-5DCEAA889F37}"/>
               </a:ext>
             </a:extLst>
           </p:cNvPr>
@@ -13815,7 +13815,7 @@
           <p:nvPr/>
         </p:nvPicPr>
         <p:blipFill>
-          <a:blip r:embed="rId11"/>
+          <a:blip r:embed="rId11" cstate="print"/>
           <a:stretch>
             <a:fillRect/>
           </a:stretch>
@@ -13835,7 +13835,7 @@
           <p:cNvPr id="229" name="TextBox 228">
             <a:extLst>
               <a:ext uri="{FF2B5EF4-FFF2-40B4-BE49-F238E27FC236}">
-                <a16:creationId xmlns:a16="http://schemas.microsoft.com/office/drawing/2014/main" id="{445D1F8C-9934-EF31-ACA7-B10896A3196C}"/>
+                <a16:creationId xmlns:a16="http://schemas.microsoft.com/office/drawing/2014/main" xmlns="" id="{445D1F8C-9934-EF31-ACA7-B10896A3196C}"/>
               </a:ext>
             </a:extLst>
           </p:cNvPr>
@@ -13871,7 +13871,7 @@
           <p:cNvPr id="231" name="Straight Connector 230">
             <a:extLst>
               <a:ext uri="{FF2B5EF4-FFF2-40B4-BE49-F238E27FC236}">
-                <a16:creationId xmlns:a16="http://schemas.microsoft.com/office/drawing/2014/main" id="{D37D587B-DF6A-9F24-86AC-157D9881356B}"/>
+                <a16:creationId xmlns:a16="http://schemas.microsoft.com/office/drawing/2014/main" xmlns="" id="{D37D587B-DF6A-9F24-86AC-157D9881356B}"/>
               </a:ext>
             </a:extLst>
           </p:cNvPr>
@@ -13909,7 +13909,7 @@
           <p:cNvPr id="235" name="Straight Connector 234">
             <a:extLst>
               <a:ext uri="{FF2B5EF4-FFF2-40B4-BE49-F238E27FC236}">
-                <a16:creationId xmlns:a16="http://schemas.microsoft.com/office/drawing/2014/main" id="{005D11A0-CD58-0FB9-8B62-DDACDE37DB5C}"/>
+                <a16:creationId xmlns:a16="http://schemas.microsoft.com/office/drawing/2014/main" xmlns="" id="{005D11A0-CD58-0FB9-8B62-DDACDE37DB5C}"/>
               </a:ext>
             </a:extLst>
           </p:cNvPr>
@@ -13947,7 +13947,7 @@
           <p:cNvPr id="236" name="Straight Connector 235">
             <a:extLst>
               <a:ext uri="{FF2B5EF4-FFF2-40B4-BE49-F238E27FC236}">
-                <a16:creationId xmlns:a16="http://schemas.microsoft.com/office/drawing/2014/main" id="{C5A1D8DF-B3E0-798F-8530-C5D7E698600C}"/>
+                <a16:creationId xmlns:a16="http://schemas.microsoft.com/office/drawing/2014/main" xmlns="" id="{C5A1D8DF-B3E0-798F-8530-C5D7E698600C}"/>
               </a:ext>
             </a:extLst>
           </p:cNvPr>
@@ -13985,7 +13985,7 @@
           <p:cNvPr id="237" name="Straight Connector 236">
             <a:extLst>
               <a:ext uri="{FF2B5EF4-FFF2-40B4-BE49-F238E27FC236}">
-                <a16:creationId xmlns:a16="http://schemas.microsoft.com/office/drawing/2014/main" id="{F2FAB770-EF47-B0D6-7FC3-AF2F6D4C6807}"/>
+                <a16:creationId xmlns:a16="http://schemas.microsoft.com/office/drawing/2014/main" xmlns="" id="{F2FAB770-EF47-B0D6-7FC3-AF2F6D4C6807}"/>
               </a:ext>
             </a:extLst>
           </p:cNvPr>
@@ -14023,7 +14023,7 @@
           <p:cNvPr id="238" name="Straight Connector 237">
             <a:extLst>
               <a:ext uri="{FF2B5EF4-FFF2-40B4-BE49-F238E27FC236}">
-                <a16:creationId xmlns:a16="http://schemas.microsoft.com/office/drawing/2014/main" id="{68BD5F20-F01C-5483-0883-45190AA4A302}"/>
+                <a16:creationId xmlns:a16="http://schemas.microsoft.com/office/drawing/2014/main" xmlns="" id="{68BD5F20-F01C-5483-0883-45190AA4A302}"/>
               </a:ext>
             </a:extLst>
           </p:cNvPr>
@@ -14061,7 +14061,7 @@
           <p:cNvPr id="239" name="Straight Connector 238">
             <a:extLst>
               <a:ext uri="{FF2B5EF4-FFF2-40B4-BE49-F238E27FC236}">
-                <a16:creationId xmlns:a16="http://schemas.microsoft.com/office/drawing/2014/main" id="{8C171B3C-7A62-E17F-30A3-262629949A93}"/>
+                <a16:creationId xmlns:a16="http://schemas.microsoft.com/office/drawing/2014/main" xmlns="" id="{8C171B3C-7A62-E17F-30A3-262629949A93}"/>
               </a:ext>
             </a:extLst>
           </p:cNvPr>
@@ -14099,7 +14099,7 @@
           <p:cNvPr id="241" name="Straight Connector 240">
             <a:extLst>
               <a:ext uri="{FF2B5EF4-FFF2-40B4-BE49-F238E27FC236}">
-                <a16:creationId xmlns:a16="http://schemas.microsoft.com/office/drawing/2014/main" id="{32616580-FC2A-63A3-317B-6500287F6247}"/>
+                <a16:creationId xmlns:a16="http://schemas.microsoft.com/office/drawing/2014/main" xmlns="" id="{32616580-FC2A-63A3-317B-6500287F6247}"/>
               </a:ext>
             </a:extLst>
           </p:cNvPr>
@@ -14137,7 +14137,7 @@
           <p:cNvPr id="243" name="Straight Connector 242">
             <a:extLst>
               <a:ext uri="{FF2B5EF4-FFF2-40B4-BE49-F238E27FC236}">
-                <a16:creationId xmlns:a16="http://schemas.microsoft.com/office/drawing/2014/main" id="{B47EA40F-9794-AFEA-4853-278F5596203B}"/>
+                <a16:creationId xmlns:a16="http://schemas.microsoft.com/office/drawing/2014/main" xmlns="" id="{B47EA40F-9794-AFEA-4853-278F5596203B}"/>
               </a:ext>
             </a:extLst>
           </p:cNvPr>
@@ -14175,7 +14175,7 @@
           <p:cNvPr id="247" name="Straight Connector 246">
             <a:extLst>
               <a:ext uri="{FF2B5EF4-FFF2-40B4-BE49-F238E27FC236}">
-                <a16:creationId xmlns:a16="http://schemas.microsoft.com/office/drawing/2014/main" id="{F68B6AAE-C39F-9C98-669F-583419C6DEBD}"/>
+                <a16:creationId xmlns:a16="http://schemas.microsoft.com/office/drawing/2014/main" xmlns="" id="{F68B6AAE-C39F-9C98-669F-583419C6DEBD}"/>
               </a:ext>
             </a:extLst>
           </p:cNvPr>
@@ -14213,7 +14213,7 @@
           <p:cNvPr id="251" name="Straight Connector 250">
             <a:extLst>
               <a:ext uri="{FF2B5EF4-FFF2-40B4-BE49-F238E27FC236}">
-                <a16:creationId xmlns:a16="http://schemas.microsoft.com/office/drawing/2014/main" id="{827BE5A2-F5E2-92EB-B9E2-B2D0052420BD}"/>
+                <a16:creationId xmlns:a16="http://schemas.microsoft.com/office/drawing/2014/main" xmlns="" id="{827BE5A2-F5E2-92EB-B9E2-B2D0052420BD}"/>
               </a:ext>
             </a:extLst>
           </p:cNvPr>
@@ -14251,7 +14251,7 @@
           <p:cNvPr id="254" name="Straight Connector 253">
             <a:extLst>
               <a:ext uri="{FF2B5EF4-FFF2-40B4-BE49-F238E27FC236}">
-                <a16:creationId xmlns:a16="http://schemas.microsoft.com/office/drawing/2014/main" id="{FA3B054A-EC21-3392-0305-0A76CB7B9D8A}"/>
+                <a16:creationId xmlns:a16="http://schemas.microsoft.com/office/drawing/2014/main" xmlns="" id="{FA3B054A-EC21-3392-0305-0A76CB7B9D8A}"/>
               </a:ext>
             </a:extLst>
           </p:cNvPr>
@@ -14289,7 +14289,7 @@
           <p:cNvPr id="33" name="Straight Connector 32">
             <a:extLst>
               <a:ext uri="{FF2B5EF4-FFF2-40B4-BE49-F238E27FC236}">
-                <a16:creationId xmlns:a16="http://schemas.microsoft.com/office/drawing/2014/main" id="{3AE5EB2D-68B6-38ED-6095-6C3674434A24}"/>
+                <a16:creationId xmlns:a16="http://schemas.microsoft.com/office/drawing/2014/main" xmlns="" id="{3AE5EB2D-68B6-38ED-6095-6C3674434A24}"/>
               </a:ext>
             </a:extLst>
           </p:cNvPr>
@@ -14327,7 +14327,7 @@
           <p:cNvPr id="36" name="Straight Connector 35">
             <a:extLst>
               <a:ext uri="{FF2B5EF4-FFF2-40B4-BE49-F238E27FC236}">
-                <a16:creationId xmlns:a16="http://schemas.microsoft.com/office/drawing/2014/main" id="{ED8ECCB6-1A21-0B41-B0AE-72A27843EC0C}"/>
+                <a16:creationId xmlns:a16="http://schemas.microsoft.com/office/drawing/2014/main" xmlns="" id="{ED8ECCB6-1A21-0B41-B0AE-72A27843EC0C}"/>
               </a:ext>
             </a:extLst>
           </p:cNvPr>
@@ -14365,7 +14365,7 @@
           <p:cNvPr id="40" name="Straight Connector 39">
             <a:extLst>
               <a:ext uri="{FF2B5EF4-FFF2-40B4-BE49-F238E27FC236}">
-                <a16:creationId xmlns:a16="http://schemas.microsoft.com/office/drawing/2014/main" id="{4356C864-598A-848F-AE78-F10CB154B6CD}"/>
+                <a16:creationId xmlns:a16="http://schemas.microsoft.com/office/drawing/2014/main" xmlns="" id="{4356C864-598A-848F-AE78-F10CB154B6CD}"/>
               </a:ext>
             </a:extLst>
           </p:cNvPr>
@@ -14403,7 +14403,7 @@
           <p:cNvPr id="43" name="Straight Connector 42">
             <a:extLst>
               <a:ext uri="{FF2B5EF4-FFF2-40B4-BE49-F238E27FC236}">
-                <a16:creationId xmlns:a16="http://schemas.microsoft.com/office/drawing/2014/main" id="{4ADDD590-457D-BD0C-1F4F-319240BB44E6}"/>
+                <a16:creationId xmlns:a16="http://schemas.microsoft.com/office/drawing/2014/main" xmlns="" id="{4ADDD590-457D-BD0C-1F4F-319240BB44E6}"/>
               </a:ext>
             </a:extLst>
           </p:cNvPr>
@@ -14441,7 +14441,7 @@
           <p:cNvPr id="49" name="Straight Connector 48">
             <a:extLst>
               <a:ext uri="{FF2B5EF4-FFF2-40B4-BE49-F238E27FC236}">
-                <a16:creationId xmlns:a16="http://schemas.microsoft.com/office/drawing/2014/main" id="{1E016C0B-4B6F-25FA-DA07-81991E28DC48}"/>
+                <a16:creationId xmlns:a16="http://schemas.microsoft.com/office/drawing/2014/main" xmlns="" id="{1E016C0B-4B6F-25FA-DA07-81991E28DC48}"/>
               </a:ext>
             </a:extLst>
           </p:cNvPr>
@@ -14479,7 +14479,7 @@
           <p:cNvPr id="52" name="Straight Connector 51">
             <a:extLst>
               <a:ext uri="{FF2B5EF4-FFF2-40B4-BE49-F238E27FC236}">
-                <a16:creationId xmlns:a16="http://schemas.microsoft.com/office/drawing/2014/main" id="{E79EF4FE-5BAA-7234-E5BD-FF3C59886BEA}"/>
+                <a16:creationId xmlns:a16="http://schemas.microsoft.com/office/drawing/2014/main" xmlns="" id="{E79EF4FE-5BAA-7234-E5BD-FF3C59886BEA}"/>
               </a:ext>
             </a:extLst>
           </p:cNvPr>
@@ -14517,7 +14517,7 @@
           <p:cNvPr id="58" name="Straight Connector 57">
             <a:extLst>
               <a:ext uri="{FF2B5EF4-FFF2-40B4-BE49-F238E27FC236}">
-                <a16:creationId xmlns:a16="http://schemas.microsoft.com/office/drawing/2014/main" id="{8D945EF1-09D6-BAE1-7118-2305CFA420AC}"/>
+                <a16:creationId xmlns:a16="http://schemas.microsoft.com/office/drawing/2014/main" xmlns="" id="{8D945EF1-09D6-BAE1-7118-2305CFA420AC}"/>
               </a:ext>
             </a:extLst>
           </p:cNvPr>
@@ -14552,38 +14552,40 @@
       </p:cxnSp>
       <p:pic>
         <p:nvPicPr>
-          <p:cNvPr id="9" name="Picture 8">
-            <a:extLst>
-              <a:ext uri="{FF2B5EF4-FFF2-40B4-BE49-F238E27FC236}">
-                <a16:creationId xmlns:a16="http://schemas.microsoft.com/office/drawing/2014/main" id="{22DB966C-0E85-2632-17C2-CE23BDED3E60}"/>
-              </a:ext>
-            </a:extLst>
-          </p:cNvPr>
+          <p:cNvPr id="153" name="Picture 14"/>
           <p:cNvPicPr>
-            <a:picLocks noChangeAspect="1"/>
+            <a:picLocks noChangeAspect="1" noChangeArrowheads="1"/>
           </p:cNvPicPr>
           <p:nvPr/>
         </p:nvPicPr>
         <p:blipFill>
-          <a:blip r:embed="rId12"/>
+          <a:blip r:embed="rId12" cstate="print"/>
+          <a:srcRect/>
           <a:stretch>
             <a:fillRect/>
           </a:stretch>
         </p:blipFill>
-        <p:spPr>
-          <a:xfrm>
-            <a:off x="1273070" y="2105384"/>
-            <a:ext cx="2005982" cy="706375"/>
+        <p:spPr bwMode="auto">
+          <a:xfrm>
+            <a:off x="1275064" y="2077157"/>
+            <a:ext cx="2005982" cy="736600"/>
           </a:xfrm>
           <a:prstGeom prst="rect">
             <a:avLst/>
           </a:prstGeom>
+          <a:noFill/>
+          <a:ln w="9525">
+            <a:noFill/>
+            <a:miter lim="800000"/>
+            <a:headEnd/>
+            <a:tailEnd/>
+          </a:ln>
         </p:spPr>
       </p:pic>
     </p:spTree>
     <p:extLst>
       <p:ext uri="{BB962C8B-B14F-4D97-AF65-F5344CB8AC3E}">
-        <p14:creationId xmlns:p14="http://schemas.microsoft.com/office/powerpoint/2010/main" val="1004649057"/>
+        <p14:creationId xmlns:p14="http://schemas.microsoft.com/office/powerpoint/2010/main" xmlns="" val="1004649057"/>
       </p:ext>
     </p:extLst>
   </p:cSld>

</xml_diff>

<commit_message>
Pull-up for IR photodiode changed to 1 M ohm.
</commit_message>
<xml_diff>
--- a/Diagram.pptx
+++ b/Diagram.pptx
@@ -14783,7 +14783,7 @@
       </p:grpSpPr>
       <p:pic>
         <p:nvPicPr>
-          <p:cNvPr id="192" name="Picture 15"/>
+          <p:cNvPr id="257" name="Picture 5"/>
           <p:cNvPicPr>
             <a:picLocks noChangeAspect="1" noChangeArrowheads="1"/>
           </p:cNvPicPr>
@@ -14798,8 +14798,8 @@
         </p:blipFill>
         <p:spPr bwMode="auto">
           <a:xfrm>
-            <a:off x="2038351" y="3104344"/>
-            <a:ext cx="1387474" cy="935420"/>
+            <a:off x="4827588" y="1835150"/>
+            <a:ext cx="182869" cy="466725"/>
           </a:xfrm>
           <a:prstGeom prst="rect">
             <a:avLst/>
@@ -14811,11 +14811,12 @@
             <a:headEnd/>
             <a:tailEnd/>
           </a:ln>
+          <a:effectLst/>
         </p:spPr>
       </p:pic>
       <p:pic>
         <p:nvPicPr>
-          <p:cNvPr id="1039" name="Picture 15"/>
+          <p:cNvPr id="258" name="Picture 5"/>
           <p:cNvPicPr>
             <a:picLocks noChangeAspect="1" noChangeArrowheads="1"/>
           </p:cNvPicPr>
@@ -14830,8 +14831,8 @@
         </p:blipFill>
         <p:spPr bwMode="auto">
           <a:xfrm>
-            <a:off x="2028826" y="4164794"/>
-            <a:ext cx="1387474" cy="935420"/>
+            <a:off x="4668838" y="2070099"/>
+            <a:ext cx="182869" cy="466725"/>
           </a:xfrm>
           <a:prstGeom prst="rect">
             <a:avLst/>
@@ -14843,11 +14844,78 @@
             <a:headEnd/>
             <a:tailEnd/>
           </a:ln>
+          <a:effectLst/>
         </p:spPr>
       </p:pic>
       <p:pic>
         <p:nvPicPr>
-          <p:cNvPr id="4" name="Picture 2"/>
+          <p:cNvPr id="259" name="Picture 5"/>
+          <p:cNvPicPr>
+            <a:picLocks noChangeAspect="1" noChangeArrowheads="1"/>
+          </p:cNvPicPr>
+          <p:nvPr/>
+        </p:nvPicPr>
+        <p:blipFill>
+          <a:blip r:embed="rId2" cstate="print"/>
+          <a:srcRect/>
+          <a:stretch>
+            <a:fillRect/>
+          </a:stretch>
+        </p:blipFill>
+        <p:spPr bwMode="auto">
+          <a:xfrm>
+            <a:off x="4521200" y="2305050"/>
+            <a:ext cx="182869" cy="466725"/>
+          </a:xfrm>
+          <a:prstGeom prst="rect">
+            <a:avLst/>
+          </a:prstGeom>
+          <a:noFill/>
+          <a:ln w="9525">
+            <a:noFill/>
+            <a:miter lim="800000"/>
+            <a:headEnd/>
+            <a:tailEnd/>
+          </a:ln>
+          <a:effectLst/>
+        </p:spPr>
+      </p:pic>
+      <p:pic>
+        <p:nvPicPr>
+          <p:cNvPr id="2053" name="Picture 5"/>
+          <p:cNvPicPr>
+            <a:picLocks noChangeAspect="1" noChangeArrowheads="1"/>
+          </p:cNvPicPr>
+          <p:nvPr/>
+        </p:nvPicPr>
+        <p:blipFill>
+          <a:blip r:embed="rId2" cstate="print"/>
+          <a:srcRect/>
+          <a:stretch>
+            <a:fillRect/>
+          </a:stretch>
+        </p:blipFill>
+        <p:spPr bwMode="auto">
+          <a:xfrm>
+            <a:off x="4983163" y="1597025"/>
+            <a:ext cx="182869" cy="466725"/>
+          </a:xfrm>
+          <a:prstGeom prst="rect">
+            <a:avLst/>
+          </a:prstGeom>
+          <a:noFill/>
+          <a:ln w="9525">
+            <a:noFill/>
+            <a:miter lim="800000"/>
+            <a:headEnd/>
+            <a:tailEnd/>
+          </a:ln>
+          <a:effectLst/>
+        </p:spPr>
+      </p:pic>
+      <p:pic>
+        <p:nvPicPr>
+          <p:cNvPr id="192" name="Picture 15"/>
           <p:cNvPicPr>
             <a:picLocks noChangeAspect="1" noChangeArrowheads="1"/>
           </p:cNvPicPr>
@@ -14862,8 +14930,8 @@
         </p:blipFill>
         <p:spPr bwMode="auto">
           <a:xfrm>
-            <a:off x="3889014" y="2706121"/>
-            <a:ext cx="2887878" cy="1518487"/>
+            <a:off x="2038351" y="3104344"/>
+            <a:ext cx="1387474" cy="935420"/>
           </a:xfrm>
           <a:prstGeom prst="rect">
             <a:avLst/>
@@ -14879,7 +14947,39 @@
       </p:pic>
       <p:pic>
         <p:nvPicPr>
-          <p:cNvPr id="1037" name="Picture 13"/>
+          <p:cNvPr id="1039" name="Picture 15"/>
+          <p:cNvPicPr>
+            <a:picLocks noChangeAspect="1" noChangeArrowheads="1"/>
+          </p:cNvPicPr>
+          <p:nvPr/>
+        </p:nvPicPr>
+        <p:blipFill>
+          <a:blip r:embed="rId3" cstate="print"/>
+          <a:srcRect/>
+          <a:stretch>
+            <a:fillRect/>
+          </a:stretch>
+        </p:blipFill>
+        <p:spPr bwMode="auto">
+          <a:xfrm>
+            <a:off x="2028826" y="4164794"/>
+            <a:ext cx="1387474" cy="935420"/>
+          </a:xfrm>
+          <a:prstGeom prst="rect">
+            <a:avLst/>
+          </a:prstGeom>
+          <a:noFill/>
+          <a:ln w="9525">
+            <a:noFill/>
+            <a:miter lim="800000"/>
+            <a:headEnd/>
+            <a:tailEnd/>
+          </a:ln>
+        </p:spPr>
+      </p:pic>
+      <p:pic>
+        <p:nvPicPr>
+          <p:cNvPr id="4" name="Picture 2"/>
           <p:cNvPicPr>
             <a:picLocks noChangeAspect="1" noChangeArrowheads="1"/>
           </p:cNvPicPr>
@@ -14894,8 +14994,8 @@
         </p:blipFill>
         <p:spPr bwMode="auto">
           <a:xfrm>
-            <a:off x="7154864" y="2495550"/>
-            <a:ext cx="851671" cy="947738"/>
+            <a:off x="3889014" y="2706121"/>
+            <a:ext cx="2887878" cy="1518487"/>
           </a:xfrm>
           <a:prstGeom prst="rect">
             <a:avLst/>
@@ -14911,6 +15011,38 @@
       </p:pic>
       <p:pic>
         <p:nvPicPr>
+          <p:cNvPr id="1037" name="Picture 13"/>
+          <p:cNvPicPr>
+            <a:picLocks noChangeAspect="1" noChangeArrowheads="1"/>
+          </p:cNvPicPr>
+          <p:nvPr/>
+        </p:nvPicPr>
+        <p:blipFill>
+          <a:blip r:embed="rId5" cstate="print"/>
+          <a:srcRect/>
+          <a:stretch>
+            <a:fillRect/>
+          </a:stretch>
+        </p:blipFill>
+        <p:spPr bwMode="auto">
+          <a:xfrm>
+            <a:off x="7154864" y="2495550"/>
+            <a:ext cx="851671" cy="947738"/>
+          </a:xfrm>
+          <a:prstGeom prst="rect">
+            <a:avLst/>
+          </a:prstGeom>
+          <a:noFill/>
+          <a:ln w="9525">
+            <a:noFill/>
+            <a:miter lim="800000"/>
+            <a:headEnd/>
+            <a:tailEnd/>
+          </a:ln>
+        </p:spPr>
+      </p:pic>
+      <p:pic>
+        <p:nvPicPr>
           <p:cNvPr id="110" name="Picture 12"/>
           <p:cNvPicPr>
             <a:picLocks noChangeAspect="1" noChangeArrowheads="1"/>
@@ -14918,7 +15050,7 @@
           <p:nvPr/>
         </p:nvPicPr>
         <p:blipFill>
-          <a:blip r:embed="rId5" cstate="print"/>
+          <a:blip r:embed="rId6" cstate="print"/>
           <a:srcRect/>
           <a:stretch>
             <a:fillRect/>
@@ -15480,7 +15612,7 @@
           <p:nvPr/>
         </p:nvPicPr>
         <p:blipFill>
-          <a:blip r:embed="rId6" cstate="print"/>
+          <a:blip r:embed="rId7" cstate="print"/>
           <a:srcRect/>
           <a:stretch>
             <a:fillRect/>
@@ -15783,7 +15915,7 @@
           <p:nvPr/>
         </p:nvPicPr>
         <p:blipFill>
-          <a:blip r:embed="rId7" cstate="print"/>
+          <a:blip r:embed="rId8" cstate="print"/>
           <a:srcRect/>
           <a:stretch>
             <a:fillRect/>
@@ -15816,7 +15948,7 @@
           <p:nvPr/>
         </p:nvPicPr>
         <p:blipFill>
-          <a:blip r:embed="rId7" cstate="print"/>
+          <a:blip r:embed="rId8" cstate="print"/>
           <a:srcRect/>
           <a:stretch>
             <a:fillRect/>
@@ -15849,7 +15981,7 @@
           <p:nvPr/>
         </p:nvPicPr>
         <p:blipFill>
-          <a:blip r:embed="rId7" cstate="print"/>
+          <a:blip r:embed="rId8" cstate="print"/>
           <a:srcRect/>
           <a:stretch>
             <a:fillRect/>
@@ -17188,7 +17320,7 @@
           <p:nvPr/>
         </p:nvPicPr>
         <p:blipFill>
-          <a:blip r:embed="rId8" cstate="print"/>
+          <a:blip r:embed="rId9" cstate="print"/>
           <a:srcRect/>
           <a:stretch>
             <a:fillRect/>
@@ -17221,7 +17353,7 @@
           <p:nvPr/>
         </p:nvPicPr>
         <p:blipFill>
-          <a:blip r:embed="rId5" cstate="print"/>
+          <a:blip r:embed="rId6" cstate="print"/>
           <a:srcRect/>
           <a:stretch>
             <a:fillRect/>
@@ -18261,7 +18393,7 @@
           <p:nvPr/>
         </p:nvPicPr>
         <p:blipFill>
-          <a:blip r:embed="rId5" cstate="print"/>
+          <a:blip r:embed="rId6" cstate="print"/>
           <a:srcRect/>
           <a:stretch>
             <a:fillRect/>
@@ -18299,7 +18431,7 @@
           <p:nvPr/>
         </p:nvPicPr>
         <p:blipFill>
-          <a:blip r:embed="rId9" cstate="print"/>
+          <a:blip r:embed="rId10" cstate="print"/>
           <a:stretch>
             <a:fillRect/>
           </a:stretch>
@@ -18329,7 +18461,7 @@
           <p:nvPr/>
         </p:nvPicPr>
         <p:blipFill>
-          <a:blip r:embed="rId9" cstate="print"/>
+          <a:blip r:embed="rId10" cstate="print"/>
           <a:stretch>
             <a:fillRect/>
           </a:stretch>
@@ -18921,7 +19053,7 @@
           <p:nvPr/>
         </p:nvPicPr>
         <p:blipFill>
-          <a:blip r:embed="rId10" cstate="print"/>
+          <a:blip r:embed="rId11" cstate="print"/>
           <a:srcRect/>
           <a:stretch>
             <a:fillRect/>
@@ -18947,39 +19079,6 @@
       <p:pic>
         <p:nvPicPr>
           <p:cNvPr id="2051" name="Picture 3"/>
-          <p:cNvPicPr>
-            <a:picLocks noChangeAspect="1" noChangeArrowheads="1"/>
-          </p:cNvPicPr>
-          <p:nvPr/>
-        </p:nvPicPr>
-        <p:blipFill>
-          <a:blip r:embed="rId11" cstate="print"/>
-          <a:srcRect/>
-          <a:stretch>
-            <a:fillRect/>
-          </a:stretch>
-        </p:blipFill>
-        <p:spPr bwMode="auto">
-          <a:xfrm>
-            <a:off x="4565396" y="4424299"/>
-            <a:ext cx="287020" cy="563001"/>
-          </a:xfrm>
-          <a:prstGeom prst="rect">
-            <a:avLst/>
-          </a:prstGeom>
-          <a:noFill/>
-          <a:ln w="9525">
-            <a:noFill/>
-            <a:miter lim="800000"/>
-            <a:headEnd/>
-            <a:tailEnd/>
-          </a:ln>
-          <a:effectLst/>
-        </p:spPr>
-      </p:pic>
-      <p:pic>
-        <p:nvPicPr>
-          <p:cNvPr id="2052" name="Picture 4"/>
           <p:cNvPicPr>
             <a:picLocks noChangeAspect="1" noChangeArrowheads="1"/>
           </p:cNvPicPr>
@@ -18994,8 +19093,8 @@
         </p:blipFill>
         <p:spPr bwMode="auto">
           <a:xfrm>
-            <a:off x="4492626" y="2308036"/>
-            <a:ext cx="206636" cy="468375"/>
+            <a:off x="4565396" y="4424299"/>
+            <a:ext cx="287020" cy="563001"/>
           </a:xfrm>
           <a:prstGeom prst="rect">
             <a:avLst/>
@@ -19057,7 +19156,7 @@
           <p:nvPr/>
         </p:nvPicPr>
         <p:blipFill>
-          <a:blip r:embed="rId11" cstate="print"/>
+          <a:blip r:embed="rId12" cstate="print"/>
           <a:srcRect/>
           <a:stretch>
             <a:fillRect/>
@@ -19084,72 +19183,6 @@
       <p:pic>
         <p:nvPicPr>
           <p:cNvPr id="193" name="Picture 3"/>
-          <p:cNvPicPr>
-            <a:picLocks noChangeAspect="1" noChangeArrowheads="1"/>
-          </p:cNvPicPr>
-          <p:nvPr/>
-        </p:nvPicPr>
-        <p:blipFill>
-          <a:blip r:embed="rId11" cstate="print"/>
-          <a:srcRect/>
-          <a:stretch>
-            <a:fillRect/>
-          </a:stretch>
-        </p:blipFill>
-        <p:spPr bwMode="auto">
-          <a:xfrm>
-            <a:off x="5394452" y="4424299"/>
-            <a:ext cx="287020" cy="563001"/>
-          </a:xfrm>
-          <a:prstGeom prst="rect">
-            <a:avLst/>
-          </a:prstGeom>
-          <a:noFill/>
-          <a:ln w="9525">
-            <a:noFill/>
-            <a:miter lim="800000"/>
-            <a:headEnd/>
-            <a:tailEnd/>
-          </a:ln>
-          <a:effectLst/>
-        </p:spPr>
-      </p:pic>
-      <p:pic>
-        <p:nvPicPr>
-          <p:cNvPr id="194" name="Picture 3"/>
-          <p:cNvPicPr>
-            <a:picLocks noChangeAspect="1" noChangeArrowheads="1"/>
-          </p:cNvPicPr>
-          <p:nvPr/>
-        </p:nvPicPr>
-        <p:blipFill>
-          <a:blip r:embed="rId11" cstate="print"/>
-          <a:srcRect/>
-          <a:stretch>
-            <a:fillRect/>
-          </a:stretch>
-        </p:blipFill>
-        <p:spPr bwMode="auto">
-          <a:xfrm>
-            <a:off x="5808980" y="4424299"/>
-            <a:ext cx="287020" cy="563001"/>
-          </a:xfrm>
-          <a:prstGeom prst="rect">
-            <a:avLst/>
-          </a:prstGeom>
-          <a:noFill/>
-          <a:ln w="9525">
-            <a:noFill/>
-            <a:miter lim="800000"/>
-            <a:headEnd/>
-            <a:tailEnd/>
-          </a:ln>
-          <a:effectLst/>
-        </p:spPr>
-      </p:pic>
-      <p:pic>
-        <p:nvPicPr>
-          <p:cNvPr id="212" name="Picture 4"/>
           <p:cNvPicPr>
             <a:picLocks noChangeAspect="1" noChangeArrowheads="1"/>
           </p:cNvPicPr>
@@ -19164,8 +19197,8 @@
         </p:blipFill>
         <p:spPr bwMode="auto">
           <a:xfrm>
-            <a:off x="4647142" y="2072373"/>
-            <a:ext cx="206636" cy="468375"/>
+            <a:off x="5394452" y="4424299"/>
+            <a:ext cx="287020" cy="563001"/>
           </a:xfrm>
           <a:prstGeom prst="rect">
             <a:avLst/>
@@ -19182,7 +19215,7 @@
       </p:pic>
       <p:pic>
         <p:nvPicPr>
-          <p:cNvPr id="213" name="Picture 4"/>
+          <p:cNvPr id="194" name="Picture 3"/>
           <p:cNvPicPr>
             <a:picLocks noChangeAspect="1" noChangeArrowheads="1"/>
           </p:cNvPicPr>
@@ -19197,41 +19230,8 @@
         </p:blipFill>
         <p:spPr bwMode="auto">
           <a:xfrm>
-            <a:off x="4801658" y="1836710"/>
-            <a:ext cx="206636" cy="468375"/>
-          </a:xfrm>
-          <a:prstGeom prst="rect">
-            <a:avLst/>
-          </a:prstGeom>
-          <a:noFill/>
-          <a:ln w="9525">
-            <a:noFill/>
-            <a:miter lim="800000"/>
-            <a:headEnd/>
-            <a:tailEnd/>
-          </a:ln>
-          <a:effectLst/>
-        </p:spPr>
-      </p:pic>
-      <p:pic>
-        <p:nvPicPr>
-          <p:cNvPr id="215" name="Picture 4"/>
-          <p:cNvPicPr>
-            <a:picLocks noChangeAspect="1" noChangeArrowheads="1"/>
-          </p:cNvPicPr>
-          <p:nvPr/>
-        </p:nvPicPr>
-        <p:blipFill>
-          <a:blip r:embed="rId12" cstate="print"/>
-          <a:srcRect/>
-          <a:stretch>
-            <a:fillRect/>
-          </a:stretch>
-        </p:blipFill>
-        <p:spPr bwMode="auto">
-          <a:xfrm>
-            <a:off x="4956175" y="1601047"/>
-            <a:ext cx="206636" cy="468375"/>
+            <a:off x="5808980" y="4424299"/>
+            <a:ext cx="287020" cy="563001"/>
           </a:xfrm>
           <a:prstGeom prst="rect">
             <a:avLst/>

</xml_diff>